<commit_message>
renamed vardesc -> descriptions
</commit_message>
<xml_diff>
--- a/docs/Simar overview.pptx
+++ b/docs/Simar overview.pptx
@@ -10,15 +10,18 @@
     <p:sldId id="263" r:id="rId4"/>
     <p:sldId id="260" r:id="rId5"/>
     <p:sldId id="270" r:id="rId6"/>
-    <p:sldId id="261" r:id="rId7"/>
-    <p:sldId id="269" r:id="rId8"/>
-    <p:sldId id="264" r:id="rId9"/>
-    <p:sldId id="268" r:id="rId10"/>
-    <p:sldId id="267" r:id="rId11"/>
-    <p:sldId id="266" r:id="rId12"/>
-    <p:sldId id="265" r:id="rId13"/>
-    <p:sldId id="257" r:id="rId14"/>
-    <p:sldId id="259" r:id="rId15"/>
+    <p:sldId id="271" r:id="rId7"/>
+    <p:sldId id="273" r:id="rId8"/>
+    <p:sldId id="261" r:id="rId9"/>
+    <p:sldId id="269" r:id="rId10"/>
+    <p:sldId id="264" r:id="rId11"/>
+    <p:sldId id="268" r:id="rId12"/>
+    <p:sldId id="267" r:id="rId13"/>
+    <p:sldId id="266" r:id="rId14"/>
+    <p:sldId id="272" r:id="rId15"/>
+    <p:sldId id="265" r:id="rId16"/>
+    <p:sldId id="257" r:id="rId17"/>
+    <p:sldId id="259" r:id="rId18"/>
   </p:sldIdLst>
   <p:sldSz cx="9144000" cy="6858000" type="screen4x3"/>
   <p:notesSz cx="6858000" cy="9144000"/>
@@ -301,7 +304,7 @@
           <a:p>
             <a:fld id="{3ACCE87F-A4BF-4D9A-9320-ACD565033031}" type="datetimeFigureOut">
               <a:rPr lang="en-NZ" smtClean="0"/>
-              <a:t>26/01/2012</a:t>
+              <a:t>27/01/2012</a:t>
             </a:fld>
             <a:endParaRPr lang="en-NZ"/>
           </a:p>
@@ -466,7 +469,7 @@
           <a:p>
             <a:fld id="{3ACCE87F-A4BF-4D9A-9320-ACD565033031}" type="datetimeFigureOut">
               <a:rPr lang="en-NZ" smtClean="0"/>
-              <a:t>26/01/2012</a:t>
+              <a:t>27/01/2012</a:t>
             </a:fld>
             <a:endParaRPr lang="en-NZ"/>
           </a:p>
@@ -641,7 +644,7 @@
           <a:p>
             <a:fld id="{3ACCE87F-A4BF-4D9A-9320-ACD565033031}" type="datetimeFigureOut">
               <a:rPr lang="en-NZ" smtClean="0"/>
-              <a:t>26/01/2012</a:t>
+              <a:t>27/01/2012</a:t>
             </a:fld>
             <a:endParaRPr lang="en-NZ"/>
           </a:p>
@@ -806,7 +809,7 @@
           <a:p>
             <a:fld id="{3ACCE87F-A4BF-4D9A-9320-ACD565033031}" type="datetimeFigureOut">
               <a:rPr lang="en-NZ" smtClean="0"/>
-              <a:t>26/01/2012</a:t>
+              <a:t>27/01/2012</a:t>
             </a:fld>
             <a:endParaRPr lang="en-NZ"/>
           </a:p>
@@ -1047,7 +1050,7 @@
           <a:p>
             <a:fld id="{3ACCE87F-A4BF-4D9A-9320-ACD565033031}" type="datetimeFigureOut">
               <a:rPr lang="en-NZ" smtClean="0"/>
-              <a:t>26/01/2012</a:t>
+              <a:t>27/01/2012</a:t>
             </a:fld>
             <a:endParaRPr lang="en-NZ"/>
           </a:p>
@@ -1330,7 +1333,7 @@
           <a:p>
             <a:fld id="{3ACCE87F-A4BF-4D9A-9320-ACD565033031}" type="datetimeFigureOut">
               <a:rPr lang="en-NZ" smtClean="0"/>
-              <a:t>26/01/2012</a:t>
+              <a:t>27/01/2012</a:t>
             </a:fld>
             <a:endParaRPr lang="en-NZ"/>
           </a:p>
@@ -1747,7 +1750,7 @@
           <a:p>
             <a:fld id="{3ACCE87F-A4BF-4D9A-9320-ACD565033031}" type="datetimeFigureOut">
               <a:rPr lang="en-NZ" smtClean="0"/>
-              <a:t>26/01/2012</a:t>
+              <a:t>27/01/2012</a:t>
             </a:fld>
             <a:endParaRPr lang="en-NZ"/>
           </a:p>
@@ -1860,7 +1863,7 @@
           <a:p>
             <a:fld id="{3ACCE87F-A4BF-4D9A-9320-ACD565033031}" type="datetimeFigureOut">
               <a:rPr lang="en-NZ" smtClean="0"/>
-              <a:t>26/01/2012</a:t>
+              <a:t>27/01/2012</a:t>
             </a:fld>
             <a:endParaRPr lang="en-NZ"/>
           </a:p>
@@ -1950,7 +1953,7 @@
           <a:p>
             <a:fld id="{3ACCE87F-A4BF-4D9A-9320-ACD565033031}" type="datetimeFigureOut">
               <a:rPr lang="en-NZ" smtClean="0"/>
-              <a:t>26/01/2012</a:t>
+              <a:t>27/01/2012</a:t>
             </a:fld>
             <a:endParaRPr lang="en-NZ"/>
           </a:p>
@@ -2222,7 +2225,7 @@
           <a:p>
             <a:fld id="{3ACCE87F-A4BF-4D9A-9320-ACD565033031}" type="datetimeFigureOut">
               <a:rPr lang="en-NZ" smtClean="0"/>
-              <a:t>26/01/2012</a:t>
+              <a:t>27/01/2012</a:t>
             </a:fld>
             <a:endParaRPr lang="en-NZ"/>
           </a:p>
@@ -2470,7 +2473,7 @@
           <a:p>
             <a:fld id="{3ACCE87F-A4BF-4D9A-9320-ACD565033031}" type="datetimeFigureOut">
               <a:rPr lang="en-NZ" smtClean="0"/>
-              <a:t>26/01/2012</a:t>
+              <a:t>27/01/2012</a:t>
             </a:fld>
             <a:endParaRPr lang="en-NZ"/>
           </a:p>
@@ -2678,7 +2681,7 @@
           <a:p>
             <a:fld id="{3ACCE87F-A4BF-4D9A-9320-ACD565033031}" type="datetimeFigureOut">
               <a:rPr lang="en-NZ" smtClean="0"/>
-              <a:t>26/01/2012</a:t>
+              <a:t>27/01/2012</a:t>
             </a:fld>
             <a:endParaRPr lang="en-NZ"/>
           </a:p>
@@ -3123,384 +3126,108 @@
         </p:nvSpPr>
         <p:spPr/>
         <p:txBody>
-          <a:bodyPr/>
+          <a:bodyPr>
+            <a:normAutofit/>
+          </a:bodyPr>
           <a:lstStyle/>
           <a:p>
             <a:r>
+              <a:rPr lang="en-NZ" dirty="0" smtClean="0"/>
+              <a:t>The master </a:t>
+            </a:r>
+            <a:r>
               <a:rPr lang="en-NZ" dirty="0" err="1" smtClean="0"/>
-              <a:t>Simframe</a:t>
-            </a:r>
+              <a:t>simframe</a:t>
+            </a:r>
+            <a:endParaRPr lang="en-NZ" dirty="0"/>
+          </a:p>
+        </p:txBody>
+      </p:sp>
+      <p:sp>
+        <p:nvSpPr>
+          <p:cNvPr id="3" name="Content Placeholder 2"/>
+          <p:cNvSpPr>
+            <a:spLocks noGrp="1"/>
+          </p:cNvSpPr>
+          <p:nvPr>
+            <p:ph idx="1"/>
+          </p:nvPr>
+        </p:nvSpPr>
+        <p:spPr/>
+        <p:txBody>
+          <a:bodyPr>
+            <a:normAutofit/>
+          </a:bodyPr>
+          <a:lstStyle/>
+          <a:p>
             <a:r>
               <a:rPr lang="en-NZ" dirty="0" smtClean="0"/>
-              <a:t> definition file</a:t>
-            </a:r>
+              <a:t>The master </a:t>
+            </a:r>
+            <a:r>
+              <a:rPr lang="en-NZ" dirty="0" err="1" smtClean="0"/>
+              <a:t>simframe</a:t>
+            </a:r>
+            <a:r>
+              <a:rPr lang="en-NZ" dirty="0" smtClean="0"/>
+              <a:t> is initialised from a </a:t>
+            </a:r>
+            <a:r>
+              <a:rPr lang="en-NZ" dirty="0" err="1" smtClean="0"/>
+              <a:t>simframe</a:t>
+            </a:r>
+            <a:r>
+              <a:rPr lang="en-NZ" dirty="0" smtClean="0"/>
+              <a:t> definition file.</a:t>
+            </a:r>
+          </a:p>
+          <a:p>
+            <a:r>
+              <a:rPr lang="en-NZ" dirty="0" smtClean="0"/>
+              <a:t>Each </a:t>
+            </a:r>
+            <a:r>
+              <a:rPr lang="en-NZ" dirty="0" err="1" smtClean="0"/>
+              <a:t>simframe</a:t>
+            </a:r>
+            <a:r>
+              <a:rPr lang="en-NZ" dirty="0" smtClean="0"/>
+              <a:t> variable is populated with initial values, as specified by the definition file.</a:t>
+            </a:r>
+          </a:p>
+          <a:p>
+            <a:r>
+              <a:rPr lang="en-NZ" dirty="0" smtClean="0"/>
+              <a:t>The master </a:t>
+            </a:r>
+            <a:r>
+              <a:rPr lang="en-NZ" dirty="0" err="1" smtClean="0"/>
+              <a:t>simframe</a:t>
+            </a:r>
+            <a:r>
+              <a:rPr lang="en-NZ" dirty="0" smtClean="0"/>
+              <a:t> is typically stored in the global variable </a:t>
+            </a:r>
+            <a:r>
+              <a:rPr lang="en-NZ" dirty="0" err="1" smtClean="0">
+                <a:latin typeface="Courier New" pitchFamily="49" charset="0"/>
+                <a:cs typeface="Courier New" pitchFamily="49" charset="0"/>
+              </a:rPr>
+              <a:t>simframe.master</a:t>
+            </a:r>
+            <a:endParaRPr lang="en-NZ" dirty="0" smtClean="0">
+              <a:latin typeface="Courier New" pitchFamily="49" charset="0"/>
+              <a:cs typeface="Courier New" pitchFamily="49" charset="0"/>
+            </a:endParaRPr>
+          </a:p>
+          <a:p>
+            <a:endParaRPr lang="en-NZ" dirty="0" smtClean="0"/>
+          </a:p>
+          <a:p>
             <a:endParaRPr lang="en-NZ" dirty="0"/>
           </a:p>
         </p:txBody>
       </p:sp>
-      <p:graphicFrame>
-        <p:nvGraphicFramePr>
-          <p:cNvPr id="4" name="Content Placeholder 3"/>
-          <p:cNvGraphicFramePr>
-            <a:graphicFrameLocks noGrp="1"/>
-          </p:cNvGraphicFramePr>
-          <p:nvPr>
-            <p:ph idx="1"/>
-          </p:nvPr>
-        </p:nvGraphicFramePr>
-        <p:xfrm>
-          <a:off x="457200" y="1600200"/>
-          <a:ext cx="8229600" cy="2392680"/>
-        </p:xfrm>
-        <a:graphic>
-          <a:graphicData uri="http://schemas.openxmlformats.org/drawingml/2006/table">
-            <a:tbl>
-              <a:tblPr firstRow="1" bandRow="1">
-                <a:tableStyleId>{5C22544A-7EE6-4342-B048-85BDC9FD1C3A}</a:tableStyleId>
-              </a:tblPr>
-              <a:tblGrid>
-                <a:gridCol w="1378496"/>
-                <a:gridCol w="1512168"/>
-                <a:gridCol w="1656184"/>
-                <a:gridCol w="1728192"/>
-                <a:gridCol w="1954560"/>
-              </a:tblGrid>
-              <a:tr h="370840">
-                <a:tc>
-                  <a:txBody>
-                    <a:bodyPr/>
-                    <a:lstStyle/>
-                    <a:p>
-                      <a:r>
-                        <a:rPr lang="en-NZ" smtClean="0"/>
-                        <a:t>Varname</a:t>
-                      </a:r>
-                      <a:endParaRPr lang="en-NZ" dirty="0"/>
-                    </a:p>
-                  </a:txBody>
-                  <a:tcPr/>
-                </a:tc>
-                <a:tc>
-                  <a:txBody>
-                    <a:bodyPr/>
-                    <a:lstStyle/>
-                    <a:p>
-                      <a:r>
-                        <a:rPr lang="en-NZ" dirty="0" err="1" smtClean="0"/>
-                        <a:t>Previous_var</a:t>
-                      </a:r>
-                      <a:endParaRPr lang="en-NZ" dirty="0"/>
-                    </a:p>
-                  </a:txBody>
-                  <a:tcPr/>
-                </a:tc>
-                <a:tc>
-                  <a:txBody>
-                    <a:bodyPr/>
-                    <a:lstStyle/>
-                    <a:p>
-                      <a:r>
-                        <a:rPr lang="en-NZ" dirty="0" err="1" smtClean="0"/>
-                        <a:t>Initial_value</a:t>
-                      </a:r>
-                      <a:endParaRPr lang="en-NZ" dirty="0"/>
-                    </a:p>
-                  </a:txBody>
-                  <a:tcPr/>
-                </a:tc>
-                <a:tc>
-                  <a:txBody>
-                    <a:bodyPr/>
-                    <a:lstStyle/>
-                    <a:p>
-                      <a:r>
-                        <a:rPr lang="en-NZ" dirty="0" err="1" smtClean="0"/>
-                        <a:t>Outcome_type</a:t>
-                      </a:r>
-                      <a:endParaRPr lang="en-NZ" dirty="0"/>
-                    </a:p>
-                  </a:txBody>
-                  <a:tcPr/>
-                </a:tc>
-                <a:tc>
-                  <a:txBody>
-                    <a:bodyPr/>
-                    <a:lstStyle/>
-                    <a:p>
-                      <a:r>
-                        <a:rPr lang="en-NZ" dirty="0" err="1" smtClean="0"/>
-                        <a:t>Outcome_module</a:t>
-                      </a:r>
-                      <a:endParaRPr lang="en-NZ" dirty="0"/>
-                    </a:p>
-                  </a:txBody>
-                  <a:tcPr/>
-                </a:tc>
-              </a:tr>
-              <a:tr h="370840">
-                <a:tc>
-                  <a:txBody>
-                    <a:bodyPr/>
-                    <a:lstStyle/>
-                    <a:p>
-                      <a:r>
-                        <a:rPr lang="en-NZ" dirty="0" smtClean="0"/>
-                        <a:t>Age</a:t>
-                      </a:r>
-                      <a:endParaRPr lang="en-NZ" dirty="0"/>
-                    </a:p>
-                  </a:txBody>
-                  <a:tcPr/>
-                </a:tc>
-                <a:tc>
-                  <a:txBody>
-                    <a:bodyPr/>
-                    <a:lstStyle/>
-                    <a:p>
-                      <a:endParaRPr lang="en-NZ" dirty="0"/>
-                    </a:p>
-                  </a:txBody>
-                  <a:tcPr/>
-                </a:tc>
-                <a:tc>
-                  <a:txBody>
-                    <a:bodyPr/>
-                    <a:lstStyle/>
-                    <a:p>
-                      <a:r>
-                        <a:rPr lang="en-NZ" dirty="0" err="1" smtClean="0"/>
-                        <a:t>Basefile_age</a:t>
-                      </a:r>
-                      <a:endParaRPr lang="en-NZ" dirty="0"/>
-                    </a:p>
-                  </a:txBody>
-                  <a:tcPr/>
-                </a:tc>
-                <a:tc>
-                  <a:txBody>
-                    <a:bodyPr/>
-                    <a:lstStyle/>
-                    <a:p>
-                      <a:endParaRPr lang="en-NZ" dirty="0"/>
-                    </a:p>
-                  </a:txBody>
-                  <a:tcPr/>
-                </a:tc>
-                <a:tc>
-                  <a:txBody>
-                    <a:bodyPr/>
-                    <a:lstStyle/>
-                    <a:p>
-                      <a:endParaRPr lang="en-NZ" dirty="0"/>
-                    </a:p>
-                  </a:txBody>
-                  <a:tcPr/>
-                </a:tc>
-              </a:tr>
-              <a:tr h="370840">
-                <a:tc>
-                  <a:txBody>
-                    <a:bodyPr/>
-                    <a:lstStyle/>
-                    <a:p>
-                      <a:r>
-                        <a:rPr lang="en-NZ" dirty="0" smtClean="0"/>
-                        <a:t>Health</a:t>
-                      </a:r>
-                      <a:endParaRPr lang="en-NZ" dirty="0"/>
-                    </a:p>
-                  </a:txBody>
-                  <a:tcPr/>
-                </a:tc>
-                <a:tc>
-                  <a:txBody>
-                    <a:bodyPr/>
-                    <a:lstStyle/>
-                    <a:p>
-                      <a:r>
-                        <a:rPr lang="en-NZ" dirty="0" err="1" smtClean="0"/>
-                        <a:t>Health_previous</a:t>
-                      </a:r>
-                      <a:endParaRPr lang="en-NZ" dirty="0"/>
-                    </a:p>
-                  </a:txBody>
-                  <a:tcPr/>
-                </a:tc>
-                <a:tc>
-                  <a:txBody>
-                    <a:bodyPr/>
-                    <a:lstStyle/>
-                    <a:p>
-                      <a:r>
-                        <a:rPr lang="en-NZ" dirty="0" smtClean="0"/>
-                        <a:t>0</a:t>
-                      </a:r>
-                      <a:endParaRPr lang="en-NZ" dirty="0"/>
-                    </a:p>
-                  </a:txBody>
-                  <a:tcPr/>
-                </a:tc>
-                <a:tc>
-                  <a:txBody>
-                    <a:bodyPr/>
-                    <a:lstStyle/>
-                    <a:p>
-                      <a:r>
-                        <a:rPr lang="en-NZ" dirty="0" smtClean="0"/>
-                        <a:t>categorical</a:t>
-                      </a:r>
-                      <a:endParaRPr lang="en-NZ" dirty="0"/>
-                    </a:p>
-                  </a:txBody>
-                  <a:tcPr/>
-                </a:tc>
-                <a:tc>
-                  <a:txBody>
-                    <a:bodyPr/>
-                    <a:lstStyle/>
-                    <a:p>
-                      <a:r>
-                        <a:rPr lang="en-NZ" dirty="0" smtClean="0"/>
-                        <a:t>Main</a:t>
-                      </a:r>
-                      <a:endParaRPr lang="en-NZ" dirty="0"/>
-                    </a:p>
-                  </a:txBody>
-                  <a:tcPr/>
-                </a:tc>
-              </a:tr>
-              <a:tr h="370840">
-                <a:tc>
-                  <a:txBody>
-                    <a:bodyPr/>
-                    <a:lstStyle/>
-                    <a:p>
-                      <a:r>
-                        <a:rPr lang="en-NZ" dirty="0" err="1" smtClean="0"/>
-                        <a:t>Health_previous</a:t>
-                      </a:r>
-                      <a:endParaRPr lang="en-NZ" dirty="0"/>
-                    </a:p>
-                  </a:txBody>
-                  <a:tcPr/>
-                </a:tc>
-                <a:tc>
-                  <a:txBody>
-                    <a:bodyPr/>
-                    <a:lstStyle/>
-                    <a:p>
-                      <a:endParaRPr lang="en-NZ" dirty="0"/>
-                    </a:p>
-                  </a:txBody>
-                  <a:tcPr/>
-                </a:tc>
-                <a:tc>
-                  <a:txBody>
-                    <a:bodyPr/>
-                    <a:lstStyle/>
-                    <a:p>
-                      <a:r>
-                        <a:rPr lang="en-NZ" dirty="0" smtClean="0"/>
-                        <a:t>NA</a:t>
-                      </a:r>
-                      <a:endParaRPr lang="en-NZ" dirty="0"/>
-                    </a:p>
-                  </a:txBody>
-                  <a:tcPr/>
-                </a:tc>
-                <a:tc>
-                  <a:txBody>
-                    <a:bodyPr/>
-                    <a:lstStyle/>
-                    <a:p>
-                      <a:endParaRPr lang="en-NZ" dirty="0"/>
-                    </a:p>
-                  </a:txBody>
-                  <a:tcPr/>
-                </a:tc>
-                <a:tc>
-                  <a:txBody>
-                    <a:bodyPr/>
-                    <a:lstStyle/>
-                    <a:p>
-                      <a:endParaRPr lang="en-NZ" dirty="0"/>
-                    </a:p>
-                  </a:txBody>
-                  <a:tcPr/>
-                </a:tc>
-              </a:tr>
-              <a:tr h="370840">
-                <a:tc>
-                  <a:txBody>
-                    <a:bodyPr/>
-                    <a:lstStyle/>
-                    <a:p>
-                      <a:r>
-                        <a:rPr lang="en-NZ" dirty="0" smtClean="0"/>
-                        <a:t>Earnings</a:t>
-                      </a:r>
-                      <a:endParaRPr lang="en-NZ" dirty="0"/>
-                    </a:p>
-                  </a:txBody>
-                  <a:tcPr/>
-                </a:tc>
-                <a:tc>
-                  <a:txBody>
-                    <a:bodyPr/>
-                    <a:lstStyle/>
-                    <a:p>
-                      <a:endParaRPr lang="en-NZ" dirty="0"/>
-                    </a:p>
-                  </a:txBody>
-                  <a:tcPr/>
-                </a:tc>
-                <a:tc>
-                  <a:txBody>
-                    <a:bodyPr/>
-                    <a:lstStyle/>
-                    <a:p>
-                      <a:r>
-                        <a:rPr lang="en-NZ" dirty="0" smtClean="0"/>
-                        <a:t>0</a:t>
-                      </a:r>
-                      <a:endParaRPr lang="en-NZ" dirty="0"/>
-                    </a:p>
-                  </a:txBody>
-                  <a:tcPr/>
-                </a:tc>
-                <a:tc>
-                  <a:txBody>
-                    <a:bodyPr/>
-                    <a:lstStyle/>
-                    <a:p>
-                      <a:r>
-                        <a:rPr lang="en-NZ" dirty="0" smtClean="0"/>
-                        <a:t>continuous</a:t>
-                      </a:r>
-                      <a:endParaRPr lang="en-NZ" dirty="0"/>
-                    </a:p>
-                  </a:txBody>
-                  <a:tcPr/>
-                </a:tc>
-                <a:tc>
-                  <a:txBody>
-                    <a:bodyPr/>
-                    <a:lstStyle/>
-                    <a:p>
-                      <a:r>
-                        <a:rPr lang="en-NZ" dirty="0" smtClean="0"/>
-                        <a:t>Main</a:t>
-                      </a:r>
-                      <a:endParaRPr lang="en-NZ" dirty="0"/>
-                    </a:p>
-                  </a:txBody>
-                  <a:tcPr/>
-                </a:tc>
-              </a:tr>
-            </a:tbl>
-          </a:graphicData>
-        </a:graphic>
-      </p:graphicFrame>
     </p:spTree>
   </p:cSld>
   <p:clrMapOvr>
@@ -3542,16 +3269,12 @@
           <a:lstStyle/>
           <a:p>
             <a:r>
+              <a:rPr lang="en-NZ" dirty="0" err="1" smtClean="0"/>
+              <a:t>Simframe</a:t>
+            </a:r>
+            <a:r>
               <a:rPr lang="en-NZ" dirty="0" smtClean="0"/>
-              <a:t>1 </a:t>
-            </a:r>
-            <a:r>
-              <a:rPr lang="en-NZ" dirty="0" err="1" smtClean="0"/>
-              <a:t>simframe</a:t>
-            </a:r>
-            <a:r>
-              <a:rPr lang="en-NZ" dirty="0" smtClean="0"/>
-              <a:t> per environment</a:t>
+              <a:t> definition file</a:t>
             </a:r>
             <a:endParaRPr lang="en-NZ" dirty="0"/>
           </a:p>
@@ -3569,12 +3292,25 @@
         </p:nvSpPr>
         <p:spPr/>
         <p:txBody>
-          <a:bodyPr/>
+          <a:bodyPr>
+            <a:normAutofit fontScale="70000" lnSpcReduction="20000"/>
+          </a:bodyPr>
           <a:lstStyle/>
           <a:p>
             <a:r>
+              <a:rPr lang="en-NZ" dirty="0" err="1" smtClean="0"/>
+              <a:t>Varname</a:t>
+            </a:r>
+            <a:r>
               <a:rPr lang="en-NZ" dirty="0" smtClean="0"/>
-              <a:t>When a simulation environment is created, it takes a copy of the master </a:t>
+              <a:t>: </a:t>
+            </a:r>
+          </a:p>
+          <a:p>
+            <a:pPr lvl="1"/>
+            <a:r>
+              <a:rPr lang="en-NZ" dirty="0" smtClean="0"/>
+              <a:t>the name of a variable in the </a:t>
             </a:r>
             <a:r>
               <a:rPr lang="en-NZ" dirty="0" err="1" smtClean="0"/>
@@ -3584,20 +3320,132 @@
           </a:p>
           <a:p>
             <a:r>
+              <a:rPr lang="en-NZ" dirty="0" err="1" smtClean="0"/>
+              <a:t>Previous_var</a:t>
+            </a:r>
+            <a:endParaRPr lang="en-NZ" dirty="0" smtClean="0"/>
+          </a:p>
+          <a:p>
+            <a:pPr lvl="1"/>
+            <a:r>
               <a:rPr lang="en-NZ" dirty="0" smtClean="0"/>
-              <a:t>Before simulating, a environment’s </a:t>
-            </a:r>
+              <a:t>the </a:t>
+            </a:r>
+            <a:r>
+              <a:rPr lang="en-NZ" dirty="0"/>
+              <a:t>name of a variable in which to store the current value in at the </a:t>
+            </a:r>
+            <a:r>
+              <a:rPr lang="en-NZ" dirty="0" smtClean="0"/>
+              <a:t>beginning of </a:t>
+            </a:r>
+            <a:r>
+              <a:rPr lang="en-NZ" dirty="0"/>
+              <a:t>each iteration (</a:t>
+            </a:r>
+            <a:r>
+              <a:rPr lang="en-NZ" dirty="0" err="1"/>
+              <a:t>i.e</a:t>
+            </a:r>
+            <a:r>
+              <a:rPr lang="en-NZ" dirty="0"/>
+              <a:t>: before it's transformed</a:t>
+            </a:r>
+            <a:r>
+              <a:rPr lang="en-NZ" dirty="0" smtClean="0"/>
+              <a:t>).</a:t>
+            </a:r>
+          </a:p>
+          <a:p>
+            <a:pPr lvl="1"/>
+            <a:r>
+              <a:rPr lang="en-NZ" dirty="0" smtClean="0"/>
+              <a:t>Optional </a:t>
+            </a:r>
+            <a:r>
+              <a:rPr lang="en-NZ" dirty="0"/>
+              <a:t>- for models that require previous state</a:t>
+            </a:r>
+            <a:r>
+              <a:rPr lang="en-NZ" dirty="0" smtClean="0"/>
+              <a:t>.</a:t>
+            </a:r>
+            <a:endParaRPr lang="en-NZ" dirty="0"/>
+          </a:p>
+          <a:p>
             <a:r>
               <a:rPr lang="en-NZ" dirty="0" err="1" smtClean="0"/>
-              <a:t>simframe</a:t>
+              <a:t>Initial_value</a:t>
+            </a:r>
+            <a:endParaRPr lang="en-NZ" dirty="0" smtClean="0"/>
+          </a:p>
+          <a:p>
+            <a:pPr lvl="1"/>
+            <a:r>
+              <a:rPr lang="en-NZ" dirty="0"/>
+              <a:t>an expression that generates the initial value of the variable</a:t>
             </a:r>
             <a:r>
               <a:rPr lang="en-NZ" dirty="0" smtClean="0"/>
-              <a:t> may be modified to test a particular scenario</a:t>
-            </a:r>
-          </a:p>
-          <a:p>
-            <a:endParaRPr lang="en-NZ" dirty="0"/>
+              <a:t>. Typically this expression will reference values in a previously loaded </a:t>
+            </a:r>
+            <a:r>
+              <a:rPr lang="en-NZ" dirty="0" err="1" smtClean="0"/>
+              <a:t>basefile</a:t>
+            </a:r>
+            <a:r>
+              <a:rPr lang="en-NZ" dirty="0" smtClean="0"/>
+              <a:t>.</a:t>
+            </a:r>
+          </a:p>
+          <a:p>
+            <a:r>
+              <a:rPr lang="en-NZ" dirty="0" err="1" smtClean="0"/>
+              <a:t>Outcome_type</a:t>
+            </a:r>
+            <a:endParaRPr lang="en-NZ" dirty="0" smtClean="0"/>
+          </a:p>
+          <a:p>
+            <a:pPr lvl="1"/>
+            <a:r>
+              <a:rPr lang="en-NZ" dirty="0"/>
+              <a:t>i</a:t>
+            </a:r>
+            <a:r>
+              <a:rPr lang="en-NZ" dirty="0" smtClean="0"/>
+              <a:t>f specified, indicates this is an outcome variable and indicates its type which is one of “categorical” or “continuous”</a:t>
+            </a:r>
+          </a:p>
+          <a:p>
+            <a:r>
+              <a:rPr lang="en-NZ" dirty="0" err="1" smtClean="0"/>
+              <a:t>Outcome_module</a:t>
+            </a:r>
+            <a:endParaRPr lang="en-NZ" dirty="0" smtClean="0"/>
+          </a:p>
+          <a:p>
+            <a:pPr lvl="1"/>
+            <a:r>
+              <a:rPr lang="en-NZ" dirty="0"/>
+              <a:t>if specified, indicates the </a:t>
+            </a:r>
+            <a:r>
+              <a:rPr lang="en-NZ" dirty="0" err="1" smtClean="0"/>
+              <a:t>Simmodule</a:t>
+            </a:r>
+            <a:r>
+              <a:rPr lang="en-NZ" dirty="0" smtClean="0"/>
+              <a:t> </a:t>
+            </a:r>
+            <a:r>
+              <a:rPr lang="en-NZ" dirty="0"/>
+              <a:t>this outcome variable belongs to</a:t>
+            </a:r>
+            <a:endParaRPr lang="en-NZ" dirty="0" smtClean="0"/>
+          </a:p>
+          <a:p>
+            <a:pPr lvl="1"/>
+            <a:endParaRPr lang="en-NZ" dirty="0" smtClean="0"/>
           </a:p>
         </p:txBody>
       </p:sp>
@@ -3638,160 +3486,384 @@
         </p:nvSpPr>
         <p:spPr/>
         <p:txBody>
-          <a:bodyPr>
-            <a:normAutofit/>
-          </a:bodyPr>
+          <a:bodyPr/>
           <a:lstStyle/>
           <a:p>
             <a:r>
               <a:rPr lang="en-NZ" dirty="0" err="1" smtClean="0"/>
-              <a:t>simulateRun</a:t>
+              <a:t>Simframe</a:t>
             </a:r>
             <a:r>
               <a:rPr lang="en-NZ" dirty="0" smtClean="0"/>
-              <a:t>()</a:t>
+              <a:t> definition file</a:t>
             </a:r>
             <a:endParaRPr lang="en-NZ" dirty="0"/>
           </a:p>
         </p:txBody>
       </p:sp>
-      <p:sp>
-        <p:nvSpPr>
-          <p:cNvPr id="3" name="Content Placeholder 2"/>
-          <p:cNvSpPr>
-            <a:spLocks noGrp="1"/>
-          </p:cNvSpPr>
+      <p:graphicFrame>
+        <p:nvGraphicFramePr>
+          <p:cNvPr id="4" name="Content Placeholder 3"/>
+          <p:cNvGraphicFramePr>
+            <a:graphicFrameLocks noGrp="1"/>
+          </p:cNvGraphicFramePr>
           <p:nvPr>
             <p:ph idx="1"/>
           </p:nvPr>
-        </p:nvSpPr>
-        <p:spPr/>
-        <p:txBody>
-          <a:bodyPr>
-            <a:normAutofit fontScale="70000" lnSpcReduction="20000"/>
-          </a:bodyPr>
-          <a:lstStyle/>
-          <a:p>
-            <a:r>
-              <a:rPr lang="en-NZ" dirty="0" smtClean="0"/>
-              <a:t>Simulation involves calling </a:t>
-            </a:r>
-            <a:r>
-              <a:rPr lang="en-NZ" dirty="0" err="1" smtClean="0"/>
-              <a:t>simulateRun</a:t>
-            </a:r>
-            <a:r>
-              <a:rPr lang="en-NZ" dirty="0" smtClean="0"/>
-              <a:t>() for each </a:t>
-            </a:r>
-            <a:r>
-              <a:rPr lang="en-NZ" dirty="0" err="1" smtClean="0"/>
-              <a:t>Simmodule</a:t>
-            </a:r>
-            <a:r>
-              <a:rPr lang="en-NZ" dirty="0" smtClean="0"/>
-              <a:t> </a:t>
-            </a:r>
-          </a:p>
-          <a:p>
-            <a:r>
-              <a:rPr lang="en-NZ" dirty="0" smtClean="0"/>
-              <a:t>The </a:t>
-            </a:r>
-            <a:r>
-              <a:rPr lang="en-NZ" dirty="0" err="1" smtClean="0"/>
-              <a:t>simulateRun</a:t>
-            </a:r>
-            <a:r>
-              <a:rPr lang="en-NZ" dirty="0" smtClean="0"/>
-              <a:t>() method uses a local copy of the </a:t>
-            </a:r>
-            <a:r>
-              <a:rPr lang="en-NZ" dirty="0" err="1" smtClean="0"/>
-              <a:t>simframe</a:t>
-            </a:r>
-            <a:r>
-              <a:rPr lang="en-NZ" dirty="0" smtClean="0"/>
-              <a:t>, copied from the environment’s </a:t>
-            </a:r>
-            <a:r>
-              <a:rPr lang="en-NZ" dirty="0" err="1" smtClean="0"/>
-              <a:t>simframe</a:t>
-            </a:r>
-            <a:r>
-              <a:rPr lang="en-NZ" dirty="0" smtClean="0"/>
-              <a:t>. The environment’s </a:t>
-            </a:r>
-            <a:r>
-              <a:rPr lang="en-NZ" dirty="0" err="1" smtClean="0"/>
-              <a:t>simframe</a:t>
-            </a:r>
-            <a:r>
-              <a:rPr lang="en-NZ" dirty="0" smtClean="0"/>
-              <a:t> is not modified. This is so that each run will start with the same </a:t>
-            </a:r>
-            <a:r>
-              <a:rPr lang="en-NZ" dirty="0" err="1" smtClean="0"/>
-              <a:t>simframe</a:t>
-            </a:r>
-            <a:r>
-              <a:rPr lang="en-NZ" dirty="0" smtClean="0"/>
-              <a:t>.</a:t>
-            </a:r>
-          </a:p>
-          <a:p>
-            <a:r>
-              <a:rPr lang="en-NZ" dirty="0" smtClean="0"/>
-              <a:t>At the beginning of each iteration, the current values of specified </a:t>
-            </a:r>
-            <a:r>
-              <a:rPr lang="en-NZ" dirty="0" err="1" smtClean="0"/>
-              <a:t>simframe</a:t>
-            </a:r>
-            <a:r>
-              <a:rPr lang="en-NZ" dirty="0" smtClean="0"/>
-              <a:t> variables </a:t>
-            </a:r>
-            <a:r>
-              <a:rPr lang="en-NZ" dirty="0" smtClean="0"/>
-              <a:t>are </a:t>
-            </a:r>
-            <a:r>
-              <a:rPr lang="en-NZ" dirty="0" smtClean="0"/>
-              <a:t>stored in corresponding “previous” variables. (This optional feature can be used by models that rely on previous state information to generate the current state).</a:t>
-            </a:r>
-          </a:p>
-          <a:p>
-            <a:r>
-              <a:rPr lang="en-NZ" dirty="0" smtClean="0"/>
-              <a:t>During the iteration, </a:t>
-            </a:r>
-            <a:r>
-              <a:rPr lang="en-NZ" dirty="0" err="1" smtClean="0"/>
-              <a:t>simframe</a:t>
-            </a:r>
-            <a:r>
-              <a:rPr lang="en-NZ" dirty="0" smtClean="0"/>
-              <a:t> variables are transformed </a:t>
-            </a:r>
-          </a:p>
-          <a:p>
-            <a:r>
-              <a:rPr lang="en-NZ" dirty="0" smtClean="0"/>
-              <a:t>At the end of the iteration, </a:t>
-            </a:r>
-            <a:r>
-              <a:rPr lang="en-NZ" dirty="0" err="1" smtClean="0"/>
-              <a:t>simframe</a:t>
-            </a:r>
-            <a:r>
-              <a:rPr lang="en-NZ" dirty="0" smtClean="0"/>
-              <a:t> outcome variables are stored in outcome matrices</a:t>
-            </a:r>
-            <a:endParaRPr lang="en-NZ" dirty="0"/>
-          </a:p>
-        </p:txBody>
-      </p:sp>
+        </p:nvGraphicFramePr>
+        <p:xfrm>
+          <a:off x="457200" y="1600200"/>
+          <a:ext cx="8229600" cy="2392680"/>
+        </p:xfrm>
+        <a:graphic>
+          <a:graphicData uri="http://schemas.openxmlformats.org/drawingml/2006/table">
+            <a:tbl>
+              <a:tblPr firstRow="1" bandRow="1">
+                <a:tableStyleId>{5C22544A-7EE6-4342-B048-85BDC9FD1C3A}</a:tableStyleId>
+              </a:tblPr>
+              <a:tblGrid>
+                <a:gridCol w="1378496"/>
+                <a:gridCol w="1512168"/>
+                <a:gridCol w="1656184"/>
+                <a:gridCol w="1728192"/>
+                <a:gridCol w="1954560"/>
+              </a:tblGrid>
+              <a:tr h="370840">
+                <a:tc>
+                  <a:txBody>
+                    <a:bodyPr/>
+                    <a:lstStyle/>
+                    <a:p>
+                      <a:r>
+                        <a:rPr lang="en-NZ" smtClean="0"/>
+                        <a:t>Varname</a:t>
+                      </a:r>
+                      <a:endParaRPr lang="en-NZ" dirty="0"/>
+                    </a:p>
+                  </a:txBody>
+                  <a:tcPr/>
+                </a:tc>
+                <a:tc>
+                  <a:txBody>
+                    <a:bodyPr/>
+                    <a:lstStyle/>
+                    <a:p>
+                      <a:r>
+                        <a:rPr lang="en-NZ" dirty="0" err="1" smtClean="0"/>
+                        <a:t>Previous_var</a:t>
+                      </a:r>
+                      <a:endParaRPr lang="en-NZ" dirty="0"/>
+                    </a:p>
+                  </a:txBody>
+                  <a:tcPr/>
+                </a:tc>
+                <a:tc>
+                  <a:txBody>
+                    <a:bodyPr/>
+                    <a:lstStyle/>
+                    <a:p>
+                      <a:r>
+                        <a:rPr lang="en-NZ" dirty="0" err="1" smtClean="0"/>
+                        <a:t>Initial_value</a:t>
+                      </a:r>
+                      <a:endParaRPr lang="en-NZ" dirty="0"/>
+                    </a:p>
+                  </a:txBody>
+                  <a:tcPr/>
+                </a:tc>
+                <a:tc>
+                  <a:txBody>
+                    <a:bodyPr/>
+                    <a:lstStyle/>
+                    <a:p>
+                      <a:r>
+                        <a:rPr lang="en-NZ" dirty="0" err="1" smtClean="0"/>
+                        <a:t>Outcome_type</a:t>
+                      </a:r>
+                      <a:endParaRPr lang="en-NZ" dirty="0"/>
+                    </a:p>
+                  </a:txBody>
+                  <a:tcPr/>
+                </a:tc>
+                <a:tc>
+                  <a:txBody>
+                    <a:bodyPr/>
+                    <a:lstStyle/>
+                    <a:p>
+                      <a:r>
+                        <a:rPr lang="en-NZ" dirty="0" err="1" smtClean="0"/>
+                        <a:t>Outcome_module</a:t>
+                      </a:r>
+                      <a:endParaRPr lang="en-NZ" dirty="0"/>
+                    </a:p>
+                  </a:txBody>
+                  <a:tcPr/>
+                </a:tc>
+              </a:tr>
+              <a:tr h="370840">
+                <a:tc>
+                  <a:txBody>
+                    <a:bodyPr/>
+                    <a:lstStyle/>
+                    <a:p>
+                      <a:r>
+                        <a:rPr lang="en-NZ" dirty="0" smtClean="0"/>
+                        <a:t>Age</a:t>
+                      </a:r>
+                      <a:endParaRPr lang="en-NZ" dirty="0"/>
+                    </a:p>
+                  </a:txBody>
+                  <a:tcPr/>
+                </a:tc>
+                <a:tc>
+                  <a:txBody>
+                    <a:bodyPr/>
+                    <a:lstStyle/>
+                    <a:p>
+                      <a:endParaRPr lang="en-NZ" dirty="0"/>
+                    </a:p>
+                  </a:txBody>
+                  <a:tcPr/>
+                </a:tc>
+                <a:tc>
+                  <a:txBody>
+                    <a:bodyPr/>
+                    <a:lstStyle/>
+                    <a:p>
+                      <a:r>
+                        <a:rPr lang="en-NZ" dirty="0" err="1" smtClean="0"/>
+                        <a:t>Basefile_age</a:t>
+                      </a:r>
+                      <a:endParaRPr lang="en-NZ" dirty="0"/>
+                    </a:p>
+                  </a:txBody>
+                  <a:tcPr/>
+                </a:tc>
+                <a:tc>
+                  <a:txBody>
+                    <a:bodyPr/>
+                    <a:lstStyle/>
+                    <a:p>
+                      <a:endParaRPr lang="en-NZ" dirty="0"/>
+                    </a:p>
+                  </a:txBody>
+                  <a:tcPr/>
+                </a:tc>
+                <a:tc>
+                  <a:txBody>
+                    <a:bodyPr/>
+                    <a:lstStyle/>
+                    <a:p>
+                      <a:endParaRPr lang="en-NZ" dirty="0"/>
+                    </a:p>
+                  </a:txBody>
+                  <a:tcPr/>
+                </a:tc>
+              </a:tr>
+              <a:tr h="370840">
+                <a:tc>
+                  <a:txBody>
+                    <a:bodyPr/>
+                    <a:lstStyle/>
+                    <a:p>
+                      <a:r>
+                        <a:rPr lang="en-NZ" dirty="0" smtClean="0"/>
+                        <a:t>Health</a:t>
+                      </a:r>
+                      <a:endParaRPr lang="en-NZ" dirty="0"/>
+                    </a:p>
+                  </a:txBody>
+                  <a:tcPr/>
+                </a:tc>
+                <a:tc>
+                  <a:txBody>
+                    <a:bodyPr/>
+                    <a:lstStyle/>
+                    <a:p>
+                      <a:r>
+                        <a:rPr lang="en-NZ" dirty="0" err="1" smtClean="0"/>
+                        <a:t>Health_previous</a:t>
+                      </a:r>
+                      <a:endParaRPr lang="en-NZ" dirty="0"/>
+                    </a:p>
+                  </a:txBody>
+                  <a:tcPr/>
+                </a:tc>
+                <a:tc>
+                  <a:txBody>
+                    <a:bodyPr/>
+                    <a:lstStyle/>
+                    <a:p>
+                      <a:r>
+                        <a:rPr lang="en-NZ" dirty="0" smtClean="0"/>
+                        <a:t>0</a:t>
+                      </a:r>
+                      <a:endParaRPr lang="en-NZ" dirty="0"/>
+                    </a:p>
+                  </a:txBody>
+                  <a:tcPr/>
+                </a:tc>
+                <a:tc>
+                  <a:txBody>
+                    <a:bodyPr/>
+                    <a:lstStyle/>
+                    <a:p>
+                      <a:r>
+                        <a:rPr lang="en-NZ" dirty="0" smtClean="0"/>
+                        <a:t>categorical</a:t>
+                      </a:r>
+                      <a:endParaRPr lang="en-NZ" dirty="0"/>
+                    </a:p>
+                  </a:txBody>
+                  <a:tcPr/>
+                </a:tc>
+                <a:tc>
+                  <a:txBody>
+                    <a:bodyPr/>
+                    <a:lstStyle/>
+                    <a:p>
+                      <a:r>
+                        <a:rPr lang="en-NZ" dirty="0" smtClean="0"/>
+                        <a:t>Main</a:t>
+                      </a:r>
+                      <a:endParaRPr lang="en-NZ" dirty="0"/>
+                    </a:p>
+                  </a:txBody>
+                  <a:tcPr/>
+                </a:tc>
+              </a:tr>
+              <a:tr h="370840">
+                <a:tc>
+                  <a:txBody>
+                    <a:bodyPr/>
+                    <a:lstStyle/>
+                    <a:p>
+                      <a:r>
+                        <a:rPr lang="en-NZ" dirty="0" err="1" smtClean="0"/>
+                        <a:t>Health_previous</a:t>
+                      </a:r>
+                      <a:endParaRPr lang="en-NZ" dirty="0"/>
+                    </a:p>
+                  </a:txBody>
+                  <a:tcPr/>
+                </a:tc>
+                <a:tc>
+                  <a:txBody>
+                    <a:bodyPr/>
+                    <a:lstStyle/>
+                    <a:p>
+                      <a:endParaRPr lang="en-NZ" dirty="0"/>
+                    </a:p>
+                  </a:txBody>
+                  <a:tcPr/>
+                </a:tc>
+                <a:tc>
+                  <a:txBody>
+                    <a:bodyPr/>
+                    <a:lstStyle/>
+                    <a:p>
+                      <a:r>
+                        <a:rPr lang="en-NZ" dirty="0" smtClean="0"/>
+                        <a:t>NA</a:t>
+                      </a:r>
+                      <a:endParaRPr lang="en-NZ" dirty="0"/>
+                    </a:p>
+                  </a:txBody>
+                  <a:tcPr/>
+                </a:tc>
+                <a:tc>
+                  <a:txBody>
+                    <a:bodyPr/>
+                    <a:lstStyle/>
+                    <a:p>
+                      <a:endParaRPr lang="en-NZ" dirty="0"/>
+                    </a:p>
+                  </a:txBody>
+                  <a:tcPr/>
+                </a:tc>
+                <a:tc>
+                  <a:txBody>
+                    <a:bodyPr/>
+                    <a:lstStyle/>
+                    <a:p>
+                      <a:endParaRPr lang="en-NZ" dirty="0"/>
+                    </a:p>
+                  </a:txBody>
+                  <a:tcPr/>
+                </a:tc>
+              </a:tr>
+              <a:tr h="370840">
+                <a:tc>
+                  <a:txBody>
+                    <a:bodyPr/>
+                    <a:lstStyle/>
+                    <a:p>
+                      <a:r>
+                        <a:rPr lang="en-NZ" dirty="0" smtClean="0"/>
+                        <a:t>Earnings</a:t>
+                      </a:r>
+                      <a:endParaRPr lang="en-NZ" dirty="0"/>
+                    </a:p>
+                  </a:txBody>
+                  <a:tcPr/>
+                </a:tc>
+                <a:tc>
+                  <a:txBody>
+                    <a:bodyPr/>
+                    <a:lstStyle/>
+                    <a:p>
+                      <a:endParaRPr lang="en-NZ" dirty="0"/>
+                    </a:p>
+                  </a:txBody>
+                  <a:tcPr/>
+                </a:tc>
+                <a:tc>
+                  <a:txBody>
+                    <a:bodyPr/>
+                    <a:lstStyle/>
+                    <a:p>
+                      <a:r>
+                        <a:rPr lang="en-NZ" dirty="0" smtClean="0"/>
+                        <a:t>0</a:t>
+                      </a:r>
+                      <a:endParaRPr lang="en-NZ" dirty="0"/>
+                    </a:p>
+                  </a:txBody>
+                  <a:tcPr/>
+                </a:tc>
+                <a:tc>
+                  <a:txBody>
+                    <a:bodyPr/>
+                    <a:lstStyle/>
+                    <a:p>
+                      <a:r>
+                        <a:rPr lang="en-NZ" dirty="0" smtClean="0"/>
+                        <a:t>continuous</a:t>
+                      </a:r>
+                      <a:endParaRPr lang="en-NZ" dirty="0"/>
+                    </a:p>
+                  </a:txBody>
+                  <a:tcPr/>
+                </a:tc>
+                <a:tc>
+                  <a:txBody>
+                    <a:bodyPr/>
+                    <a:lstStyle/>
+                    <a:p>
+                      <a:r>
+                        <a:rPr lang="en-NZ" dirty="0" smtClean="0"/>
+                        <a:t>Main</a:t>
+                      </a:r>
+                      <a:endParaRPr lang="en-NZ" dirty="0"/>
+                    </a:p>
+                  </a:txBody>
+                  <a:tcPr/>
+                </a:tc>
+              </a:tr>
+            </a:tbl>
+          </a:graphicData>
+        </a:graphic>
+      </p:graphicFrame>
     </p:spTree>
   </p:cSld>
   <p:clrMapOvr>
@@ -3801,6 +3873,439 @@
 </file>
 
 <file path=ppt/slides/slide13.xml><?xml version="1.0" encoding="utf-8"?>
+<p:sld xmlns:a="http://schemas.openxmlformats.org/drawingml/2006/main" xmlns:r="http://schemas.openxmlformats.org/officeDocument/2006/relationships" xmlns:p="http://schemas.openxmlformats.org/presentationml/2006/main">
+  <p:cSld>
+    <p:spTree>
+      <p:nvGrpSpPr>
+        <p:cNvPr id="1" name=""/>
+        <p:cNvGrpSpPr/>
+        <p:nvPr/>
+      </p:nvGrpSpPr>
+      <p:grpSpPr>
+        <a:xfrm>
+          <a:off x="0" y="0"/>
+          <a:ext cx="0" cy="0"/>
+          <a:chOff x="0" y="0"/>
+          <a:chExt cx="0" cy="0"/>
+        </a:xfrm>
+      </p:grpSpPr>
+      <p:sp>
+        <p:nvSpPr>
+          <p:cNvPr id="2" name="Title 1"/>
+          <p:cNvSpPr>
+            <a:spLocks noGrp="1"/>
+          </p:cNvSpPr>
+          <p:nvPr>
+            <p:ph type="title"/>
+          </p:nvPr>
+        </p:nvSpPr>
+        <p:spPr/>
+        <p:txBody>
+          <a:bodyPr/>
+          <a:lstStyle/>
+          <a:p>
+            <a:r>
+              <a:rPr lang="en-NZ" dirty="0" smtClean="0"/>
+              <a:t>One</a:t>
+            </a:r>
+            <a:r>
+              <a:rPr lang="en-NZ" dirty="0" smtClean="0"/>
+              <a:t> </a:t>
+            </a:r>
+            <a:r>
+              <a:rPr lang="en-NZ" dirty="0" err="1" smtClean="0"/>
+              <a:t>simframe</a:t>
+            </a:r>
+            <a:r>
+              <a:rPr lang="en-NZ" dirty="0" smtClean="0"/>
+              <a:t> per environment</a:t>
+            </a:r>
+            <a:endParaRPr lang="en-NZ" dirty="0"/>
+          </a:p>
+        </p:txBody>
+      </p:sp>
+      <p:sp>
+        <p:nvSpPr>
+          <p:cNvPr id="3" name="Content Placeholder 2"/>
+          <p:cNvSpPr>
+            <a:spLocks noGrp="1"/>
+          </p:cNvSpPr>
+          <p:nvPr>
+            <p:ph idx="1"/>
+          </p:nvPr>
+        </p:nvSpPr>
+        <p:spPr/>
+        <p:txBody>
+          <a:bodyPr/>
+          <a:lstStyle/>
+          <a:p>
+            <a:r>
+              <a:rPr lang="en-NZ" dirty="0" smtClean="0"/>
+              <a:t>When a simulation environment is created, it takes a copy of the master </a:t>
+            </a:r>
+            <a:r>
+              <a:rPr lang="en-NZ" dirty="0" err="1" smtClean="0"/>
+              <a:t>simframe</a:t>
+            </a:r>
+            <a:endParaRPr lang="en-NZ" dirty="0" smtClean="0"/>
+          </a:p>
+          <a:p>
+            <a:r>
+              <a:rPr lang="en-NZ" dirty="0" smtClean="0"/>
+              <a:t>Before simulating, a environment’s </a:t>
+            </a:r>
+            <a:r>
+              <a:rPr lang="en-NZ" dirty="0" err="1" smtClean="0"/>
+              <a:t>simframe</a:t>
+            </a:r>
+            <a:r>
+              <a:rPr lang="en-NZ" dirty="0" smtClean="0"/>
+              <a:t> may be modified to test a particular scenario</a:t>
+            </a:r>
+          </a:p>
+          <a:p>
+            <a:endParaRPr lang="en-NZ" dirty="0"/>
+          </a:p>
+        </p:txBody>
+      </p:sp>
+    </p:spTree>
+  </p:cSld>
+  <p:clrMapOvr>
+    <a:masterClrMapping/>
+  </p:clrMapOvr>
+</p:sld>
+</file>
+
+<file path=ppt/slides/slide14.xml><?xml version="1.0" encoding="utf-8"?>
+<p:sld xmlns:a="http://schemas.openxmlformats.org/drawingml/2006/main" xmlns:r="http://schemas.openxmlformats.org/officeDocument/2006/relationships" xmlns:p="http://schemas.openxmlformats.org/presentationml/2006/main">
+  <p:cSld>
+    <p:spTree>
+      <p:nvGrpSpPr>
+        <p:cNvPr id="1" name=""/>
+        <p:cNvGrpSpPr/>
+        <p:nvPr/>
+      </p:nvGrpSpPr>
+      <p:grpSpPr>
+        <a:xfrm>
+          <a:off x="0" y="0"/>
+          <a:ext cx="0" cy="0"/>
+          <a:chOff x="0" y="0"/>
+          <a:chExt cx="0" cy="0"/>
+        </a:xfrm>
+      </p:grpSpPr>
+      <p:sp>
+        <p:nvSpPr>
+          <p:cNvPr id="2" name="Title 1"/>
+          <p:cNvSpPr>
+            <a:spLocks noGrp="1"/>
+          </p:cNvSpPr>
+          <p:nvPr>
+            <p:ph type="title"/>
+          </p:nvPr>
+        </p:nvSpPr>
+        <p:spPr/>
+        <p:txBody>
+          <a:bodyPr/>
+          <a:lstStyle/>
+          <a:p>
+            <a:r>
+              <a:rPr lang="en-NZ" dirty="0" smtClean="0"/>
+              <a:t>The simulation process</a:t>
+            </a:r>
+            <a:endParaRPr lang="en-NZ" dirty="0"/>
+          </a:p>
+        </p:txBody>
+      </p:sp>
+      <p:sp>
+        <p:nvSpPr>
+          <p:cNvPr id="3" name="Content Placeholder 2"/>
+          <p:cNvSpPr>
+            <a:spLocks noGrp="1"/>
+          </p:cNvSpPr>
+          <p:nvPr>
+            <p:ph idx="1"/>
+          </p:nvPr>
+        </p:nvSpPr>
+        <p:spPr/>
+        <p:txBody>
+          <a:bodyPr>
+            <a:normAutofit fontScale="77500" lnSpcReduction="20000"/>
+          </a:bodyPr>
+          <a:lstStyle/>
+          <a:p>
+            <a:r>
+              <a:rPr lang="en-NZ" dirty="0" smtClean="0"/>
+              <a:t>Categorical adjustments for iteration 1 are applied to the </a:t>
+            </a:r>
+            <a:r>
+              <a:rPr lang="en-NZ" dirty="0" err="1" smtClean="0"/>
+              <a:t>simframe</a:t>
+            </a:r>
+            <a:r>
+              <a:rPr lang="en-NZ" dirty="0" smtClean="0"/>
+              <a:t>. The adjustments to apply are specified in the </a:t>
+            </a:r>
+            <a:r>
+              <a:rPr lang="en-NZ" dirty="0" err="1" smtClean="0"/>
+              <a:t>cat.adjustments</a:t>
+            </a:r>
+            <a:r>
+              <a:rPr lang="en-NZ" dirty="0" smtClean="0"/>
+              <a:t> variable. </a:t>
+            </a:r>
+          </a:p>
+          <a:p>
+            <a:pPr lvl="1"/>
+            <a:r>
+              <a:rPr lang="en-NZ" dirty="0" smtClean="0"/>
+              <a:t>Other adjustments that might need to be performed, such as adjustments to continuous variables, can be done outside </a:t>
+            </a:r>
+            <a:r>
+              <a:rPr lang="en-NZ" dirty="0" err="1" smtClean="0"/>
+              <a:t>simar</a:t>
+            </a:r>
+            <a:r>
+              <a:rPr lang="en-NZ" dirty="0" smtClean="0"/>
+              <a:t> by the user before simulation.</a:t>
+            </a:r>
+          </a:p>
+          <a:p>
+            <a:r>
+              <a:rPr lang="en-NZ" dirty="0" smtClean="0"/>
+              <a:t>Pre simulation stats are generated</a:t>
+            </a:r>
+          </a:p>
+          <a:p>
+            <a:r>
+              <a:rPr lang="en-NZ" dirty="0" smtClean="0"/>
+              <a:t>Run loop</a:t>
+            </a:r>
+          </a:p>
+          <a:p>
+            <a:pPr lvl="1"/>
+            <a:r>
+              <a:rPr lang="en-NZ" dirty="0" smtClean="0"/>
+              <a:t>During each run, the following functions are called on each module</a:t>
+            </a:r>
+          </a:p>
+          <a:p>
+            <a:pPr lvl="2"/>
+            <a:r>
+              <a:rPr lang="en-NZ" dirty="0" err="1" smtClean="0"/>
+              <a:t>simulateRun</a:t>
+            </a:r>
+            <a:endParaRPr lang="en-NZ" dirty="0" smtClean="0"/>
+          </a:p>
+          <a:p>
+            <a:pPr lvl="2"/>
+            <a:r>
+              <a:rPr lang="en-NZ" dirty="0" err="1" smtClean="0"/>
+              <a:t>appendRunStats</a:t>
+            </a:r>
+            <a:endParaRPr lang="en-NZ" dirty="0" smtClean="0"/>
+          </a:p>
+          <a:p>
+            <a:r>
+              <a:rPr lang="en-NZ" dirty="0" smtClean="0"/>
+              <a:t>Final results are calculated by each module across all runs</a:t>
+            </a:r>
+            <a:endParaRPr lang="en-NZ" dirty="0"/>
+          </a:p>
+        </p:txBody>
+      </p:sp>
+    </p:spTree>
+    <p:extLst>
+      <p:ext uri="{BB962C8B-B14F-4D97-AF65-F5344CB8AC3E}">
+        <p14:creationId xmlns:p14="http://schemas.microsoft.com/office/powerpoint/2010/main" val="3435886797"/>
+      </p:ext>
+    </p:extLst>
+  </p:cSld>
+  <p:clrMapOvr>
+    <a:masterClrMapping/>
+  </p:clrMapOvr>
+</p:sld>
+</file>
+
+<file path=ppt/slides/slide15.xml><?xml version="1.0" encoding="utf-8"?>
+<p:sld xmlns:a="http://schemas.openxmlformats.org/drawingml/2006/main" xmlns:r="http://schemas.openxmlformats.org/officeDocument/2006/relationships" xmlns:p="http://schemas.openxmlformats.org/presentationml/2006/main">
+  <p:cSld>
+    <p:spTree>
+      <p:nvGrpSpPr>
+        <p:cNvPr id="1" name=""/>
+        <p:cNvGrpSpPr/>
+        <p:nvPr/>
+      </p:nvGrpSpPr>
+      <p:grpSpPr>
+        <a:xfrm>
+          <a:off x="0" y="0"/>
+          <a:ext cx="0" cy="0"/>
+          <a:chOff x="0" y="0"/>
+          <a:chExt cx="0" cy="0"/>
+        </a:xfrm>
+      </p:grpSpPr>
+      <p:sp>
+        <p:nvSpPr>
+          <p:cNvPr id="2" name="Title 1"/>
+          <p:cNvSpPr>
+            <a:spLocks noGrp="1"/>
+          </p:cNvSpPr>
+          <p:nvPr>
+            <p:ph type="title"/>
+          </p:nvPr>
+        </p:nvSpPr>
+        <p:spPr/>
+        <p:txBody>
+          <a:bodyPr>
+            <a:normAutofit/>
+          </a:bodyPr>
+          <a:lstStyle/>
+          <a:p>
+            <a:r>
+              <a:rPr lang="en-NZ" dirty="0" err="1" smtClean="0"/>
+              <a:t>simulateRun</a:t>
+            </a:r>
+            <a:endParaRPr lang="en-NZ" dirty="0"/>
+          </a:p>
+        </p:txBody>
+      </p:sp>
+      <p:sp>
+        <p:nvSpPr>
+          <p:cNvPr id="3" name="Content Placeholder 2"/>
+          <p:cNvSpPr>
+            <a:spLocks noGrp="1"/>
+          </p:cNvSpPr>
+          <p:nvPr>
+            <p:ph idx="1"/>
+          </p:nvPr>
+        </p:nvSpPr>
+        <p:spPr/>
+        <p:txBody>
+          <a:bodyPr>
+            <a:normAutofit fontScale="70000" lnSpcReduction="20000"/>
+          </a:bodyPr>
+          <a:lstStyle/>
+          <a:p>
+            <a:r>
+              <a:rPr lang="en-NZ" dirty="0" smtClean="0"/>
+              <a:t>Simulation involves calling </a:t>
+            </a:r>
+            <a:r>
+              <a:rPr lang="en-NZ" dirty="0" err="1" smtClean="0"/>
+              <a:t>simulateRun</a:t>
+            </a:r>
+            <a:r>
+              <a:rPr lang="en-NZ" dirty="0" smtClean="0"/>
+              <a:t>() for each </a:t>
+            </a:r>
+            <a:r>
+              <a:rPr lang="en-NZ" dirty="0" err="1" smtClean="0"/>
+              <a:t>Simmodule</a:t>
+            </a:r>
+            <a:r>
+              <a:rPr lang="en-NZ" dirty="0" smtClean="0"/>
+              <a:t> </a:t>
+            </a:r>
+          </a:p>
+          <a:p>
+            <a:r>
+              <a:rPr lang="en-NZ" dirty="0" smtClean="0"/>
+              <a:t>The </a:t>
+            </a:r>
+            <a:r>
+              <a:rPr lang="en-NZ" dirty="0" err="1" smtClean="0"/>
+              <a:t>simulateRun</a:t>
+            </a:r>
+            <a:r>
+              <a:rPr lang="en-NZ" dirty="0" smtClean="0"/>
+              <a:t>() method uses a local copy of the </a:t>
+            </a:r>
+            <a:r>
+              <a:rPr lang="en-NZ" dirty="0" err="1" smtClean="0"/>
+              <a:t>simframe</a:t>
+            </a:r>
+            <a:r>
+              <a:rPr lang="en-NZ" dirty="0" smtClean="0"/>
+              <a:t>, copied from the environment’s </a:t>
+            </a:r>
+            <a:r>
+              <a:rPr lang="en-NZ" dirty="0" err="1" smtClean="0"/>
+              <a:t>simframe</a:t>
+            </a:r>
+            <a:r>
+              <a:rPr lang="en-NZ" dirty="0" smtClean="0"/>
+              <a:t>. The environment’s </a:t>
+            </a:r>
+            <a:r>
+              <a:rPr lang="en-NZ" dirty="0" err="1" smtClean="0"/>
+              <a:t>simframe</a:t>
+            </a:r>
+            <a:r>
+              <a:rPr lang="en-NZ" dirty="0" smtClean="0"/>
+              <a:t> is not modified. This is so that each run will start with the same </a:t>
+            </a:r>
+            <a:r>
+              <a:rPr lang="en-NZ" dirty="0" err="1" smtClean="0"/>
+              <a:t>simframe</a:t>
+            </a:r>
+            <a:r>
+              <a:rPr lang="en-NZ" dirty="0" smtClean="0"/>
+              <a:t>.</a:t>
+            </a:r>
+          </a:p>
+          <a:p>
+            <a:r>
+              <a:rPr lang="en-NZ" dirty="0" smtClean="0"/>
+              <a:t>At the beginning of each iteration, the current values of specified </a:t>
+            </a:r>
+            <a:r>
+              <a:rPr lang="en-NZ" dirty="0" err="1" smtClean="0"/>
+              <a:t>simframe</a:t>
+            </a:r>
+            <a:r>
+              <a:rPr lang="en-NZ" dirty="0" smtClean="0"/>
+              <a:t> variables are stored in corresponding “previous” variables. (This optional feature can be used by models that rely on previous state information to generate the current state).</a:t>
+            </a:r>
+          </a:p>
+          <a:p>
+            <a:r>
+              <a:rPr lang="en-NZ" dirty="0" smtClean="0"/>
+              <a:t>During the iteration, </a:t>
+            </a:r>
+            <a:r>
+              <a:rPr lang="en-NZ" dirty="0" err="1" smtClean="0"/>
+              <a:t>simframe</a:t>
+            </a:r>
+            <a:r>
+              <a:rPr lang="en-NZ" dirty="0" smtClean="0"/>
+              <a:t> variables are transformed </a:t>
+            </a:r>
+          </a:p>
+          <a:p>
+            <a:r>
+              <a:rPr lang="en-NZ" dirty="0" smtClean="0"/>
+              <a:t>At the end of the iteration, </a:t>
+            </a:r>
+            <a:r>
+              <a:rPr lang="en-NZ" dirty="0" err="1" smtClean="0"/>
+              <a:t>simframe</a:t>
+            </a:r>
+            <a:r>
+              <a:rPr lang="en-NZ" dirty="0" smtClean="0"/>
+              <a:t> outcome variables are stored in outcome matrices</a:t>
+            </a:r>
+            <a:endParaRPr lang="en-NZ" dirty="0"/>
+          </a:p>
+        </p:txBody>
+      </p:sp>
+    </p:spTree>
+  </p:cSld>
+  <p:clrMapOvr>
+    <a:masterClrMapping/>
+  </p:clrMapOvr>
+</p:sld>
+</file>
+
+<file path=ppt/slides/slide16.xml><?xml version="1.0" encoding="utf-8"?>
 <p:sld xmlns:a="http://schemas.openxmlformats.org/drawingml/2006/main" xmlns:r="http://schemas.openxmlformats.org/officeDocument/2006/relationships" xmlns:p="http://schemas.openxmlformats.org/presentationml/2006/main">
   <p:cSld>
     <p:spTree>
@@ -7223,7 +7728,7 @@
 </p:sld>
 </file>
 
-<file path=ppt/slides/slide14.xml><?xml version="1.0" encoding="utf-8"?>
+<file path=ppt/slides/slide17.xml><?xml version="1.0" encoding="utf-8"?>
 <p:sld xmlns:a="http://schemas.openxmlformats.org/drawingml/2006/main" xmlns:r="http://schemas.openxmlformats.org/officeDocument/2006/relationships" xmlns:p="http://schemas.openxmlformats.org/presentationml/2006/main">
   <p:cSld>
     <p:spTree>
@@ -7551,10 +8056,10 @@
               <a:t>Simenv</a:t>
             </a:r>
             <a:r>
-              <a:rPr lang="en-NZ" smtClean="0"/>
+              <a:rPr lang="en-NZ" dirty="0" smtClean="0"/>
               <a:t>)</a:t>
             </a:r>
-            <a:endParaRPr lang="en-NZ"/>
+            <a:endParaRPr lang="en-NZ" dirty="0"/>
           </a:p>
         </p:txBody>
       </p:sp>
@@ -7573,7 +8078,46 @@
           <a:bodyPr/>
           <a:lstStyle/>
           <a:p>
-            <a:endParaRPr lang="en-NZ"/>
+            <a:r>
+              <a:rPr lang="en-NZ" dirty="0" smtClean="0"/>
+              <a:t>A </a:t>
+            </a:r>
+            <a:r>
+              <a:rPr lang="en-NZ" dirty="0"/>
+              <a:t>simulation environment contains everything required to perform a simulation. </a:t>
+            </a:r>
+            <a:endParaRPr lang="en-NZ" dirty="0" smtClean="0"/>
+          </a:p>
+          <a:p>
+            <a:r>
+              <a:rPr lang="en-NZ" dirty="0" smtClean="0"/>
+              <a:t>Typically one </a:t>
+            </a:r>
+            <a:r>
+              <a:rPr lang="en-NZ" dirty="0" err="1"/>
+              <a:t>Simenv</a:t>
+            </a:r>
+            <a:r>
+              <a:rPr lang="en-NZ" dirty="0"/>
+              <a:t> will be created </a:t>
+            </a:r>
+            <a:r>
+              <a:rPr lang="en-NZ" dirty="0" smtClean="0"/>
+              <a:t>and </a:t>
+            </a:r>
+            <a:r>
+              <a:rPr lang="en-NZ" dirty="0"/>
+              <a:t>used to run a base simulation, and additional </a:t>
+            </a:r>
+            <a:r>
+              <a:rPr lang="en-NZ" dirty="0" err="1"/>
+              <a:t>Simenvs</a:t>
+            </a:r>
+            <a:r>
+              <a:rPr lang="en-NZ" dirty="0"/>
+              <a:t> will be created to test different scenarios.</a:t>
+            </a:r>
+            <a:endParaRPr lang="en-NZ" dirty="0"/>
           </a:p>
         </p:txBody>
       </p:sp>
@@ -7604,7 +8148,7 @@
       </p:grpSpPr>
       <p:sp>
         <p:nvSpPr>
-          <p:cNvPr id="8" name="Title 7"/>
+          <p:cNvPr id="2" name="Title 1"/>
           <p:cNvSpPr>
             <a:spLocks noGrp="1"/>
           </p:cNvSpPr>
@@ -7618,8 +8162,8 @@
           <a:lstStyle/>
           <a:p>
             <a:r>
-              <a:rPr lang="en-NZ" dirty="0" err="1" smtClean="0"/>
-              <a:t>Simframe</a:t>
+              <a:rPr lang="en-NZ" dirty="0" smtClean="0"/>
+              <a:t>Simulation environment contents</a:t>
             </a:r>
             <a:endParaRPr lang="en-NZ" dirty="0"/>
           </a:p>
@@ -7627,7 +8171,7 @@
       </p:sp>
       <p:sp>
         <p:nvSpPr>
-          <p:cNvPr id="9" name="Content Placeholder 8"/>
+          <p:cNvPr id="3" name="Content Placeholder 2"/>
           <p:cNvSpPr>
             <a:spLocks noGrp="1"/>
           </p:cNvSpPr>
@@ -7638,53 +8182,123 @@
         <p:spPr/>
         <p:txBody>
           <a:bodyPr>
-            <a:normAutofit fontScale="92500" lnSpcReduction="10000"/>
+            <a:normAutofit fontScale="62500" lnSpcReduction="20000"/>
           </a:bodyPr>
           <a:lstStyle/>
           <a:p>
             <a:r>
               <a:rPr lang="en-NZ" dirty="0" smtClean="0"/>
-              <a:t>A </a:t>
-            </a:r>
+              <a:t>name</a:t>
+            </a:r>
+          </a:p>
+          <a:p>
             <a:r>
               <a:rPr lang="en-NZ" dirty="0" err="1" smtClean="0"/>
-              <a:t>dataframe</a:t>
-            </a:r>
+              <a:t>runs_simulated</a:t>
+            </a:r>
+            <a:endParaRPr lang="en-NZ" dirty="0" smtClean="0"/>
+          </a:p>
+          <a:p>
+            <a:pPr lvl="1"/>
             <a:r>
               <a:rPr lang="en-NZ" dirty="0" smtClean="0"/>
-              <a:t> of variables (input, intermediate, and outcome) used during the simulation</a:t>
-            </a:r>
+              <a:t>incremented during the simulation process</a:t>
+            </a:r>
+          </a:p>
+          <a:p>
+            <a:r>
+              <a:rPr lang="en-NZ" dirty="0" err="1" smtClean="0"/>
+              <a:t>dict</a:t>
+            </a:r>
+            <a:endParaRPr lang="en-NZ" dirty="0" smtClean="0"/>
           </a:p>
           <a:p>
             <a:pPr lvl="1"/>
             <a:r>
               <a:rPr lang="en-NZ" dirty="0" smtClean="0"/>
-              <a:t>Input variables are those that are not transformed</a:t>
-            </a:r>
+              <a:t>the data dictionary for the whole simulation</a:t>
+            </a:r>
+          </a:p>
+          <a:p>
+            <a:r>
+              <a:rPr lang="en-NZ" dirty="0" err="1" smtClean="0"/>
+              <a:t>Simframe</a:t>
+            </a:r>
+            <a:endParaRPr lang="en-NZ" dirty="0" smtClean="0"/>
+          </a:p>
+          <a:p>
+            <a:r>
+              <a:rPr lang="en-NZ" dirty="0" err="1" smtClean="0"/>
+              <a:t>cat.adjustments</a:t>
+            </a:r>
+            <a:endParaRPr lang="en-NZ" dirty="0" smtClean="0"/>
           </a:p>
           <a:p>
             <a:pPr lvl="1"/>
             <a:r>
               <a:rPr lang="en-NZ" dirty="0" smtClean="0"/>
-              <a:t>Intermediate variables are transformed during simulation iterations, but not recorded for output</a:t>
-            </a:r>
+              <a:t>adjustments to apply to categorical variables before and during the simulation</a:t>
+            </a:r>
+          </a:p>
+          <a:p>
+            <a:r>
+              <a:rPr lang="en-NZ" dirty="0" err="1"/>
+              <a:t>p</a:t>
+            </a:r>
+            <a:r>
+              <a:rPr lang="en-NZ" dirty="0" err="1" smtClean="0"/>
+              <a:t>resim.stats</a:t>
+            </a:r>
+            <a:endParaRPr lang="en-NZ" dirty="0"/>
           </a:p>
           <a:p>
             <a:pPr lvl="1"/>
             <a:r>
               <a:rPr lang="en-NZ" dirty="0" smtClean="0"/>
-              <a:t>Outcome variables are transformed during simulation iterations, and are stored in outcome matrices for generation of run stats after each run</a:t>
-            </a:r>
-          </a:p>
-          <a:p>
+              <a:t>stats generated after adjustment but before simulation begins. Typically these will be descriptive statistics of input variables that don’t change </a:t>
+            </a:r>
+            <a:r>
+              <a:rPr lang="en-NZ" dirty="0" err="1" smtClean="0"/>
+              <a:t>eg</a:t>
+            </a:r>
             <a:r>
               <a:rPr lang="en-NZ" dirty="0" smtClean="0"/>
-              <a:t>Each variable is a vector that contains values for all micro-units</a:t>
+              <a:t>: gender, ethnicity</a:t>
+            </a:r>
+          </a:p>
+          <a:p>
+            <a:r>
+              <a:rPr lang="en-NZ" dirty="0"/>
+              <a:t>m</a:t>
+            </a:r>
+            <a:r>
+              <a:rPr lang="en-NZ" dirty="0" smtClean="0"/>
+              <a:t>odules</a:t>
+            </a:r>
+          </a:p>
+          <a:p>
+            <a:pPr lvl="1"/>
+            <a:r>
+              <a:rPr lang="en-NZ" dirty="0" smtClean="0"/>
+              <a:t>one or more simulation modules (</a:t>
+            </a:r>
+            <a:r>
+              <a:rPr lang="en-NZ" dirty="0" err="1" smtClean="0"/>
+              <a:t>Simmodule</a:t>
+            </a:r>
+            <a:r>
+              <a:rPr lang="en-NZ" dirty="0" smtClean="0"/>
+              <a:t>)</a:t>
             </a:r>
           </a:p>
         </p:txBody>
       </p:sp>
     </p:spTree>
+    <p:extLst>
+      <p:ext uri="{BB962C8B-B14F-4D97-AF65-F5344CB8AC3E}">
+        <p14:creationId xmlns:p14="http://schemas.microsoft.com/office/powerpoint/2010/main" val="647059191"/>
+      </p:ext>
+    </p:extLst>
   </p:cSld>
   <p:clrMapOvr>
     <a:masterClrMapping/>
@@ -7725,477 +8339,138 @@
           <a:lstStyle/>
           <a:p>
             <a:r>
+              <a:rPr lang="en-NZ" dirty="0" smtClean="0"/>
+              <a:t>Data dictionary</a:t>
+            </a:r>
+            <a:endParaRPr lang="en-NZ" dirty="0"/>
+          </a:p>
+        </p:txBody>
+      </p:sp>
+      <p:sp>
+        <p:nvSpPr>
+          <p:cNvPr id="3" name="Content Placeholder 2"/>
+          <p:cNvSpPr>
+            <a:spLocks noGrp="1"/>
+          </p:cNvSpPr>
+          <p:nvPr>
+            <p:ph idx="1"/>
+          </p:nvPr>
+        </p:nvSpPr>
+        <p:spPr/>
+        <p:txBody>
+          <a:bodyPr>
+            <a:normAutofit lnSpcReduction="10000"/>
+          </a:bodyPr>
+          <a:lstStyle/>
+          <a:p>
+            <a:r>
+              <a:rPr lang="en-NZ" dirty="0" smtClean="0"/>
+              <a:t>Contains</a:t>
+            </a:r>
+          </a:p>
+          <a:p>
+            <a:pPr lvl="1"/>
+            <a:r>
               <a:rPr lang="en-NZ" dirty="0" err="1" smtClean="0"/>
-              <a:t>Simframe</a:t>
+              <a:t>vardesc</a:t>
+            </a:r>
+            <a:r>
+              <a:rPr lang="en-NZ" dirty="0" smtClean="0"/>
+              <a:t>: a vector of variable descriptions, named with variable names</a:t>
+            </a:r>
+          </a:p>
+          <a:p>
+            <a:pPr lvl="2"/>
+            <a:r>
+              <a:rPr lang="en-NZ" dirty="0" err="1" smtClean="0"/>
+              <a:t>eg</a:t>
+            </a:r>
+            <a:r>
+              <a:rPr lang="en-NZ" dirty="0" smtClean="0"/>
+              <a:t>: c(“</a:t>
+            </a:r>
+            <a:r>
+              <a:rPr lang="en-NZ" dirty="0" err="1" smtClean="0"/>
+              <a:t>bwkg</a:t>
+            </a:r>
+            <a:r>
+              <a:rPr lang="en-NZ" dirty="0" smtClean="0"/>
+              <a:t>”=“Birth weight (g)”, “</a:t>
+            </a:r>
+            <a:r>
+              <a:rPr lang="en-NZ" dirty="0" err="1" smtClean="0"/>
+              <a:t>chkids</a:t>
+            </a:r>
+            <a:r>
+              <a:rPr lang="en-NZ" dirty="0" smtClean="0"/>
+              <a:t>”=“Change in kids”)</a:t>
+            </a:r>
+          </a:p>
+          <a:p>
+            <a:pPr lvl="1"/>
+            <a:r>
+              <a:rPr lang="en-NZ" dirty="0" err="1" smtClean="0"/>
+              <a:t>codings</a:t>
+            </a:r>
+            <a:r>
+              <a:rPr lang="en-NZ" dirty="0" smtClean="0"/>
+              <a:t>: a list of category names for categorical variables</a:t>
+            </a:r>
+          </a:p>
+          <a:p>
+            <a:pPr lvl="2"/>
+            <a:r>
+              <a:rPr lang="en-NZ" dirty="0" err="1" smtClean="0"/>
+              <a:t>eg</a:t>
+            </a:r>
+            <a:r>
+              <a:rPr lang="en-NZ" dirty="0" smtClean="0"/>
+              <a:t>: list(SESBTH=c(“Professional”=1, “Clerical”=2), gender=c(“F”=</a:t>
+            </a:r>
+            <a:r>
+              <a:rPr lang="en-NZ" dirty="0"/>
+              <a:t>0</a:t>
+            </a:r>
+            <a:r>
+              <a:rPr lang="en-NZ" dirty="0" smtClean="0"/>
+              <a:t>, “</a:t>
+            </a:r>
+            <a:r>
+              <a:rPr lang="en-NZ" dirty="0"/>
+              <a:t>M</a:t>
+            </a:r>
+            <a:r>
+              <a:rPr lang="en-NZ" dirty="0" smtClean="0"/>
+              <a:t>”=1)</a:t>
+            </a:r>
+          </a:p>
+          <a:p>
+            <a:r>
+              <a:rPr lang="en-NZ" dirty="0" err="1" smtClean="0"/>
+              <a:t>Vardesc</a:t>
+            </a:r>
+            <a:r>
+              <a:rPr lang="en-NZ" dirty="0" smtClean="0"/>
+              <a:t> and </a:t>
+            </a:r>
+            <a:r>
+              <a:rPr lang="en-NZ" dirty="0" err="1" smtClean="0"/>
+              <a:t>codings</a:t>
+            </a:r>
+            <a:r>
+              <a:rPr lang="en-NZ" dirty="0" smtClean="0"/>
+              <a:t> are loaded from a file</a:t>
             </a:r>
             <a:endParaRPr lang="en-NZ" dirty="0"/>
           </a:p>
         </p:txBody>
       </p:sp>
-      <p:graphicFrame>
-        <p:nvGraphicFramePr>
-          <p:cNvPr id="4" name="Content Placeholder 3"/>
-          <p:cNvGraphicFramePr>
-            <a:graphicFrameLocks noGrp="1"/>
-          </p:cNvGraphicFramePr>
-          <p:nvPr>
-            <p:ph idx="1"/>
-          </p:nvPr>
-        </p:nvGraphicFramePr>
-        <p:xfrm>
-          <a:off x="1763688" y="1628800"/>
-          <a:ext cx="5606836" cy="2225040"/>
-        </p:xfrm>
-        <a:graphic>
-          <a:graphicData uri="http://schemas.openxmlformats.org/drawingml/2006/table">
-            <a:tbl>
-              <a:tblPr firstRow="1" bandRow="1">
-                <a:tableStyleId>{5C22544A-7EE6-4342-B048-85BDC9FD1C3A}</a:tableStyleId>
-              </a:tblPr>
-              <a:tblGrid>
-                <a:gridCol w="514400"/>
-                <a:gridCol w="792088"/>
-                <a:gridCol w="863918"/>
-                <a:gridCol w="1790510"/>
-                <a:gridCol w="1645920"/>
-              </a:tblGrid>
-              <a:tr h="370840">
-                <a:tc>
-                  <a:txBody>
-                    <a:bodyPr/>
-                    <a:lstStyle/>
-                    <a:p>
-                      <a:r>
-                        <a:rPr lang="en-NZ" dirty="0" smtClean="0"/>
-                        <a:t>ID</a:t>
-                      </a:r>
-                      <a:endParaRPr lang="en-NZ" dirty="0"/>
-                    </a:p>
-                  </a:txBody>
-                  <a:tcPr/>
-                </a:tc>
-                <a:tc>
-                  <a:txBody>
-                    <a:bodyPr/>
-                    <a:lstStyle/>
-                    <a:p>
-                      <a:r>
-                        <a:rPr lang="en-NZ" dirty="0" smtClean="0"/>
-                        <a:t>Age</a:t>
-                      </a:r>
-                      <a:endParaRPr lang="en-NZ" dirty="0"/>
-                    </a:p>
-                  </a:txBody>
-                  <a:tcPr/>
-                </a:tc>
-                <a:tc>
-                  <a:txBody>
-                    <a:bodyPr/>
-                    <a:lstStyle/>
-                    <a:p>
-                      <a:r>
-                        <a:rPr lang="en-NZ" dirty="0" smtClean="0"/>
-                        <a:t>Health</a:t>
-                      </a:r>
-                      <a:endParaRPr lang="en-NZ" dirty="0"/>
-                    </a:p>
-                  </a:txBody>
-                  <a:tcPr/>
-                </a:tc>
-                <a:tc>
-                  <a:txBody>
-                    <a:bodyPr/>
-                    <a:lstStyle/>
-                    <a:p>
-                      <a:r>
-                        <a:rPr lang="en-NZ" dirty="0" err="1" smtClean="0"/>
-                        <a:t>Health_previous</a:t>
-                      </a:r>
-                      <a:endParaRPr lang="en-NZ" dirty="0"/>
-                    </a:p>
-                  </a:txBody>
-                  <a:tcPr/>
-                </a:tc>
-                <a:tc>
-                  <a:txBody>
-                    <a:bodyPr/>
-                    <a:lstStyle/>
-                    <a:p>
-                      <a:r>
-                        <a:rPr lang="en-NZ" dirty="0" smtClean="0"/>
-                        <a:t>Earnings</a:t>
-                      </a:r>
-                      <a:endParaRPr lang="en-NZ" dirty="0"/>
-                    </a:p>
-                  </a:txBody>
-                  <a:tcPr/>
-                </a:tc>
-              </a:tr>
-              <a:tr h="370840">
-                <a:tc>
-                  <a:txBody>
-                    <a:bodyPr/>
-                    <a:lstStyle/>
-                    <a:p>
-                      <a:r>
-                        <a:rPr lang="en-NZ" dirty="0" smtClean="0"/>
-                        <a:t>1</a:t>
-                      </a:r>
-                      <a:endParaRPr lang="en-NZ" dirty="0"/>
-                    </a:p>
-                  </a:txBody>
-                  <a:tcPr/>
-                </a:tc>
-                <a:tc>
-                  <a:txBody>
-                    <a:bodyPr/>
-                    <a:lstStyle/>
-                    <a:p>
-                      <a:r>
-                        <a:rPr lang="en-NZ" dirty="0" smtClean="0"/>
-                        <a:t>2</a:t>
-                      </a:r>
-                      <a:endParaRPr lang="en-NZ" dirty="0"/>
-                    </a:p>
-                  </a:txBody>
-                  <a:tcPr/>
-                </a:tc>
-                <a:tc>
-                  <a:txBody>
-                    <a:bodyPr/>
-                    <a:lstStyle/>
-                    <a:p>
-                      <a:r>
-                        <a:rPr lang="en-NZ" dirty="0" smtClean="0"/>
-                        <a:t>0</a:t>
-                      </a:r>
-                      <a:endParaRPr lang="en-NZ" dirty="0"/>
-                    </a:p>
-                  </a:txBody>
-                  <a:tcPr/>
-                </a:tc>
-                <a:tc>
-                  <a:txBody>
-                    <a:bodyPr/>
-                    <a:lstStyle/>
-                    <a:p>
-                      <a:r>
-                        <a:rPr lang="en-NZ" dirty="0" smtClean="0"/>
-                        <a:t>NA</a:t>
-                      </a:r>
-                      <a:endParaRPr lang="en-NZ" dirty="0"/>
-                    </a:p>
-                  </a:txBody>
-                  <a:tcPr/>
-                </a:tc>
-                <a:tc>
-                  <a:txBody>
-                    <a:bodyPr/>
-                    <a:lstStyle/>
-                    <a:p>
-                      <a:r>
-                        <a:rPr lang="en-NZ" dirty="0" smtClean="0"/>
-                        <a:t>0</a:t>
-                      </a:r>
-                      <a:endParaRPr lang="en-NZ" dirty="0"/>
-                    </a:p>
-                  </a:txBody>
-                  <a:tcPr/>
-                </a:tc>
-              </a:tr>
-              <a:tr h="370840">
-                <a:tc>
-                  <a:txBody>
-                    <a:bodyPr/>
-                    <a:lstStyle/>
-                    <a:p>
-                      <a:r>
-                        <a:rPr lang="en-NZ" dirty="0" smtClean="0"/>
-                        <a:t>2</a:t>
-                      </a:r>
-                      <a:endParaRPr lang="en-NZ" dirty="0"/>
-                    </a:p>
-                  </a:txBody>
-                  <a:tcPr/>
-                </a:tc>
-                <a:tc>
-                  <a:txBody>
-                    <a:bodyPr/>
-                    <a:lstStyle/>
-                    <a:p>
-                      <a:r>
-                        <a:rPr lang="en-NZ" dirty="0" smtClean="0"/>
-                        <a:t>5</a:t>
-                      </a:r>
-                      <a:endParaRPr lang="en-NZ" dirty="0"/>
-                    </a:p>
-                  </a:txBody>
-                  <a:tcPr/>
-                </a:tc>
-                <a:tc>
-                  <a:txBody>
-                    <a:bodyPr/>
-                    <a:lstStyle/>
-                    <a:p>
-                      <a:r>
-                        <a:rPr lang="en-NZ" dirty="0" smtClean="0"/>
-                        <a:t>0</a:t>
-                      </a:r>
-                      <a:endParaRPr lang="en-NZ" dirty="0"/>
-                    </a:p>
-                  </a:txBody>
-                  <a:tcPr/>
-                </a:tc>
-                <a:tc>
-                  <a:txBody>
-                    <a:bodyPr/>
-                    <a:lstStyle/>
-                    <a:p>
-                      <a:r>
-                        <a:rPr lang="en-NZ" dirty="0" smtClean="0"/>
-                        <a:t>NA</a:t>
-                      </a:r>
-                      <a:endParaRPr lang="en-NZ" dirty="0"/>
-                    </a:p>
-                  </a:txBody>
-                  <a:tcPr/>
-                </a:tc>
-                <a:tc>
-                  <a:txBody>
-                    <a:bodyPr/>
-                    <a:lstStyle/>
-                    <a:p>
-                      <a:r>
-                        <a:rPr lang="en-NZ" dirty="0" smtClean="0"/>
-                        <a:t>0</a:t>
-                      </a:r>
-                      <a:endParaRPr lang="en-NZ" dirty="0"/>
-                    </a:p>
-                  </a:txBody>
-                  <a:tcPr/>
-                </a:tc>
-              </a:tr>
-              <a:tr h="370840">
-                <a:tc>
-                  <a:txBody>
-                    <a:bodyPr/>
-                    <a:lstStyle/>
-                    <a:p>
-                      <a:r>
-                        <a:rPr lang="en-NZ" dirty="0" smtClean="0"/>
-                        <a:t>3</a:t>
-                      </a:r>
-                      <a:endParaRPr lang="en-NZ" dirty="0"/>
-                    </a:p>
-                  </a:txBody>
-                  <a:tcPr/>
-                </a:tc>
-                <a:tc>
-                  <a:txBody>
-                    <a:bodyPr/>
-                    <a:lstStyle/>
-                    <a:p>
-                      <a:r>
-                        <a:rPr lang="en-NZ" dirty="0" smtClean="0"/>
-                        <a:t>6</a:t>
-                      </a:r>
-                      <a:endParaRPr lang="en-NZ" dirty="0"/>
-                    </a:p>
-                  </a:txBody>
-                  <a:tcPr/>
-                </a:tc>
-                <a:tc>
-                  <a:txBody>
-                    <a:bodyPr/>
-                    <a:lstStyle/>
-                    <a:p>
-                      <a:r>
-                        <a:rPr lang="en-NZ" dirty="0" smtClean="0"/>
-                        <a:t>0</a:t>
-                      </a:r>
-                      <a:endParaRPr lang="en-NZ" dirty="0"/>
-                    </a:p>
-                  </a:txBody>
-                  <a:tcPr/>
-                </a:tc>
-                <a:tc>
-                  <a:txBody>
-                    <a:bodyPr/>
-                    <a:lstStyle/>
-                    <a:p>
-                      <a:r>
-                        <a:rPr lang="en-NZ" dirty="0" smtClean="0"/>
-                        <a:t>NA</a:t>
-                      </a:r>
-                      <a:endParaRPr lang="en-NZ" dirty="0"/>
-                    </a:p>
-                  </a:txBody>
-                  <a:tcPr/>
-                </a:tc>
-                <a:tc>
-                  <a:txBody>
-                    <a:bodyPr/>
-                    <a:lstStyle/>
-                    <a:p>
-                      <a:r>
-                        <a:rPr lang="en-NZ" dirty="0" smtClean="0"/>
-                        <a:t>0</a:t>
-                      </a:r>
-                      <a:endParaRPr lang="en-NZ" dirty="0"/>
-                    </a:p>
-                  </a:txBody>
-                  <a:tcPr/>
-                </a:tc>
-              </a:tr>
-              <a:tr h="370840">
-                <a:tc>
-                  <a:txBody>
-                    <a:bodyPr/>
-                    <a:lstStyle/>
-                    <a:p>
-                      <a:r>
-                        <a:rPr lang="en-NZ" dirty="0" smtClean="0"/>
-                        <a:t>4</a:t>
-                      </a:r>
-                      <a:endParaRPr lang="en-NZ" dirty="0"/>
-                    </a:p>
-                  </a:txBody>
-                  <a:tcPr/>
-                </a:tc>
-                <a:tc>
-                  <a:txBody>
-                    <a:bodyPr/>
-                    <a:lstStyle/>
-                    <a:p>
-                      <a:r>
-                        <a:rPr lang="en-NZ" dirty="0" smtClean="0"/>
-                        <a:t>2</a:t>
-                      </a:r>
-                      <a:endParaRPr lang="en-NZ" dirty="0"/>
-                    </a:p>
-                  </a:txBody>
-                  <a:tcPr/>
-                </a:tc>
-                <a:tc>
-                  <a:txBody>
-                    <a:bodyPr/>
-                    <a:lstStyle/>
-                    <a:p>
-                      <a:r>
-                        <a:rPr lang="en-NZ" dirty="0" smtClean="0"/>
-                        <a:t>0</a:t>
-                      </a:r>
-                      <a:endParaRPr lang="en-NZ" dirty="0"/>
-                    </a:p>
-                  </a:txBody>
-                  <a:tcPr/>
-                </a:tc>
-                <a:tc>
-                  <a:txBody>
-                    <a:bodyPr/>
-                    <a:lstStyle/>
-                    <a:p>
-                      <a:r>
-                        <a:rPr lang="en-NZ" dirty="0" smtClean="0"/>
-                        <a:t>NA</a:t>
-                      </a:r>
-                      <a:endParaRPr lang="en-NZ" dirty="0"/>
-                    </a:p>
-                  </a:txBody>
-                  <a:tcPr/>
-                </a:tc>
-                <a:tc>
-                  <a:txBody>
-                    <a:bodyPr/>
-                    <a:lstStyle/>
-                    <a:p>
-                      <a:r>
-                        <a:rPr lang="en-NZ" dirty="0" smtClean="0"/>
-                        <a:t>0</a:t>
-                      </a:r>
-                      <a:endParaRPr lang="en-NZ" dirty="0"/>
-                    </a:p>
-                  </a:txBody>
-                  <a:tcPr/>
-                </a:tc>
-              </a:tr>
-              <a:tr h="370840">
-                <a:tc>
-                  <a:txBody>
-                    <a:bodyPr/>
-                    <a:lstStyle/>
-                    <a:p>
-                      <a:r>
-                        <a:rPr lang="en-NZ" dirty="0" smtClean="0"/>
-                        <a:t>5</a:t>
-                      </a:r>
-                      <a:endParaRPr lang="en-NZ" dirty="0"/>
-                    </a:p>
-                  </a:txBody>
-                  <a:tcPr/>
-                </a:tc>
-                <a:tc>
-                  <a:txBody>
-                    <a:bodyPr/>
-                    <a:lstStyle/>
-                    <a:p>
-                      <a:r>
-                        <a:rPr lang="en-NZ" dirty="0" smtClean="0"/>
-                        <a:t>4</a:t>
-                      </a:r>
-                      <a:endParaRPr lang="en-NZ" dirty="0"/>
-                    </a:p>
-                  </a:txBody>
-                  <a:tcPr/>
-                </a:tc>
-                <a:tc>
-                  <a:txBody>
-                    <a:bodyPr/>
-                    <a:lstStyle/>
-                    <a:p>
-                      <a:r>
-                        <a:rPr lang="en-NZ" dirty="0" smtClean="0"/>
-                        <a:t>0</a:t>
-                      </a:r>
-                      <a:endParaRPr lang="en-NZ" dirty="0"/>
-                    </a:p>
-                  </a:txBody>
-                  <a:tcPr/>
-                </a:tc>
-                <a:tc>
-                  <a:txBody>
-                    <a:bodyPr/>
-                    <a:lstStyle/>
-                    <a:p>
-                      <a:r>
-                        <a:rPr lang="en-NZ" dirty="0" smtClean="0"/>
-                        <a:t>NA</a:t>
-                      </a:r>
-                      <a:endParaRPr lang="en-NZ" dirty="0"/>
-                    </a:p>
-                  </a:txBody>
-                  <a:tcPr/>
-                </a:tc>
-                <a:tc>
-                  <a:txBody>
-                    <a:bodyPr/>
-                    <a:lstStyle/>
-                    <a:p>
-                      <a:r>
-                        <a:rPr lang="en-NZ" dirty="0" smtClean="0"/>
-                        <a:t>0</a:t>
-                      </a:r>
-                      <a:endParaRPr lang="en-NZ" dirty="0"/>
-                    </a:p>
-                  </a:txBody>
-                  <a:tcPr/>
-                </a:tc>
-              </a:tr>
-            </a:tbl>
-          </a:graphicData>
-        </a:graphic>
-      </p:graphicFrame>
     </p:spTree>
+    <p:extLst>
+      <p:ext uri="{BB962C8B-B14F-4D97-AF65-F5344CB8AC3E}">
+        <p14:creationId xmlns:p14="http://schemas.microsoft.com/office/powerpoint/2010/main" val="3229340986"/>
+      </p:ext>
+    </p:extLst>
   </p:cSld>
   <p:clrMapOvr>
     <a:masterClrMapping/>
@@ -8222,7 +8497,7 @@
       </p:grpSpPr>
       <p:sp>
         <p:nvSpPr>
-          <p:cNvPr id="2" name="Title 1"/>
+          <p:cNvPr id="8" name="Title 7"/>
           <p:cNvSpPr>
             <a:spLocks noGrp="1"/>
           </p:cNvSpPr>
@@ -8232,18 +8507,12 @@
         </p:nvSpPr>
         <p:spPr/>
         <p:txBody>
-          <a:bodyPr>
-            <a:normAutofit/>
-          </a:bodyPr>
+          <a:bodyPr/>
           <a:lstStyle/>
           <a:p>
             <a:r>
-              <a:rPr lang="en-NZ" dirty="0" smtClean="0"/>
-              <a:t>The master </a:t>
-            </a:r>
-            <a:r>
               <a:rPr lang="en-NZ" dirty="0" err="1" smtClean="0"/>
-              <a:t>simframe</a:t>
+              <a:t>Simframe</a:t>
             </a:r>
             <a:endParaRPr lang="en-NZ" dirty="0"/>
           </a:p>
@@ -8251,7 +8520,7 @@
       </p:sp>
       <p:sp>
         <p:nvSpPr>
-          <p:cNvPr id="3" name="Content Placeholder 2"/>
+          <p:cNvPr id="9" name="Content Placeholder 8"/>
           <p:cNvSpPr>
             <a:spLocks noGrp="1"/>
           </p:cNvSpPr>
@@ -8262,75 +8531,49 @@
         <p:spPr/>
         <p:txBody>
           <a:bodyPr>
-            <a:normAutofit/>
+            <a:normAutofit fontScale="92500" lnSpcReduction="10000"/>
           </a:bodyPr>
           <a:lstStyle/>
           <a:p>
             <a:r>
               <a:rPr lang="en-NZ" dirty="0" smtClean="0"/>
-              <a:t>The master </a:t>
+              <a:t>A </a:t>
             </a:r>
             <a:r>
               <a:rPr lang="en-NZ" dirty="0" err="1" smtClean="0"/>
-              <a:t>simframe</a:t>
+              <a:t>dataframe</a:t>
             </a:r>
             <a:r>
               <a:rPr lang="en-NZ" dirty="0" smtClean="0"/>
-              <a:t> is initialised from a </a:t>
-            </a:r>
-            <a:r>
-              <a:rPr lang="en-NZ" dirty="0" err="1" smtClean="0"/>
-              <a:t>simframe</a:t>
-            </a:r>
+              <a:t> of variables (input, intermediate, and outcome) used during the simulation</a:t>
+            </a:r>
+          </a:p>
+          <a:p>
+            <a:pPr lvl="1"/>
             <a:r>
               <a:rPr lang="en-NZ" dirty="0" smtClean="0"/>
-              <a:t> definition file.</a:t>
-            </a:r>
-          </a:p>
-          <a:p>
+              <a:t>Input variables are those that are not transformed</a:t>
+            </a:r>
+          </a:p>
+          <a:p>
+            <a:pPr lvl="1"/>
             <a:r>
               <a:rPr lang="en-NZ" dirty="0" smtClean="0"/>
-              <a:t>Each </a:t>
-            </a:r>
-            <a:r>
-              <a:rPr lang="en-NZ" dirty="0" err="1" smtClean="0"/>
-              <a:t>simframe</a:t>
-            </a:r>
+              <a:t>Intermediate variables are transformed during simulation iterations, but not recorded for output</a:t>
+            </a:r>
+          </a:p>
+          <a:p>
+            <a:pPr lvl="1"/>
             <a:r>
               <a:rPr lang="en-NZ" dirty="0" smtClean="0"/>
-              <a:t> variable is populated with initial values, as specified by the definition file.</a:t>
+              <a:t>Outcome variables are transformed during simulation iterations, and are stored in outcome matrices for generation of run stats after each run</a:t>
             </a:r>
           </a:p>
           <a:p>
             <a:r>
               <a:rPr lang="en-NZ" dirty="0" smtClean="0"/>
-              <a:t>The master </a:t>
-            </a:r>
-            <a:r>
-              <a:rPr lang="en-NZ" dirty="0" err="1" smtClean="0"/>
-              <a:t>simframe</a:t>
-            </a:r>
-            <a:r>
-              <a:rPr lang="en-NZ" dirty="0" smtClean="0"/>
-              <a:t> is typically stored in the global variable </a:t>
-            </a:r>
-            <a:r>
-              <a:rPr lang="en-NZ" dirty="0" err="1" smtClean="0">
-                <a:latin typeface="Courier New" pitchFamily="49" charset="0"/>
-                <a:cs typeface="Courier New" pitchFamily="49" charset="0"/>
-              </a:rPr>
-              <a:t>simframe.master</a:t>
-            </a:r>
-            <a:endParaRPr lang="en-NZ" dirty="0" smtClean="0">
-              <a:latin typeface="Courier New" pitchFamily="49" charset="0"/>
-              <a:cs typeface="Courier New" pitchFamily="49" charset="0"/>
-            </a:endParaRPr>
-          </a:p>
-          <a:p>
-            <a:endParaRPr lang="en-NZ" dirty="0" smtClean="0"/>
-          </a:p>
-          <a:p>
-            <a:endParaRPr lang="en-NZ" dirty="0"/>
+              <a:t>Each variable is a vector that contains values for all micro-units</a:t>
+            </a:r>
           </a:p>
         </p:txBody>
       </p:sp>
@@ -8378,183 +8621,473 @@
               <a:rPr lang="en-NZ" dirty="0" err="1" smtClean="0"/>
               <a:t>Simframe</a:t>
             </a:r>
-            <a:r>
-              <a:rPr lang="en-NZ" dirty="0" smtClean="0"/>
-              <a:t> definition file</a:t>
-            </a:r>
             <a:endParaRPr lang="en-NZ" dirty="0"/>
           </a:p>
         </p:txBody>
       </p:sp>
-      <p:sp>
-        <p:nvSpPr>
-          <p:cNvPr id="3" name="Content Placeholder 2"/>
-          <p:cNvSpPr>
-            <a:spLocks noGrp="1"/>
-          </p:cNvSpPr>
+      <p:graphicFrame>
+        <p:nvGraphicFramePr>
+          <p:cNvPr id="4" name="Content Placeholder 3"/>
+          <p:cNvGraphicFramePr>
+            <a:graphicFrameLocks noGrp="1"/>
+          </p:cNvGraphicFramePr>
           <p:nvPr>
             <p:ph idx="1"/>
           </p:nvPr>
-        </p:nvSpPr>
-        <p:spPr/>
-        <p:txBody>
-          <a:bodyPr>
-            <a:normAutofit fontScale="70000" lnSpcReduction="20000"/>
-          </a:bodyPr>
-          <a:lstStyle/>
-          <a:p>
-            <a:r>
-              <a:rPr lang="en-NZ" dirty="0" err="1" smtClean="0"/>
-              <a:t>Varname</a:t>
-            </a:r>
-            <a:r>
-              <a:rPr lang="en-NZ" dirty="0" smtClean="0"/>
-              <a:t>: </a:t>
-            </a:r>
-          </a:p>
-          <a:p>
-            <a:pPr lvl="1"/>
-            <a:r>
-              <a:rPr lang="en-NZ" dirty="0" smtClean="0"/>
-              <a:t>the name of a variable in the </a:t>
-            </a:r>
-            <a:r>
-              <a:rPr lang="en-NZ" dirty="0" err="1" smtClean="0"/>
-              <a:t>simframe</a:t>
-            </a:r>
-            <a:endParaRPr lang="en-NZ" dirty="0" smtClean="0"/>
-          </a:p>
-          <a:p>
-            <a:r>
-              <a:rPr lang="en-NZ" dirty="0" err="1" smtClean="0"/>
-              <a:t>Previous_var</a:t>
-            </a:r>
-            <a:endParaRPr lang="en-NZ" dirty="0" smtClean="0"/>
-          </a:p>
-          <a:p>
-            <a:pPr lvl="1"/>
-            <a:r>
-              <a:rPr lang="en-NZ" dirty="0" smtClean="0"/>
-              <a:t>the </a:t>
-            </a:r>
-            <a:r>
-              <a:rPr lang="en-NZ" dirty="0"/>
-              <a:t>name of a variable in which to store the current value in at the </a:t>
-            </a:r>
-            <a:r>
-              <a:rPr lang="en-NZ" dirty="0" smtClean="0"/>
-              <a:t>beginning of </a:t>
-            </a:r>
-            <a:r>
-              <a:rPr lang="en-NZ" dirty="0"/>
-              <a:t>each iteration (</a:t>
-            </a:r>
-            <a:r>
-              <a:rPr lang="en-NZ" dirty="0" err="1"/>
-              <a:t>i.e</a:t>
-            </a:r>
-            <a:r>
-              <a:rPr lang="en-NZ" dirty="0"/>
-              <a:t>: before it's transformed</a:t>
-            </a:r>
-            <a:r>
-              <a:rPr lang="en-NZ" dirty="0" smtClean="0"/>
-              <a:t>).</a:t>
-            </a:r>
-          </a:p>
-          <a:p>
-            <a:pPr lvl="1"/>
-            <a:r>
-              <a:rPr lang="en-NZ" dirty="0" smtClean="0"/>
-              <a:t>Optional </a:t>
-            </a:r>
-            <a:r>
-              <a:rPr lang="en-NZ" dirty="0"/>
-              <a:t>- for models that require previous state</a:t>
-            </a:r>
-            <a:r>
-              <a:rPr lang="en-NZ" dirty="0" smtClean="0"/>
-              <a:t>.</a:t>
-            </a:r>
-            <a:endParaRPr lang="en-NZ" dirty="0"/>
-          </a:p>
-          <a:p>
-            <a:r>
-              <a:rPr lang="en-NZ" dirty="0" err="1" smtClean="0"/>
-              <a:t>Initial_value</a:t>
-            </a:r>
-            <a:endParaRPr lang="en-NZ" dirty="0" smtClean="0"/>
-          </a:p>
-          <a:p>
-            <a:pPr lvl="1"/>
-            <a:r>
-              <a:rPr lang="en-NZ" dirty="0"/>
-              <a:t>an expression that generates the initial value of the variable</a:t>
-            </a:r>
-            <a:r>
-              <a:rPr lang="en-NZ" dirty="0" smtClean="0"/>
-              <a:t>. Typically this expression will reference values in a previously loaded </a:t>
-            </a:r>
-            <a:r>
-              <a:rPr lang="en-NZ" dirty="0" err="1" smtClean="0"/>
-              <a:t>basefile</a:t>
-            </a:r>
-            <a:r>
-              <a:rPr lang="en-NZ" dirty="0" smtClean="0"/>
-              <a:t>.</a:t>
-            </a:r>
-          </a:p>
-          <a:p>
-            <a:r>
-              <a:rPr lang="en-NZ" dirty="0" err="1" smtClean="0"/>
-              <a:t>Outcome_type</a:t>
-            </a:r>
-            <a:endParaRPr lang="en-NZ" dirty="0" smtClean="0"/>
-          </a:p>
-          <a:p>
-            <a:pPr lvl="1"/>
-            <a:r>
-              <a:rPr lang="en-NZ" dirty="0"/>
-              <a:t>i</a:t>
-            </a:r>
-            <a:r>
-              <a:rPr lang="en-NZ" dirty="0" smtClean="0"/>
-              <a:t>f specified, indicates this is an outcome variable and indicates its type which is one of “categorical” or “continuous”</a:t>
-            </a:r>
-          </a:p>
-          <a:p>
-            <a:r>
-              <a:rPr lang="en-NZ" dirty="0" err="1" smtClean="0"/>
-              <a:t>Outcome_module</a:t>
-            </a:r>
-            <a:endParaRPr lang="en-NZ" dirty="0" smtClean="0"/>
-          </a:p>
-          <a:p>
-            <a:pPr lvl="1"/>
-            <a:r>
-              <a:rPr lang="en-NZ" dirty="0"/>
-              <a:t>if specified, indicates the </a:t>
-            </a:r>
-            <a:r>
-              <a:rPr lang="en-NZ" dirty="0" err="1" smtClean="0"/>
-              <a:t>Simmodule</a:t>
-            </a:r>
-            <a:r>
-              <a:rPr lang="en-NZ" dirty="0" smtClean="0"/>
-              <a:t> </a:t>
-            </a:r>
-            <a:r>
-              <a:rPr lang="en-NZ" dirty="0"/>
-              <a:t>this outcome variable belongs to</a:t>
-            </a:r>
-            <a:endParaRPr lang="en-NZ" dirty="0" smtClean="0"/>
-          </a:p>
-          <a:p>
-            <a:pPr lvl="1"/>
-            <a:endParaRPr lang="en-NZ" dirty="0" smtClean="0"/>
-          </a:p>
-        </p:txBody>
-      </p:sp>
+        </p:nvGraphicFramePr>
+        <p:xfrm>
+          <a:off x="1763688" y="1628800"/>
+          <a:ext cx="5606836" cy="2225040"/>
+        </p:xfrm>
+        <a:graphic>
+          <a:graphicData uri="http://schemas.openxmlformats.org/drawingml/2006/table">
+            <a:tbl>
+              <a:tblPr firstRow="1" bandRow="1">
+                <a:tableStyleId>{5C22544A-7EE6-4342-B048-85BDC9FD1C3A}</a:tableStyleId>
+              </a:tblPr>
+              <a:tblGrid>
+                <a:gridCol w="514400"/>
+                <a:gridCol w="792088"/>
+                <a:gridCol w="863918"/>
+                <a:gridCol w="1790510"/>
+                <a:gridCol w="1645920"/>
+              </a:tblGrid>
+              <a:tr h="370840">
+                <a:tc>
+                  <a:txBody>
+                    <a:bodyPr/>
+                    <a:lstStyle/>
+                    <a:p>
+                      <a:r>
+                        <a:rPr lang="en-NZ" dirty="0" smtClean="0"/>
+                        <a:t>ID</a:t>
+                      </a:r>
+                      <a:endParaRPr lang="en-NZ" dirty="0"/>
+                    </a:p>
+                  </a:txBody>
+                  <a:tcPr/>
+                </a:tc>
+                <a:tc>
+                  <a:txBody>
+                    <a:bodyPr/>
+                    <a:lstStyle/>
+                    <a:p>
+                      <a:r>
+                        <a:rPr lang="en-NZ" dirty="0" smtClean="0"/>
+                        <a:t>Age</a:t>
+                      </a:r>
+                      <a:endParaRPr lang="en-NZ" dirty="0"/>
+                    </a:p>
+                  </a:txBody>
+                  <a:tcPr/>
+                </a:tc>
+                <a:tc>
+                  <a:txBody>
+                    <a:bodyPr/>
+                    <a:lstStyle/>
+                    <a:p>
+                      <a:r>
+                        <a:rPr lang="en-NZ" dirty="0" smtClean="0"/>
+                        <a:t>Health</a:t>
+                      </a:r>
+                      <a:endParaRPr lang="en-NZ" dirty="0"/>
+                    </a:p>
+                  </a:txBody>
+                  <a:tcPr/>
+                </a:tc>
+                <a:tc>
+                  <a:txBody>
+                    <a:bodyPr/>
+                    <a:lstStyle/>
+                    <a:p>
+                      <a:r>
+                        <a:rPr lang="en-NZ" dirty="0" err="1" smtClean="0"/>
+                        <a:t>Health_previous</a:t>
+                      </a:r>
+                      <a:endParaRPr lang="en-NZ" dirty="0"/>
+                    </a:p>
+                  </a:txBody>
+                  <a:tcPr/>
+                </a:tc>
+                <a:tc>
+                  <a:txBody>
+                    <a:bodyPr/>
+                    <a:lstStyle/>
+                    <a:p>
+                      <a:r>
+                        <a:rPr lang="en-NZ" dirty="0" smtClean="0"/>
+                        <a:t>Earnings</a:t>
+                      </a:r>
+                      <a:endParaRPr lang="en-NZ" dirty="0"/>
+                    </a:p>
+                  </a:txBody>
+                  <a:tcPr/>
+                </a:tc>
+              </a:tr>
+              <a:tr h="370840">
+                <a:tc>
+                  <a:txBody>
+                    <a:bodyPr/>
+                    <a:lstStyle/>
+                    <a:p>
+                      <a:r>
+                        <a:rPr lang="en-NZ" dirty="0" smtClean="0"/>
+                        <a:t>1</a:t>
+                      </a:r>
+                      <a:endParaRPr lang="en-NZ" dirty="0"/>
+                    </a:p>
+                  </a:txBody>
+                  <a:tcPr/>
+                </a:tc>
+                <a:tc>
+                  <a:txBody>
+                    <a:bodyPr/>
+                    <a:lstStyle/>
+                    <a:p>
+                      <a:r>
+                        <a:rPr lang="en-NZ" dirty="0" smtClean="0"/>
+                        <a:t>2</a:t>
+                      </a:r>
+                      <a:endParaRPr lang="en-NZ" dirty="0"/>
+                    </a:p>
+                  </a:txBody>
+                  <a:tcPr/>
+                </a:tc>
+                <a:tc>
+                  <a:txBody>
+                    <a:bodyPr/>
+                    <a:lstStyle/>
+                    <a:p>
+                      <a:r>
+                        <a:rPr lang="en-NZ" dirty="0" smtClean="0"/>
+                        <a:t>0</a:t>
+                      </a:r>
+                      <a:endParaRPr lang="en-NZ" dirty="0"/>
+                    </a:p>
+                  </a:txBody>
+                  <a:tcPr/>
+                </a:tc>
+                <a:tc>
+                  <a:txBody>
+                    <a:bodyPr/>
+                    <a:lstStyle/>
+                    <a:p>
+                      <a:r>
+                        <a:rPr lang="en-NZ" dirty="0" smtClean="0"/>
+                        <a:t>NA</a:t>
+                      </a:r>
+                      <a:endParaRPr lang="en-NZ" dirty="0"/>
+                    </a:p>
+                  </a:txBody>
+                  <a:tcPr/>
+                </a:tc>
+                <a:tc>
+                  <a:txBody>
+                    <a:bodyPr/>
+                    <a:lstStyle/>
+                    <a:p>
+                      <a:r>
+                        <a:rPr lang="en-NZ" dirty="0" smtClean="0"/>
+                        <a:t>0</a:t>
+                      </a:r>
+                      <a:endParaRPr lang="en-NZ" dirty="0"/>
+                    </a:p>
+                  </a:txBody>
+                  <a:tcPr/>
+                </a:tc>
+              </a:tr>
+              <a:tr h="370840">
+                <a:tc>
+                  <a:txBody>
+                    <a:bodyPr/>
+                    <a:lstStyle/>
+                    <a:p>
+                      <a:r>
+                        <a:rPr lang="en-NZ" dirty="0" smtClean="0"/>
+                        <a:t>2</a:t>
+                      </a:r>
+                      <a:endParaRPr lang="en-NZ" dirty="0"/>
+                    </a:p>
+                  </a:txBody>
+                  <a:tcPr/>
+                </a:tc>
+                <a:tc>
+                  <a:txBody>
+                    <a:bodyPr/>
+                    <a:lstStyle/>
+                    <a:p>
+                      <a:r>
+                        <a:rPr lang="en-NZ" dirty="0" smtClean="0"/>
+                        <a:t>5</a:t>
+                      </a:r>
+                      <a:endParaRPr lang="en-NZ" dirty="0"/>
+                    </a:p>
+                  </a:txBody>
+                  <a:tcPr/>
+                </a:tc>
+                <a:tc>
+                  <a:txBody>
+                    <a:bodyPr/>
+                    <a:lstStyle/>
+                    <a:p>
+                      <a:r>
+                        <a:rPr lang="en-NZ" dirty="0" smtClean="0"/>
+                        <a:t>0</a:t>
+                      </a:r>
+                      <a:endParaRPr lang="en-NZ" dirty="0"/>
+                    </a:p>
+                  </a:txBody>
+                  <a:tcPr/>
+                </a:tc>
+                <a:tc>
+                  <a:txBody>
+                    <a:bodyPr/>
+                    <a:lstStyle/>
+                    <a:p>
+                      <a:r>
+                        <a:rPr lang="en-NZ" dirty="0" smtClean="0"/>
+                        <a:t>NA</a:t>
+                      </a:r>
+                      <a:endParaRPr lang="en-NZ" dirty="0"/>
+                    </a:p>
+                  </a:txBody>
+                  <a:tcPr/>
+                </a:tc>
+                <a:tc>
+                  <a:txBody>
+                    <a:bodyPr/>
+                    <a:lstStyle/>
+                    <a:p>
+                      <a:r>
+                        <a:rPr lang="en-NZ" dirty="0" smtClean="0"/>
+                        <a:t>0</a:t>
+                      </a:r>
+                      <a:endParaRPr lang="en-NZ" dirty="0"/>
+                    </a:p>
+                  </a:txBody>
+                  <a:tcPr/>
+                </a:tc>
+              </a:tr>
+              <a:tr h="370840">
+                <a:tc>
+                  <a:txBody>
+                    <a:bodyPr/>
+                    <a:lstStyle/>
+                    <a:p>
+                      <a:r>
+                        <a:rPr lang="en-NZ" dirty="0" smtClean="0"/>
+                        <a:t>3</a:t>
+                      </a:r>
+                      <a:endParaRPr lang="en-NZ" dirty="0"/>
+                    </a:p>
+                  </a:txBody>
+                  <a:tcPr/>
+                </a:tc>
+                <a:tc>
+                  <a:txBody>
+                    <a:bodyPr/>
+                    <a:lstStyle/>
+                    <a:p>
+                      <a:r>
+                        <a:rPr lang="en-NZ" dirty="0" smtClean="0"/>
+                        <a:t>6</a:t>
+                      </a:r>
+                      <a:endParaRPr lang="en-NZ" dirty="0"/>
+                    </a:p>
+                  </a:txBody>
+                  <a:tcPr/>
+                </a:tc>
+                <a:tc>
+                  <a:txBody>
+                    <a:bodyPr/>
+                    <a:lstStyle/>
+                    <a:p>
+                      <a:r>
+                        <a:rPr lang="en-NZ" dirty="0" smtClean="0"/>
+                        <a:t>0</a:t>
+                      </a:r>
+                      <a:endParaRPr lang="en-NZ" dirty="0"/>
+                    </a:p>
+                  </a:txBody>
+                  <a:tcPr/>
+                </a:tc>
+                <a:tc>
+                  <a:txBody>
+                    <a:bodyPr/>
+                    <a:lstStyle/>
+                    <a:p>
+                      <a:r>
+                        <a:rPr lang="en-NZ" dirty="0" smtClean="0"/>
+                        <a:t>NA</a:t>
+                      </a:r>
+                      <a:endParaRPr lang="en-NZ" dirty="0"/>
+                    </a:p>
+                  </a:txBody>
+                  <a:tcPr/>
+                </a:tc>
+                <a:tc>
+                  <a:txBody>
+                    <a:bodyPr/>
+                    <a:lstStyle/>
+                    <a:p>
+                      <a:r>
+                        <a:rPr lang="en-NZ" dirty="0" smtClean="0"/>
+                        <a:t>0</a:t>
+                      </a:r>
+                      <a:endParaRPr lang="en-NZ" dirty="0"/>
+                    </a:p>
+                  </a:txBody>
+                  <a:tcPr/>
+                </a:tc>
+              </a:tr>
+              <a:tr h="370840">
+                <a:tc>
+                  <a:txBody>
+                    <a:bodyPr/>
+                    <a:lstStyle/>
+                    <a:p>
+                      <a:r>
+                        <a:rPr lang="en-NZ" dirty="0" smtClean="0"/>
+                        <a:t>4</a:t>
+                      </a:r>
+                      <a:endParaRPr lang="en-NZ" dirty="0"/>
+                    </a:p>
+                  </a:txBody>
+                  <a:tcPr/>
+                </a:tc>
+                <a:tc>
+                  <a:txBody>
+                    <a:bodyPr/>
+                    <a:lstStyle/>
+                    <a:p>
+                      <a:r>
+                        <a:rPr lang="en-NZ" dirty="0" smtClean="0"/>
+                        <a:t>2</a:t>
+                      </a:r>
+                      <a:endParaRPr lang="en-NZ" dirty="0"/>
+                    </a:p>
+                  </a:txBody>
+                  <a:tcPr/>
+                </a:tc>
+                <a:tc>
+                  <a:txBody>
+                    <a:bodyPr/>
+                    <a:lstStyle/>
+                    <a:p>
+                      <a:r>
+                        <a:rPr lang="en-NZ" dirty="0" smtClean="0"/>
+                        <a:t>0</a:t>
+                      </a:r>
+                      <a:endParaRPr lang="en-NZ" dirty="0"/>
+                    </a:p>
+                  </a:txBody>
+                  <a:tcPr/>
+                </a:tc>
+                <a:tc>
+                  <a:txBody>
+                    <a:bodyPr/>
+                    <a:lstStyle/>
+                    <a:p>
+                      <a:r>
+                        <a:rPr lang="en-NZ" dirty="0" smtClean="0"/>
+                        <a:t>NA</a:t>
+                      </a:r>
+                      <a:endParaRPr lang="en-NZ" dirty="0"/>
+                    </a:p>
+                  </a:txBody>
+                  <a:tcPr/>
+                </a:tc>
+                <a:tc>
+                  <a:txBody>
+                    <a:bodyPr/>
+                    <a:lstStyle/>
+                    <a:p>
+                      <a:r>
+                        <a:rPr lang="en-NZ" dirty="0" smtClean="0"/>
+                        <a:t>0</a:t>
+                      </a:r>
+                      <a:endParaRPr lang="en-NZ" dirty="0"/>
+                    </a:p>
+                  </a:txBody>
+                  <a:tcPr/>
+                </a:tc>
+              </a:tr>
+              <a:tr h="370840">
+                <a:tc>
+                  <a:txBody>
+                    <a:bodyPr/>
+                    <a:lstStyle/>
+                    <a:p>
+                      <a:r>
+                        <a:rPr lang="en-NZ" dirty="0" smtClean="0"/>
+                        <a:t>5</a:t>
+                      </a:r>
+                      <a:endParaRPr lang="en-NZ" dirty="0"/>
+                    </a:p>
+                  </a:txBody>
+                  <a:tcPr/>
+                </a:tc>
+                <a:tc>
+                  <a:txBody>
+                    <a:bodyPr/>
+                    <a:lstStyle/>
+                    <a:p>
+                      <a:r>
+                        <a:rPr lang="en-NZ" dirty="0" smtClean="0"/>
+                        <a:t>4</a:t>
+                      </a:r>
+                      <a:endParaRPr lang="en-NZ" dirty="0"/>
+                    </a:p>
+                  </a:txBody>
+                  <a:tcPr/>
+                </a:tc>
+                <a:tc>
+                  <a:txBody>
+                    <a:bodyPr/>
+                    <a:lstStyle/>
+                    <a:p>
+                      <a:r>
+                        <a:rPr lang="en-NZ" dirty="0" smtClean="0"/>
+                        <a:t>0</a:t>
+                      </a:r>
+                      <a:endParaRPr lang="en-NZ" dirty="0"/>
+                    </a:p>
+                  </a:txBody>
+                  <a:tcPr/>
+                </a:tc>
+                <a:tc>
+                  <a:txBody>
+                    <a:bodyPr/>
+                    <a:lstStyle/>
+                    <a:p>
+                      <a:r>
+                        <a:rPr lang="en-NZ" dirty="0" smtClean="0"/>
+                        <a:t>NA</a:t>
+                      </a:r>
+                      <a:endParaRPr lang="en-NZ" dirty="0"/>
+                    </a:p>
+                  </a:txBody>
+                  <a:tcPr/>
+                </a:tc>
+                <a:tc>
+                  <a:txBody>
+                    <a:bodyPr/>
+                    <a:lstStyle/>
+                    <a:p>
+                      <a:r>
+                        <a:rPr lang="en-NZ" dirty="0" smtClean="0"/>
+                        <a:t>0</a:t>
+                      </a:r>
+                      <a:endParaRPr lang="en-NZ" dirty="0"/>
+                    </a:p>
+                  </a:txBody>
+                  <a:tcPr/>
+                </a:tc>
+              </a:tr>
+            </a:tbl>
+          </a:graphicData>
+        </a:graphic>
+      </p:graphicFrame>
     </p:spTree>
   </p:cSld>
   <p:clrMapOvr>

</xml_diff>

<commit_message>
added demo wip files
</commit_message>
<xml_diff>
--- a/docs/Simar overview.pptx
+++ b/docs/Simar overview.pptx
@@ -12,16 +12,18 @@
     <p:sldId id="270" r:id="rId6"/>
     <p:sldId id="271" r:id="rId7"/>
     <p:sldId id="273" r:id="rId8"/>
-    <p:sldId id="261" r:id="rId9"/>
-    <p:sldId id="269" r:id="rId10"/>
-    <p:sldId id="264" r:id="rId11"/>
-    <p:sldId id="268" r:id="rId12"/>
-    <p:sldId id="267" r:id="rId13"/>
-    <p:sldId id="266" r:id="rId14"/>
-    <p:sldId id="272" r:id="rId15"/>
-    <p:sldId id="265" r:id="rId16"/>
-    <p:sldId id="257" r:id="rId17"/>
-    <p:sldId id="259" r:id="rId18"/>
+    <p:sldId id="274" r:id="rId9"/>
+    <p:sldId id="275" r:id="rId10"/>
+    <p:sldId id="261" r:id="rId11"/>
+    <p:sldId id="269" r:id="rId12"/>
+    <p:sldId id="264" r:id="rId13"/>
+    <p:sldId id="268" r:id="rId14"/>
+    <p:sldId id="267" r:id="rId15"/>
+    <p:sldId id="266" r:id="rId16"/>
+    <p:sldId id="272" r:id="rId17"/>
+    <p:sldId id="265" r:id="rId18"/>
+    <p:sldId id="257" r:id="rId19"/>
+    <p:sldId id="259" r:id="rId20"/>
   </p:sldIdLst>
   <p:sldSz cx="9144000" cy="6858000" type="screen4x3"/>
   <p:notesSz cx="6858000" cy="9144000"/>
@@ -3116,115 +3118,83 @@
       </p:grpSpPr>
       <p:sp>
         <p:nvSpPr>
-          <p:cNvPr id="2" name="Title 1"/>
+          <p:cNvPr id="8" name="Title 7"/>
           <p:cNvSpPr>
             <a:spLocks noGrp="1"/>
           </p:cNvSpPr>
           <p:nvPr>
             <p:ph type="title"/>
+          </p:nvPr>
+        </p:nvSpPr>
+        <p:spPr/>
+        <p:txBody>
+          <a:bodyPr/>
+          <a:lstStyle/>
+          <a:p>
+            <a:r>
+              <a:rPr lang="en-NZ" dirty="0" err="1" smtClean="0"/>
+              <a:t>Simframe</a:t>
+            </a:r>
+            <a:endParaRPr lang="en-NZ" dirty="0"/>
+          </a:p>
+        </p:txBody>
+      </p:sp>
+      <p:sp>
+        <p:nvSpPr>
+          <p:cNvPr id="9" name="Content Placeholder 8"/>
+          <p:cNvSpPr>
+            <a:spLocks noGrp="1"/>
+          </p:cNvSpPr>
+          <p:nvPr>
+            <p:ph idx="1"/>
           </p:nvPr>
         </p:nvSpPr>
         <p:spPr/>
         <p:txBody>
           <a:bodyPr>
-            <a:normAutofit/>
+            <a:normAutofit fontScale="92500" lnSpcReduction="10000"/>
           </a:bodyPr>
           <a:lstStyle/>
           <a:p>
             <a:r>
               <a:rPr lang="en-NZ" dirty="0" smtClean="0"/>
-              <a:t>The master </a:t>
+              <a:t>A </a:t>
             </a:r>
             <a:r>
               <a:rPr lang="en-NZ" dirty="0" err="1" smtClean="0"/>
-              <a:t>simframe</a:t>
-            </a:r>
-            <a:endParaRPr lang="en-NZ" dirty="0"/>
-          </a:p>
-        </p:txBody>
-      </p:sp>
-      <p:sp>
-        <p:nvSpPr>
-          <p:cNvPr id="3" name="Content Placeholder 2"/>
-          <p:cNvSpPr>
-            <a:spLocks noGrp="1"/>
-          </p:cNvSpPr>
-          <p:nvPr>
-            <p:ph idx="1"/>
-          </p:nvPr>
-        </p:nvSpPr>
-        <p:spPr/>
-        <p:txBody>
-          <a:bodyPr>
-            <a:normAutofit/>
-          </a:bodyPr>
-          <a:lstStyle/>
-          <a:p>
-            <a:r>
-              <a:rPr lang="en-NZ" dirty="0" smtClean="0"/>
-              <a:t>The master </a:t>
-            </a:r>
-            <a:r>
-              <a:rPr lang="en-NZ" dirty="0" err="1" smtClean="0"/>
-              <a:t>simframe</a:t>
-            </a:r>
-            <a:r>
-              <a:rPr lang="en-NZ" dirty="0" smtClean="0"/>
-              <a:t> is initialised from a </a:t>
-            </a:r>
-            <a:r>
-              <a:rPr lang="en-NZ" dirty="0" err="1" smtClean="0"/>
-              <a:t>simframe</a:t>
-            </a:r>
-            <a:r>
-              <a:rPr lang="en-NZ" dirty="0" smtClean="0"/>
-              <a:t> definition file.</a:t>
-            </a:r>
-          </a:p>
-          <a:p>
-            <a:r>
-              <a:rPr lang="en-NZ" dirty="0" smtClean="0"/>
-              <a:t>Each </a:t>
-            </a:r>
-            <a:r>
-              <a:rPr lang="en-NZ" dirty="0" err="1" smtClean="0"/>
-              <a:t>simframe</a:t>
-            </a:r>
-            <a:r>
-              <a:rPr lang="en-NZ" dirty="0" smtClean="0"/>
-              <a:t> variable is populated with initial values, as specified by the definition file.</a:t>
-            </a:r>
-          </a:p>
-          <a:p>
-            <a:r>
-              <a:rPr lang="en-NZ" dirty="0" smtClean="0"/>
-              <a:t>The master </a:t>
-            </a:r>
-            <a:r>
-              <a:rPr lang="en-NZ" dirty="0" err="1" smtClean="0"/>
-              <a:t>simframe</a:t>
-            </a:r>
-            <a:r>
-              <a:rPr lang="en-NZ" dirty="0" smtClean="0"/>
-              <a:t> is typically stored in the global variable </a:t>
-            </a:r>
-            <a:r>
-              <a:rPr lang="en-NZ" dirty="0" err="1" smtClean="0">
-                <a:latin typeface="Courier New" pitchFamily="49" charset="0"/>
-                <a:cs typeface="Courier New" pitchFamily="49" charset="0"/>
-              </a:rPr>
-              <a:t>simframe.master</a:t>
-            </a:r>
-            <a:endParaRPr lang="en-NZ" dirty="0" smtClean="0">
-              <a:latin typeface="Courier New" pitchFamily="49" charset="0"/>
-              <a:cs typeface="Courier New" pitchFamily="49" charset="0"/>
-            </a:endParaRPr>
-          </a:p>
-          <a:p>
-            <a:endParaRPr lang="en-NZ" dirty="0" smtClean="0"/>
-          </a:p>
-          <a:p>
-            <a:endParaRPr lang="en-NZ" dirty="0"/>
+              <a:t>dataframe</a:t>
+            </a:r>
+            <a:r>
+              <a:rPr lang="en-NZ" dirty="0" smtClean="0"/>
+              <a:t> of variables (input, intermediate, and outcome) used during the simulation</a:t>
+            </a:r>
+          </a:p>
+          <a:p>
+            <a:pPr lvl="1"/>
+            <a:r>
+              <a:rPr lang="en-NZ" dirty="0" smtClean="0"/>
+              <a:t>Input variables are those that are not transformed</a:t>
+            </a:r>
+          </a:p>
+          <a:p>
+            <a:pPr lvl="1"/>
+            <a:r>
+              <a:rPr lang="en-NZ" dirty="0" smtClean="0"/>
+              <a:t>Intermediate variables are transformed during simulation iterations, but not recorded for output</a:t>
+            </a:r>
+          </a:p>
+          <a:p>
+            <a:pPr lvl="1"/>
+            <a:r>
+              <a:rPr lang="en-NZ" dirty="0" smtClean="0"/>
+              <a:t>Outcome variables are transformed during simulation iterations, and are stored in outcome matrices for generation of run stats after each run</a:t>
+            </a:r>
+          </a:p>
+          <a:p>
+            <a:r>
+              <a:rPr lang="en-NZ" dirty="0" smtClean="0"/>
+              <a:t>Each variable is a vector that contains values for all micro-units</a:t>
+            </a:r>
           </a:p>
         </p:txBody>
       </p:sp>
@@ -3272,183 +3242,473 @@
               <a:rPr lang="en-NZ" dirty="0" err="1" smtClean="0"/>
               <a:t>Simframe</a:t>
             </a:r>
-            <a:r>
-              <a:rPr lang="en-NZ" dirty="0" smtClean="0"/>
-              <a:t> definition file</a:t>
-            </a:r>
             <a:endParaRPr lang="en-NZ" dirty="0"/>
           </a:p>
         </p:txBody>
       </p:sp>
-      <p:sp>
-        <p:nvSpPr>
-          <p:cNvPr id="3" name="Content Placeholder 2"/>
-          <p:cNvSpPr>
-            <a:spLocks noGrp="1"/>
-          </p:cNvSpPr>
+      <p:graphicFrame>
+        <p:nvGraphicFramePr>
+          <p:cNvPr id="4" name="Content Placeholder 3"/>
+          <p:cNvGraphicFramePr>
+            <a:graphicFrameLocks noGrp="1"/>
+          </p:cNvGraphicFramePr>
           <p:nvPr>
             <p:ph idx="1"/>
           </p:nvPr>
-        </p:nvSpPr>
-        <p:spPr/>
-        <p:txBody>
-          <a:bodyPr>
-            <a:normAutofit fontScale="70000" lnSpcReduction="20000"/>
-          </a:bodyPr>
-          <a:lstStyle/>
-          <a:p>
-            <a:r>
-              <a:rPr lang="en-NZ" dirty="0" err="1" smtClean="0"/>
-              <a:t>Varname</a:t>
-            </a:r>
-            <a:r>
-              <a:rPr lang="en-NZ" dirty="0" smtClean="0"/>
-              <a:t>: </a:t>
-            </a:r>
-          </a:p>
-          <a:p>
-            <a:pPr lvl="1"/>
-            <a:r>
-              <a:rPr lang="en-NZ" dirty="0" smtClean="0"/>
-              <a:t>the name of a variable in the </a:t>
-            </a:r>
-            <a:r>
-              <a:rPr lang="en-NZ" dirty="0" err="1" smtClean="0"/>
-              <a:t>simframe</a:t>
-            </a:r>
-            <a:endParaRPr lang="en-NZ" dirty="0" smtClean="0"/>
-          </a:p>
-          <a:p>
-            <a:r>
-              <a:rPr lang="en-NZ" dirty="0" err="1" smtClean="0"/>
-              <a:t>Previous_var</a:t>
-            </a:r>
-            <a:endParaRPr lang="en-NZ" dirty="0" smtClean="0"/>
-          </a:p>
-          <a:p>
-            <a:pPr lvl="1"/>
-            <a:r>
-              <a:rPr lang="en-NZ" dirty="0" smtClean="0"/>
-              <a:t>the </a:t>
-            </a:r>
-            <a:r>
-              <a:rPr lang="en-NZ" dirty="0"/>
-              <a:t>name of a variable in which to store the current value in at the </a:t>
-            </a:r>
-            <a:r>
-              <a:rPr lang="en-NZ" dirty="0" smtClean="0"/>
-              <a:t>beginning of </a:t>
-            </a:r>
-            <a:r>
-              <a:rPr lang="en-NZ" dirty="0"/>
-              <a:t>each iteration (</a:t>
-            </a:r>
-            <a:r>
-              <a:rPr lang="en-NZ" dirty="0" err="1"/>
-              <a:t>i.e</a:t>
-            </a:r>
-            <a:r>
-              <a:rPr lang="en-NZ" dirty="0"/>
-              <a:t>: before it's transformed</a:t>
-            </a:r>
-            <a:r>
-              <a:rPr lang="en-NZ" dirty="0" smtClean="0"/>
-              <a:t>).</a:t>
-            </a:r>
-          </a:p>
-          <a:p>
-            <a:pPr lvl="1"/>
-            <a:r>
-              <a:rPr lang="en-NZ" dirty="0" smtClean="0"/>
-              <a:t>Optional </a:t>
-            </a:r>
-            <a:r>
-              <a:rPr lang="en-NZ" dirty="0"/>
-              <a:t>- for models that require previous state</a:t>
-            </a:r>
-            <a:r>
-              <a:rPr lang="en-NZ" dirty="0" smtClean="0"/>
-              <a:t>.</a:t>
-            </a:r>
-            <a:endParaRPr lang="en-NZ" dirty="0"/>
-          </a:p>
-          <a:p>
-            <a:r>
-              <a:rPr lang="en-NZ" dirty="0" err="1" smtClean="0"/>
-              <a:t>Initial_value</a:t>
-            </a:r>
-            <a:endParaRPr lang="en-NZ" dirty="0" smtClean="0"/>
-          </a:p>
-          <a:p>
-            <a:pPr lvl="1"/>
-            <a:r>
-              <a:rPr lang="en-NZ" dirty="0"/>
-              <a:t>an expression that generates the initial value of the variable</a:t>
-            </a:r>
-            <a:r>
-              <a:rPr lang="en-NZ" dirty="0" smtClean="0"/>
-              <a:t>. Typically this expression will reference values in a previously loaded </a:t>
-            </a:r>
-            <a:r>
-              <a:rPr lang="en-NZ" dirty="0" err="1" smtClean="0"/>
-              <a:t>basefile</a:t>
-            </a:r>
-            <a:r>
-              <a:rPr lang="en-NZ" dirty="0" smtClean="0"/>
-              <a:t>.</a:t>
-            </a:r>
-          </a:p>
-          <a:p>
-            <a:r>
-              <a:rPr lang="en-NZ" dirty="0" err="1" smtClean="0"/>
-              <a:t>Outcome_type</a:t>
-            </a:r>
-            <a:endParaRPr lang="en-NZ" dirty="0" smtClean="0"/>
-          </a:p>
-          <a:p>
-            <a:pPr lvl="1"/>
-            <a:r>
-              <a:rPr lang="en-NZ" dirty="0"/>
-              <a:t>i</a:t>
-            </a:r>
-            <a:r>
-              <a:rPr lang="en-NZ" dirty="0" smtClean="0"/>
-              <a:t>f specified, indicates this is an outcome variable and indicates its type which is one of “categorical” or “continuous”</a:t>
-            </a:r>
-          </a:p>
-          <a:p>
-            <a:r>
-              <a:rPr lang="en-NZ" dirty="0" err="1" smtClean="0"/>
-              <a:t>Outcome_module</a:t>
-            </a:r>
-            <a:endParaRPr lang="en-NZ" dirty="0" smtClean="0"/>
-          </a:p>
-          <a:p>
-            <a:pPr lvl="1"/>
-            <a:r>
-              <a:rPr lang="en-NZ" dirty="0"/>
-              <a:t>if specified, indicates the </a:t>
-            </a:r>
-            <a:r>
-              <a:rPr lang="en-NZ" dirty="0" err="1" smtClean="0"/>
-              <a:t>Simmodule</a:t>
-            </a:r>
-            <a:r>
-              <a:rPr lang="en-NZ" dirty="0" smtClean="0"/>
-              <a:t> </a:t>
-            </a:r>
-            <a:r>
-              <a:rPr lang="en-NZ" dirty="0"/>
-              <a:t>this outcome variable belongs to</a:t>
-            </a:r>
-            <a:endParaRPr lang="en-NZ" dirty="0" smtClean="0"/>
-          </a:p>
-          <a:p>
-            <a:pPr lvl="1"/>
-            <a:endParaRPr lang="en-NZ" dirty="0" smtClean="0"/>
-          </a:p>
-        </p:txBody>
-      </p:sp>
+        </p:nvGraphicFramePr>
+        <p:xfrm>
+          <a:off x="1763688" y="1628800"/>
+          <a:ext cx="5606836" cy="2225040"/>
+        </p:xfrm>
+        <a:graphic>
+          <a:graphicData uri="http://schemas.openxmlformats.org/drawingml/2006/table">
+            <a:tbl>
+              <a:tblPr firstRow="1" bandRow="1">
+                <a:tableStyleId>{5C22544A-7EE6-4342-B048-85BDC9FD1C3A}</a:tableStyleId>
+              </a:tblPr>
+              <a:tblGrid>
+                <a:gridCol w="514400"/>
+                <a:gridCol w="792088"/>
+                <a:gridCol w="863918"/>
+                <a:gridCol w="1790510"/>
+                <a:gridCol w="1645920"/>
+              </a:tblGrid>
+              <a:tr h="370840">
+                <a:tc>
+                  <a:txBody>
+                    <a:bodyPr/>
+                    <a:lstStyle/>
+                    <a:p>
+                      <a:r>
+                        <a:rPr lang="en-NZ" dirty="0" smtClean="0"/>
+                        <a:t>ID</a:t>
+                      </a:r>
+                      <a:endParaRPr lang="en-NZ" dirty="0"/>
+                    </a:p>
+                  </a:txBody>
+                  <a:tcPr/>
+                </a:tc>
+                <a:tc>
+                  <a:txBody>
+                    <a:bodyPr/>
+                    <a:lstStyle/>
+                    <a:p>
+                      <a:r>
+                        <a:rPr lang="en-NZ" dirty="0" smtClean="0"/>
+                        <a:t>Age</a:t>
+                      </a:r>
+                      <a:endParaRPr lang="en-NZ" dirty="0"/>
+                    </a:p>
+                  </a:txBody>
+                  <a:tcPr/>
+                </a:tc>
+                <a:tc>
+                  <a:txBody>
+                    <a:bodyPr/>
+                    <a:lstStyle/>
+                    <a:p>
+                      <a:r>
+                        <a:rPr lang="en-NZ" dirty="0" smtClean="0"/>
+                        <a:t>Health</a:t>
+                      </a:r>
+                      <a:endParaRPr lang="en-NZ" dirty="0"/>
+                    </a:p>
+                  </a:txBody>
+                  <a:tcPr/>
+                </a:tc>
+                <a:tc>
+                  <a:txBody>
+                    <a:bodyPr/>
+                    <a:lstStyle/>
+                    <a:p>
+                      <a:r>
+                        <a:rPr lang="en-NZ" dirty="0" err="1" smtClean="0"/>
+                        <a:t>Health_previous</a:t>
+                      </a:r>
+                      <a:endParaRPr lang="en-NZ" dirty="0"/>
+                    </a:p>
+                  </a:txBody>
+                  <a:tcPr/>
+                </a:tc>
+                <a:tc>
+                  <a:txBody>
+                    <a:bodyPr/>
+                    <a:lstStyle/>
+                    <a:p>
+                      <a:r>
+                        <a:rPr lang="en-NZ" dirty="0" smtClean="0"/>
+                        <a:t>Earnings</a:t>
+                      </a:r>
+                      <a:endParaRPr lang="en-NZ" dirty="0"/>
+                    </a:p>
+                  </a:txBody>
+                  <a:tcPr/>
+                </a:tc>
+              </a:tr>
+              <a:tr h="370840">
+                <a:tc>
+                  <a:txBody>
+                    <a:bodyPr/>
+                    <a:lstStyle/>
+                    <a:p>
+                      <a:r>
+                        <a:rPr lang="en-NZ" dirty="0" smtClean="0"/>
+                        <a:t>1</a:t>
+                      </a:r>
+                      <a:endParaRPr lang="en-NZ" dirty="0"/>
+                    </a:p>
+                  </a:txBody>
+                  <a:tcPr/>
+                </a:tc>
+                <a:tc>
+                  <a:txBody>
+                    <a:bodyPr/>
+                    <a:lstStyle/>
+                    <a:p>
+                      <a:r>
+                        <a:rPr lang="en-NZ" dirty="0" smtClean="0"/>
+                        <a:t>2</a:t>
+                      </a:r>
+                      <a:endParaRPr lang="en-NZ" dirty="0"/>
+                    </a:p>
+                  </a:txBody>
+                  <a:tcPr/>
+                </a:tc>
+                <a:tc>
+                  <a:txBody>
+                    <a:bodyPr/>
+                    <a:lstStyle/>
+                    <a:p>
+                      <a:r>
+                        <a:rPr lang="en-NZ" dirty="0" smtClean="0"/>
+                        <a:t>0</a:t>
+                      </a:r>
+                      <a:endParaRPr lang="en-NZ" dirty="0"/>
+                    </a:p>
+                  </a:txBody>
+                  <a:tcPr/>
+                </a:tc>
+                <a:tc>
+                  <a:txBody>
+                    <a:bodyPr/>
+                    <a:lstStyle/>
+                    <a:p>
+                      <a:r>
+                        <a:rPr lang="en-NZ" dirty="0" smtClean="0"/>
+                        <a:t>NA</a:t>
+                      </a:r>
+                      <a:endParaRPr lang="en-NZ" dirty="0"/>
+                    </a:p>
+                  </a:txBody>
+                  <a:tcPr/>
+                </a:tc>
+                <a:tc>
+                  <a:txBody>
+                    <a:bodyPr/>
+                    <a:lstStyle/>
+                    <a:p>
+                      <a:r>
+                        <a:rPr lang="en-NZ" dirty="0" smtClean="0"/>
+                        <a:t>0</a:t>
+                      </a:r>
+                      <a:endParaRPr lang="en-NZ" dirty="0"/>
+                    </a:p>
+                  </a:txBody>
+                  <a:tcPr/>
+                </a:tc>
+              </a:tr>
+              <a:tr h="370840">
+                <a:tc>
+                  <a:txBody>
+                    <a:bodyPr/>
+                    <a:lstStyle/>
+                    <a:p>
+                      <a:r>
+                        <a:rPr lang="en-NZ" dirty="0" smtClean="0"/>
+                        <a:t>2</a:t>
+                      </a:r>
+                      <a:endParaRPr lang="en-NZ" dirty="0"/>
+                    </a:p>
+                  </a:txBody>
+                  <a:tcPr/>
+                </a:tc>
+                <a:tc>
+                  <a:txBody>
+                    <a:bodyPr/>
+                    <a:lstStyle/>
+                    <a:p>
+                      <a:r>
+                        <a:rPr lang="en-NZ" dirty="0" smtClean="0"/>
+                        <a:t>5</a:t>
+                      </a:r>
+                      <a:endParaRPr lang="en-NZ" dirty="0"/>
+                    </a:p>
+                  </a:txBody>
+                  <a:tcPr/>
+                </a:tc>
+                <a:tc>
+                  <a:txBody>
+                    <a:bodyPr/>
+                    <a:lstStyle/>
+                    <a:p>
+                      <a:r>
+                        <a:rPr lang="en-NZ" dirty="0" smtClean="0"/>
+                        <a:t>0</a:t>
+                      </a:r>
+                      <a:endParaRPr lang="en-NZ" dirty="0"/>
+                    </a:p>
+                  </a:txBody>
+                  <a:tcPr/>
+                </a:tc>
+                <a:tc>
+                  <a:txBody>
+                    <a:bodyPr/>
+                    <a:lstStyle/>
+                    <a:p>
+                      <a:r>
+                        <a:rPr lang="en-NZ" dirty="0" smtClean="0"/>
+                        <a:t>NA</a:t>
+                      </a:r>
+                      <a:endParaRPr lang="en-NZ" dirty="0"/>
+                    </a:p>
+                  </a:txBody>
+                  <a:tcPr/>
+                </a:tc>
+                <a:tc>
+                  <a:txBody>
+                    <a:bodyPr/>
+                    <a:lstStyle/>
+                    <a:p>
+                      <a:r>
+                        <a:rPr lang="en-NZ" dirty="0" smtClean="0"/>
+                        <a:t>0</a:t>
+                      </a:r>
+                      <a:endParaRPr lang="en-NZ" dirty="0"/>
+                    </a:p>
+                  </a:txBody>
+                  <a:tcPr/>
+                </a:tc>
+              </a:tr>
+              <a:tr h="370840">
+                <a:tc>
+                  <a:txBody>
+                    <a:bodyPr/>
+                    <a:lstStyle/>
+                    <a:p>
+                      <a:r>
+                        <a:rPr lang="en-NZ" dirty="0" smtClean="0"/>
+                        <a:t>3</a:t>
+                      </a:r>
+                      <a:endParaRPr lang="en-NZ" dirty="0"/>
+                    </a:p>
+                  </a:txBody>
+                  <a:tcPr/>
+                </a:tc>
+                <a:tc>
+                  <a:txBody>
+                    <a:bodyPr/>
+                    <a:lstStyle/>
+                    <a:p>
+                      <a:r>
+                        <a:rPr lang="en-NZ" dirty="0" smtClean="0"/>
+                        <a:t>6</a:t>
+                      </a:r>
+                      <a:endParaRPr lang="en-NZ" dirty="0"/>
+                    </a:p>
+                  </a:txBody>
+                  <a:tcPr/>
+                </a:tc>
+                <a:tc>
+                  <a:txBody>
+                    <a:bodyPr/>
+                    <a:lstStyle/>
+                    <a:p>
+                      <a:r>
+                        <a:rPr lang="en-NZ" dirty="0" smtClean="0"/>
+                        <a:t>0</a:t>
+                      </a:r>
+                      <a:endParaRPr lang="en-NZ" dirty="0"/>
+                    </a:p>
+                  </a:txBody>
+                  <a:tcPr/>
+                </a:tc>
+                <a:tc>
+                  <a:txBody>
+                    <a:bodyPr/>
+                    <a:lstStyle/>
+                    <a:p>
+                      <a:r>
+                        <a:rPr lang="en-NZ" dirty="0" smtClean="0"/>
+                        <a:t>NA</a:t>
+                      </a:r>
+                      <a:endParaRPr lang="en-NZ" dirty="0"/>
+                    </a:p>
+                  </a:txBody>
+                  <a:tcPr/>
+                </a:tc>
+                <a:tc>
+                  <a:txBody>
+                    <a:bodyPr/>
+                    <a:lstStyle/>
+                    <a:p>
+                      <a:r>
+                        <a:rPr lang="en-NZ" dirty="0" smtClean="0"/>
+                        <a:t>0</a:t>
+                      </a:r>
+                      <a:endParaRPr lang="en-NZ" dirty="0"/>
+                    </a:p>
+                  </a:txBody>
+                  <a:tcPr/>
+                </a:tc>
+              </a:tr>
+              <a:tr h="370840">
+                <a:tc>
+                  <a:txBody>
+                    <a:bodyPr/>
+                    <a:lstStyle/>
+                    <a:p>
+                      <a:r>
+                        <a:rPr lang="en-NZ" dirty="0" smtClean="0"/>
+                        <a:t>4</a:t>
+                      </a:r>
+                      <a:endParaRPr lang="en-NZ" dirty="0"/>
+                    </a:p>
+                  </a:txBody>
+                  <a:tcPr/>
+                </a:tc>
+                <a:tc>
+                  <a:txBody>
+                    <a:bodyPr/>
+                    <a:lstStyle/>
+                    <a:p>
+                      <a:r>
+                        <a:rPr lang="en-NZ" dirty="0" smtClean="0"/>
+                        <a:t>2</a:t>
+                      </a:r>
+                      <a:endParaRPr lang="en-NZ" dirty="0"/>
+                    </a:p>
+                  </a:txBody>
+                  <a:tcPr/>
+                </a:tc>
+                <a:tc>
+                  <a:txBody>
+                    <a:bodyPr/>
+                    <a:lstStyle/>
+                    <a:p>
+                      <a:r>
+                        <a:rPr lang="en-NZ" dirty="0" smtClean="0"/>
+                        <a:t>0</a:t>
+                      </a:r>
+                      <a:endParaRPr lang="en-NZ" dirty="0"/>
+                    </a:p>
+                  </a:txBody>
+                  <a:tcPr/>
+                </a:tc>
+                <a:tc>
+                  <a:txBody>
+                    <a:bodyPr/>
+                    <a:lstStyle/>
+                    <a:p>
+                      <a:r>
+                        <a:rPr lang="en-NZ" dirty="0" smtClean="0"/>
+                        <a:t>NA</a:t>
+                      </a:r>
+                      <a:endParaRPr lang="en-NZ" dirty="0"/>
+                    </a:p>
+                  </a:txBody>
+                  <a:tcPr/>
+                </a:tc>
+                <a:tc>
+                  <a:txBody>
+                    <a:bodyPr/>
+                    <a:lstStyle/>
+                    <a:p>
+                      <a:r>
+                        <a:rPr lang="en-NZ" dirty="0" smtClean="0"/>
+                        <a:t>0</a:t>
+                      </a:r>
+                      <a:endParaRPr lang="en-NZ" dirty="0"/>
+                    </a:p>
+                  </a:txBody>
+                  <a:tcPr/>
+                </a:tc>
+              </a:tr>
+              <a:tr h="370840">
+                <a:tc>
+                  <a:txBody>
+                    <a:bodyPr/>
+                    <a:lstStyle/>
+                    <a:p>
+                      <a:r>
+                        <a:rPr lang="en-NZ" dirty="0" smtClean="0"/>
+                        <a:t>5</a:t>
+                      </a:r>
+                      <a:endParaRPr lang="en-NZ" dirty="0"/>
+                    </a:p>
+                  </a:txBody>
+                  <a:tcPr/>
+                </a:tc>
+                <a:tc>
+                  <a:txBody>
+                    <a:bodyPr/>
+                    <a:lstStyle/>
+                    <a:p>
+                      <a:r>
+                        <a:rPr lang="en-NZ" dirty="0" smtClean="0"/>
+                        <a:t>4</a:t>
+                      </a:r>
+                      <a:endParaRPr lang="en-NZ" dirty="0"/>
+                    </a:p>
+                  </a:txBody>
+                  <a:tcPr/>
+                </a:tc>
+                <a:tc>
+                  <a:txBody>
+                    <a:bodyPr/>
+                    <a:lstStyle/>
+                    <a:p>
+                      <a:r>
+                        <a:rPr lang="en-NZ" dirty="0" smtClean="0"/>
+                        <a:t>0</a:t>
+                      </a:r>
+                      <a:endParaRPr lang="en-NZ" dirty="0"/>
+                    </a:p>
+                  </a:txBody>
+                  <a:tcPr/>
+                </a:tc>
+                <a:tc>
+                  <a:txBody>
+                    <a:bodyPr/>
+                    <a:lstStyle/>
+                    <a:p>
+                      <a:r>
+                        <a:rPr lang="en-NZ" dirty="0" smtClean="0"/>
+                        <a:t>NA</a:t>
+                      </a:r>
+                      <a:endParaRPr lang="en-NZ" dirty="0"/>
+                    </a:p>
+                  </a:txBody>
+                  <a:tcPr/>
+                </a:tc>
+                <a:tc>
+                  <a:txBody>
+                    <a:bodyPr/>
+                    <a:lstStyle/>
+                    <a:p>
+                      <a:r>
+                        <a:rPr lang="en-NZ" dirty="0" smtClean="0"/>
+                        <a:t>0</a:t>
+                      </a:r>
+                      <a:endParaRPr lang="en-NZ" dirty="0"/>
+                    </a:p>
+                  </a:txBody>
+                  <a:tcPr/>
+                </a:tc>
+              </a:tr>
+            </a:tbl>
+          </a:graphicData>
+        </a:graphic>
+      </p:graphicFrame>
     </p:spTree>
   </p:cSld>
   <p:clrMapOvr>
@@ -3486,384 +3746,108 @@
         </p:nvSpPr>
         <p:spPr/>
         <p:txBody>
-          <a:bodyPr/>
+          <a:bodyPr>
+            <a:normAutofit/>
+          </a:bodyPr>
           <a:lstStyle/>
           <a:p>
             <a:r>
+              <a:rPr lang="en-NZ" dirty="0" smtClean="0"/>
+              <a:t>The master </a:t>
+            </a:r>
+            <a:r>
               <a:rPr lang="en-NZ" dirty="0" err="1" smtClean="0"/>
-              <a:t>Simframe</a:t>
-            </a:r>
-            <a:r>
-              <a:rPr lang="en-NZ" dirty="0" smtClean="0"/>
-              <a:t> definition file</a:t>
+              <a:t>simframe</a:t>
             </a:r>
             <a:endParaRPr lang="en-NZ" dirty="0"/>
           </a:p>
         </p:txBody>
       </p:sp>
-      <p:graphicFrame>
-        <p:nvGraphicFramePr>
-          <p:cNvPr id="4" name="Content Placeholder 3"/>
-          <p:cNvGraphicFramePr>
-            <a:graphicFrameLocks noGrp="1"/>
-          </p:cNvGraphicFramePr>
+      <p:sp>
+        <p:nvSpPr>
+          <p:cNvPr id="3" name="Content Placeholder 2"/>
+          <p:cNvSpPr>
+            <a:spLocks noGrp="1"/>
+          </p:cNvSpPr>
           <p:nvPr>
             <p:ph idx="1"/>
           </p:nvPr>
-        </p:nvGraphicFramePr>
-        <p:xfrm>
-          <a:off x="457200" y="1600200"/>
-          <a:ext cx="8229600" cy="2392680"/>
-        </p:xfrm>
-        <a:graphic>
-          <a:graphicData uri="http://schemas.openxmlformats.org/drawingml/2006/table">
-            <a:tbl>
-              <a:tblPr firstRow="1" bandRow="1">
-                <a:tableStyleId>{5C22544A-7EE6-4342-B048-85BDC9FD1C3A}</a:tableStyleId>
-              </a:tblPr>
-              <a:tblGrid>
-                <a:gridCol w="1378496"/>
-                <a:gridCol w="1512168"/>
-                <a:gridCol w="1656184"/>
-                <a:gridCol w="1728192"/>
-                <a:gridCol w="1954560"/>
-              </a:tblGrid>
-              <a:tr h="370840">
-                <a:tc>
-                  <a:txBody>
-                    <a:bodyPr/>
-                    <a:lstStyle/>
-                    <a:p>
-                      <a:r>
-                        <a:rPr lang="en-NZ" smtClean="0"/>
-                        <a:t>Varname</a:t>
-                      </a:r>
-                      <a:endParaRPr lang="en-NZ" dirty="0"/>
-                    </a:p>
-                  </a:txBody>
-                  <a:tcPr/>
-                </a:tc>
-                <a:tc>
-                  <a:txBody>
-                    <a:bodyPr/>
-                    <a:lstStyle/>
-                    <a:p>
-                      <a:r>
-                        <a:rPr lang="en-NZ" dirty="0" err="1" smtClean="0"/>
-                        <a:t>Previous_var</a:t>
-                      </a:r>
-                      <a:endParaRPr lang="en-NZ" dirty="0"/>
-                    </a:p>
-                  </a:txBody>
-                  <a:tcPr/>
-                </a:tc>
-                <a:tc>
-                  <a:txBody>
-                    <a:bodyPr/>
-                    <a:lstStyle/>
-                    <a:p>
-                      <a:r>
-                        <a:rPr lang="en-NZ" dirty="0" err="1" smtClean="0"/>
-                        <a:t>Initial_value</a:t>
-                      </a:r>
-                      <a:endParaRPr lang="en-NZ" dirty="0"/>
-                    </a:p>
-                  </a:txBody>
-                  <a:tcPr/>
-                </a:tc>
-                <a:tc>
-                  <a:txBody>
-                    <a:bodyPr/>
-                    <a:lstStyle/>
-                    <a:p>
-                      <a:r>
-                        <a:rPr lang="en-NZ" dirty="0" err="1" smtClean="0"/>
-                        <a:t>Outcome_type</a:t>
-                      </a:r>
-                      <a:endParaRPr lang="en-NZ" dirty="0"/>
-                    </a:p>
-                  </a:txBody>
-                  <a:tcPr/>
-                </a:tc>
-                <a:tc>
-                  <a:txBody>
-                    <a:bodyPr/>
-                    <a:lstStyle/>
-                    <a:p>
-                      <a:r>
-                        <a:rPr lang="en-NZ" dirty="0" err="1" smtClean="0"/>
-                        <a:t>Outcome_module</a:t>
-                      </a:r>
-                      <a:endParaRPr lang="en-NZ" dirty="0"/>
-                    </a:p>
-                  </a:txBody>
-                  <a:tcPr/>
-                </a:tc>
-              </a:tr>
-              <a:tr h="370840">
-                <a:tc>
-                  <a:txBody>
-                    <a:bodyPr/>
-                    <a:lstStyle/>
-                    <a:p>
-                      <a:r>
-                        <a:rPr lang="en-NZ" dirty="0" smtClean="0"/>
-                        <a:t>Age</a:t>
-                      </a:r>
-                      <a:endParaRPr lang="en-NZ" dirty="0"/>
-                    </a:p>
-                  </a:txBody>
-                  <a:tcPr/>
-                </a:tc>
-                <a:tc>
-                  <a:txBody>
-                    <a:bodyPr/>
-                    <a:lstStyle/>
-                    <a:p>
-                      <a:endParaRPr lang="en-NZ" dirty="0"/>
-                    </a:p>
-                  </a:txBody>
-                  <a:tcPr/>
-                </a:tc>
-                <a:tc>
-                  <a:txBody>
-                    <a:bodyPr/>
-                    <a:lstStyle/>
-                    <a:p>
-                      <a:r>
-                        <a:rPr lang="en-NZ" dirty="0" err="1" smtClean="0"/>
-                        <a:t>Basefile_age</a:t>
-                      </a:r>
-                      <a:endParaRPr lang="en-NZ" dirty="0"/>
-                    </a:p>
-                  </a:txBody>
-                  <a:tcPr/>
-                </a:tc>
-                <a:tc>
-                  <a:txBody>
-                    <a:bodyPr/>
-                    <a:lstStyle/>
-                    <a:p>
-                      <a:endParaRPr lang="en-NZ" dirty="0"/>
-                    </a:p>
-                  </a:txBody>
-                  <a:tcPr/>
-                </a:tc>
-                <a:tc>
-                  <a:txBody>
-                    <a:bodyPr/>
-                    <a:lstStyle/>
-                    <a:p>
-                      <a:endParaRPr lang="en-NZ" dirty="0"/>
-                    </a:p>
-                  </a:txBody>
-                  <a:tcPr/>
-                </a:tc>
-              </a:tr>
-              <a:tr h="370840">
-                <a:tc>
-                  <a:txBody>
-                    <a:bodyPr/>
-                    <a:lstStyle/>
-                    <a:p>
-                      <a:r>
-                        <a:rPr lang="en-NZ" dirty="0" smtClean="0"/>
-                        <a:t>Health</a:t>
-                      </a:r>
-                      <a:endParaRPr lang="en-NZ" dirty="0"/>
-                    </a:p>
-                  </a:txBody>
-                  <a:tcPr/>
-                </a:tc>
-                <a:tc>
-                  <a:txBody>
-                    <a:bodyPr/>
-                    <a:lstStyle/>
-                    <a:p>
-                      <a:r>
-                        <a:rPr lang="en-NZ" dirty="0" err="1" smtClean="0"/>
-                        <a:t>Health_previous</a:t>
-                      </a:r>
-                      <a:endParaRPr lang="en-NZ" dirty="0"/>
-                    </a:p>
-                  </a:txBody>
-                  <a:tcPr/>
-                </a:tc>
-                <a:tc>
-                  <a:txBody>
-                    <a:bodyPr/>
-                    <a:lstStyle/>
-                    <a:p>
-                      <a:r>
-                        <a:rPr lang="en-NZ" dirty="0" smtClean="0"/>
-                        <a:t>0</a:t>
-                      </a:r>
-                      <a:endParaRPr lang="en-NZ" dirty="0"/>
-                    </a:p>
-                  </a:txBody>
-                  <a:tcPr/>
-                </a:tc>
-                <a:tc>
-                  <a:txBody>
-                    <a:bodyPr/>
-                    <a:lstStyle/>
-                    <a:p>
-                      <a:r>
-                        <a:rPr lang="en-NZ" dirty="0" smtClean="0"/>
-                        <a:t>categorical</a:t>
-                      </a:r>
-                      <a:endParaRPr lang="en-NZ" dirty="0"/>
-                    </a:p>
-                  </a:txBody>
-                  <a:tcPr/>
-                </a:tc>
-                <a:tc>
-                  <a:txBody>
-                    <a:bodyPr/>
-                    <a:lstStyle/>
-                    <a:p>
-                      <a:r>
-                        <a:rPr lang="en-NZ" dirty="0" smtClean="0"/>
-                        <a:t>Main</a:t>
-                      </a:r>
-                      <a:endParaRPr lang="en-NZ" dirty="0"/>
-                    </a:p>
-                  </a:txBody>
-                  <a:tcPr/>
-                </a:tc>
-              </a:tr>
-              <a:tr h="370840">
-                <a:tc>
-                  <a:txBody>
-                    <a:bodyPr/>
-                    <a:lstStyle/>
-                    <a:p>
-                      <a:r>
-                        <a:rPr lang="en-NZ" dirty="0" err="1" smtClean="0"/>
-                        <a:t>Health_previous</a:t>
-                      </a:r>
-                      <a:endParaRPr lang="en-NZ" dirty="0"/>
-                    </a:p>
-                  </a:txBody>
-                  <a:tcPr/>
-                </a:tc>
-                <a:tc>
-                  <a:txBody>
-                    <a:bodyPr/>
-                    <a:lstStyle/>
-                    <a:p>
-                      <a:endParaRPr lang="en-NZ" dirty="0"/>
-                    </a:p>
-                  </a:txBody>
-                  <a:tcPr/>
-                </a:tc>
-                <a:tc>
-                  <a:txBody>
-                    <a:bodyPr/>
-                    <a:lstStyle/>
-                    <a:p>
-                      <a:r>
-                        <a:rPr lang="en-NZ" dirty="0" smtClean="0"/>
-                        <a:t>NA</a:t>
-                      </a:r>
-                      <a:endParaRPr lang="en-NZ" dirty="0"/>
-                    </a:p>
-                  </a:txBody>
-                  <a:tcPr/>
-                </a:tc>
-                <a:tc>
-                  <a:txBody>
-                    <a:bodyPr/>
-                    <a:lstStyle/>
-                    <a:p>
-                      <a:endParaRPr lang="en-NZ" dirty="0"/>
-                    </a:p>
-                  </a:txBody>
-                  <a:tcPr/>
-                </a:tc>
-                <a:tc>
-                  <a:txBody>
-                    <a:bodyPr/>
-                    <a:lstStyle/>
-                    <a:p>
-                      <a:endParaRPr lang="en-NZ" dirty="0"/>
-                    </a:p>
-                  </a:txBody>
-                  <a:tcPr/>
-                </a:tc>
-              </a:tr>
-              <a:tr h="370840">
-                <a:tc>
-                  <a:txBody>
-                    <a:bodyPr/>
-                    <a:lstStyle/>
-                    <a:p>
-                      <a:r>
-                        <a:rPr lang="en-NZ" dirty="0" smtClean="0"/>
-                        <a:t>Earnings</a:t>
-                      </a:r>
-                      <a:endParaRPr lang="en-NZ" dirty="0"/>
-                    </a:p>
-                  </a:txBody>
-                  <a:tcPr/>
-                </a:tc>
-                <a:tc>
-                  <a:txBody>
-                    <a:bodyPr/>
-                    <a:lstStyle/>
-                    <a:p>
-                      <a:endParaRPr lang="en-NZ" dirty="0"/>
-                    </a:p>
-                  </a:txBody>
-                  <a:tcPr/>
-                </a:tc>
-                <a:tc>
-                  <a:txBody>
-                    <a:bodyPr/>
-                    <a:lstStyle/>
-                    <a:p>
-                      <a:r>
-                        <a:rPr lang="en-NZ" dirty="0" smtClean="0"/>
-                        <a:t>0</a:t>
-                      </a:r>
-                      <a:endParaRPr lang="en-NZ" dirty="0"/>
-                    </a:p>
-                  </a:txBody>
-                  <a:tcPr/>
-                </a:tc>
-                <a:tc>
-                  <a:txBody>
-                    <a:bodyPr/>
-                    <a:lstStyle/>
-                    <a:p>
-                      <a:r>
-                        <a:rPr lang="en-NZ" dirty="0" smtClean="0"/>
-                        <a:t>continuous</a:t>
-                      </a:r>
-                      <a:endParaRPr lang="en-NZ" dirty="0"/>
-                    </a:p>
-                  </a:txBody>
-                  <a:tcPr/>
-                </a:tc>
-                <a:tc>
-                  <a:txBody>
-                    <a:bodyPr/>
-                    <a:lstStyle/>
-                    <a:p>
-                      <a:r>
-                        <a:rPr lang="en-NZ" dirty="0" smtClean="0"/>
-                        <a:t>Main</a:t>
-                      </a:r>
-                      <a:endParaRPr lang="en-NZ" dirty="0"/>
-                    </a:p>
-                  </a:txBody>
-                  <a:tcPr/>
-                </a:tc>
-              </a:tr>
-            </a:tbl>
-          </a:graphicData>
-        </a:graphic>
-      </p:graphicFrame>
+        </p:nvSpPr>
+        <p:spPr/>
+        <p:txBody>
+          <a:bodyPr>
+            <a:normAutofit/>
+          </a:bodyPr>
+          <a:lstStyle/>
+          <a:p>
+            <a:r>
+              <a:rPr lang="en-NZ" dirty="0" smtClean="0"/>
+              <a:t>The master </a:t>
+            </a:r>
+            <a:r>
+              <a:rPr lang="en-NZ" dirty="0" err="1" smtClean="0"/>
+              <a:t>simframe</a:t>
+            </a:r>
+            <a:r>
+              <a:rPr lang="en-NZ" dirty="0" smtClean="0"/>
+              <a:t> is initialised from a </a:t>
+            </a:r>
+            <a:r>
+              <a:rPr lang="en-NZ" dirty="0" err="1" smtClean="0"/>
+              <a:t>simframe</a:t>
+            </a:r>
+            <a:r>
+              <a:rPr lang="en-NZ" dirty="0" smtClean="0"/>
+              <a:t> definition file.</a:t>
+            </a:r>
+          </a:p>
+          <a:p>
+            <a:r>
+              <a:rPr lang="en-NZ" dirty="0" smtClean="0"/>
+              <a:t>Each </a:t>
+            </a:r>
+            <a:r>
+              <a:rPr lang="en-NZ" dirty="0" err="1" smtClean="0"/>
+              <a:t>simframe</a:t>
+            </a:r>
+            <a:r>
+              <a:rPr lang="en-NZ" dirty="0" smtClean="0"/>
+              <a:t> variable is populated with initial values, as specified by the definition file.</a:t>
+            </a:r>
+          </a:p>
+          <a:p>
+            <a:r>
+              <a:rPr lang="en-NZ" dirty="0" smtClean="0"/>
+              <a:t>The master </a:t>
+            </a:r>
+            <a:r>
+              <a:rPr lang="en-NZ" dirty="0" err="1" smtClean="0"/>
+              <a:t>simframe</a:t>
+            </a:r>
+            <a:r>
+              <a:rPr lang="en-NZ" dirty="0" smtClean="0"/>
+              <a:t> is typically stored in the global variable </a:t>
+            </a:r>
+            <a:r>
+              <a:rPr lang="en-NZ" dirty="0" err="1" smtClean="0">
+                <a:latin typeface="Courier New" pitchFamily="49" charset="0"/>
+                <a:cs typeface="Courier New" pitchFamily="49" charset="0"/>
+              </a:rPr>
+              <a:t>simframe.master</a:t>
+            </a:r>
+            <a:endParaRPr lang="en-NZ" dirty="0" smtClean="0">
+              <a:latin typeface="Courier New" pitchFamily="49" charset="0"/>
+              <a:cs typeface="Courier New" pitchFamily="49" charset="0"/>
+            </a:endParaRPr>
+          </a:p>
+          <a:p>
+            <a:endParaRPr lang="en-NZ" dirty="0" smtClean="0"/>
+          </a:p>
+          <a:p>
+            <a:endParaRPr lang="en-NZ" dirty="0"/>
+          </a:p>
+        </p:txBody>
+      </p:sp>
     </p:spTree>
   </p:cSld>
   <p:clrMapOvr>
@@ -3905,20 +3889,12 @@
           <a:lstStyle/>
           <a:p>
             <a:r>
-              <a:rPr lang="en-NZ" dirty="0" smtClean="0"/>
-              <a:t>One</a:t>
-            </a:r>
-            <a:r>
-              <a:rPr lang="en-NZ" dirty="0" smtClean="0"/>
-              <a:t> </a:t>
-            </a:r>
-            <a:r>
               <a:rPr lang="en-NZ" dirty="0" err="1" smtClean="0"/>
-              <a:t>simframe</a:t>
-            </a:r>
-            <a:r>
-              <a:rPr lang="en-NZ" dirty="0" smtClean="0"/>
-              <a:t> per environment</a:t>
+              <a:t>Simframe</a:t>
+            </a:r>
+            <a:r>
+              <a:rPr lang="en-NZ" dirty="0" smtClean="0"/>
+              <a:t> definition file</a:t>
             </a:r>
             <a:endParaRPr lang="en-NZ" dirty="0"/>
           </a:p>
@@ -3936,12 +3912,25 @@
         </p:nvSpPr>
         <p:spPr/>
         <p:txBody>
-          <a:bodyPr/>
+          <a:bodyPr>
+            <a:normAutofit fontScale="70000" lnSpcReduction="20000"/>
+          </a:bodyPr>
           <a:lstStyle/>
           <a:p>
             <a:r>
-              <a:rPr lang="en-NZ" dirty="0" smtClean="0"/>
-              <a:t>When a simulation environment is created, it takes a copy of the master </a:t>
+              <a:rPr lang="en-NZ" dirty="0" err="1" smtClean="0"/>
+              <a:t>Varname</a:t>
+            </a:r>
+            <a:r>
+              <a:rPr lang="en-NZ" dirty="0" smtClean="0"/>
+              <a:t>: </a:t>
+            </a:r>
+          </a:p>
+          <a:p>
+            <a:pPr lvl="1"/>
+            <a:r>
+              <a:rPr lang="en-NZ" dirty="0" smtClean="0"/>
+              <a:t>the name of a variable in the </a:t>
             </a:r>
             <a:r>
               <a:rPr lang="en-NZ" dirty="0" err="1" smtClean="0"/>
@@ -3951,20 +3940,132 @@
           </a:p>
           <a:p>
             <a:r>
-              <a:rPr lang="en-NZ" dirty="0" smtClean="0"/>
-              <a:t>Before simulating, a environment’s </a:t>
-            </a:r>
-            <a:r>
               <a:rPr lang="en-NZ" dirty="0" err="1" smtClean="0"/>
-              <a:t>simframe</a:t>
-            </a:r>
-            <a:r>
-              <a:rPr lang="en-NZ" dirty="0" smtClean="0"/>
-              <a:t> may be modified to test a particular scenario</a:t>
-            </a:r>
-          </a:p>
-          <a:p>
+              <a:t>Previous_var</a:t>
+            </a:r>
+            <a:endParaRPr lang="en-NZ" dirty="0" smtClean="0"/>
+          </a:p>
+          <a:p>
+            <a:pPr lvl="1"/>
+            <a:r>
+              <a:rPr lang="en-NZ" dirty="0" smtClean="0"/>
+              <a:t>the </a:t>
+            </a:r>
+            <a:r>
+              <a:rPr lang="en-NZ" dirty="0"/>
+              <a:t>name of a variable in which to store the current value in at the </a:t>
+            </a:r>
+            <a:r>
+              <a:rPr lang="en-NZ" dirty="0" smtClean="0"/>
+              <a:t>beginning of </a:t>
+            </a:r>
+            <a:r>
+              <a:rPr lang="en-NZ" dirty="0"/>
+              <a:t>each iteration (</a:t>
+            </a:r>
+            <a:r>
+              <a:rPr lang="en-NZ" dirty="0" err="1"/>
+              <a:t>i.e</a:t>
+            </a:r>
+            <a:r>
+              <a:rPr lang="en-NZ" dirty="0"/>
+              <a:t>: before it's transformed</a:t>
+            </a:r>
+            <a:r>
+              <a:rPr lang="en-NZ" dirty="0" smtClean="0"/>
+              <a:t>).</a:t>
+            </a:r>
+          </a:p>
+          <a:p>
+            <a:pPr lvl="1"/>
+            <a:r>
+              <a:rPr lang="en-NZ" dirty="0" smtClean="0"/>
+              <a:t>Optional </a:t>
+            </a:r>
+            <a:r>
+              <a:rPr lang="en-NZ" dirty="0"/>
+              <a:t>- for models that require previous state</a:t>
+            </a:r>
+            <a:r>
+              <a:rPr lang="en-NZ" dirty="0" smtClean="0"/>
+              <a:t>.</a:t>
+            </a:r>
             <a:endParaRPr lang="en-NZ" dirty="0"/>
+          </a:p>
+          <a:p>
+            <a:r>
+              <a:rPr lang="en-NZ" dirty="0" err="1" smtClean="0"/>
+              <a:t>Initial_value</a:t>
+            </a:r>
+            <a:endParaRPr lang="en-NZ" dirty="0" smtClean="0"/>
+          </a:p>
+          <a:p>
+            <a:pPr lvl="1"/>
+            <a:r>
+              <a:rPr lang="en-NZ" dirty="0"/>
+              <a:t>an expression that generates the initial value of the variable</a:t>
+            </a:r>
+            <a:r>
+              <a:rPr lang="en-NZ" dirty="0" smtClean="0"/>
+              <a:t>. Typically this expression will reference values in a previously loaded </a:t>
+            </a:r>
+            <a:r>
+              <a:rPr lang="en-NZ" dirty="0" err="1" smtClean="0"/>
+              <a:t>basefile</a:t>
+            </a:r>
+            <a:r>
+              <a:rPr lang="en-NZ" dirty="0" smtClean="0"/>
+              <a:t>.</a:t>
+            </a:r>
+          </a:p>
+          <a:p>
+            <a:r>
+              <a:rPr lang="en-NZ" dirty="0" err="1" smtClean="0"/>
+              <a:t>Outcome_type</a:t>
+            </a:r>
+            <a:endParaRPr lang="en-NZ" dirty="0" smtClean="0"/>
+          </a:p>
+          <a:p>
+            <a:pPr lvl="1"/>
+            <a:r>
+              <a:rPr lang="en-NZ" dirty="0"/>
+              <a:t>i</a:t>
+            </a:r>
+            <a:r>
+              <a:rPr lang="en-NZ" dirty="0" smtClean="0"/>
+              <a:t>f specified, indicates this is an outcome variable and indicates its type which is one of “categorical” or “continuous”</a:t>
+            </a:r>
+          </a:p>
+          <a:p>
+            <a:r>
+              <a:rPr lang="en-NZ" dirty="0" err="1" smtClean="0"/>
+              <a:t>Outcome_module</a:t>
+            </a:r>
+            <a:endParaRPr lang="en-NZ" dirty="0" smtClean="0"/>
+          </a:p>
+          <a:p>
+            <a:pPr lvl="1"/>
+            <a:r>
+              <a:rPr lang="en-NZ" dirty="0"/>
+              <a:t>if specified, indicates the </a:t>
+            </a:r>
+            <a:r>
+              <a:rPr lang="en-NZ" dirty="0" err="1" smtClean="0"/>
+              <a:t>Simmodule</a:t>
+            </a:r>
+            <a:r>
+              <a:rPr lang="en-NZ" dirty="0" smtClean="0"/>
+              <a:t> </a:t>
+            </a:r>
+            <a:r>
+              <a:rPr lang="en-NZ" dirty="0"/>
+              <a:t>this outcome variable belongs to</a:t>
+            </a:r>
+            <a:endParaRPr lang="en-NZ" dirty="0" smtClean="0"/>
+          </a:p>
+          <a:p>
+            <a:pPr lvl="1"/>
+            <a:endParaRPr lang="en-NZ" dirty="0" smtClean="0"/>
           </a:p>
         </p:txBody>
       </p:sp>
@@ -4009,116 +4110,381 @@
           <a:lstStyle/>
           <a:p>
             <a:r>
-              <a:rPr lang="en-NZ" dirty="0" smtClean="0"/>
-              <a:t>The simulation process</a:t>
+              <a:rPr lang="en-NZ" dirty="0" err="1" smtClean="0"/>
+              <a:t>Simframe</a:t>
+            </a:r>
+            <a:r>
+              <a:rPr lang="en-NZ" dirty="0" smtClean="0"/>
+              <a:t> definition file</a:t>
             </a:r>
             <a:endParaRPr lang="en-NZ" dirty="0"/>
           </a:p>
         </p:txBody>
       </p:sp>
-      <p:sp>
-        <p:nvSpPr>
-          <p:cNvPr id="3" name="Content Placeholder 2"/>
-          <p:cNvSpPr>
-            <a:spLocks noGrp="1"/>
-          </p:cNvSpPr>
+      <p:graphicFrame>
+        <p:nvGraphicFramePr>
+          <p:cNvPr id="4" name="Content Placeholder 3"/>
+          <p:cNvGraphicFramePr>
+            <a:graphicFrameLocks noGrp="1"/>
+          </p:cNvGraphicFramePr>
           <p:nvPr>
             <p:ph idx="1"/>
           </p:nvPr>
-        </p:nvSpPr>
-        <p:spPr/>
-        <p:txBody>
-          <a:bodyPr>
-            <a:normAutofit fontScale="77500" lnSpcReduction="20000"/>
-          </a:bodyPr>
-          <a:lstStyle/>
-          <a:p>
-            <a:r>
-              <a:rPr lang="en-NZ" dirty="0" smtClean="0"/>
-              <a:t>Categorical adjustments for iteration 1 are applied to the </a:t>
-            </a:r>
-            <a:r>
-              <a:rPr lang="en-NZ" dirty="0" err="1" smtClean="0"/>
-              <a:t>simframe</a:t>
-            </a:r>
-            <a:r>
-              <a:rPr lang="en-NZ" dirty="0" smtClean="0"/>
-              <a:t>. The adjustments to apply are specified in the </a:t>
-            </a:r>
-            <a:r>
-              <a:rPr lang="en-NZ" dirty="0" err="1" smtClean="0"/>
-              <a:t>cat.adjustments</a:t>
-            </a:r>
-            <a:r>
-              <a:rPr lang="en-NZ" dirty="0" smtClean="0"/>
-              <a:t> variable. </a:t>
-            </a:r>
-          </a:p>
-          <a:p>
-            <a:pPr lvl="1"/>
-            <a:r>
-              <a:rPr lang="en-NZ" dirty="0" smtClean="0"/>
-              <a:t>Other adjustments that might need to be performed, such as adjustments to continuous variables, can be done outside </a:t>
-            </a:r>
-            <a:r>
-              <a:rPr lang="en-NZ" dirty="0" err="1" smtClean="0"/>
-              <a:t>simar</a:t>
-            </a:r>
-            <a:r>
-              <a:rPr lang="en-NZ" dirty="0" smtClean="0"/>
-              <a:t> by the user before simulation.</a:t>
-            </a:r>
-          </a:p>
-          <a:p>
-            <a:r>
-              <a:rPr lang="en-NZ" dirty="0" smtClean="0"/>
-              <a:t>Pre simulation stats are generated</a:t>
-            </a:r>
-          </a:p>
-          <a:p>
-            <a:r>
-              <a:rPr lang="en-NZ" dirty="0" smtClean="0"/>
-              <a:t>Run loop</a:t>
-            </a:r>
-          </a:p>
-          <a:p>
-            <a:pPr lvl="1"/>
-            <a:r>
-              <a:rPr lang="en-NZ" dirty="0" smtClean="0"/>
-              <a:t>During each run, the following functions are called on each module</a:t>
-            </a:r>
-          </a:p>
-          <a:p>
-            <a:pPr lvl="2"/>
-            <a:r>
-              <a:rPr lang="en-NZ" dirty="0" err="1" smtClean="0"/>
-              <a:t>simulateRun</a:t>
-            </a:r>
-            <a:endParaRPr lang="en-NZ" dirty="0" smtClean="0"/>
-          </a:p>
-          <a:p>
-            <a:pPr lvl="2"/>
-            <a:r>
-              <a:rPr lang="en-NZ" dirty="0" err="1" smtClean="0"/>
-              <a:t>appendRunStats</a:t>
-            </a:r>
-            <a:endParaRPr lang="en-NZ" dirty="0" smtClean="0"/>
-          </a:p>
-          <a:p>
-            <a:r>
-              <a:rPr lang="en-NZ" dirty="0" smtClean="0"/>
-              <a:t>Final results are calculated by each module across all runs</a:t>
-            </a:r>
-            <a:endParaRPr lang="en-NZ" dirty="0"/>
-          </a:p>
-        </p:txBody>
-      </p:sp>
+        </p:nvGraphicFramePr>
+        <p:xfrm>
+          <a:off x="457200" y="1600200"/>
+          <a:ext cx="8229600" cy="2392680"/>
+        </p:xfrm>
+        <a:graphic>
+          <a:graphicData uri="http://schemas.openxmlformats.org/drawingml/2006/table">
+            <a:tbl>
+              <a:tblPr firstRow="1" bandRow="1">
+                <a:tableStyleId>{5C22544A-7EE6-4342-B048-85BDC9FD1C3A}</a:tableStyleId>
+              </a:tblPr>
+              <a:tblGrid>
+                <a:gridCol w="1378496"/>
+                <a:gridCol w="1512168"/>
+                <a:gridCol w="1656184"/>
+                <a:gridCol w="1728192"/>
+                <a:gridCol w="1954560"/>
+              </a:tblGrid>
+              <a:tr h="370840">
+                <a:tc>
+                  <a:txBody>
+                    <a:bodyPr/>
+                    <a:lstStyle/>
+                    <a:p>
+                      <a:r>
+                        <a:rPr lang="en-NZ" smtClean="0"/>
+                        <a:t>Varname</a:t>
+                      </a:r>
+                      <a:endParaRPr lang="en-NZ" dirty="0"/>
+                    </a:p>
+                  </a:txBody>
+                  <a:tcPr/>
+                </a:tc>
+                <a:tc>
+                  <a:txBody>
+                    <a:bodyPr/>
+                    <a:lstStyle/>
+                    <a:p>
+                      <a:r>
+                        <a:rPr lang="en-NZ" dirty="0" err="1" smtClean="0"/>
+                        <a:t>Previous_var</a:t>
+                      </a:r>
+                      <a:endParaRPr lang="en-NZ" dirty="0"/>
+                    </a:p>
+                  </a:txBody>
+                  <a:tcPr/>
+                </a:tc>
+                <a:tc>
+                  <a:txBody>
+                    <a:bodyPr/>
+                    <a:lstStyle/>
+                    <a:p>
+                      <a:r>
+                        <a:rPr lang="en-NZ" dirty="0" err="1" smtClean="0"/>
+                        <a:t>Initial_value</a:t>
+                      </a:r>
+                      <a:endParaRPr lang="en-NZ" dirty="0"/>
+                    </a:p>
+                  </a:txBody>
+                  <a:tcPr/>
+                </a:tc>
+                <a:tc>
+                  <a:txBody>
+                    <a:bodyPr/>
+                    <a:lstStyle/>
+                    <a:p>
+                      <a:r>
+                        <a:rPr lang="en-NZ" dirty="0" err="1" smtClean="0"/>
+                        <a:t>Outcome_type</a:t>
+                      </a:r>
+                      <a:endParaRPr lang="en-NZ" dirty="0"/>
+                    </a:p>
+                  </a:txBody>
+                  <a:tcPr/>
+                </a:tc>
+                <a:tc>
+                  <a:txBody>
+                    <a:bodyPr/>
+                    <a:lstStyle/>
+                    <a:p>
+                      <a:r>
+                        <a:rPr lang="en-NZ" dirty="0" err="1" smtClean="0"/>
+                        <a:t>Outcome_module</a:t>
+                      </a:r>
+                      <a:endParaRPr lang="en-NZ" dirty="0"/>
+                    </a:p>
+                  </a:txBody>
+                  <a:tcPr/>
+                </a:tc>
+              </a:tr>
+              <a:tr h="370840">
+                <a:tc>
+                  <a:txBody>
+                    <a:bodyPr/>
+                    <a:lstStyle/>
+                    <a:p>
+                      <a:r>
+                        <a:rPr lang="en-NZ" dirty="0" smtClean="0"/>
+                        <a:t>Age</a:t>
+                      </a:r>
+                      <a:endParaRPr lang="en-NZ" dirty="0"/>
+                    </a:p>
+                  </a:txBody>
+                  <a:tcPr/>
+                </a:tc>
+                <a:tc>
+                  <a:txBody>
+                    <a:bodyPr/>
+                    <a:lstStyle/>
+                    <a:p>
+                      <a:endParaRPr lang="en-NZ" dirty="0"/>
+                    </a:p>
+                  </a:txBody>
+                  <a:tcPr/>
+                </a:tc>
+                <a:tc>
+                  <a:txBody>
+                    <a:bodyPr/>
+                    <a:lstStyle/>
+                    <a:p>
+                      <a:r>
+                        <a:rPr lang="en-NZ" dirty="0" err="1" smtClean="0"/>
+                        <a:t>Basefile_age</a:t>
+                      </a:r>
+                      <a:endParaRPr lang="en-NZ" dirty="0"/>
+                    </a:p>
+                  </a:txBody>
+                  <a:tcPr/>
+                </a:tc>
+                <a:tc>
+                  <a:txBody>
+                    <a:bodyPr/>
+                    <a:lstStyle/>
+                    <a:p>
+                      <a:endParaRPr lang="en-NZ" dirty="0"/>
+                    </a:p>
+                  </a:txBody>
+                  <a:tcPr/>
+                </a:tc>
+                <a:tc>
+                  <a:txBody>
+                    <a:bodyPr/>
+                    <a:lstStyle/>
+                    <a:p>
+                      <a:endParaRPr lang="en-NZ" dirty="0"/>
+                    </a:p>
+                  </a:txBody>
+                  <a:tcPr/>
+                </a:tc>
+              </a:tr>
+              <a:tr h="370840">
+                <a:tc>
+                  <a:txBody>
+                    <a:bodyPr/>
+                    <a:lstStyle/>
+                    <a:p>
+                      <a:r>
+                        <a:rPr lang="en-NZ" dirty="0" smtClean="0"/>
+                        <a:t>Health</a:t>
+                      </a:r>
+                      <a:endParaRPr lang="en-NZ" dirty="0"/>
+                    </a:p>
+                  </a:txBody>
+                  <a:tcPr/>
+                </a:tc>
+                <a:tc>
+                  <a:txBody>
+                    <a:bodyPr/>
+                    <a:lstStyle/>
+                    <a:p>
+                      <a:r>
+                        <a:rPr lang="en-NZ" dirty="0" err="1" smtClean="0"/>
+                        <a:t>Health_previous</a:t>
+                      </a:r>
+                      <a:endParaRPr lang="en-NZ" dirty="0"/>
+                    </a:p>
+                  </a:txBody>
+                  <a:tcPr/>
+                </a:tc>
+                <a:tc>
+                  <a:txBody>
+                    <a:bodyPr/>
+                    <a:lstStyle/>
+                    <a:p>
+                      <a:r>
+                        <a:rPr lang="en-NZ" dirty="0" smtClean="0"/>
+                        <a:t>0</a:t>
+                      </a:r>
+                      <a:endParaRPr lang="en-NZ" dirty="0"/>
+                    </a:p>
+                  </a:txBody>
+                  <a:tcPr/>
+                </a:tc>
+                <a:tc>
+                  <a:txBody>
+                    <a:bodyPr/>
+                    <a:lstStyle/>
+                    <a:p>
+                      <a:r>
+                        <a:rPr lang="en-NZ" dirty="0" smtClean="0"/>
+                        <a:t>categorical</a:t>
+                      </a:r>
+                      <a:endParaRPr lang="en-NZ" dirty="0"/>
+                    </a:p>
+                  </a:txBody>
+                  <a:tcPr/>
+                </a:tc>
+                <a:tc>
+                  <a:txBody>
+                    <a:bodyPr/>
+                    <a:lstStyle/>
+                    <a:p>
+                      <a:r>
+                        <a:rPr lang="en-NZ" dirty="0" smtClean="0"/>
+                        <a:t>Main</a:t>
+                      </a:r>
+                      <a:endParaRPr lang="en-NZ" dirty="0"/>
+                    </a:p>
+                  </a:txBody>
+                  <a:tcPr/>
+                </a:tc>
+              </a:tr>
+              <a:tr h="370840">
+                <a:tc>
+                  <a:txBody>
+                    <a:bodyPr/>
+                    <a:lstStyle/>
+                    <a:p>
+                      <a:r>
+                        <a:rPr lang="en-NZ" dirty="0" err="1" smtClean="0"/>
+                        <a:t>Health_previous</a:t>
+                      </a:r>
+                      <a:endParaRPr lang="en-NZ" dirty="0"/>
+                    </a:p>
+                  </a:txBody>
+                  <a:tcPr/>
+                </a:tc>
+                <a:tc>
+                  <a:txBody>
+                    <a:bodyPr/>
+                    <a:lstStyle/>
+                    <a:p>
+                      <a:endParaRPr lang="en-NZ" dirty="0"/>
+                    </a:p>
+                  </a:txBody>
+                  <a:tcPr/>
+                </a:tc>
+                <a:tc>
+                  <a:txBody>
+                    <a:bodyPr/>
+                    <a:lstStyle/>
+                    <a:p>
+                      <a:r>
+                        <a:rPr lang="en-NZ" dirty="0" smtClean="0"/>
+                        <a:t>NA</a:t>
+                      </a:r>
+                      <a:endParaRPr lang="en-NZ" dirty="0"/>
+                    </a:p>
+                  </a:txBody>
+                  <a:tcPr/>
+                </a:tc>
+                <a:tc>
+                  <a:txBody>
+                    <a:bodyPr/>
+                    <a:lstStyle/>
+                    <a:p>
+                      <a:endParaRPr lang="en-NZ" dirty="0"/>
+                    </a:p>
+                  </a:txBody>
+                  <a:tcPr/>
+                </a:tc>
+                <a:tc>
+                  <a:txBody>
+                    <a:bodyPr/>
+                    <a:lstStyle/>
+                    <a:p>
+                      <a:endParaRPr lang="en-NZ" dirty="0"/>
+                    </a:p>
+                  </a:txBody>
+                  <a:tcPr/>
+                </a:tc>
+              </a:tr>
+              <a:tr h="370840">
+                <a:tc>
+                  <a:txBody>
+                    <a:bodyPr/>
+                    <a:lstStyle/>
+                    <a:p>
+                      <a:r>
+                        <a:rPr lang="en-NZ" dirty="0" smtClean="0"/>
+                        <a:t>Earnings</a:t>
+                      </a:r>
+                      <a:endParaRPr lang="en-NZ" dirty="0"/>
+                    </a:p>
+                  </a:txBody>
+                  <a:tcPr/>
+                </a:tc>
+                <a:tc>
+                  <a:txBody>
+                    <a:bodyPr/>
+                    <a:lstStyle/>
+                    <a:p>
+                      <a:endParaRPr lang="en-NZ" dirty="0"/>
+                    </a:p>
+                  </a:txBody>
+                  <a:tcPr/>
+                </a:tc>
+                <a:tc>
+                  <a:txBody>
+                    <a:bodyPr/>
+                    <a:lstStyle/>
+                    <a:p>
+                      <a:r>
+                        <a:rPr lang="en-NZ" dirty="0" smtClean="0"/>
+                        <a:t>0</a:t>
+                      </a:r>
+                      <a:endParaRPr lang="en-NZ" dirty="0"/>
+                    </a:p>
+                  </a:txBody>
+                  <a:tcPr/>
+                </a:tc>
+                <a:tc>
+                  <a:txBody>
+                    <a:bodyPr/>
+                    <a:lstStyle/>
+                    <a:p>
+                      <a:r>
+                        <a:rPr lang="en-NZ" dirty="0" smtClean="0"/>
+                        <a:t>continuous</a:t>
+                      </a:r>
+                      <a:endParaRPr lang="en-NZ" dirty="0"/>
+                    </a:p>
+                  </a:txBody>
+                  <a:tcPr/>
+                </a:tc>
+                <a:tc>
+                  <a:txBody>
+                    <a:bodyPr/>
+                    <a:lstStyle/>
+                    <a:p>
+                      <a:r>
+                        <a:rPr lang="en-NZ" dirty="0" smtClean="0"/>
+                        <a:t>Main</a:t>
+                      </a:r>
+                      <a:endParaRPr lang="en-NZ" dirty="0"/>
+                    </a:p>
+                  </a:txBody>
+                  <a:tcPr/>
+                </a:tc>
+              </a:tr>
+            </a:tbl>
+          </a:graphicData>
+        </a:graphic>
+      </p:graphicFrame>
     </p:spTree>
-    <p:extLst>
-      <p:ext uri="{BB962C8B-B14F-4D97-AF65-F5344CB8AC3E}">
-        <p14:creationId xmlns:p14="http://schemas.microsoft.com/office/powerpoint/2010/main" val="3435886797"/>
-      </p:ext>
-    </p:extLst>
   </p:cSld>
   <p:clrMapOvr>
     <a:masterClrMapping/>
@@ -4155,14 +4521,24 @@
         </p:nvSpPr>
         <p:spPr/>
         <p:txBody>
-          <a:bodyPr>
-            <a:normAutofit/>
-          </a:bodyPr>
+          <a:bodyPr/>
           <a:lstStyle/>
           <a:p>
             <a:r>
+              <a:rPr lang="en-NZ" dirty="0" smtClean="0"/>
+              <a:t>One</a:t>
+            </a:r>
+            <a:r>
+              <a:rPr lang="en-NZ" dirty="0" smtClean="0"/>
+              <a:t> </a:t>
+            </a:r>
+            <a:r>
               <a:rPr lang="en-NZ" dirty="0" err="1" smtClean="0"/>
-              <a:t>simulateRun</a:t>
+              <a:t>simframe</a:t>
+            </a:r>
+            <a:r>
+              <a:rPr lang="en-NZ" dirty="0" smtClean="0"/>
+              <a:t> per environment</a:t>
             </a:r>
             <a:endParaRPr lang="en-NZ" dirty="0"/>
           </a:p>
@@ -4180,52 +4556,23 @@
         </p:nvSpPr>
         <p:spPr/>
         <p:txBody>
-          <a:bodyPr>
-            <a:normAutofit fontScale="70000" lnSpcReduction="20000"/>
-          </a:bodyPr>
+          <a:bodyPr/>
           <a:lstStyle/>
           <a:p>
             <a:r>
               <a:rPr lang="en-NZ" dirty="0" smtClean="0"/>
-              <a:t>Simulation involves calling </a:t>
-            </a:r>
-            <a:r>
-              <a:rPr lang="en-NZ" dirty="0" err="1" smtClean="0"/>
-              <a:t>simulateRun</a:t>
-            </a:r>
-            <a:r>
-              <a:rPr lang="en-NZ" dirty="0" smtClean="0"/>
-              <a:t>() for each </a:t>
-            </a:r>
-            <a:r>
-              <a:rPr lang="en-NZ" dirty="0" err="1" smtClean="0"/>
-              <a:t>Simmodule</a:t>
-            </a:r>
-            <a:r>
-              <a:rPr lang="en-NZ" dirty="0" smtClean="0"/>
-              <a:t> </a:t>
-            </a:r>
-          </a:p>
-          <a:p>
-            <a:r>
-              <a:rPr lang="en-NZ" dirty="0" smtClean="0"/>
-              <a:t>The </a:t>
-            </a:r>
-            <a:r>
-              <a:rPr lang="en-NZ" dirty="0" err="1" smtClean="0"/>
-              <a:t>simulateRun</a:t>
-            </a:r>
-            <a:r>
-              <a:rPr lang="en-NZ" dirty="0" smtClean="0"/>
-              <a:t>() method uses a local copy of the </a:t>
+              <a:t>When a simulation environment is created, it takes a copy of the master </a:t>
             </a:r>
             <a:r>
               <a:rPr lang="en-NZ" dirty="0" err="1" smtClean="0"/>
               <a:t>simframe</a:t>
             </a:r>
-            <a:r>
-              <a:rPr lang="en-NZ" dirty="0" smtClean="0"/>
-              <a:t>, copied from the environment’s </a:t>
+            <a:endParaRPr lang="en-NZ" dirty="0" smtClean="0"/>
+          </a:p>
+          <a:p>
+            <a:r>
+              <a:rPr lang="en-NZ" dirty="0" smtClean="0"/>
+              <a:t>Before simulating, a environment’s </a:t>
             </a:r>
             <a:r>
               <a:rPr lang="en-NZ" dirty="0" err="1" smtClean="0"/>
@@ -4233,66 +4580,10 @@
             </a:r>
             <a:r>
               <a:rPr lang="en-NZ" dirty="0" smtClean="0"/>
-              <a:t>. The environment’s </a:t>
-            </a:r>
-            <a:r>
-              <a:rPr lang="en-NZ" dirty="0" err="1" smtClean="0"/>
-              <a:t>simframe</a:t>
-            </a:r>
-            <a:r>
-              <a:rPr lang="en-NZ" dirty="0" smtClean="0"/>
-              <a:t> is not modified. This is so that each run will start with the same </a:t>
-            </a:r>
-            <a:r>
-              <a:rPr lang="en-NZ" dirty="0" err="1" smtClean="0"/>
-              <a:t>simframe</a:t>
-            </a:r>
-            <a:r>
-              <a:rPr lang="en-NZ" dirty="0" smtClean="0"/>
-              <a:t>.</a:t>
-            </a:r>
-          </a:p>
-          <a:p>
-            <a:r>
-              <a:rPr lang="en-NZ" dirty="0" smtClean="0"/>
-              <a:t>At the beginning of each iteration, the current values of specified </a:t>
-            </a:r>
-            <a:r>
-              <a:rPr lang="en-NZ" dirty="0" err="1" smtClean="0"/>
-              <a:t>simframe</a:t>
-            </a:r>
-            <a:r>
-              <a:rPr lang="en-NZ" dirty="0" smtClean="0"/>
-              <a:t> variables are stored in corresponding “previous” variables. (This optional feature can be used by models that rely on previous state information to generate the current state).</a:t>
-            </a:r>
-          </a:p>
-          <a:p>
-            <a:r>
-              <a:rPr lang="en-NZ" dirty="0" smtClean="0"/>
-              <a:t>During the iteration, </a:t>
-            </a:r>
-            <a:r>
-              <a:rPr lang="en-NZ" dirty="0" err="1" smtClean="0"/>
-              <a:t>simframe</a:t>
-            </a:r>
-            <a:r>
-              <a:rPr lang="en-NZ" dirty="0" smtClean="0"/>
-              <a:t> variables are transformed </a:t>
-            </a:r>
-          </a:p>
-          <a:p>
-            <a:r>
-              <a:rPr lang="en-NZ" dirty="0" smtClean="0"/>
-              <a:t>At the end of the iteration, </a:t>
-            </a:r>
-            <a:r>
-              <a:rPr lang="en-NZ" dirty="0" err="1" smtClean="0"/>
-              <a:t>simframe</a:t>
-            </a:r>
-            <a:r>
-              <a:rPr lang="en-NZ" dirty="0" smtClean="0"/>
-              <a:t> outcome variables are stored in outcome matrices</a:t>
-            </a:r>
+              <a:t> may be modified to test a particular scenario</a:t>
+            </a:r>
+          </a:p>
+          <a:p>
             <a:endParaRPr lang="en-NZ" dirty="0"/>
           </a:p>
         </p:txBody>
@@ -4306,6 +4597,335 @@
 </file>
 
 <file path=ppt/slides/slide16.xml><?xml version="1.0" encoding="utf-8"?>
+<p:sld xmlns:a="http://schemas.openxmlformats.org/drawingml/2006/main" xmlns:r="http://schemas.openxmlformats.org/officeDocument/2006/relationships" xmlns:p="http://schemas.openxmlformats.org/presentationml/2006/main">
+  <p:cSld>
+    <p:spTree>
+      <p:nvGrpSpPr>
+        <p:cNvPr id="1" name=""/>
+        <p:cNvGrpSpPr/>
+        <p:nvPr/>
+      </p:nvGrpSpPr>
+      <p:grpSpPr>
+        <a:xfrm>
+          <a:off x="0" y="0"/>
+          <a:ext cx="0" cy="0"/>
+          <a:chOff x="0" y="0"/>
+          <a:chExt cx="0" cy="0"/>
+        </a:xfrm>
+      </p:grpSpPr>
+      <p:sp>
+        <p:nvSpPr>
+          <p:cNvPr id="2" name="Title 1"/>
+          <p:cNvSpPr>
+            <a:spLocks noGrp="1"/>
+          </p:cNvSpPr>
+          <p:nvPr>
+            <p:ph type="title"/>
+          </p:nvPr>
+        </p:nvSpPr>
+        <p:spPr/>
+        <p:txBody>
+          <a:bodyPr/>
+          <a:lstStyle/>
+          <a:p>
+            <a:r>
+              <a:rPr lang="en-NZ" dirty="0" smtClean="0"/>
+              <a:t>The simulation process</a:t>
+            </a:r>
+            <a:endParaRPr lang="en-NZ" dirty="0"/>
+          </a:p>
+        </p:txBody>
+      </p:sp>
+      <p:sp>
+        <p:nvSpPr>
+          <p:cNvPr id="3" name="Content Placeholder 2"/>
+          <p:cNvSpPr>
+            <a:spLocks noGrp="1"/>
+          </p:cNvSpPr>
+          <p:nvPr>
+            <p:ph idx="1"/>
+          </p:nvPr>
+        </p:nvSpPr>
+        <p:spPr/>
+        <p:txBody>
+          <a:bodyPr>
+            <a:normAutofit fontScale="77500" lnSpcReduction="20000"/>
+          </a:bodyPr>
+          <a:lstStyle/>
+          <a:p>
+            <a:r>
+              <a:rPr lang="en-NZ" dirty="0" smtClean="0"/>
+              <a:t>Categorical adjustments for iteration 1 are applied to the </a:t>
+            </a:r>
+            <a:r>
+              <a:rPr lang="en-NZ" dirty="0" err="1" smtClean="0"/>
+              <a:t>simframe</a:t>
+            </a:r>
+            <a:r>
+              <a:rPr lang="en-NZ" dirty="0" smtClean="0"/>
+              <a:t>. The adjustments applied are specified in the </a:t>
+            </a:r>
+            <a:r>
+              <a:rPr lang="en-NZ" dirty="0" err="1" smtClean="0"/>
+              <a:t>cat.adjustments</a:t>
+            </a:r>
+            <a:r>
+              <a:rPr lang="en-NZ" dirty="0" smtClean="0"/>
+              <a:t> variable. </a:t>
+            </a:r>
+          </a:p>
+          <a:p>
+            <a:pPr lvl="1"/>
+            <a:r>
+              <a:rPr lang="en-NZ" dirty="0" smtClean="0"/>
+              <a:t>Other adjustments that might need to be performed, such as adjustments to continuous variables, can be done outside </a:t>
+            </a:r>
+            <a:r>
+              <a:rPr lang="en-NZ" dirty="0" err="1" smtClean="0"/>
+              <a:t>simar</a:t>
+            </a:r>
+            <a:r>
+              <a:rPr lang="en-NZ" dirty="0" smtClean="0"/>
+              <a:t> by the user before simulation.</a:t>
+            </a:r>
+          </a:p>
+          <a:p>
+            <a:r>
+              <a:rPr lang="en-NZ" dirty="0" smtClean="0"/>
+              <a:t>Pre simulation stats are generated</a:t>
+            </a:r>
+          </a:p>
+          <a:p>
+            <a:r>
+              <a:rPr lang="en-NZ" dirty="0" smtClean="0"/>
+              <a:t>Run loop</a:t>
+            </a:r>
+          </a:p>
+          <a:p>
+            <a:pPr lvl="1"/>
+            <a:r>
+              <a:rPr lang="en-NZ" dirty="0" smtClean="0"/>
+              <a:t>During each run, the following functions are called on each module</a:t>
+            </a:r>
+          </a:p>
+          <a:p>
+            <a:pPr lvl="2"/>
+            <a:r>
+              <a:rPr lang="en-NZ" dirty="0" err="1" smtClean="0"/>
+              <a:t>simulateRun</a:t>
+            </a:r>
+            <a:endParaRPr lang="en-NZ" dirty="0" smtClean="0"/>
+          </a:p>
+          <a:p>
+            <a:pPr lvl="2"/>
+            <a:r>
+              <a:rPr lang="en-NZ" dirty="0" err="1" smtClean="0"/>
+              <a:t>appendRunStats</a:t>
+            </a:r>
+            <a:endParaRPr lang="en-NZ" dirty="0" smtClean="0"/>
+          </a:p>
+          <a:p>
+            <a:r>
+              <a:rPr lang="en-NZ" dirty="0" smtClean="0"/>
+              <a:t>Final results are calculated by each module across all runs</a:t>
+            </a:r>
+            <a:endParaRPr lang="en-NZ" dirty="0"/>
+          </a:p>
+        </p:txBody>
+      </p:sp>
+    </p:spTree>
+    <p:extLst>
+      <p:ext uri="{BB962C8B-B14F-4D97-AF65-F5344CB8AC3E}">
+        <p14:creationId xmlns:p14="http://schemas.microsoft.com/office/powerpoint/2010/main" val="3435886797"/>
+      </p:ext>
+    </p:extLst>
+  </p:cSld>
+  <p:clrMapOvr>
+    <a:masterClrMapping/>
+  </p:clrMapOvr>
+</p:sld>
+</file>
+
+<file path=ppt/slides/slide17.xml><?xml version="1.0" encoding="utf-8"?>
+<p:sld xmlns:a="http://schemas.openxmlformats.org/drawingml/2006/main" xmlns:r="http://schemas.openxmlformats.org/officeDocument/2006/relationships" xmlns:p="http://schemas.openxmlformats.org/presentationml/2006/main">
+  <p:cSld>
+    <p:spTree>
+      <p:nvGrpSpPr>
+        <p:cNvPr id="1" name=""/>
+        <p:cNvGrpSpPr/>
+        <p:nvPr/>
+      </p:nvGrpSpPr>
+      <p:grpSpPr>
+        <a:xfrm>
+          <a:off x="0" y="0"/>
+          <a:ext cx="0" cy="0"/>
+          <a:chOff x="0" y="0"/>
+          <a:chExt cx="0" cy="0"/>
+        </a:xfrm>
+      </p:grpSpPr>
+      <p:sp>
+        <p:nvSpPr>
+          <p:cNvPr id="2" name="Title 1"/>
+          <p:cNvSpPr>
+            <a:spLocks noGrp="1"/>
+          </p:cNvSpPr>
+          <p:nvPr>
+            <p:ph type="title"/>
+          </p:nvPr>
+        </p:nvSpPr>
+        <p:spPr/>
+        <p:txBody>
+          <a:bodyPr>
+            <a:normAutofit/>
+          </a:bodyPr>
+          <a:lstStyle/>
+          <a:p>
+            <a:r>
+              <a:rPr lang="en-NZ" dirty="0" err="1" smtClean="0"/>
+              <a:t>simulateRun</a:t>
+            </a:r>
+            <a:endParaRPr lang="en-NZ" dirty="0"/>
+          </a:p>
+        </p:txBody>
+      </p:sp>
+      <p:sp>
+        <p:nvSpPr>
+          <p:cNvPr id="3" name="Content Placeholder 2"/>
+          <p:cNvSpPr>
+            <a:spLocks noGrp="1"/>
+          </p:cNvSpPr>
+          <p:nvPr>
+            <p:ph idx="1"/>
+          </p:nvPr>
+        </p:nvSpPr>
+        <p:spPr/>
+        <p:txBody>
+          <a:bodyPr>
+            <a:normAutofit fontScale="70000" lnSpcReduction="20000"/>
+          </a:bodyPr>
+          <a:lstStyle/>
+          <a:p>
+            <a:r>
+              <a:rPr lang="en-NZ" dirty="0" smtClean="0"/>
+              <a:t>Simulation involves calling </a:t>
+            </a:r>
+            <a:r>
+              <a:rPr lang="en-NZ" dirty="0" err="1" smtClean="0"/>
+              <a:t>simulateRun</a:t>
+            </a:r>
+            <a:r>
+              <a:rPr lang="en-NZ" dirty="0" smtClean="0"/>
+              <a:t>() for each </a:t>
+            </a:r>
+            <a:r>
+              <a:rPr lang="en-NZ" dirty="0" err="1" smtClean="0"/>
+              <a:t>Simmodule</a:t>
+            </a:r>
+            <a:r>
+              <a:rPr lang="en-NZ" dirty="0" smtClean="0"/>
+              <a:t> </a:t>
+            </a:r>
+          </a:p>
+          <a:p>
+            <a:r>
+              <a:rPr lang="en-NZ" dirty="0" smtClean="0"/>
+              <a:t>The </a:t>
+            </a:r>
+            <a:r>
+              <a:rPr lang="en-NZ" dirty="0" err="1" smtClean="0"/>
+              <a:t>simulateRun</a:t>
+            </a:r>
+            <a:r>
+              <a:rPr lang="en-NZ" dirty="0" smtClean="0"/>
+              <a:t>() method uses a local copy of the </a:t>
+            </a:r>
+            <a:r>
+              <a:rPr lang="en-NZ" dirty="0" err="1" smtClean="0"/>
+              <a:t>simframe</a:t>
+            </a:r>
+            <a:r>
+              <a:rPr lang="en-NZ" dirty="0" smtClean="0"/>
+              <a:t>, copied from the environment’s </a:t>
+            </a:r>
+            <a:r>
+              <a:rPr lang="en-NZ" dirty="0" err="1" smtClean="0"/>
+              <a:t>simframe</a:t>
+            </a:r>
+            <a:r>
+              <a:rPr lang="en-NZ" dirty="0" smtClean="0"/>
+              <a:t>. The environment’s </a:t>
+            </a:r>
+            <a:r>
+              <a:rPr lang="en-NZ" dirty="0" err="1" smtClean="0"/>
+              <a:t>simframe</a:t>
+            </a:r>
+            <a:r>
+              <a:rPr lang="en-NZ" dirty="0" smtClean="0"/>
+              <a:t> is not modified. This is so that each run will start with the same </a:t>
+            </a:r>
+            <a:r>
+              <a:rPr lang="en-NZ" dirty="0" err="1" smtClean="0"/>
+              <a:t>simframe</a:t>
+            </a:r>
+            <a:r>
+              <a:rPr lang="en-NZ" dirty="0" smtClean="0"/>
+              <a:t>.</a:t>
+            </a:r>
+          </a:p>
+          <a:p>
+            <a:r>
+              <a:rPr lang="en-NZ" dirty="0" smtClean="0"/>
+              <a:t>At the beginning of each iteration, the current values of specified </a:t>
+            </a:r>
+            <a:r>
+              <a:rPr lang="en-NZ" dirty="0" err="1" smtClean="0"/>
+              <a:t>simframe</a:t>
+            </a:r>
+            <a:r>
+              <a:rPr lang="en-NZ" dirty="0" smtClean="0"/>
+              <a:t> variables are stored in corresponding “previous” variables. (This optional feature can be used by models that rely on previous state information to generate the current state).</a:t>
+            </a:r>
+          </a:p>
+          <a:p>
+            <a:r>
+              <a:rPr lang="en-NZ" dirty="0" smtClean="0"/>
+              <a:t>During the iteration, </a:t>
+            </a:r>
+            <a:r>
+              <a:rPr lang="en-NZ" dirty="0" err="1" smtClean="0"/>
+              <a:t>simframe</a:t>
+            </a:r>
+            <a:r>
+              <a:rPr lang="en-NZ" dirty="0" smtClean="0"/>
+              <a:t> variables are transformed </a:t>
+            </a:r>
+          </a:p>
+          <a:p>
+            <a:r>
+              <a:rPr lang="en-NZ" dirty="0" smtClean="0"/>
+              <a:t>At the end of the iteration, </a:t>
+            </a:r>
+            <a:r>
+              <a:rPr lang="en-NZ" dirty="0" err="1" smtClean="0"/>
+              <a:t>simframe</a:t>
+            </a:r>
+            <a:r>
+              <a:rPr lang="en-NZ" dirty="0" smtClean="0"/>
+              <a:t> outcome variables are stored in outcome matrices</a:t>
+            </a:r>
+            <a:endParaRPr lang="en-NZ" dirty="0"/>
+          </a:p>
+        </p:txBody>
+      </p:sp>
+    </p:spTree>
+  </p:cSld>
+  <p:clrMapOvr>
+    <a:masterClrMapping/>
+  </p:clrMapOvr>
+</p:sld>
+</file>
+
+<file path=ppt/slides/slide18.xml><?xml version="1.0" encoding="utf-8"?>
 <p:sld xmlns:a="http://schemas.openxmlformats.org/drawingml/2006/main" xmlns:r="http://schemas.openxmlformats.org/officeDocument/2006/relationships" xmlns:p="http://schemas.openxmlformats.org/presentationml/2006/main">
   <p:cSld>
     <p:spTree>
@@ -7728,7 +8348,7 @@
 </p:sld>
 </file>
 
-<file path=ppt/slides/slide17.xml><?xml version="1.0" encoding="utf-8"?>
+<file path=ppt/slides/slide19.xml><?xml version="1.0" encoding="utf-8"?>
 <p:sld xmlns:a="http://schemas.openxmlformats.org/drawingml/2006/main" xmlns:r="http://schemas.openxmlformats.org/officeDocument/2006/relationships" xmlns:p="http://schemas.openxmlformats.org/presentationml/2006/main">
   <p:cSld>
     <p:spTree>
@@ -8237,7 +8857,7 @@
             <a:pPr lvl="1"/>
             <a:r>
               <a:rPr lang="en-NZ" dirty="0" smtClean="0"/>
-              <a:t>adjustments to apply to categorical variables before and during the simulation</a:t>
+              <a:t>adjustments applied to categorical variables before and during the simulation</a:t>
             </a:r>
           </a:p>
           <a:p>
@@ -8359,24 +8979,42 @@
         <p:spPr/>
         <p:txBody>
           <a:bodyPr>
-            <a:normAutofit lnSpcReduction="10000"/>
+            <a:normAutofit fontScale="92500" lnSpcReduction="10000"/>
           </a:bodyPr>
           <a:lstStyle/>
           <a:p>
             <a:r>
               <a:rPr lang="en-NZ" dirty="0" smtClean="0"/>
-              <a:t>Contains</a:t>
-            </a:r>
-          </a:p>
-          <a:p>
-            <a:pPr lvl="1"/>
+              <a:t>Contains </a:t>
+            </a:r>
             <a:r>
               <a:rPr lang="en-NZ" dirty="0" err="1" smtClean="0"/>
               <a:t>vardesc</a:t>
             </a:r>
             <a:r>
               <a:rPr lang="en-NZ" dirty="0" smtClean="0"/>
-              <a:t>: a vector of variable descriptions, named with variable names</a:t>
+              <a:t>, and </a:t>
+            </a:r>
+            <a:r>
+              <a:rPr lang="en-NZ" dirty="0" err="1" smtClean="0"/>
+              <a:t>codings</a:t>
+            </a:r>
+            <a:r>
+              <a:rPr lang="en-NZ" dirty="0" smtClean="0"/>
+              <a:t>. Both are loaded from a file</a:t>
+            </a:r>
+          </a:p>
+          <a:p>
+            <a:r>
+              <a:rPr lang="en-NZ" dirty="0" smtClean="0"/>
+              <a:t>descriptions</a:t>
+            </a:r>
+          </a:p>
+          <a:p>
+            <a:pPr lvl="1"/>
+            <a:r>
+              <a:rPr lang="en-NZ" dirty="0" smtClean="0"/>
+              <a:t>a vector of variable descriptions, named with variable names</a:t>
             </a:r>
           </a:p>
           <a:p>
@@ -8407,14 +9045,17 @@
             </a:r>
           </a:p>
           <a:p>
-            <a:pPr lvl="1"/>
             <a:r>
               <a:rPr lang="en-NZ" dirty="0" err="1" smtClean="0"/>
               <a:t>codings</a:t>
             </a:r>
-            <a:r>
-              <a:rPr lang="en-NZ" dirty="0" smtClean="0"/>
-              <a:t>: a list of category names for categorical variables</a:t>
+            <a:endParaRPr lang="en-NZ" dirty="0" smtClean="0"/>
+          </a:p>
+          <a:p>
+            <a:pPr lvl="1"/>
+            <a:r>
+              <a:rPr lang="en-NZ" dirty="0" smtClean="0"/>
+              <a:t>a list of category names for categorical variables</a:t>
             </a:r>
           </a:p>
           <a:p>
@@ -8443,25 +9084,6 @@
               <a:rPr lang="en-NZ" dirty="0" smtClean="0"/>
               <a:t>”=1)</a:t>
             </a:r>
-          </a:p>
-          <a:p>
-            <a:r>
-              <a:rPr lang="en-NZ" dirty="0" err="1" smtClean="0"/>
-              <a:t>Vardesc</a:t>
-            </a:r>
-            <a:r>
-              <a:rPr lang="en-NZ" dirty="0" smtClean="0"/>
-              <a:t> and </a:t>
-            </a:r>
-            <a:r>
-              <a:rPr lang="en-NZ" dirty="0" err="1" smtClean="0"/>
-              <a:t>codings</a:t>
-            </a:r>
-            <a:r>
-              <a:rPr lang="en-NZ" dirty="0" smtClean="0"/>
-              <a:t> are loaded from a file</a:t>
-            </a:r>
-            <a:endParaRPr lang="en-NZ" dirty="0"/>
           </a:p>
         </p:txBody>
       </p:sp>
@@ -8497,7 +9119,7 @@
       </p:grpSpPr>
       <p:sp>
         <p:nvSpPr>
-          <p:cNvPr id="8" name="Title 7"/>
+          <p:cNvPr id="2" name="Title 1"/>
           <p:cNvSpPr>
             <a:spLocks noGrp="1"/>
           </p:cNvSpPr>
@@ -8511,8 +9133,8 @@
           <a:lstStyle/>
           <a:p>
             <a:r>
-              <a:rPr lang="en-NZ" dirty="0" err="1" smtClean="0"/>
-              <a:t>Simframe</a:t>
+              <a:rPr lang="en-NZ" dirty="0" smtClean="0"/>
+              <a:t>Categorical adjustments	</a:t>
             </a:r>
             <a:endParaRPr lang="en-NZ" dirty="0"/>
           </a:p>
@@ -8520,7 +9142,7 @@
       </p:sp>
       <p:sp>
         <p:nvSpPr>
-          <p:cNvPr id="9" name="Content Placeholder 8"/>
+          <p:cNvPr id="3" name="Content Placeholder 2"/>
           <p:cNvSpPr>
             <a:spLocks noGrp="1"/>
           </p:cNvSpPr>
@@ -8531,53 +9153,228 @@
         <p:spPr/>
         <p:txBody>
           <a:bodyPr>
-            <a:normAutofit fontScale="92500" lnSpcReduction="10000"/>
+            <a:normAutofit/>
           </a:bodyPr>
           <a:lstStyle/>
           <a:p>
             <a:r>
               <a:rPr lang="en-NZ" dirty="0" smtClean="0"/>
-              <a:t>A </a:t>
+              <a:t>Before or during the simulation the user may wish to specify the proportion of category values desired for a </a:t>
             </a:r>
             <a:r>
               <a:rPr lang="en-NZ" dirty="0" err="1" smtClean="0"/>
-              <a:t>dataframe</a:t>
-            </a:r>
-            <a:r>
-              <a:rPr lang="en-NZ" dirty="0" smtClean="0"/>
-              <a:t> of variables (input, intermediate, and outcome) used during the simulation</a:t>
+              <a:t>simframe</a:t>
+            </a:r>
+            <a:r>
+              <a:rPr lang="en-NZ" dirty="0" smtClean="0"/>
+              <a:t> variable</a:t>
             </a:r>
           </a:p>
           <a:p>
             <a:pPr lvl="1"/>
             <a:r>
-              <a:rPr lang="en-NZ" dirty="0" smtClean="0"/>
-              <a:t>Input variables are those that are not transformed</a:t>
-            </a:r>
+              <a:rPr lang="en-NZ" dirty="0" err="1" smtClean="0"/>
+              <a:t>Eg</a:t>
+            </a:r>
+            <a:r>
+              <a:rPr lang="en-NZ" dirty="0" smtClean="0"/>
+              <a:t>: a user may wish the proportion of home owners in year 2 to be 0.4, 0.6</a:t>
+            </a:r>
+          </a:p>
+          <a:p>
+            <a:r>
+              <a:rPr lang="en-NZ" dirty="0" smtClean="0"/>
+              <a:t>Desired proportions can be specified in a categorical adjustment matrix, </a:t>
+            </a:r>
+            <a:r>
+              <a:rPr lang="en-NZ" dirty="0" err="1" smtClean="0"/>
+              <a:t>eg</a:t>
+            </a:r>
+            <a:r>
+              <a:rPr lang="en-NZ" dirty="0" smtClean="0"/>
+              <a:t>:</a:t>
+            </a:r>
+          </a:p>
+          <a:p>
+            <a:endParaRPr lang="en-NZ" dirty="0" smtClean="0"/>
           </a:p>
           <a:p>
             <a:pPr lvl="1"/>
-            <a:r>
-              <a:rPr lang="en-NZ" dirty="0" smtClean="0"/>
-              <a:t>Intermediate variables are transformed during simulation iterations, but not recorded for output</a:t>
-            </a:r>
-          </a:p>
-          <a:p>
-            <a:pPr lvl="1"/>
-            <a:r>
-              <a:rPr lang="en-NZ" dirty="0" smtClean="0"/>
-              <a:t>Outcome variables are transformed during simulation iterations, and are stored in outcome matrices for generation of run stats after each run</a:t>
-            </a:r>
-          </a:p>
-          <a:p>
-            <a:r>
-              <a:rPr lang="en-NZ" dirty="0" smtClean="0"/>
-              <a:t>Each variable is a vector that contains values for all micro-units</a:t>
-            </a:r>
+            <a:endParaRPr lang="en-NZ" dirty="0" smtClean="0"/>
           </a:p>
         </p:txBody>
       </p:sp>
+      <p:graphicFrame>
+        <p:nvGraphicFramePr>
+          <p:cNvPr id="4" name="Table 3"/>
+          <p:cNvGraphicFramePr>
+            <a:graphicFrameLocks noGrp="1"/>
+          </p:cNvGraphicFramePr>
+          <p:nvPr>
+            <p:extLst>
+              <p:ext uri="{D42A27DB-BD31-4B8C-83A1-F6EECF244321}">
+                <p14:modId xmlns:p14="http://schemas.microsoft.com/office/powerpoint/2010/main" val="1728243183"/>
+              </p:ext>
+            </p:extLst>
+          </p:nvPr>
+        </p:nvGraphicFramePr>
+        <p:xfrm>
+          <a:off x="1331640" y="5373216"/>
+          <a:ext cx="6096000" cy="1112520"/>
+        </p:xfrm>
+        <a:graphic>
+          <a:graphicData uri="http://schemas.openxmlformats.org/drawingml/2006/table">
+            <a:tbl>
+              <a:tblPr firstRow="1" bandRow="1">
+                <a:tableStyleId>{5C22544A-7EE6-4342-B048-85BDC9FD1C3A}</a:tableStyleId>
+              </a:tblPr>
+              <a:tblGrid>
+                <a:gridCol w="2032000"/>
+                <a:gridCol w="2032000"/>
+                <a:gridCol w="2032000"/>
+              </a:tblGrid>
+              <a:tr h="370840">
+                <a:tc>
+                  <a:txBody>
+                    <a:bodyPr/>
+                    <a:lstStyle/>
+                    <a:p>
+                      <a:r>
+                        <a:rPr lang="en-NZ" dirty="0" smtClean="0"/>
+                        <a:t>Iteration</a:t>
+                      </a:r>
+                      <a:endParaRPr lang="en-NZ" dirty="0"/>
+                    </a:p>
+                  </a:txBody>
+                  <a:tcPr/>
+                </a:tc>
+                <a:tc>
+                  <a:txBody>
+                    <a:bodyPr/>
+                    <a:lstStyle/>
+                    <a:p>
+                      <a:r>
+                        <a:rPr lang="en-NZ" dirty="0" smtClean="0"/>
+                        <a:t>Own home</a:t>
+                      </a:r>
+                      <a:endParaRPr lang="en-NZ" dirty="0"/>
+                    </a:p>
+                  </a:txBody>
+                  <a:tcPr/>
+                </a:tc>
+                <a:tc>
+                  <a:txBody>
+                    <a:bodyPr/>
+                    <a:lstStyle/>
+                    <a:p>
+                      <a:r>
+                        <a:rPr lang="en-NZ" dirty="0" smtClean="0"/>
+                        <a:t>Rents</a:t>
+                      </a:r>
+                      <a:endParaRPr lang="en-NZ" dirty="0"/>
+                    </a:p>
+                  </a:txBody>
+                  <a:tcPr/>
+                </a:tc>
+              </a:tr>
+              <a:tr h="370840">
+                <a:tc>
+                  <a:txBody>
+                    <a:bodyPr/>
+                    <a:lstStyle/>
+                    <a:p>
+                      <a:r>
+                        <a:rPr lang="en-NZ" dirty="0" smtClean="0"/>
+                        <a:t>1</a:t>
+                      </a:r>
+                      <a:endParaRPr lang="en-NZ" dirty="0"/>
+                    </a:p>
+                  </a:txBody>
+                  <a:tcPr/>
+                </a:tc>
+                <a:tc>
+                  <a:txBody>
+                    <a:bodyPr/>
+                    <a:lstStyle/>
+                    <a:p>
+                      <a:r>
+                        <a:rPr lang="en-NZ" dirty="0" smtClean="0"/>
+                        <a:t>NA</a:t>
+                      </a:r>
+                      <a:endParaRPr lang="en-NZ" dirty="0"/>
+                    </a:p>
+                  </a:txBody>
+                  <a:tcPr/>
+                </a:tc>
+                <a:tc>
+                  <a:txBody>
+                    <a:bodyPr/>
+                    <a:lstStyle/>
+                    <a:p>
+                      <a:r>
+                        <a:rPr lang="en-NZ" dirty="0" smtClean="0"/>
+                        <a:t>NA</a:t>
+                      </a:r>
+                      <a:endParaRPr lang="en-NZ" dirty="0"/>
+                    </a:p>
+                  </a:txBody>
+                  <a:tcPr/>
+                </a:tc>
+              </a:tr>
+              <a:tr h="370840">
+                <a:tc>
+                  <a:txBody>
+                    <a:bodyPr/>
+                    <a:lstStyle/>
+                    <a:p>
+                      <a:r>
+                        <a:rPr lang="en-NZ" dirty="0" smtClean="0"/>
+                        <a:t>2</a:t>
+                      </a:r>
+                      <a:endParaRPr lang="en-NZ" dirty="0"/>
+                    </a:p>
+                  </a:txBody>
+                  <a:tcPr/>
+                </a:tc>
+                <a:tc>
+                  <a:txBody>
+                    <a:bodyPr/>
+                    <a:lstStyle/>
+                    <a:p>
+                      <a:r>
+                        <a:rPr lang="en-NZ" dirty="0" smtClean="0"/>
+                        <a:t>0.4</a:t>
+                      </a:r>
+                      <a:endParaRPr lang="en-NZ" dirty="0"/>
+                    </a:p>
+                  </a:txBody>
+                  <a:tcPr/>
+                </a:tc>
+                <a:tc>
+                  <a:txBody>
+                    <a:bodyPr/>
+                    <a:lstStyle/>
+                    <a:p>
+                      <a:r>
+                        <a:rPr lang="en-NZ" dirty="0" smtClean="0"/>
+                        <a:t>0.6</a:t>
+                      </a:r>
+                      <a:endParaRPr lang="en-NZ" dirty="0"/>
+                    </a:p>
+                  </a:txBody>
+                  <a:tcPr/>
+                </a:tc>
+              </a:tr>
+            </a:tbl>
+          </a:graphicData>
+        </a:graphic>
+      </p:graphicFrame>
     </p:spTree>
+    <p:extLst>
+      <p:ext uri="{BB962C8B-B14F-4D97-AF65-F5344CB8AC3E}">
+        <p14:creationId xmlns:p14="http://schemas.microsoft.com/office/powerpoint/2010/main" val="2426780635"/>
+      </p:ext>
+    </p:extLst>
   </p:cSld>
   <p:clrMapOvr>
     <a:masterClrMapping/>
@@ -8618,477 +9415,105 @@
           <a:lstStyle/>
           <a:p>
             <a:r>
-              <a:rPr lang="en-NZ" dirty="0" err="1" smtClean="0"/>
-              <a:t>Simframe</a:t>
+              <a:rPr lang="en-NZ" dirty="0" smtClean="0"/>
+              <a:t>Categorical adjustments	</a:t>
             </a:r>
             <a:endParaRPr lang="en-NZ" dirty="0"/>
           </a:p>
         </p:txBody>
       </p:sp>
-      <p:graphicFrame>
-        <p:nvGraphicFramePr>
-          <p:cNvPr id="4" name="Content Placeholder 3"/>
-          <p:cNvGraphicFramePr>
-            <a:graphicFrameLocks noGrp="1"/>
-          </p:cNvGraphicFramePr>
+      <p:sp>
+        <p:nvSpPr>
+          <p:cNvPr id="3" name="Content Placeholder 2"/>
+          <p:cNvSpPr>
+            <a:spLocks noGrp="1"/>
+          </p:cNvSpPr>
           <p:nvPr>
             <p:ph idx="1"/>
           </p:nvPr>
-        </p:nvGraphicFramePr>
-        <p:xfrm>
-          <a:off x="1763688" y="1628800"/>
-          <a:ext cx="5606836" cy="2225040"/>
-        </p:xfrm>
-        <a:graphic>
-          <a:graphicData uri="http://schemas.openxmlformats.org/drawingml/2006/table">
-            <a:tbl>
-              <a:tblPr firstRow="1" bandRow="1">
-                <a:tableStyleId>{5C22544A-7EE6-4342-B048-85BDC9FD1C3A}</a:tableStyleId>
-              </a:tblPr>
-              <a:tblGrid>
-                <a:gridCol w="514400"/>
-                <a:gridCol w="792088"/>
-                <a:gridCol w="863918"/>
-                <a:gridCol w="1790510"/>
-                <a:gridCol w="1645920"/>
-              </a:tblGrid>
-              <a:tr h="370840">
-                <a:tc>
-                  <a:txBody>
-                    <a:bodyPr/>
-                    <a:lstStyle/>
-                    <a:p>
-                      <a:r>
-                        <a:rPr lang="en-NZ" dirty="0" smtClean="0"/>
-                        <a:t>ID</a:t>
-                      </a:r>
-                      <a:endParaRPr lang="en-NZ" dirty="0"/>
-                    </a:p>
-                  </a:txBody>
-                  <a:tcPr/>
-                </a:tc>
-                <a:tc>
-                  <a:txBody>
-                    <a:bodyPr/>
-                    <a:lstStyle/>
-                    <a:p>
-                      <a:r>
-                        <a:rPr lang="en-NZ" dirty="0" smtClean="0"/>
-                        <a:t>Age</a:t>
-                      </a:r>
-                      <a:endParaRPr lang="en-NZ" dirty="0"/>
-                    </a:p>
-                  </a:txBody>
-                  <a:tcPr/>
-                </a:tc>
-                <a:tc>
-                  <a:txBody>
-                    <a:bodyPr/>
-                    <a:lstStyle/>
-                    <a:p>
-                      <a:r>
-                        <a:rPr lang="en-NZ" dirty="0" smtClean="0"/>
-                        <a:t>Health</a:t>
-                      </a:r>
-                      <a:endParaRPr lang="en-NZ" dirty="0"/>
-                    </a:p>
-                  </a:txBody>
-                  <a:tcPr/>
-                </a:tc>
-                <a:tc>
-                  <a:txBody>
-                    <a:bodyPr/>
-                    <a:lstStyle/>
-                    <a:p>
-                      <a:r>
-                        <a:rPr lang="en-NZ" dirty="0" err="1" smtClean="0"/>
-                        <a:t>Health_previous</a:t>
-                      </a:r>
-                      <a:endParaRPr lang="en-NZ" dirty="0"/>
-                    </a:p>
-                  </a:txBody>
-                  <a:tcPr/>
-                </a:tc>
-                <a:tc>
-                  <a:txBody>
-                    <a:bodyPr/>
-                    <a:lstStyle/>
-                    <a:p>
-                      <a:r>
-                        <a:rPr lang="en-NZ" dirty="0" smtClean="0"/>
-                        <a:t>Earnings</a:t>
-                      </a:r>
-                      <a:endParaRPr lang="en-NZ" dirty="0"/>
-                    </a:p>
-                  </a:txBody>
-                  <a:tcPr/>
-                </a:tc>
-              </a:tr>
-              <a:tr h="370840">
-                <a:tc>
-                  <a:txBody>
-                    <a:bodyPr/>
-                    <a:lstStyle/>
-                    <a:p>
-                      <a:r>
-                        <a:rPr lang="en-NZ" dirty="0" smtClean="0"/>
-                        <a:t>1</a:t>
-                      </a:r>
-                      <a:endParaRPr lang="en-NZ" dirty="0"/>
-                    </a:p>
-                  </a:txBody>
-                  <a:tcPr/>
-                </a:tc>
-                <a:tc>
-                  <a:txBody>
-                    <a:bodyPr/>
-                    <a:lstStyle/>
-                    <a:p>
-                      <a:r>
-                        <a:rPr lang="en-NZ" dirty="0" smtClean="0"/>
-                        <a:t>2</a:t>
-                      </a:r>
-                      <a:endParaRPr lang="en-NZ" dirty="0"/>
-                    </a:p>
-                  </a:txBody>
-                  <a:tcPr/>
-                </a:tc>
-                <a:tc>
-                  <a:txBody>
-                    <a:bodyPr/>
-                    <a:lstStyle/>
-                    <a:p>
-                      <a:r>
-                        <a:rPr lang="en-NZ" dirty="0" smtClean="0"/>
-                        <a:t>0</a:t>
-                      </a:r>
-                      <a:endParaRPr lang="en-NZ" dirty="0"/>
-                    </a:p>
-                  </a:txBody>
-                  <a:tcPr/>
-                </a:tc>
-                <a:tc>
-                  <a:txBody>
-                    <a:bodyPr/>
-                    <a:lstStyle/>
-                    <a:p>
-                      <a:r>
-                        <a:rPr lang="en-NZ" dirty="0" smtClean="0"/>
-                        <a:t>NA</a:t>
-                      </a:r>
-                      <a:endParaRPr lang="en-NZ" dirty="0"/>
-                    </a:p>
-                  </a:txBody>
-                  <a:tcPr/>
-                </a:tc>
-                <a:tc>
-                  <a:txBody>
-                    <a:bodyPr/>
-                    <a:lstStyle/>
-                    <a:p>
-                      <a:r>
-                        <a:rPr lang="en-NZ" dirty="0" smtClean="0"/>
-                        <a:t>0</a:t>
-                      </a:r>
-                      <a:endParaRPr lang="en-NZ" dirty="0"/>
-                    </a:p>
-                  </a:txBody>
-                  <a:tcPr/>
-                </a:tc>
-              </a:tr>
-              <a:tr h="370840">
-                <a:tc>
-                  <a:txBody>
-                    <a:bodyPr/>
-                    <a:lstStyle/>
-                    <a:p>
-                      <a:r>
-                        <a:rPr lang="en-NZ" dirty="0" smtClean="0"/>
-                        <a:t>2</a:t>
-                      </a:r>
-                      <a:endParaRPr lang="en-NZ" dirty="0"/>
-                    </a:p>
-                  </a:txBody>
-                  <a:tcPr/>
-                </a:tc>
-                <a:tc>
-                  <a:txBody>
-                    <a:bodyPr/>
-                    <a:lstStyle/>
-                    <a:p>
-                      <a:r>
-                        <a:rPr lang="en-NZ" dirty="0" smtClean="0"/>
-                        <a:t>5</a:t>
-                      </a:r>
-                      <a:endParaRPr lang="en-NZ" dirty="0"/>
-                    </a:p>
-                  </a:txBody>
-                  <a:tcPr/>
-                </a:tc>
-                <a:tc>
-                  <a:txBody>
-                    <a:bodyPr/>
-                    <a:lstStyle/>
-                    <a:p>
-                      <a:r>
-                        <a:rPr lang="en-NZ" dirty="0" smtClean="0"/>
-                        <a:t>0</a:t>
-                      </a:r>
-                      <a:endParaRPr lang="en-NZ" dirty="0"/>
-                    </a:p>
-                  </a:txBody>
-                  <a:tcPr/>
-                </a:tc>
-                <a:tc>
-                  <a:txBody>
-                    <a:bodyPr/>
-                    <a:lstStyle/>
-                    <a:p>
-                      <a:r>
-                        <a:rPr lang="en-NZ" dirty="0" smtClean="0"/>
-                        <a:t>NA</a:t>
-                      </a:r>
-                      <a:endParaRPr lang="en-NZ" dirty="0"/>
-                    </a:p>
-                  </a:txBody>
-                  <a:tcPr/>
-                </a:tc>
-                <a:tc>
-                  <a:txBody>
-                    <a:bodyPr/>
-                    <a:lstStyle/>
-                    <a:p>
-                      <a:r>
-                        <a:rPr lang="en-NZ" dirty="0" smtClean="0"/>
-                        <a:t>0</a:t>
-                      </a:r>
-                      <a:endParaRPr lang="en-NZ" dirty="0"/>
-                    </a:p>
-                  </a:txBody>
-                  <a:tcPr/>
-                </a:tc>
-              </a:tr>
-              <a:tr h="370840">
-                <a:tc>
-                  <a:txBody>
-                    <a:bodyPr/>
-                    <a:lstStyle/>
-                    <a:p>
-                      <a:r>
-                        <a:rPr lang="en-NZ" dirty="0" smtClean="0"/>
-                        <a:t>3</a:t>
-                      </a:r>
-                      <a:endParaRPr lang="en-NZ" dirty="0"/>
-                    </a:p>
-                  </a:txBody>
-                  <a:tcPr/>
-                </a:tc>
-                <a:tc>
-                  <a:txBody>
-                    <a:bodyPr/>
-                    <a:lstStyle/>
-                    <a:p>
-                      <a:r>
-                        <a:rPr lang="en-NZ" dirty="0" smtClean="0"/>
-                        <a:t>6</a:t>
-                      </a:r>
-                      <a:endParaRPr lang="en-NZ" dirty="0"/>
-                    </a:p>
-                  </a:txBody>
-                  <a:tcPr/>
-                </a:tc>
-                <a:tc>
-                  <a:txBody>
-                    <a:bodyPr/>
-                    <a:lstStyle/>
-                    <a:p>
-                      <a:r>
-                        <a:rPr lang="en-NZ" dirty="0" smtClean="0"/>
-                        <a:t>0</a:t>
-                      </a:r>
-                      <a:endParaRPr lang="en-NZ" dirty="0"/>
-                    </a:p>
-                  </a:txBody>
-                  <a:tcPr/>
-                </a:tc>
-                <a:tc>
-                  <a:txBody>
-                    <a:bodyPr/>
-                    <a:lstStyle/>
-                    <a:p>
-                      <a:r>
-                        <a:rPr lang="en-NZ" dirty="0" smtClean="0"/>
-                        <a:t>NA</a:t>
-                      </a:r>
-                      <a:endParaRPr lang="en-NZ" dirty="0"/>
-                    </a:p>
-                  </a:txBody>
-                  <a:tcPr/>
-                </a:tc>
-                <a:tc>
-                  <a:txBody>
-                    <a:bodyPr/>
-                    <a:lstStyle/>
-                    <a:p>
-                      <a:r>
-                        <a:rPr lang="en-NZ" dirty="0" smtClean="0"/>
-                        <a:t>0</a:t>
-                      </a:r>
-                      <a:endParaRPr lang="en-NZ" dirty="0"/>
-                    </a:p>
-                  </a:txBody>
-                  <a:tcPr/>
-                </a:tc>
-              </a:tr>
-              <a:tr h="370840">
-                <a:tc>
-                  <a:txBody>
-                    <a:bodyPr/>
-                    <a:lstStyle/>
-                    <a:p>
-                      <a:r>
-                        <a:rPr lang="en-NZ" dirty="0" smtClean="0"/>
-                        <a:t>4</a:t>
-                      </a:r>
-                      <a:endParaRPr lang="en-NZ" dirty="0"/>
-                    </a:p>
-                  </a:txBody>
-                  <a:tcPr/>
-                </a:tc>
-                <a:tc>
-                  <a:txBody>
-                    <a:bodyPr/>
-                    <a:lstStyle/>
-                    <a:p>
-                      <a:r>
-                        <a:rPr lang="en-NZ" dirty="0" smtClean="0"/>
-                        <a:t>2</a:t>
-                      </a:r>
-                      <a:endParaRPr lang="en-NZ" dirty="0"/>
-                    </a:p>
-                  </a:txBody>
-                  <a:tcPr/>
-                </a:tc>
-                <a:tc>
-                  <a:txBody>
-                    <a:bodyPr/>
-                    <a:lstStyle/>
-                    <a:p>
-                      <a:r>
-                        <a:rPr lang="en-NZ" dirty="0" smtClean="0"/>
-                        <a:t>0</a:t>
-                      </a:r>
-                      <a:endParaRPr lang="en-NZ" dirty="0"/>
-                    </a:p>
-                  </a:txBody>
-                  <a:tcPr/>
-                </a:tc>
-                <a:tc>
-                  <a:txBody>
-                    <a:bodyPr/>
-                    <a:lstStyle/>
-                    <a:p>
-                      <a:r>
-                        <a:rPr lang="en-NZ" dirty="0" smtClean="0"/>
-                        <a:t>NA</a:t>
-                      </a:r>
-                      <a:endParaRPr lang="en-NZ" dirty="0"/>
-                    </a:p>
-                  </a:txBody>
-                  <a:tcPr/>
-                </a:tc>
-                <a:tc>
-                  <a:txBody>
-                    <a:bodyPr/>
-                    <a:lstStyle/>
-                    <a:p>
-                      <a:r>
-                        <a:rPr lang="en-NZ" dirty="0" smtClean="0"/>
-                        <a:t>0</a:t>
-                      </a:r>
-                      <a:endParaRPr lang="en-NZ" dirty="0"/>
-                    </a:p>
-                  </a:txBody>
-                  <a:tcPr/>
-                </a:tc>
-              </a:tr>
-              <a:tr h="370840">
-                <a:tc>
-                  <a:txBody>
-                    <a:bodyPr/>
-                    <a:lstStyle/>
-                    <a:p>
-                      <a:r>
-                        <a:rPr lang="en-NZ" dirty="0" smtClean="0"/>
-                        <a:t>5</a:t>
-                      </a:r>
-                      <a:endParaRPr lang="en-NZ" dirty="0"/>
-                    </a:p>
-                  </a:txBody>
-                  <a:tcPr/>
-                </a:tc>
-                <a:tc>
-                  <a:txBody>
-                    <a:bodyPr/>
-                    <a:lstStyle/>
-                    <a:p>
-                      <a:r>
-                        <a:rPr lang="en-NZ" dirty="0" smtClean="0"/>
-                        <a:t>4</a:t>
-                      </a:r>
-                      <a:endParaRPr lang="en-NZ" dirty="0"/>
-                    </a:p>
-                  </a:txBody>
-                  <a:tcPr/>
-                </a:tc>
-                <a:tc>
-                  <a:txBody>
-                    <a:bodyPr/>
-                    <a:lstStyle/>
-                    <a:p>
-                      <a:r>
-                        <a:rPr lang="en-NZ" dirty="0" smtClean="0"/>
-                        <a:t>0</a:t>
-                      </a:r>
-                      <a:endParaRPr lang="en-NZ" dirty="0"/>
-                    </a:p>
-                  </a:txBody>
-                  <a:tcPr/>
-                </a:tc>
-                <a:tc>
-                  <a:txBody>
-                    <a:bodyPr/>
-                    <a:lstStyle/>
-                    <a:p>
-                      <a:r>
-                        <a:rPr lang="en-NZ" dirty="0" smtClean="0"/>
-                        <a:t>NA</a:t>
-                      </a:r>
-                      <a:endParaRPr lang="en-NZ" dirty="0"/>
-                    </a:p>
-                  </a:txBody>
-                  <a:tcPr/>
-                </a:tc>
-                <a:tc>
-                  <a:txBody>
-                    <a:bodyPr/>
-                    <a:lstStyle/>
-                    <a:p>
-                      <a:r>
-                        <a:rPr lang="en-NZ" dirty="0" smtClean="0"/>
-                        <a:t>0</a:t>
-                      </a:r>
-                      <a:endParaRPr lang="en-NZ" dirty="0"/>
-                    </a:p>
-                  </a:txBody>
-                  <a:tcPr/>
-                </a:tc>
-              </a:tr>
-            </a:tbl>
-          </a:graphicData>
-        </a:graphic>
-      </p:graphicFrame>
+        </p:nvSpPr>
+        <p:spPr/>
+        <p:txBody>
+          <a:bodyPr>
+            <a:normAutofit fontScale="92500" lnSpcReduction="10000"/>
+          </a:bodyPr>
+          <a:lstStyle/>
+          <a:p>
+            <a:r>
+              <a:rPr lang="en-NZ" dirty="0" smtClean="0"/>
+              <a:t>In the above example instead of simulating the home ownership variable in year 2, it will be set to the desired proportions 0.4, 0.6 </a:t>
+            </a:r>
+          </a:p>
+          <a:p>
+            <a:r>
+              <a:rPr lang="en-NZ" dirty="0" smtClean="0"/>
+              <a:t>A </a:t>
+            </a:r>
+            <a:r>
+              <a:rPr lang="en-NZ" dirty="0"/>
+              <a:t>desired proportion of NA </a:t>
+            </a:r>
+            <a:r>
+              <a:rPr lang="en-NZ" dirty="0" smtClean="0"/>
+              <a:t>will leave the variable unchanged</a:t>
+            </a:r>
+            <a:endParaRPr lang="en-NZ" dirty="0"/>
+          </a:p>
+          <a:p>
+            <a:r>
+              <a:rPr lang="en-NZ" dirty="0"/>
+              <a:t>If propensities are supplied </a:t>
+            </a:r>
+            <a:r>
+              <a:rPr lang="en-NZ" dirty="0" smtClean="0"/>
+              <a:t>they </a:t>
+            </a:r>
+            <a:r>
+              <a:rPr lang="en-NZ" dirty="0"/>
+              <a:t>will be used to select </a:t>
+            </a:r>
+            <a:r>
+              <a:rPr lang="en-NZ" dirty="0" smtClean="0"/>
+              <a:t>which micro-units </a:t>
+            </a:r>
+            <a:r>
+              <a:rPr lang="en-NZ" dirty="0"/>
+              <a:t>to </a:t>
+            </a:r>
+            <a:r>
+              <a:rPr lang="en-NZ" dirty="0" smtClean="0"/>
+              <a:t>adjust, otherwise the selection will be random</a:t>
+            </a:r>
+          </a:p>
+          <a:p>
+            <a:pPr lvl="1"/>
+            <a:r>
+              <a:rPr lang="en-NZ" dirty="0" smtClean="0"/>
+              <a:t>Propensities are specified via the global list variable </a:t>
+            </a:r>
+            <a:r>
+              <a:rPr lang="en-NZ" sz="2400" dirty="0" err="1" smtClean="0">
+                <a:latin typeface="Courier New" pitchFamily="49" charset="0"/>
+                <a:cs typeface="Courier New" pitchFamily="49" charset="0"/>
+              </a:rPr>
+              <a:t>propens.all</a:t>
+            </a:r>
+            <a:endParaRPr lang="en-NZ" sz="2400" dirty="0">
+              <a:latin typeface="Courier New" pitchFamily="49" charset="0"/>
+              <a:cs typeface="Courier New" pitchFamily="49" charset="0"/>
+            </a:endParaRPr>
+          </a:p>
+          <a:p>
+            <a:endParaRPr lang="en-NZ" dirty="0"/>
+          </a:p>
+        </p:txBody>
+      </p:sp>
     </p:spTree>
+    <p:extLst>
+      <p:ext uri="{BB962C8B-B14F-4D97-AF65-F5344CB8AC3E}">
+        <p14:creationId xmlns:p14="http://schemas.microsoft.com/office/powerpoint/2010/main" val="2840074760"/>
+      </p:ext>
+    </p:extLst>
   </p:cSld>
   <p:clrMapOvr>
     <a:masterClrMapping/>

</xml_diff>

<commit_message>
added propensity loading rebuilt Rd files fixed CMD R CHECK errors
</commit_message>
<xml_diff>
--- a/docs/Simar overview.pptx
+++ b/docs/Simar overview.pptx
@@ -9,21 +9,22 @@
     <p:sldId id="262" r:id="rId3"/>
     <p:sldId id="263" r:id="rId4"/>
     <p:sldId id="260" r:id="rId5"/>
-    <p:sldId id="270" r:id="rId6"/>
-    <p:sldId id="271" r:id="rId7"/>
-    <p:sldId id="273" r:id="rId8"/>
-    <p:sldId id="274" r:id="rId9"/>
-    <p:sldId id="275" r:id="rId10"/>
-    <p:sldId id="261" r:id="rId11"/>
-    <p:sldId id="269" r:id="rId12"/>
-    <p:sldId id="264" r:id="rId13"/>
-    <p:sldId id="268" r:id="rId14"/>
-    <p:sldId id="267" r:id="rId15"/>
-    <p:sldId id="266" r:id="rId16"/>
-    <p:sldId id="272" r:id="rId17"/>
-    <p:sldId id="265" r:id="rId18"/>
-    <p:sldId id="257" r:id="rId19"/>
-    <p:sldId id="259" r:id="rId20"/>
+    <p:sldId id="276" r:id="rId6"/>
+    <p:sldId id="270" r:id="rId7"/>
+    <p:sldId id="271" r:id="rId8"/>
+    <p:sldId id="273" r:id="rId9"/>
+    <p:sldId id="274" r:id="rId10"/>
+    <p:sldId id="275" r:id="rId11"/>
+    <p:sldId id="261" r:id="rId12"/>
+    <p:sldId id="269" r:id="rId13"/>
+    <p:sldId id="264" r:id="rId14"/>
+    <p:sldId id="268" r:id="rId15"/>
+    <p:sldId id="267" r:id="rId16"/>
+    <p:sldId id="266" r:id="rId17"/>
+    <p:sldId id="272" r:id="rId18"/>
+    <p:sldId id="265" r:id="rId19"/>
+    <p:sldId id="257" r:id="rId20"/>
+    <p:sldId id="259" r:id="rId21"/>
   </p:sldIdLst>
   <p:sldSz cx="9144000" cy="6858000" type="screen4x3"/>
   <p:notesSz cx="6858000" cy="9144000"/>
@@ -306,7 +307,7 @@
           <a:p>
             <a:fld id="{3ACCE87F-A4BF-4D9A-9320-ACD565033031}" type="datetimeFigureOut">
               <a:rPr lang="en-NZ" smtClean="0"/>
-              <a:t>27/01/2012</a:t>
+              <a:t>31/01/2012</a:t>
             </a:fld>
             <a:endParaRPr lang="en-NZ"/>
           </a:p>
@@ -471,7 +472,7 @@
           <a:p>
             <a:fld id="{3ACCE87F-A4BF-4D9A-9320-ACD565033031}" type="datetimeFigureOut">
               <a:rPr lang="en-NZ" smtClean="0"/>
-              <a:t>27/01/2012</a:t>
+              <a:t>31/01/2012</a:t>
             </a:fld>
             <a:endParaRPr lang="en-NZ"/>
           </a:p>
@@ -646,7 +647,7 @@
           <a:p>
             <a:fld id="{3ACCE87F-A4BF-4D9A-9320-ACD565033031}" type="datetimeFigureOut">
               <a:rPr lang="en-NZ" smtClean="0"/>
-              <a:t>27/01/2012</a:t>
+              <a:t>31/01/2012</a:t>
             </a:fld>
             <a:endParaRPr lang="en-NZ"/>
           </a:p>
@@ -811,7 +812,7 @@
           <a:p>
             <a:fld id="{3ACCE87F-A4BF-4D9A-9320-ACD565033031}" type="datetimeFigureOut">
               <a:rPr lang="en-NZ" smtClean="0"/>
-              <a:t>27/01/2012</a:t>
+              <a:t>31/01/2012</a:t>
             </a:fld>
             <a:endParaRPr lang="en-NZ"/>
           </a:p>
@@ -1052,7 +1053,7 @@
           <a:p>
             <a:fld id="{3ACCE87F-A4BF-4D9A-9320-ACD565033031}" type="datetimeFigureOut">
               <a:rPr lang="en-NZ" smtClean="0"/>
-              <a:t>27/01/2012</a:t>
+              <a:t>31/01/2012</a:t>
             </a:fld>
             <a:endParaRPr lang="en-NZ"/>
           </a:p>
@@ -1335,7 +1336,7 @@
           <a:p>
             <a:fld id="{3ACCE87F-A4BF-4D9A-9320-ACD565033031}" type="datetimeFigureOut">
               <a:rPr lang="en-NZ" smtClean="0"/>
-              <a:t>27/01/2012</a:t>
+              <a:t>31/01/2012</a:t>
             </a:fld>
             <a:endParaRPr lang="en-NZ"/>
           </a:p>
@@ -1752,7 +1753,7 @@
           <a:p>
             <a:fld id="{3ACCE87F-A4BF-4D9A-9320-ACD565033031}" type="datetimeFigureOut">
               <a:rPr lang="en-NZ" smtClean="0"/>
-              <a:t>27/01/2012</a:t>
+              <a:t>31/01/2012</a:t>
             </a:fld>
             <a:endParaRPr lang="en-NZ"/>
           </a:p>
@@ -1865,7 +1866,7 @@
           <a:p>
             <a:fld id="{3ACCE87F-A4BF-4D9A-9320-ACD565033031}" type="datetimeFigureOut">
               <a:rPr lang="en-NZ" smtClean="0"/>
-              <a:t>27/01/2012</a:t>
+              <a:t>31/01/2012</a:t>
             </a:fld>
             <a:endParaRPr lang="en-NZ"/>
           </a:p>
@@ -1955,7 +1956,7 @@
           <a:p>
             <a:fld id="{3ACCE87F-A4BF-4D9A-9320-ACD565033031}" type="datetimeFigureOut">
               <a:rPr lang="en-NZ" smtClean="0"/>
-              <a:t>27/01/2012</a:t>
+              <a:t>31/01/2012</a:t>
             </a:fld>
             <a:endParaRPr lang="en-NZ"/>
           </a:p>
@@ -2227,7 +2228,7 @@
           <a:p>
             <a:fld id="{3ACCE87F-A4BF-4D9A-9320-ACD565033031}" type="datetimeFigureOut">
               <a:rPr lang="en-NZ" smtClean="0"/>
-              <a:t>27/01/2012</a:t>
+              <a:t>31/01/2012</a:t>
             </a:fld>
             <a:endParaRPr lang="en-NZ"/>
           </a:p>
@@ -2475,7 +2476,7 @@
           <a:p>
             <a:fld id="{3ACCE87F-A4BF-4D9A-9320-ACD565033031}" type="datetimeFigureOut">
               <a:rPr lang="en-NZ" smtClean="0"/>
-              <a:t>27/01/2012</a:t>
+              <a:t>31/01/2012</a:t>
             </a:fld>
             <a:endParaRPr lang="en-NZ"/>
           </a:p>
@@ -2683,7 +2684,7 @@
           <a:p>
             <a:fld id="{3ACCE87F-A4BF-4D9A-9320-ACD565033031}" type="datetimeFigureOut">
               <a:rPr lang="en-NZ" smtClean="0"/>
-              <a:t>27/01/2012</a:t>
+              <a:t>31/01/2012</a:t>
             </a:fld>
             <a:endParaRPr lang="en-NZ"/>
           </a:p>
@@ -3118,7 +3119,7 @@
       </p:grpSpPr>
       <p:sp>
         <p:nvSpPr>
-          <p:cNvPr id="8" name="Title 7"/>
+          <p:cNvPr id="2" name="Title 1"/>
           <p:cNvSpPr>
             <a:spLocks noGrp="1"/>
           </p:cNvSpPr>
@@ -3132,8 +3133,8 @@
           <a:lstStyle/>
           <a:p>
             <a:r>
-              <a:rPr lang="en-NZ" dirty="0" err="1" smtClean="0"/>
-              <a:t>Simframe</a:t>
+              <a:rPr lang="en-NZ" dirty="0" smtClean="0"/>
+              <a:t>Categorical adjustments	</a:t>
             </a:r>
             <a:endParaRPr lang="en-NZ" dirty="0"/>
           </a:p>
@@ -3141,7 +3142,7 @@
       </p:sp>
       <p:sp>
         <p:nvSpPr>
-          <p:cNvPr id="9" name="Content Placeholder 8"/>
+          <p:cNvPr id="3" name="Content Placeholder 2"/>
           <p:cNvSpPr>
             <a:spLocks noGrp="1"/>
           </p:cNvSpPr>
@@ -3158,47 +3159,79 @@
           <a:p>
             <a:r>
               <a:rPr lang="en-NZ" dirty="0" smtClean="0"/>
+              <a:t>In the above example instead of simulating the home ownership variable in year 2, it will be set to the desired proportions 0.4, 0.6 </a:t>
+            </a:r>
+          </a:p>
+          <a:p>
+            <a:r>
+              <a:rPr lang="en-NZ" dirty="0" smtClean="0"/>
               <a:t>A </a:t>
             </a:r>
             <a:r>
-              <a:rPr lang="en-NZ" dirty="0" err="1" smtClean="0"/>
-              <a:t>dataframe</a:t>
-            </a:r>
-            <a:r>
-              <a:rPr lang="en-NZ" dirty="0" smtClean="0"/>
-              <a:t> of variables (input, intermediate, and outcome) used during the simulation</a:t>
+              <a:rPr lang="en-NZ" dirty="0"/>
+              <a:t>desired proportion of NA </a:t>
+            </a:r>
+            <a:r>
+              <a:rPr lang="en-NZ" dirty="0" smtClean="0"/>
+              <a:t>will leave the variable unchanged</a:t>
+            </a:r>
+            <a:endParaRPr lang="en-NZ" dirty="0"/>
+          </a:p>
+          <a:p>
+            <a:r>
+              <a:rPr lang="en-NZ" dirty="0"/>
+              <a:t>If propensities are supplied </a:t>
+            </a:r>
+            <a:r>
+              <a:rPr lang="en-NZ" dirty="0" smtClean="0"/>
+              <a:t>they </a:t>
+            </a:r>
+            <a:r>
+              <a:rPr lang="en-NZ" dirty="0"/>
+              <a:t>will be used to select </a:t>
+            </a:r>
+            <a:r>
+              <a:rPr lang="en-NZ" dirty="0" smtClean="0"/>
+              <a:t>which micro-units </a:t>
+            </a:r>
+            <a:r>
+              <a:rPr lang="en-NZ" dirty="0"/>
+              <a:t>to </a:t>
+            </a:r>
+            <a:r>
+              <a:rPr lang="en-NZ" dirty="0" smtClean="0"/>
+              <a:t>adjust, otherwise the selection will be random</a:t>
             </a:r>
           </a:p>
           <a:p>
             <a:pPr lvl="1"/>
             <a:r>
               <a:rPr lang="en-NZ" dirty="0" smtClean="0"/>
-              <a:t>Input variables are those that are not transformed</a:t>
-            </a:r>
-          </a:p>
-          <a:p>
-            <a:pPr lvl="1"/>
-            <a:r>
-              <a:rPr lang="en-NZ" dirty="0" smtClean="0"/>
-              <a:t>Intermediate variables are transformed during simulation iterations, but not recorded for output</a:t>
-            </a:r>
-          </a:p>
-          <a:p>
-            <a:pPr lvl="1"/>
-            <a:r>
-              <a:rPr lang="en-NZ" dirty="0" smtClean="0"/>
-              <a:t>Outcome variables are transformed during simulation iterations, and are stored in outcome matrices for generation of run stats after each run</a:t>
-            </a:r>
-          </a:p>
-          <a:p>
-            <a:r>
-              <a:rPr lang="en-NZ" dirty="0" smtClean="0"/>
-              <a:t>Each variable is a vector that contains values for all micro-units</a:t>
-            </a:r>
+              <a:t>Propensities are specified via the global list variable </a:t>
+            </a:r>
+            <a:r>
+              <a:rPr lang="en-NZ" sz="2400" dirty="0" err="1" smtClean="0">
+                <a:latin typeface="Courier New" pitchFamily="49" charset="0"/>
+                <a:cs typeface="Courier New" pitchFamily="49" charset="0"/>
+              </a:rPr>
+              <a:t>propens.all</a:t>
+            </a:r>
+            <a:endParaRPr lang="en-NZ" sz="2400" dirty="0">
+              <a:latin typeface="Courier New" pitchFamily="49" charset="0"/>
+              <a:cs typeface="Courier New" pitchFamily="49" charset="0"/>
+            </a:endParaRPr>
+          </a:p>
+          <a:p>
+            <a:endParaRPr lang="en-NZ" dirty="0"/>
           </a:p>
         </p:txBody>
       </p:sp>
     </p:spTree>
+    <p:extLst>
+      <p:ext uri="{BB962C8B-B14F-4D97-AF65-F5344CB8AC3E}">
+        <p14:creationId xmlns:p14="http://schemas.microsoft.com/office/powerpoint/2010/main" val="2840074760"/>
+      </p:ext>
+    </p:extLst>
   </p:cSld>
   <p:clrMapOvr>
     <a:masterClrMapping/>
@@ -3225,7 +3258,7 @@
       </p:grpSpPr>
       <p:sp>
         <p:nvSpPr>
-          <p:cNvPr id="2" name="Title 1"/>
+          <p:cNvPr id="8" name="Title 7"/>
           <p:cNvSpPr>
             <a:spLocks noGrp="1"/>
           </p:cNvSpPr>
@@ -3246,469 +3279,65 @@
           </a:p>
         </p:txBody>
       </p:sp>
-      <p:graphicFrame>
-        <p:nvGraphicFramePr>
-          <p:cNvPr id="4" name="Content Placeholder 3"/>
-          <p:cNvGraphicFramePr>
-            <a:graphicFrameLocks noGrp="1"/>
-          </p:cNvGraphicFramePr>
+      <p:sp>
+        <p:nvSpPr>
+          <p:cNvPr id="9" name="Content Placeholder 8"/>
+          <p:cNvSpPr>
+            <a:spLocks noGrp="1"/>
+          </p:cNvSpPr>
           <p:nvPr>
             <p:ph idx="1"/>
           </p:nvPr>
-        </p:nvGraphicFramePr>
-        <p:xfrm>
-          <a:off x="1763688" y="1628800"/>
-          <a:ext cx="5606836" cy="2225040"/>
-        </p:xfrm>
-        <a:graphic>
-          <a:graphicData uri="http://schemas.openxmlformats.org/drawingml/2006/table">
-            <a:tbl>
-              <a:tblPr firstRow="1" bandRow="1">
-                <a:tableStyleId>{5C22544A-7EE6-4342-B048-85BDC9FD1C3A}</a:tableStyleId>
-              </a:tblPr>
-              <a:tblGrid>
-                <a:gridCol w="514400"/>
-                <a:gridCol w="792088"/>
-                <a:gridCol w="863918"/>
-                <a:gridCol w="1790510"/>
-                <a:gridCol w="1645920"/>
-              </a:tblGrid>
-              <a:tr h="370840">
-                <a:tc>
-                  <a:txBody>
-                    <a:bodyPr/>
-                    <a:lstStyle/>
-                    <a:p>
-                      <a:r>
-                        <a:rPr lang="en-NZ" dirty="0" smtClean="0"/>
-                        <a:t>ID</a:t>
-                      </a:r>
-                      <a:endParaRPr lang="en-NZ" dirty="0"/>
-                    </a:p>
-                  </a:txBody>
-                  <a:tcPr/>
-                </a:tc>
-                <a:tc>
-                  <a:txBody>
-                    <a:bodyPr/>
-                    <a:lstStyle/>
-                    <a:p>
-                      <a:r>
-                        <a:rPr lang="en-NZ" dirty="0" smtClean="0"/>
-                        <a:t>Age</a:t>
-                      </a:r>
-                      <a:endParaRPr lang="en-NZ" dirty="0"/>
-                    </a:p>
-                  </a:txBody>
-                  <a:tcPr/>
-                </a:tc>
-                <a:tc>
-                  <a:txBody>
-                    <a:bodyPr/>
-                    <a:lstStyle/>
-                    <a:p>
-                      <a:r>
-                        <a:rPr lang="en-NZ" dirty="0" smtClean="0"/>
-                        <a:t>Health</a:t>
-                      </a:r>
-                      <a:endParaRPr lang="en-NZ" dirty="0"/>
-                    </a:p>
-                  </a:txBody>
-                  <a:tcPr/>
-                </a:tc>
-                <a:tc>
-                  <a:txBody>
-                    <a:bodyPr/>
-                    <a:lstStyle/>
-                    <a:p>
-                      <a:r>
-                        <a:rPr lang="en-NZ" dirty="0" err="1" smtClean="0"/>
-                        <a:t>Health_previous</a:t>
-                      </a:r>
-                      <a:endParaRPr lang="en-NZ" dirty="0"/>
-                    </a:p>
-                  </a:txBody>
-                  <a:tcPr/>
-                </a:tc>
-                <a:tc>
-                  <a:txBody>
-                    <a:bodyPr/>
-                    <a:lstStyle/>
-                    <a:p>
-                      <a:r>
-                        <a:rPr lang="en-NZ" dirty="0" smtClean="0"/>
-                        <a:t>Earnings</a:t>
-                      </a:r>
-                      <a:endParaRPr lang="en-NZ" dirty="0"/>
-                    </a:p>
-                  </a:txBody>
-                  <a:tcPr/>
-                </a:tc>
-              </a:tr>
-              <a:tr h="370840">
-                <a:tc>
-                  <a:txBody>
-                    <a:bodyPr/>
-                    <a:lstStyle/>
-                    <a:p>
-                      <a:r>
-                        <a:rPr lang="en-NZ" dirty="0" smtClean="0"/>
-                        <a:t>1</a:t>
-                      </a:r>
-                      <a:endParaRPr lang="en-NZ" dirty="0"/>
-                    </a:p>
-                  </a:txBody>
-                  <a:tcPr/>
-                </a:tc>
-                <a:tc>
-                  <a:txBody>
-                    <a:bodyPr/>
-                    <a:lstStyle/>
-                    <a:p>
-                      <a:r>
-                        <a:rPr lang="en-NZ" dirty="0" smtClean="0"/>
-                        <a:t>2</a:t>
-                      </a:r>
-                      <a:endParaRPr lang="en-NZ" dirty="0"/>
-                    </a:p>
-                  </a:txBody>
-                  <a:tcPr/>
-                </a:tc>
-                <a:tc>
-                  <a:txBody>
-                    <a:bodyPr/>
-                    <a:lstStyle/>
-                    <a:p>
-                      <a:r>
-                        <a:rPr lang="en-NZ" dirty="0" smtClean="0"/>
-                        <a:t>0</a:t>
-                      </a:r>
-                      <a:endParaRPr lang="en-NZ" dirty="0"/>
-                    </a:p>
-                  </a:txBody>
-                  <a:tcPr/>
-                </a:tc>
-                <a:tc>
-                  <a:txBody>
-                    <a:bodyPr/>
-                    <a:lstStyle/>
-                    <a:p>
-                      <a:r>
-                        <a:rPr lang="en-NZ" dirty="0" smtClean="0"/>
-                        <a:t>NA</a:t>
-                      </a:r>
-                      <a:endParaRPr lang="en-NZ" dirty="0"/>
-                    </a:p>
-                  </a:txBody>
-                  <a:tcPr/>
-                </a:tc>
-                <a:tc>
-                  <a:txBody>
-                    <a:bodyPr/>
-                    <a:lstStyle/>
-                    <a:p>
-                      <a:r>
-                        <a:rPr lang="en-NZ" dirty="0" smtClean="0"/>
-                        <a:t>0</a:t>
-                      </a:r>
-                      <a:endParaRPr lang="en-NZ" dirty="0"/>
-                    </a:p>
-                  </a:txBody>
-                  <a:tcPr/>
-                </a:tc>
-              </a:tr>
-              <a:tr h="370840">
-                <a:tc>
-                  <a:txBody>
-                    <a:bodyPr/>
-                    <a:lstStyle/>
-                    <a:p>
-                      <a:r>
-                        <a:rPr lang="en-NZ" dirty="0" smtClean="0"/>
-                        <a:t>2</a:t>
-                      </a:r>
-                      <a:endParaRPr lang="en-NZ" dirty="0"/>
-                    </a:p>
-                  </a:txBody>
-                  <a:tcPr/>
-                </a:tc>
-                <a:tc>
-                  <a:txBody>
-                    <a:bodyPr/>
-                    <a:lstStyle/>
-                    <a:p>
-                      <a:r>
-                        <a:rPr lang="en-NZ" dirty="0" smtClean="0"/>
-                        <a:t>5</a:t>
-                      </a:r>
-                      <a:endParaRPr lang="en-NZ" dirty="0"/>
-                    </a:p>
-                  </a:txBody>
-                  <a:tcPr/>
-                </a:tc>
-                <a:tc>
-                  <a:txBody>
-                    <a:bodyPr/>
-                    <a:lstStyle/>
-                    <a:p>
-                      <a:r>
-                        <a:rPr lang="en-NZ" dirty="0" smtClean="0"/>
-                        <a:t>0</a:t>
-                      </a:r>
-                      <a:endParaRPr lang="en-NZ" dirty="0"/>
-                    </a:p>
-                  </a:txBody>
-                  <a:tcPr/>
-                </a:tc>
-                <a:tc>
-                  <a:txBody>
-                    <a:bodyPr/>
-                    <a:lstStyle/>
-                    <a:p>
-                      <a:r>
-                        <a:rPr lang="en-NZ" dirty="0" smtClean="0"/>
-                        <a:t>NA</a:t>
-                      </a:r>
-                      <a:endParaRPr lang="en-NZ" dirty="0"/>
-                    </a:p>
-                  </a:txBody>
-                  <a:tcPr/>
-                </a:tc>
-                <a:tc>
-                  <a:txBody>
-                    <a:bodyPr/>
-                    <a:lstStyle/>
-                    <a:p>
-                      <a:r>
-                        <a:rPr lang="en-NZ" dirty="0" smtClean="0"/>
-                        <a:t>0</a:t>
-                      </a:r>
-                      <a:endParaRPr lang="en-NZ" dirty="0"/>
-                    </a:p>
-                  </a:txBody>
-                  <a:tcPr/>
-                </a:tc>
-              </a:tr>
-              <a:tr h="370840">
-                <a:tc>
-                  <a:txBody>
-                    <a:bodyPr/>
-                    <a:lstStyle/>
-                    <a:p>
-                      <a:r>
-                        <a:rPr lang="en-NZ" dirty="0" smtClean="0"/>
-                        <a:t>3</a:t>
-                      </a:r>
-                      <a:endParaRPr lang="en-NZ" dirty="0"/>
-                    </a:p>
-                  </a:txBody>
-                  <a:tcPr/>
-                </a:tc>
-                <a:tc>
-                  <a:txBody>
-                    <a:bodyPr/>
-                    <a:lstStyle/>
-                    <a:p>
-                      <a:r>
-                        <a:rPr lang="en-NZ" dirty="0" smtClean="0"/>
-                        <a:t>6</a:t>
-                      </a:r>
-                      <a:endParaRPr lang="en-NZ" dirty="0"/>
-                    </a:p>
-                  </a:txBody>
-                  <a:tcPr/>
-                </a:tc>
-                <a:tc>
-                  <a:txBody>
-                    <a:bodyPr/>
-                    <a:lstStyle/>
-                    <a:p>
-                      <a:r>
-                        <a:rPr lang="en-NZ" dirty="0" smtClean="0"/>
-                        <a:t>0</a:t>
-                      </a:r>
-                      <a:endParaRPr lang="en-NZ" dirty="0"/>
-                    </a:p>
-                  </a:txBody>
-                  <a:tcPr/>
-                </a:tc>
-                <a:tc>
-                  <a:txBody>
-                    <a:bodyPr/>
-                    <a:lstStyle/>
-                    <a:p>
-                      <a:r>
-                        <a:rPr lang="en-NZ" dirty="0" smtClean="0"/>
-                        <a:t>NA</a:t>
-                      </a:r>
-                      <a:endParaRPr lang="en-NZ" dirty="0"/>
-                    </a:p>
-                  </a:txBody>
-                  <a:tcPr/>
-                </a:tc>
-                <a:tc>
-                  <a:txBody>
-                    <a:bodyPr/>
-                    <a:lstStyle/>
-                    <a:p>
-                      <a:r>
-                        <a:rPr lang="en-NZ" dirty="0" smtClean="0"/>
-                        <a:t>0</a:t>
-                      </a:r>
-                      <a:endParaRPr lang="en-NZ" dirty="0"/>
-                    </a:p>
-                  </a:txBody>
-                  <a:tcPr/>
-                </a:tc>
-              </a:tr>
-              <a:tr h="370840">
-                <a:tc>
-                  <a:txBody>
-                    <a:bodyPr/>
-                    <a:lstStyle/>
-                    <a:p>
-                      <a:r>
-                        <a:rPr lang="en-NZ" dirty="0" smtClean="0"/>
-                        <a:t>4</a:t>
-                      </a:r>
-                      <a:endParaRPr lang="en-NZ" dirty="0"/>
-                    </a:p>
-                  </a:txBody>
-                  <a:tcPr/>
-                </a:tc>
-                <a:tc>
-                  <a:txBody>
-                    <a:bodyPr/>
-                    <a:lstStyle/>
-                    <a:p>
-                      <a:r>
-                        <a:rPr lang="en-NZ" dirty="0" smtClean="0"/>
-                        <a:t>2</a:t>
-                      </a:r>
-                      <a:endParaRPr lang="en-NZ" dirty="0"/>
-                    </a:p>
-                  </a:txBody>
-                  <a:tcPr/>
-                </a:tc>
-                <a:tc>
-                  <a:txBody>
-                    <a:bodyPr/>
-                    <a:lstStyle/>
-                    <a:p>
-                      <a:r>
-                        <a:rPr lang="en-NZ" dirty="0" smtClean="0"/>
-                        <a:t>0</a:t>
-                      </a:r>
-                      <a:endParaRPr lang="en-NZ" dirty="0"/>
-                    </a:p>
-                  </a:txBody>
-                  <a:tcPr/>
-                </a:tc>
-                <a:tc>
-                  <a:txBody>
-                    <a:bodyPr/>
-                    <a:lstStyle/>
-                    <a:p>
-                      <a:r>
-                        <a:rPr lang="en-NZ" dirty="0" smtClean="0"/>
-                        <a:t>NA</a:t>
-                      </a:r>
-                      <a:endParaRPr lang="en-NZ" dirty="0"/>
-                    </a:p>
-                  </a:txBody>
-                  <a:tcPr/>
-                </a:tc>
-                <a:tc>
-                  <a:txBody>
-                    <a:bodyPr/>
-                    <a:lstStyle/>
-                    <a:p>
-                      <a:r>
-                        <a:rPr lang="en-NZ" dirty="0" smtClean="0"/>
-                        <a:t>0</a:t>
-                      </a:r>
-                      <a:endParaRPr lang="en-NZ" dirty="0"/>
-                    </a:p>
-                  </a:txBody>
-                  <a:tcPr/>
-                </a:tc>
-              </a:tr>
-              <a:tr h="370840">
-                <a:tc>
-                  <a:txBody>
-                    <a:bodyPr/>
-                    <a:lstStyle/>
-                    <a:p>
-                      <a:r>
-                        <a:rPr lang="en-NZ" dirty="0" smtClean="0"/>
-                        <a:t>5</a:t>
-                      </a:r>
-                      <a:endParaRPr lang="en-NZ" dirty="0"/>
-                    </a:p>
-                  </a:txBody>
-                  <a:tcPr/>
-                </a:tc>
-                <a:tc>
-                  <a:txBody>
-                    <a:bodyPr/>
-                    <a:lstStyle/>
-                    <a:p>
-                      <a:r>
-                        <a:rPr lang="en-NZ" dirty="0" smtClean="0"/>
-                        <a:t>4</a:t>
-                      </a:r>
-                      <a:endParaRPr lang="en-NZ" dirty="0"/>
-                    </a:p>
-                  </a:txBody>
-                  <a:tcPr/>
-                </a:tc>
-                <a:tc>
-                  <a:txBody>
-                    <a:bodyPr/>
-                    <a:lstStyle/>
-                    <a:p>
-                      <a:r>
-                        <a:rPr lang="en-NZ" dirty="0" smtClean="0"/>
-                        <a:t>0</a:t>
-                      </a:r>
-                      <a:endParaRPr lang="en-NZ" dirty="0"/>
-                    </a:p>
-                  </a:txBody>
-                  <a:tcPr/>
-                </a:tc>
-                <a:tc>
-                  <a:txBody>
-                    <a:bodyPr/>
-                    <a:lstStyle/>
-                    <a:p>
-                      <a:r>
-                        <a:rPr lang="en-NZ" dirty="0" smtClean="0"/>
-                        <a:t>NA</a:t>
-                      </a:r>
-                      <a:endParaRPr lang="en-NZ" dirty="0"/>
-                    </a:p>
-                  </a:txBody>
-                  <a:tcPr/>
-                </a:tc>
-                <a:tc>
-                  <a:txBody>
-                    <a:bodyPr/>
-                    <a:lstStyle/>
-                    <a:p>
-                      <a:r>
-                        <a:rPr lang="en-NZ" dirty="0" smtClean="0"/>
-                        <a:t>0</a:t>
-                      </a:r>
-                      <a:endParaRPr lang="en-NZ" dirty="0"/>
-                    </a:p>
-                  </a:txBody>
-                  <a:tcPr/>
-                </a:tc>
-              </a:tr>
-            </a:tbl>
-          </a:graphicData>
-        </a:graphic>
-      </p:graphicFrame>
+        </p:nvSpPr>
+        <p:spPr/>
+        <p:txBody>
+          <a:bodyPr>
+            <a:normAutofit fontScale="92500" lnSpcReduction="10000"/>
+          </a:bodyPr>
+          <a:lstStyle/>
+          <a:p>
+            <a:r>
+              <a:rPr lang="en-NZ" dirty="0" smtClean="0"/>
+              <a:t>A </a:t>
+            </a:r>
+            <a:r>
+              <a:rPr lang="en-NZ" dirty="0" err="1" smtClean="0"/>
+              <a:t>dataframe</a:t>
+            </a:r>
+            <a:r>
+              <a:rPr lang="en-NZ" dirty="0" smtClean="0"/>
+              <a:t> of variables (input, intermediate, and outcome) used during the simulation</a:t>
+            </a:r>
+          </a:p>
+          <a:p>
+            <a:pPr lvl="1"/>
+            <a:r>
+              <a:rPr lang="en-NZ" dirty="0" smtClean="0"/>
+              <a:t>Input variables are those that are not transformed</a:t>
+            </a:r>
+          </a:p>
+          <a:p>
+            <a:pPr lvl="1"/>
+            <a:r>
+              <a:rPr lang="en-NZ" dirty="0" smtClean="0"/>
+              <a:t>Intermediate variables are transformed during simulation iterations, but not recorded for output</a:t>
+            </a:r>
+          </a:p>
+          <a:p>
+            <a:pPr lvl="1"/>
+            <a:r>
+              <a:rPr lang="en-NZ" dirty="0" smtClean="0"/>
+              <a:t>Outcome variables are transformed during simulation iterations, and are stored in outcome matrices for generation of run stats after each run</a:t>
+            </a:r>
+          </a:p>
+          <a:p>
+            <a:r>
+              <a:rPr lang="en-NZ" dirty="0" smtClean="0"/>
+              <a:t>Each variable is a vector that contains values for all micro-units</a:t>
+            </a:r>
+          </a:p>
+        </p:txBody>
+      </p:sp>
     </p:spTree>
   </p:cSld>
   <p:clrMapOvr>
@@ -3746,108 +3375,480 @@
         </p:nvSpPr>
         <p:spPr/>
         <p:txBody>
-          <a:bodyPr>
-            <a:normAutofit/>
-          </a:bodyPr>
+          <a:bodyPr/>
           <a:lstStyle/>
           <a:p>
             <a:r>
-              <a:rPr lang="en-NZ" dirty="0" smtClean="0"/>
-              <a:t>The master </a:t>
-            </a:r>
-            <a:r>
               <a:rPr lang="en-NZ" dirty="0" err="1" smtClean="0"/>
-              <a:t>simframe</a:t>
+              <a:t>Simframe</a:t>
             </a:r>
             <a:endParaRPr lang="en-NZ" dirty="0"/>
           </a:p>
         </p:txBody>
       </p:sp>
-      <p:sp>
-        <p:nvSpPr>
-          <p:cNvPr id="3" name="Content Placeholder 2"/>
-          <p:cNvSpPr>
-            <a:spLocks noGrp="1"/>
-          </p:cNvSpPr>
+      <p:graphicFrame>
+        <p:nvGraphicFramePr>
+          <p:cNvPr id="4" name="Content Placeholder 3"/>
+          <p:cNvGraphicFramePr>
+            <a:graphicFrameLocks noGrp="1"/>
+          </p:cNvGraphicFramePr>
           <p:nvPr>
             <p:ph idx="1"/>
           </p:nvPr>
-        </p:nvSpPr>
-        <p:spPr/>
-        <p:txBody>
-          <a:bodyPr>
-            <a:normAutofit/>
-          </a:bodyPr>
-          <a:lstStyle/>
-          <a:p>
-            <a:r>
-              <a:rPr lang="en-NZ" dirty="0" smtClean="0"/>
-              <a:t>The master </a:t>
-            </a:r>
-            <a:r>
-              <a:rPr lang="en-NZ" dirty="0" err="1" smtClean="0"/>
-              <a:t>simframe</a:t>
-            </a:r>
-            <a:r>
-              <a:rPr lang="en-NZ" dirty="0" smtClean="0"/>
-              <a:t> is initialised from a </a:t>
-            </a:r>
-            <a:r>
-              <a:rPr lang="en-NZ" dirty="0" err="1" smtClean="0"/>
-              <a:t>simframe</a:t>
-            </a:r>
-            <a:r>
-              <a:rPr lang="en-NZ" dirty="0" smtClean="0"/>
-              <a:t> definition file.</a:t>
-            </a:r>
-          </a:p>
-          <a:p>
-            <a:r>
-              <a:rPr lang="en-NZ" dirty="0" smtClean="0"/>
-              <a:t>Each </a:t>
-            </a:r>
-            <a:r>
-              <a:rPr lang="en-NZ" dirty="0" err="1" smtClean="0"/>
-              <a:t>simframe</a:t>
-            </a:r>
-            <a:r>
-              <a:rPr lang="en-NZ" dirty="0" smtClean="0"/>
-              <a:t> variable is populated with initial values, as specified by the definition file.</a:t>
-            </a:r>
-          </a:p>
-          <a:p>
-            <a:r>
-              <a:rPr lang="en-NZ" dirty="0" smtClean="0"/>
-              <a:t>The master </a:t>
-            </a:r>
-            <a:r>
-              <a:rPr lang="en-NZ" dirty="0" err="1" smtClean="0"/>
-              <a:t>simframe</a:t>
-            </a:r>
-            <a:r>
-              <a:rPr lang="en-NZ" dirty="0" smtClean="0"/>
-              <a:t> is typically stored in the global variable </a:t>
-            </a:r>
-            <a:r>
-              <a:rPr lang="en-NZ" dirty="0" err="1" smtClean="0">
-                <a:latin typeface="Courier New" pitchFamily="49" charset="0"/>
-                <a:cs typeface="Courier New" pitchFamily="49" charset="0"/>
-              </a:rPr>
-              <a:t>simframe.master</a:t>
-            </a:r>
-            <a:endParaRPr lang="en-NZ" dirty="0" smtClean="0">
-              <a:latin typeface="Courier New" pitchFamily="49" charset="0"/>
-              <a:cs typeface="Courier New" pitchFamily="49" charset="0"/>
-            </a:endParaRPr>
-          </a:p>
-          <a:p>
-            <a:endParaRPr lang="en-NZ" dirty="0" smtClean="0"/>
-          </a:p>
-          <a:p>
-            <a:endParaRPr lang="en-NZ" dirty="0"/>
-          </a:p>
-        </p:txBody>
-      </p:sp>
+        </p:nvGraphicFramePr>
+        <p:xfrm>
+          <a:off x="1763688" y="1628800"/>
+          <a:ext cx="5606836" cy="2225040"/>
+        </p:xfrm>
+        <a:graphic>
+          <a:graphicData uri="http://schemas.openxmlformats.org/drawingml/2006/table">
+            <a:tbl>
+              <a:tblPr firstRow="1" bandRow="1">
+                <a:tableStyleId>{5C22544A-7EE6-4342-B048-85BDC9FD1C3A}</a:tableStyleId>
+              </a:tblPr>
+              <a:tblGrid>
+                <a:gridCol w="514400"/>
+                <a:gridCol w="792088"/>
+                <a:gridCol w="863918"/>
+                <a:gridCol w="1790510"/>
+                <a:gridCol w="1645920"/>
+              </a:tblGrid>
+              <a:tr h="370840">
+                <a:tc>
+                  <a:txBody>
+                    <a:bodyPr/>
+                    <a:lstStyle/>
+                    <a:p>
+                      <a:r>
+                        <a:rPr lang="en-NZ" dirty="0" smtClean="0"/>
+                        <a:t>ID</a:t>
+                      </a:r>
+                      <a:endParaRPr lang="en-NZ" dirty="0"/>
+                    </a:p>
+                  </a:txBody>
+                  <a:tcPr/>
+                </a:tc>
+                <a:tc>
+                  <a:txBody>
+                    <a:bodyPr/>
+                    <a:lstStyle/>
+                    <a:p>
+                      <a:r>
+                        <a:rPr lang="en-NZ" dirty="0" smtClean="0"/>
+                        <a:t>Age</a:t>
+                      </a:r>
+                      <a:endParaRPr lang="en-NZ" dirty="0"/>
+                    </a:p>
+                  </a:txBody>
+                  <a:tcPr/>
+                </a:tc>
+                <a:tc>
+                  <a:txBody>
+                    <a:bodyPr/>
+                    <a:lstStyle/>
+                    <a:p>
+                      <a:r>
+                        <a:rPr lang="en-NZ" dirty="0" smtClean="0"/>
+                        <a:t>Health</a:t>
+                      </a:r>
+                      <a:endParaRPr lang="en-NZ" dirty="0"/>
+                    </a:p>
+                  </a:txBody>
+                  <a:tcPr/>
+                </a:tc>
+                <a:tc>
+                  <a:txBody>
+                    <a:bodyPr/>
+                    <a:lstStyle/>
+                    <a:p>
+                      <a:r>
+                        <a:rPr lang="en-NZ" dirty="0" err="1" smtClean="0"/>
+                        <a:t>Health_previous</a:t>
+                      </a:r>
+                      <a:endParaRPr lang="en-NZ" dirty="0"/>
+                    </a:p>
+                  </a:txBody>
+                  <a:tcPr/>
+                </a:tc>
+                <a:tc>
+                  <a:txBody>
+                    <a:bodyPr/>
+                    <a:lstStyle/>
+                    <a:p>
+                      <a:r>
+                        <a:rPr lang="en-NZ" dirty="0" smtClean="0"/>
+                        <a:t>Earnings</a:t>
+                      </a:r>
+                      <a:endParaRPr lang="en-NZ" dirty="0"/>
+                    </a:p>
+                  </a:txBody>
+                  <a:tcPr/>
+                </a:tc>
+              </a:tr>
+              <a:tr h="370840">
+                <a:tc>
+                  <a:txBody>
+                    <a:bodyPr/>
+                    <a:lstStyle/>
+                    <a:p>
+                      <a:r>
+                        <a:rPr lang="en-NZ" dirty="0" smtClean="0"/>
+                        <a:t>1</a:t>
+                      </a:r>
+                      <a:endParaRPr lang="en-NZ" dirty="0"/>
+                    </a:p>
+                  </a:txBody>
+                  <a:tcPr/>
+                </a:tc>
+                <a:tc>
+                  <a:txBody>
+                    <a:bodyPr/>
+                    <a:lstStyle/>
+                    <a:p>
+                      <a:r>
+                        <a:rPr lang="en-NZ" dirty="0" smtClean="0"/>
+                        <a:t>2</a:t>
+                      </a:r>
+                      <a:endParaRPr lang="en-NZ" dirty="0"/>
+                    </a:p>
+                  </a:txBody>
+                  <a:tcPr/>
+                </a:tc>
+                <a:tc>
+                  <a:txBody>
+                    <a:bodyPr/>
+                    <a:lstStyle/>
+                    <a:p>
+                      <a:r>
+                        <a:rPr lang="en-NZ" dirty="0" smtClean="0"/>
+                        <a:t>0</a:t>
+                      </a:r>
+                      <a:endParaRPr lang="en-NZ" dirty="0"/>
+                    </a:p>
+                  </a:txBody>
+                  <a:tcPr/>
+                </a:tc>
+                <a:tc>
+                  <a:txBody>
+                    <a:bodyPr/>
+                    <a:lstStyle/>
+                    <a:p>
+                      <a:r>
+                        <a:rPr lang="en-NZ" dirty="0" smtClean="0"/>
+                        <a:t>NA</a:t>
+                      </a:r>
+                      <a:endParaRPr lang="en-NZ" dirty="0"/>
+                    </a:p>
+                  </a:txBody>
+                  <a:tcPr/>
+                </a:tc>
+                <a:tc>
+                  <a:txBody>
+                    <a:bodyPr/>
+                    <a:lstStyle/>
+                    <a:p>
+                      <a:r>
+                        <a:rPr lang="en-NZ" dirty="0" smtClean="0"/>
+                        <a:t>0</a:t>
+                      </a:r>
+                      <a:endParaRPr lang="en-NZ" dirty="0"/>
+                    </a:p>
+                  </a:txBody>
+                  <a:tcPr/>
+                </a:tc>
+              </a:tr>
+              <a:tr h="370840">
+                <a:tc>
+                  <a:txBody>
+                    <a:bodyPr/>
+                    <a:lstStyle/>
+                    <a:p>
+                      <a:r>
+                        <a:rPr lang="en-NZ" dirty="0" smtClean="0"/>
+                        <a:t>2</a:t>
+                      </a:r>
+                      <a:endParaRPr lang="en-NZ" dirty="0"/>
+                    </a:p>
+                  </a:txBody>
+                  <a:tcPr/>
+                </a:tc>
+                <a:tc>
+                  <a:txBody>
+                    <a:bodyPr/>
+                    <a:lstStyle/>
+                    <a:p>
+                      <a:r>
+                        <a:rPr lang="en-NZ" dirty="0" smtClean="0"/>
+                        <a:t>5</a:t>
+                      </a:r>
+                      <a:endParaRPr lang="en-NZ" dirty="0"/>
+                    </a:p>
+                  </a:txBody>
+                  <a:tcPr/>
+                </a:tc>
+                <a:tc>
+                  <a:txBody>
+                    <a:bodyPr/>
+                    <a:lstStyle/>
+                    <a:p>
+                      <a:r>
+                        <a:rPr lang="en-NZ" dirty="0" smtClean="0"/>
+                        <a:t>0</a:t>
+                      </a:r>
+                      <a:endParaRPr lang="en-NZ" dirty="0"/>
+                    </a:p>
+                  </a:txBody>
+                  <a:tcPr/>
+                </a:tc>
+                <a:tc>
+                  <a:txBody>
+                    <a:bodyPr/>
+                    <a:lstStyle/>
+                    <a:p>
+                      <a:r>
+                        <a:rPr lang="en-NZ" dirty="0" smtClean="0"/>
+                        <a:t>NA</a:t>
+                      </a:r>
+                      <a:endParaRPr lang="en-NZ" dirty="0"/>
+                    </a:p>
+                  </a:txBody>
+                  <a:tcPr/>
+                </a:tc>
+                <a:tc>
+                  <a:txBody>
+                    <a:bodyPr/>
+                    <a:lstStyle/>
+                    <a:p>
+                      <a:r>
+                        <a:rPr lang="en-NZ" dirty="0" smtClean="0"/>
+                        <a:t>0</a:t>
+                      </a:r>
+                      <a:endParaRPr lang="en-NZ" dirty="0"/>
+                    </a:p>
+                  </a:txBody>
+                  <a:tcPr/>
+                </a:tc>
+              </a:tr>
+              <a:tr h="370840">
+                <a:tc>
+                  <a:txBody>
+                    <a:bodyPr/>
+                    <a:lstStyle/>
+                    <a:p>
+                      <a:r>
+                        <a:rPr lang="en-NZ" dirty="0" smtClean="0"/>
+                        <a:t>3</a:t>
+                      </a:r>
+                      <a:endParaRPr lang="en-NZ" dirty="0"/>
+                    </a:p>
+                  </a:txBody>
+                  <a:tcPr/>
+                </a:tc>
+                <a:tc>
+                  <a:txBody>
+                    <a:bodyPr/>
+                    <a:lstStyle/>
+                    <a:p>
+                      <a:r>
+                        <a:rPr lang="en-NZ" dirty="0" smtClean="0"/>
+                        <a:t>6</a:t>
+                      </a:r>
+                      <a:endParaRPr lang="en-NZ" dirty="0"/>
+                    </a:p>
+                  </a:txBody>
+                  <a:tcPr/>
+                </a:tc>
+                <a:tc>
+                  <a:txBody>
+                    <a:bodyPr/>
+                    <a:lstStyle/>
+                    <a:p>
+                      <a:r>
+                        <a:rPr lang="en-NZ" dirty="0" smtClean="0"/>
+                        <a:t>0</a:t>
+                      </a:r>
+                      <a:endParaRPr lang="en-NZ" dirty="0"/>
+                    </a:p>
+                  </a:txBody>
+                  <a:tcPr/>
+                </a:tc>
+                <a:tc>
+                  <a:txBody>
+                    <a:bodyPr/>
+                    <a:lstStyle/>
+                    <a:p>
+                      <a:r>
+                        <a:rPr lang="en-NZ" dirty="0" smtClean="0"/>
+                        <a:t>NA</a:t>
+                      </a:r>
+                      <a:endParaRPr lang="en-NZ" dirty="0"/>
+                    </a:p>
+                  </a:txBody>
+                  <a:tcPr/>
+                </a:tc>
+                <a:tc>
+                  <a:txBody>
+                    <a:bodyPr/>
+                    <a:lstStyle/>
+                    <a:p>
+                      <a:r>
+                        <a:rPr lang="en-NZ" dirty="0" smtClean="0"/>
+                        <a:t>0</a:t>
+                      </a:r>
+                      <a:endParaRPr lang="en-NZ" dirty="0"/>
+                    </a:p>
+                  </a:txBody>
+                  <a:tcPr/>
+                </a:tc>
+              </a:tr>
+              <a:tr h="370840">
+                <a:tc>
+                  <a:txBody>
+                    <a:bodyPr/>
+                    <a:lstStyle/>
+                    <a:p>
+                      <a:r>
+                        <a:rPr lang="en-NZ" dirty="0" smtClean="0"/>
+                        <a:t>4</a:t>
+                      </a:r>
+                      <a:endParaRPr lang="en-NZ" dirty="0"/>
+                    </a:p>
+                  </a:txBody>
+                  <a:tcPr/>
+                </a:tc>
+                <a:tc>
+                  <a:txBody>
+                    <a:bodyPr/>
+                    <a:lstStyle/>
+                    <a:p>
+                      <a:r>
+                        <a:rPr lang="en-NZ" dirty="0" smtClean="0"/>
+                        <a:t>2</a:t>
+                      </a:r>
+                      <a:endParaRPr lang="en-NZ" dirty="0"/>
+                    </a:p>
+                  </a:txBody>
+                  <a:tcPr/>
+                </a:tc>
+                <a:tc>
+                  <a:txBody>
+                    <a:bodyPr/>
+                    <a:lstStyle/>
+                    <a:p>
+                      <a:r>
+                        <a:rPr lang="en-NZ" dirty="0" smtClean="0"/>
+                        <a:t>0</a:t>
+                      </a:r>
+                      <a:endParaRPr lang="en-NZ" dirty="0"/>
+                    </a:p>
+                  </a:txBody>
+                  <a:tcPr/>
+                </a:tc>
+                <a:tc>
+                  <a:txBody>
+                    <a:bodyPr/>
+                    <a:lstStyle/>
+                    <a:p>
+                      <a:r>
+                        <a:rPr lang="en-NZ" dirty="0" smtClean="0"/>
+                        <a:t>NA</a:t>
+                      </a:r>
+                      <a:endParaRPr lang="en-NZ" dirty="0"/>
+                    </a:p>
+                  </a:txBody>
+                  <a:tcPr/>
+                </a:tc>
+                <a:tc>
+                  <a:txBody>
+                    <a:bodyPr/>
+                    <a:lstStyle/>
+                    <a:p>
+                      <a:r>
+                        <a:rPr lang="en-NZ" dirty="0" smtClean="0"/>
+                        <a:t>0</a:t>
+                      </a:r>
+                      <a:endParaRPr lang="en-NZ" dirty="0"/>
+                    </a:p>
+                  </a:txBody>
+                  <a:tcPr/>
+                </a:tc>
+              </a:tr>
+              <a:tr h="370840">
+                <a:tc>
+                  <a:txBody>
+                    <a:bodyPr/>
+                    <a:lstStyle/>
+                    <a:p>
+                      <a:r>
+                        <a:rPr lang="en-NZ" dirty="0" smtClean="0"/>
+                        <a:t>5</a:t>
+                      </a:r>
+                      <a:endParaRPr lang="en-NZ" dirty="0"/>
+                    </a:p>
+                  </a:txBody>
+                  <a:tcPr/>
+                </a:tc>
+                <a:tc>
+                  <a:txBody>
+                    <a:bodyPr/>
+                    <a:lstStyle/>
+                    <a:p>
+                      <a:r>
+                        <a:rPr lang="en-NZ" dirty="0" smtClean="0"/>
+                        <a:t>4</a:t>
+                      </a:r>
+                      <a:endParaRPr lang="en-NZ" dirty="0"/>
+                    </a:p>
+                  </a:txBody>
+                  <a:tcPr/>
+                </a:tc>
+                <a:tc>
+                  <a:txBody>
+                    <a:bodyPr/>
+                    <a:lstStyle/>
+                    <a:p>
+                      <a:r>
+                        <a:rPr lang="en-NZ" dirty="0" smtClean="0"/>
+                        <a:t>0</a:t>
+                      </a:r>
+                      <a:endParaRPr lang="en-NZ" dirty="0"/>
+                    </a:p>
+                  </a:txBody>
+                  <a:tcPr/>
+                </a:tc>
+                <a:tc>
+                  <a:txBody>
+                    <a:bodyPr/>
+                    <a:lstStyle/>
+                    <a:p>
+                      <a:r>
+                        <a:rPr lang="en-NZ" dirty="0" smtClean="0"/>
+                        <a:t>NA</a:t>
+                      </a:r>
+                      <a:endParaRPr lang="en-NZ" dirty="0"/>
+                    </a:p>
+                  </a:txBody>
+                  <a:tcPr/>
+                </a:tc>
+                <a:tc>
+                  <a:txBody>
+                    <a:bodyPr/>
+                    <a:lstStyle/>
+                    <a:p>
+                      <a:r>
+                        <a:rPr lang="en-NZ" dirty="0" smtClean="0"/>
+                        <a:t>0</a:t>
+                      </a:r>
+                      <a:endParaRPr lang="en-NZ" dirty="0"/>
+                    </a:p>
+                  </a:txBody>
+                  <a:tcPr/>
+                </a:tc>
+              </a:tr>
+            </a:tbl>
+          </a:graphicData>
+        </a:graphic>
+      </p:graphicFrame>
     </p:spTree>
   </p:cSld>
   <p:clrMapOvr>
@@ -3885,16 +3886,18 @@
         </p:nvSpPr>
         <p:spPr/>
         <p:txBody>
-          <a:bodyPr/>
+          <a:bodyPr>
+            <a:normAutofit/>
+          </a:bodyPr>
           <a:lstStyle/>
           <a:p>
             <a:r>
+              <a:rPr lang="en-NZ" dirty="0" smtClean="0"/>
+              <a:t>The master </a:t>
+            </a:r>
+            <a:r>
               <a:rPr lang="en-NZ" dirty="0" err="1" smtClean="0"/>
-              <a:t>Simframe</a:t>
-            </a:r>
-            <a:r>
-              <a:rPr lang="en-NZ" dirty="0" smtClean="0"/>
-              <a:t> definition file</a:t>
+              <a:t>simframe</a:t>
             </a:r>
             <a:endParaRPr lang="en-NZ" dirty="0"/>
           </a:p>
@@ -3913,159 +3916,75 @@
         <p:spPr/>
         <p:txBody>
           <a:bodyPr>
-            <a:normAutofit fontScale="70000" lnSpcReduction="20000"/>
+            <a:normAutofit/>
           </a:bodyPr>
           <a:lstStyle/>
           <a:p>
             <a:r>
-              <a:rPr lang="en-NZ" dirty="0" err="1" smtClean="0"/>
-              <a:t>Varname</a:t>
-            </a:r>
-            <a:r>
-              <a:rPr lang="en-NZ" dirty="0" smtClean="0"/>
-              <a:t>: </a:t>
-            </a:r>
-          </a:p>
-          <a:p>
-            <a:pPr lvl="1"/>
-            <a:r>
-              <a:rPr lang="en-NZ" dirty="0" smtClean="0"/>
-              <a:t>the name of a variable in the </a:t>
+              <a:rPr lang="en-NZ" dirty="0" smtClean="0"/>
+              <a:t>The master </a:t>
             </a:r>
             <a:r>
               <a:rPr lang="en-NZ" dirty="0" err="1" smtClean="0"/>
               <a:t>simframe</a:t>
             </a:r>
+            <a:r>
+              <a:rPr lang="en-NZ" dirty="0" smtClean="0"/>
+              <a:t> is initialised from a </a:t>
+            </a:r>
+            <a:r>
+              <a:rPr lang="en-NZ" dirty="0" err="1" smtClean="0"/>
+              <a:t>simframe</a:t>
+            </a:r>
+            <a:r>
+              <a:rPr lang="en-NZ" dirty="0" smtClean="0"/>
+              <a:t> definition file.</a:t>
+            </a:r>
+          </a:p>
+          <a:p>
+            <a:r>
+              <a:rPr lang="en-NZ" dirty="0" smtClean="0"/>
+              <a:t>Each </a:t>
+            </a:r>
+            <a:r>
+              <a:rPr lang="en-NZ" dirty="0" err="1" smtClean="0"/>
+              <a:t>simframe</a:t>
+            </a:r>
+            <a:r>
+              <a:rPr lang="en-NZ" dirty="0" smtClean="0"/>
+              <a:t> variable is populated with initial values, as specified by the definition file.</a:t>
+            </a:r>
+          </a:p>
+          <a:p>
+            <a:r>
+              <a:rPr lang="en-NZ" dirty="0" smtClean="0"/>
+              <a:t>The master </a:t>
+            </a:r>
+            <a:r>
+              <a:rPr lang="en-NZ" dirty="0" err="1" smtClean="0"/>
+              <a:t>simframe</a:t>
+            </a:r>
+            <a:r>
+              <a:rPr lang="en-NZ" dirty="0" smtClean="0"/>
+              <a:t> is typically stored in the global variable </a:t>
+            </a:r>
+            <a:r>
+              <a:rPr lang="en-NZ" dirty="0" err="1" smtClean="0">
+                <a:latin typeface="Courier New" pitchFamily="49" charset="0"/>
+                <a:cs typeface="Courier New" pitchFamily="49" charset="0"/>
+              </a:rPr>
+              <a:t>simframe.master</a:t>
+            </a:r>
+            <a:endParaRPr lang="en-NZ" dirty="0" smtClean="0">
+              <a:latin typeface="Courier New" pitchFamily="49" charset="0"/>
+              <a:cs typeface="Courier New" pitchFamily="49" charset="0"/>
+            </a:endParaRPr>
+          </a:p>
+          <a:p>
             <a:endParaRPr lang="en-NZ" dirty="0" smtClean="0"/>
           </a:p>
           <a:p>
-            <a:r>
-              <a:rPr lang="en-NZ" dirty="0" err="1" smtClean="0"/>
-              <a:t>Previous_var</a:t>
-            </a:r>
-            <a:endParaRPr lang="en-NZ" dirty="0" smtClean="0"/>
-          </a:p>
-          <a:p>
-            <a:pPr lvl="1"/>
-            <a:r>
-              <a:rPr lang="en-NZ" dirty="0" smtClean="0"/>
-              <a:t>the </a:t>
-            </a:r>
-            <a:r>
-              <a:rPr lang="en-NZ" dirty="0"/>
-              <a:t>name of a variable in which to store the current value in at the </a:t>
-            </a:r>
-            <a:r>
-              <a:rPr lang="en-NZ" dirty="0" smtClean="0"/>
-              <a:t>beginning of </a:t>
-            </a:r>
-            <a:r>
-              <a:rPr lang="en-NZ" dirty="0"/>
-              <a:t>each iteration (</a:t>
-            </a:r>
-            <a:r>
-              <a:rPr lang="en-NZ" dirty="0" err="1"/>
-              <a:t>i.e</a:t>
-            </a:r>
-            <a:r>
-              <a:rPr lang="en-NZ" dirty="0"/>
-              <a:t>: before it's transformed</a:t>
-            </a:r>
-            <a:r>
-              <a:rPr lang="en-NZ" dirty="0" smtClean="0"/>
-              <a:t>).</a:t>
-            </a:r>
-          </a:p>
-          <a:p>
-            <a:pPr lvl="1"/>
-            <a:r>
-              <a:rPr lang="en-NZ" dirty="0" smtClean="0"/>
-              <a:t>Optional </a:t>
-            </a:r>
-            <a:r>
-              <a:rPr lang="en-NZ" dirty="0"/>
-              <a:t>- for models that require previous state</a:t>
-            </a:r>
-            <a:r>
-              <a:rPr lang="en-NZ" dirty="0" smtClean="0"/>
-              <a:t>.</a:t>
-            </a:r>
             <a:endParaRPr lang="en-NZ" dirty="0"/>
-          </a:p>
-          <a:p>
-            <a:r>
-              <a:rPr lang="en-NZ" dirty="0" err="1" smtClean="0"/>
-              <a:t>Initial_value</a:t>
-            </a:r>
-            <a:endParaRPr lang="en-NZ" dirty="0" smtClean="0"/>
-          </a:p>
-          <a:p>
-            <a:pPr lvl="1"/>
-            <a:r>
-              <a:rPr lang="en-NZ" dirty="0"/>
-              <a:t>an expression that generates the initial value of the variable</a:t>
-            </a:r>
-            <a:r>
-              <a:rPr lang="en-NZ" dirty="0" smtClean="0"/>
-              <a:t>. Typically this expression will reference values in a previously loaded </a:t>
-            </a:r>
-            <a:r>
-              <a:rPr lang="en-NZ" dirty="0" err="1" smtClean="0"/>
-              <a:t>basefile</a:t>
-            </a:r>
-            <a:r>
-              <a:rPr lang="en-NZ" dirty="0" smtClean="0"/>
-              <a:t>.</a:t>
-            </a:r>
-          </a:p>
-          <a:p>
-            <a:r>
-              <a:rPr lang="en-NZ" dirty="0" err="1" smtClean="0"/>
-              <a:t>Outcome_type</a:t>
-            </a:r>
-            <a:endParaRPr lang="en-NZ" dirty="0" smtClean="0"/>
-          </a:p>
-          <a:p>
-            <a:pPr lvl="1"/>
-            <a:r>
-              <a:rPr lang="en-NZ" dirty="0"/>
-              <a:t>i</a:t>
-            </a:r>
-            <a:r>
-              <a:rPr lang="en-NZ" dirty="0" smtClean="0"/>
-              <a:t>f specified, indicates this is an outcome variable and indicates its type which is one of “categorical” or “continuous”</a:t>
-            </a:r>
-          </a:p>
-          <a:p>
-            <a:r>
-              <a:rPr lang="en-NZ" dirty="0" err="1" smtClean="0"/>
-              <a:t>Outcome_module</a:t>
-            </a:r>
-            <a:endParaRPr lang="en-NZ" dirty="0" smtClean="0"/>
-          </a:p>
-          <a:p>
-            <a:pPr lvl="1"/>
-            <a:r>
-              <a:rPr lang="en-NZ" dirty="0"/>
-              <a:t>if specified, indicates the </a:t>
-            </a:r>
-            <a:r>
-              <a:rPr lang="en-NZ" dirty="0" err="1" smtClean="0"/>
-              <a:t>Simmodule</a:t>
-            </a:r>
-            <a:r>
-              <a:rPr lang="en-NZ" dirty="0" smtClean="0"/>
-              <a:t> </a:t>
-            </a:r>
-            <a:r>
-              <a:rPr lang="en-NZ" dirty="0"/>
-              <a:t>this outcome variable belongs to</a:t>
-            </a:r>
-            <a:endParaRPr lang="en-NZ" dirty="0" smtClean="0"/>
-          </a:p>
-          <a:p>
-            <a:pPr lvl="1"/>
-            <a:endParaRPr lang="en-NZ" dirty="0" smtClean="0"/>
           </a:p>
         </p:txBody>
       </p:sp>
@@ -4121,369 +4040,175 @@
           </a:p>
         </p:txBody>
       </p:sp>
-      <p:graphicFrame>
-        <p:nvGraphicFramePr>
-          <p:cNvPr id="4" name="Content Placeholder 3"/>
-          <p:cNvGraphicFramePr>
-            <a:graphicFrameLocks noGrp="1"/>
-          </p:cNvGraphicFramePr>
+      <p:sp>
+        <p:nvSpPr>
+          <p:cNvPr id="3" name="Content Placeholder 2"/>
+          <p:cNvSpPr>
+            <a:spLocks noGrp="1"/>
+          </p:cNvSpPr>
           <p:nvPr>
             <p:ph idx="1"/>
           </p:nvPr>
-        </p:nvGraphicFramePr>
-        <p:xfrm>
-          <a:off x="457200" y="1600200"/>
-          <a:ext cx="8229600" cy="2392680"/>
-        </p:xfrm>
-        <a:graphic>
-          <a:graphicData uri="http://schemas.openxmlformats.org/drawingml/2006/table">
-            <a:tbl>
-              <a:tblPr firstRow="1" bandRow="1">
-                <a:tableStyleId>{5C22544A-7EE6-4342-B048-85BDC9FD1C3A}</a:tableStyleId>
-              </a:tblPr>
-              <a:tblGrid>
-                <a:gridCol w="1378496"/>
-                <a:gridCol w="1512168"/>
-                <a:gridCol w="1656184"/>
-                <a:gridCol w="1728192"/>
-                <a:gridCol w="1954560"/>
-              </a:tblGrid>
-              <a:tr h="370840">
-                <a:tc>
-                  <a:txBody>
-                    <a:bodyPr/>
-                    <a:lstStyle/>
-                    <a:p>
-                      <a:r>
-                        <a:rPr lang="en-NZ" smtClean="0"/>
-                        <a:t>Varname</a:t>
-                      </a:r>
-                      <a:endParaRPr lang="en-NZ" dirty="0"/>
-                    </a:p>
-                  </a:txBody>
-                  <a:tcPr/>
-                </a:tc>
-                <a:tc>
-                  <a:txBody>
-                    <a:bodyPr/>
-                    <a:lstStyle/>
-                    <a:p>
-                      <a:r>
-                        <a:rPr lang="en-NZ" dirty="0" err="1" smtClean="0"/>
-                        <a:t>Previous_var</a:t>
-                      </a:r>
-                      <a:endParaRPr lang="en-NZ" dirty="0"/>
-                    </a:p>
-                  </a:txBody>
-                  <a:tcPr/>
-                </a:tc>
-                <a:tc>
-                  <a:txBody>
-                    <a:bodyPr/>
-                    <a:lstStyle/>
-                    <a:p>
-                      <a:r>
-                        <a:rPr lang="en-NZ" dirty="0" err="1" smtClean="0"/>
-                        <a:t>Initial_value</a:t>
-                      </a:r>
-                      <a:endParaRPr lang="en-NZ" dirty="0"/>
-                    </a:p>
-                  </a:txBody>
-                  <a:tcPr/>
-                </a:tc>
-                <a:tc>
-                  <a:txBody>
-                    <a:bodyPr/>
-                    <a:lstStyle/>
-                    <a:p>
-                      <a:r>
-                        <a:rPr lang="en-NZ" dirty="0" err="1" smtClean="0"/>
-                        <a:t>Outcome_type</a:t>
-                      </a:r>
-                      <a:endParaRPr lang="en-NZ" dirty="0"/>
-                    </a:p>
-                  </a:txBody>
-                  <a:tcPr/>
-                </a:tc>
-                <a:tc>
-                  <a:txBody>
-                    <a:bodyPr/>
-                    <a:lstStyle/>
-                    <a:p>
-                      <a:r>
-                        <a:rPr lang="en-NZ" dirty="0" err="1" smtClean="0"/>
-                        <a:t>Outcome_module</a:t>
-                      </a:r>
-                      <a:endParaRPr lang="en-NZ" dirty="0"/>
-                    </a:p>
-                  </a:txBody>
-                  <a:tcPr/>
-                </a:tc>
-              </a:tr>
-              <a:tr h="370840">
-                <a:tc>
-                  <a:txBody>
-                    <a:bodyPr/>
-                    <a:lstStyle/>
-                    <a:p>
-                      <a:r>
-                        <a:rPr lang="en-NZ" dirty="0" smtClean="0"/>
-                        <a:t>Age</a:t>
-                      </a:r>
-                      <a:endParaRPr lang="en-NZ" dirty="0"/>
-                    </a:p>
-                  </a:txBody>
-                  <a:tcPr/>
-                </a:tc>
-                <a:tc>
-                  <a:txBody>
-                    <a:bodyPr/>
-                    <a:lstStyle/>
-                    <a:p>
-                      <a:endParaRPr lang="en-NZ" dirty="0"/>
-                    </a:p>
-                  </a:txBody>
-                  <a:tcPr/>
-                </a:tc>
-                <a:tc>
-                  <a:txBody>
-                    <a:bodyPr/>
-                    <a:lstStyle/>
-                    <a:p>
-                      <a:r>
-                        <a:rPr lang="en-NZ" dirty="0" err="1" smtClean="0"/>
-                        <a:t>Basefile_age</a:t>
-                      </a:r>
-                      <a:endParaRPr lang="en-NZ" dirty="0"/>
-                    </a:p>
-                  </a:txBody>
-                  <a:tcPr/>
-                </a:tc>
-                <a:tc>
-                  <a:txBody>
-                    <a:bodyPr/>
-                    <a:lstStyle/>
-                    <a:p>
-                      <a:endParaRPr lang="en-NZ" dirty="0"/>
-                    </a:p>
-                  </a:txBody>
-                  <a:tcPr/>
-                </a:tc>
-                <a:tc>
-                  <a:txBody>
-                    <a:bodyPr/>
-                    <a:lstStyle/>
-                    <a:p>
-                      <a:endParaRPr lang="en-NZ" dirty="0"/>
-                    </a:p>
-                  </a:txBody>
-                  <a:tcPr/>
-                </a:tc>
-              </a:tr>
-              <a:tr h="370840">
-                <a:tc>
-                  <a:txBody>
-                    <a:bodyPr/>
-                    <a:lstStyle/>
-                    <a:p>
-                      <a:r>
-                        <a:rPr lang="en-NZ" dirty="0" smtClean="0"/>
-                        <a:t>Health</a:t>
-                      </a:r>
-                      <a:endParaRPr lang="en-NZ" dirty="0"/>
-                    </a:p>
-                  </a:txBody>
-                  <a:tcPr/>
-                </a:tc>
-                <a:tc>
-                  <a:txBody>
-                    <a:bodyPr/>
-                    <a:lstStyle/>
-                    <a:p>
-                      <a:r>
-                        <a:rPr lang="en-NZ" dirty="0" err="1" smtClean="0"/>
-                        <a:t>Health_previous</a:t>
-                      </a:r>
-                      <a:endParaRPr lang="en-NZ" dirty="0"/>
-                    </a:p>
-                  </a:txBody>
-                  <a:tcPr/>
-                </a:tc>
-                <a:tc>
-                  <a:txBody>
-                    <a:bodyPr/>
-                    <a:lstStyle/>
-                    <a:p>
-                      <a:r>
-                        <a:rPr lang="en-NZ" dirty="0" smtClean="0"/>
-                        <a:t>0</a:t>
-                      </a:r>
-                      <a:endParaRPr lang="en-NZ" dirty="0"/>
-                    </a:p>
-                  </a:txBody>
-                  <a:tcPr/>
-                </a:tc>
-                <a:tc>
-                  <a:txBody>
-                    <a:bodyPr/>
-                    <a:lstStyle/>
-                    <a:p>
-                      <a:r>
-                        <a:rPr lang="en-NZ" dirty="0" smtClean="0"/>
-                        <a:t>categorical</a:t>
-                      </a:r>
-                      <a:endParaRPr lang="en-NZ" dirty="0"/>
-                    </a:p>
-                  </a:txBody>
-                  <a:tcPr/>
-                </a:tc>
-                <a:tc>
-                  <a:txBody>
-                    <a:bodyPr/>
-                    <a:lstStyle/>
-                    <a:p>
-                      <a:r>
-                        <a:rPr lang="en-NZ" dirty="0" smtClean="0"/>
-                        <a:t>Main</a:t>
-                      </a:r>
-                      <a:endParaRPr lang="en-NZ" dirty="0"/>
-                    </a:p>
-                  </a:txBody>
-                  <a:tcPr/>
-                </a:tc>
-              </a:tr>
-              <a:tr h="370840">
-                <a:tc>
-                  <a:txBody>
-                    <a:bodyPr/>
-                    <a:lstStyle/>
-                    <a:p>
-                      <a:r>
-                        <a:rPr lang="en-NZ" dirty="0" err="1" smtClean="0"/>
-                        <a:t>Health_previous</a:t>
-                      </a:r>
-                      <a:endParaRPr lang="en-NZ" dirty="0"/>
-                    </a:p>
-                  </a:txBody>
-                  <a:tcPr/>
-                </a:tc>
-                <a:tc>
-                  <a:txBody>
-                    <a:bodyPr/>
-                    <a:lstStyle/>
-                    <a:p>
-                      <a:endParaRPr lang="en-NZ" dirty="0"/>
-                    </a:p>
-                  </a:txBody>
-                  <a:tcPr/>
-                </a:tc>
-                <a:tc>
-                  <a:txBody>
-                    <a:bodyPr/>
-                    <a:lstStyle/>
-                    <a:p>
-                      <a:r>
-                        <a:rPr lang="en-NZ" dirty="0" smtClean="0"/>
-                        <a:t>NA</a:t>
-                      </a:r>
-                      <a:endParaRPr lang="en-NZ" dirty="0"/>
-                    </a:p>
-                  </a:txBody>
-                  <a:tcPr/>
-                </a:tc>
-                <a:tc>
-                  <a:txBody>
-                    <a:bodyPr/>
-                    <a:lstStyle/>
-                    <a:p>
-                      <a:endParaRPr lang="en-NZ" dirty="0"/>
-                    </a:p>
-                  </a:txBody>
-                  <a:tcPr/>
-                </a:tc>
-                <a:tc>
-                  <a:txBody>
-                    <a:bodyPr/>
-                    <a:lstStyle/>
-                    <a:p>
-                      <a:endParaRPr lang="en-NZ" dirty="0"/>
-                    </a:p>
-                  </a:txBody>
-                  <a:tcPr/>
-                </a:tc>
-              </a:tr>
-              <a:tr h="370840">
-                <a:tc>
-                  <a:txBody>
-                    <a:bodyPr/>
-                    <a:lstStyle/>
-                    <a:p>
-                      <a:r>
-                        <a:rPr lang="en-NZ" dirty="0" smtClean="0"/>
-                        <a:t>Earnings</a:t>
-                      </a:r>
-                      <a:endParaRPr lang="en-NZ" dirty="0"/>
-                    </a:p>
-                  </a:txBody>
-                  <a:tcPr/>
-                </a:tc>
-                <a:tc>
-                  <a:txBody>
-                    <a:bodyPr/>
-                    <a:lstStyle/>
-                    <a:p>
-                      <a:endParaRPr lang="en-NZ" dirty="0"/>
-                    </a:p>
-                  </a:txBody>
-                  <a:tcPr/>
-                </a:tc>
-                <a:tc>
-                  <a:txBody>
-                    <a:bodyPr/>
-                    <a:lstStyle/>
-                    <a:p>
-                      <a:r>
-                        <a:rPr lang="en-NZ" dirty="0" smtClean="0"/>
-                        <a:t>0</a:t>
-                      </a:r>
-                      <a:endParaRPr lang="en-NZ" dirty="0"/>
-                    </a:p>
-                  </a:txBody>
-                  <a:tcPr/>
-                </a:tc>
-                <a:tc>
-                  <a:txBody>
-                    <a:bodyPr/>
-                    <a:lstStyle/>
-                    <a:p>
-                      <a:r>
-                        <a:rPr lang="en-NZ" dirty="0" smtClean="0"/>
-                        <a:t>continuous</a:t>
-                      </a:r>
-                      <a:endParaRPr lang="en-NZ" dirty="0"/>
-                    </a:p>
-                  </a:txBody>
-                  <a:tcPr/>
-                </a:tc>
-                <a:tc>
-                  <a:txBody>
-                    <a:bodyPr/>
-                    <a:lstStyle/>
-                    <a:p>
-                      <a:r>
-                        <a:rPr lang="en-NZ" dirty="0" smtClean="0"/>
-                        <a:t>Main</a:t>
-                      </a:r>
-                      <a:endParaRPr lang="en-NZ" dirty="0"/>
-                    </a:p>
-                  </a:txBody>
-                  <a:tcPr/>
-                </a:tc>
-              </a:tr>
-            </a:tbl>
-          </a:graphicData>
-        </a:graphic>
-      </p:graphicFrame>
+        </p:nvSpPr>
+        <p:spPr/>
+        <p:txBody>
+          <a:bodyPr>
+            <a:normAutofit fontScale="70000" lnSpcReduction="20000"/>
+          </a:bodyPr>
+          <a:lstStyle/>
+          <a:p>
+            <a:r>
+              <a:rPr lang="en-NZ" dirty="0" err="1" smtClean="0"/>
+              <a:t>Varname</a:t>
+            </a:r>
+            <a:r>
+              <a:rPr lang="en-NZ" dirty="0" smtClean="0"/>
+              <a:t>: </a:t>
+            </a:r>
+          </a:p>
+          <a:p>
+            <a:pPr lvl="1"/>
+            <a:r>
+              <a:rPr lang="en-NZ" dirty="0" smtClean="0"/>
+              <a:t>the name of a variable in the </a:t>
+            </a:r>
+            <a:r>
+              <a:rPr lang="en-NZ" dirty="0" err="1" smtClean="0"/>
+              <a:t>simframe</a:t>
+            </a:r>
+            <a:endParaRPr lang="en-NZ" dirty="0" smtClean="0"/>
+          </a:p>
+          <a:p>
+            <a:r>
+              <a:rPr lang="en-NZ" dirty="0" err="1" smtClean="0"/>
+              <a:t>Previous_var</a:t>
+            </a:r>
+            <a:endParaRPr lang="en-NZ" dirty="0" smtClean="0"/>
+          </a:p>
+          <a:p>
+            <a:pPr lvl="1"/>
+            <a:r>
+              <a:rPr lang="en-NZ" dirty="0" smtClean="0"/>
+              <a:t>the </a:t>
+            </a:r>
+            <a:r>
+              <a:rPr lang="en-NZ" dirty="0"/>
+              <a:t>name of a variable in which to store the current value in at the </a:t>
+            </a:r>
+            <a:r>
+              <a:rPr lang="en-NZ" dirty="0" smtClean="0"/>
+              <a:t>beginning of </a:t>
+            </a:r>
+            <a:r>
+              <a:rPr lang="en-NZ" dirty="0"/>
+              <a:t>each iteration (</a:t>
+            </a:r>
+            <a:r>
+              <a:rPr lang="en-NZ" dirty="0" err="1"/>
+              <a:t>i.e</a:t>
+            </a:r>
+            <a:r>
+              <a:rPr lang="en-NZ" dirty="0"/>
+              <a:t>: before it's transformed</a:t>
+            </a:r>
+            <a:r>
+              <a:rPr lang="en-NZ" dirty="0" smtClean="0"/>
+              <a:t>).</a:t>
+            </a:r>
+          </a:p>
+          <a:p>
+            <a:pPr lvl="1"/>
+            <a:r>
+              <a:rPr lang="en-NZ" dirty="0" smtClean="0"/>
+              <a:t>Optional </a:t>
+            </a:r>
+            <a:r>
+              <a:rPr lang="en-NZ" dirty="0"/>
+              <a:t>- for models that require previous state</a:t>
+            </a:r>
+            <a:r>
+              <a:rPr lang="en-NZ" dirty="0" smtClean="0"/>
+              <a:t>.</a:t>
+            </a:r>
+            <a:endParaRPr lang="en-NZ" dirty="0"/>
+          </a:p>
+          <a:p>
+            <a:r>
+              <a:rPr lang="en-NZ" dirty="0" err="1" smtClean="0"/>
+              <a:t>Initial_value</a:t>
+            </a:r>
+            <a:endParaRPr lang="en-NZ" dirty="0" smtClean="0"/>
+          </a:p>
+          <a:p>
+            <a:pPr lvl="1"/>
+            <a:r>
+              <a:rPr lang="en-NZ" dirty="0"/>
+              <a:t>an expression that generates the initial value of the variable</a:t>
+            </a:r>
+            <a:r>
+              <a:rPr lang="en-NZ" dirty="0" smtClean="0"/>
+              <a:t>. Typically this expression will reference values in a previously loaded </a:t>
+            </a:r>
+            <a:r>
+              <a:rPr lang="en-NZ" dirty="0" err="1" smtClean="0"/>
+              <a:t>basefile</a:t>
+            </a:r>
+            <a:r>
+              <a:rPr lang="en-NZ" dirty="0" smtClean="0"/>
+              <a:t>.</a:t>
+            </a:r>
+          </a:p>
+          <a:p>
+            <a:r>
+              <a:rPr lang="en-NZ" dirty="0" err="1" smtClean="0"/>
+              <a:t>Outcome_type</a:t>
+            </a:r>
+            <a:endParaRPr lang="en-NZ" dirty="0" smtClean="0"/>
+          </a:p>
+          <a:p>
+            <a:pPr lvl="1"/>
+            <a:r>
+              <a:rPr lang="en-NZ" dirty="0"/>
+              <a:t>i</a:t>
+            </a:r>
+            <a:r>
+              <a:rPr lang="en-NZ" dirty="0" smtClean="0"/>
+              <a:t>f specified, indicates this is an outcome variable and indicates its type which is one of “categorical” or “continuous”</a:t>
+            </a:r>
+          </a:p>
+          <a:p>
+            <a:r>
+              <a:rPr lang="en-NZ" dirty="0" err="1" smtClean="0"/>
+              <a:t>Outcome_module</a:t>
+            </a:r>
+            <a:endParaRPr lang="en-NZ" dirty="0" smtClean="0"/>
+          </a:p>
+          <a:p>
+            <a:pPr lvl="1"/>
+            <a:r>
+              <a:rPr lang="en-NZ" dirty="0"/>
+              <a:t>if specified, indicates the </a:t>
+            </a:r>
+            <a:r>
+              <a:rPr lang="en-NZ" dirty="0" err="1" smtClean="0"/>
+              <a:t>Simmodule</a:t>
+            </a:r>
+            <a:r>
+              <a:rPr lang="en-NZ" dirty="0" smtClean="0"/>
+              <a:t> </a:t>
+            </a:r>
+            <a:r>
+              <a:rPr lang="en-NZ" dirty="0"/>
+              <a:t>this outcome variable belongs to</a:t>
+            </a:r>
+            <a:endParaRPr lang="en-NZ" dirty="0" smtClean="0"/>
+          </a:p>
+          <a:p>
+            <a:pPr lvl="1"/>
+            <a:endParaRPr lang="en-NZ" dirty="0" smtClean="0"/>
+          </a:p>
+        </p:txBody>
+      </p:sp>
     </p:spTree>
   </p:cSld>
   <p:clrMapOvr>
@@ -4525,69 +4250,380 @@
           <a:lstStyle/>
           <a:p>
             <a:r>
-              <a:rPr lang="en-NZ" dirty="0" smtClean="0"/>
-              <a:t>One</a:t>
-            </a:r>
-            <a:r>
-              <a:rPr lang="en-NZ" dirty="0" smtClean="0"/>
-              <a:t> </a:t>
-            </a:r>
-            <a:r>
               <a:rPr lang="en-NZ" dirty="0" err="1" smtClean="0"/>
-              <a:t>simframe</a:t>
-            </a:r>
-            <a:r>
-              <a:rPr lang="en-NZ" dirty="0" smtClean="0"/>
-              <a:t> per environment</a:t>
+              <a:t>Simframe</a:t>
+            </a:r>
+            <a:r>
+              <a:rPr lang="en-NZ" dirty="0" smtClean="0"/>
+              <a:t> definition file</a:t>
             </a:r>
             <a:endParaRPr lang="en-NZ" dirty="0"/>
           </a:p>
         </p:txBody>
       </p:sp>
-      <p:sp>
-        <p:nvSpPr>
-          <p:cNvPr id="3" name="Content Placeholder 2"/>
-          <p:cNvSpPr>
-            <a:spLocks noGrp="1"/>
-          </p:cNvSpPr>
+      <p:graphicFrame>
+        <p:nvGraphicFramePr>
+          <p:cNvPr id="4" name="Content Placeholder 3"/>
+          <p:cNvGraphicFramePr>
+            <a:graphicFrameLocks noGrp="1"/>
+          </p:cNvGraphicFramePr>
           <p:nvPr>
             <p:ph idx="1"/>
           </p:nvPr>
-        </p:nvSpPr>
-        <p:spPr/>
-        <p:txBody>
-          <a:bodyPr/>
-          <a:lstStyle/>
-          <a:p>
-            <a:r>
-              <a:rPr lang="en-NZ" dirty="0" smtClean="0"/>
-              <a:t>When a simulation environment is created, it takes a copy of the master </a:t>
-            </a:r>
-            <a:r>
-              <a:rPr lang="en-NZ" dirty="0" err="1" smtClean="0"/>
-              <a:t>simframe</a:t>
-            </a:r>
-            <a:endParaRPr lang="en-NZ" dirty="0" smtClean="0"/>
-          </a:p>
-          <a:p>
-            <a:r>
-              <a:rPr lang="en-NZ" dirty="0" smtClean="0"/>
-              <a:t>Before simulating, a environment’s </a:t>
-            </a:r>
-            <a:r>
-              <a:rPr lang="en-NZ" dirty="0" err="1" smtClean="0"/>
-              <a:t>simframe</a:t>
-            </a:r>
-            <a:r>
-              <a:rPr lang="en-NZ" dirty="0" smtClean="0"/>
-              <a:t> may be modified to test a particular scenario</a:t>
-            </a:r>
-          </a:p>
-          <a:p>
-            <a:endParaRPr lang="en-NZ" dirty="0"/>
-          </a:p>
-        </p:txBody>
-      </p:sp>
+        </p:nvGraphicFramePr>
+        <p:xfrm>
+          <a:off x="457200" y="1600200"/>
+          <a:ext cx="8229600" cy="2392680"/>
+        </p:xfrm>
+        <a:graphic>
+          <a:graphicData uri="http://schemas.openxmlformats.org/drawingml/2006/table">
+            <a:tbl>
+              <a:tblPr firstRow="1" bandRow="1">
+                <a:tableStyleId>{5C22544A-7EE6-4342-B048-85BDC9FD1C3A}</a:tableStyleId>
+              </a:tblPr>
+              <a:tblGrid>
+                <a:gridCol w="1378496"/>
+                <a:gridCol w="1512168"/>
+                <a:gridCol w="1656184"/>
+                <a:gridCol w="1728192"/>
+                <a:gridCol w="1954560"/>
+              </a:tblGrid>
+              <a:tr h="370840">
+                <a:tc>
+                  <a:txBody>
+                    <a:bodyPr/>
+                    <a:lstStyle/>
+                    <a:p>
+                      <a:r>
+                        <a:rPr lang="en-NZ" smtClean="0"/>
+                        <a:t>Varname</a:t>
+                      </a:r>
+                      <a:endParaRPr lang="en-NZ" dirty="0"/>
+                    </a:p>
+                  </a:txBody>
+                  <a:tcPr/>
+                </a:tc>
+                <a:tc>
+                  <a:txBody>
+                    <a:bodyPr/>
+                    <a:lstStyle/>
+                    <a:p>
+                      <a:r>
+                        <a:rPr lang="en-NZ" dirty="0" err="1" smtClean="0"/>
+                        <a:t>Previous_var</a:t>
+                      </a:r>
+                      <a:endParaRPr lang="en-NZ" dirty="0"/>
+                    </a:p>
+                  </a:txBody>
+                  <a:tcPr/>
+                </a:tc>
+                <a:tc>
+                  <a:txBody>
+                    <a:bodyPr/>
+                    <a:lstStyle/>
+                    <a:p>
+                      <a:r>
+                        <a:rPr lang="en-NZ" dirty="0" err="1" smtClean="0"/>
+                        <a:t>Initial_value</a:t>
+                      </a:r>
+                      <a:endParaRPr lang="en-NZ" dirty="0"/>
+                    </a:p>
+                  </a:txBody>
+                  <a:tcPr/>
+                </a:tc>
+                <a:tc>
+                  <a:txBody>
+                    <a:bodyPr/>
+                    <a:lstStyle/>
+                    <a:p>
+                      <a:r>
+                        <a:rPr lang="en-NZ" dirty="0" err="1" smtClean="0"/>
+                        <a:t>Outcome_type</a:t>
+                      </a:r>
+                      <a:endParaRPr lang="en-NZ" dirty="0"/>
+                    </a:p>
+                  </a:txBody>
+                  <a:tcPr/>
+                </a:tc>
+                <a:tc>
+                  <a:txBody>
+                    <a:bodyPr/>
+                    <a:lstStyle/>
+                    <a:p>
+                      <a:r>
+                        <a:rPr lang="en-NZ" dirty="0" err="1" smtClean="0"/>
+                        <a:t>Outcome_module</a:t>
+                      </a:r>
+                      <a:endParaRPr lang="en-NZ" dirty="0"/>
+                    </a:p>
+                  </a:txBody>
+                  <a:tcPr/>
+                </a:tc>
+              </a:tr>
+              <a:tr h="370840">
+                <a:tc>
+                  <a:txBody>
+                    <a:bodyPr/>
+                    <a:lstStyle/>
+                    <a:p>
+                      <a:r>
+                        <a:rPr lang="en-NZ" dirty="0" smtClean="0"/>
+                        <a:t>Age</a:t>
+                      </a:r>
+                      <a:endParaRPr lang="en-NZ" dirty="0"/>
+                    </a:p>
+                  </a:txBody>
+                  <a:tcPr/>
+                </a:tc>
+                <a:tc>
+                  <a:txBody>
+                    <a:bodyPr/>
+                    <a:lstStyle/>
+                    <a:p>
+                      <a:endParaRPr lang="en-NZ" dirty="0"/>
+                    </a:p>
+                  </a:txBody>
+                  <a:tcPr/>
+                </a:tc>
+                <a:tc>
+                  <a:txBody>
+                    <a:bodyPr/>
+                    <a:lstStyle/>
+                    <a:p>
+                      <a:r>
+                        <a:rPr lang="en-NZ" dirty="0" err="1" smtClean="0"/>
+                        <a:t>Basefile_age</a:t>
+                      </a:r>
+                      <a:endParaRPr lang="en-NZ" dirty="0"/>
+                    </a:p>
+                  </a:txBody>
+                  <a:tcPr/>
+                </a:tc>
+                <a:tc>
+                  <a:txBody>
+                    <a:bodyPr/>
+                    <a:lstStyle/>
+                    <a:p>
+                      <a:endParaRPr lang="en-NZ" dirty="0"/>
+                    </a:p>
+                  </a:txBody>
+                  <a:tcPr/>
+                </a:tc>
+                <a:tc>
+                  <a:txBody>
+                    <a:bodyPr/>
+                    <a:lstStyle/>
+                    <a:p>
+                      <a:endParaRPr lang="en-NZ" dirty="0"/>
+                    </a:p>
+                  </a:txBody>
+                  <a:tcPr/>
+                </a:tc>
+              </a:tr>
+              <a:tr h="370840">
+                <a:tc>
+                  <a:txBody>
+                    <a:bodyPr/>
+                    <a:lstStyle/>
+                    <a:p>
+                      <a:r>
+                        <a:rPr lang="en-NZ" dirty="0" smtClean="0"/>
+                        <a:t>Health</a:t>
+                      </a:r>
+                      <a:endParaRPr lang="en-NZ" dirty="0"/>
+                    </a:p>
+                  </a:txBody>
+                  <a:tcPr/>
+                </a:tc>
+                <a:tc>
+                  <a:txBody>
+                    <a:bodyPr/>
+                    <a:lstStyle/>
+                    <a:p>
+                      <a:r>
+                        <a:rPr lang="en-NZ" dirty="0" err="1" smtClean="0"/>
+                        <a:t>Health_previous</a:t>
+                      </a:r>
+                      <a:endParaRPr lang="en-NZ" dirty="0"/>
+                    </a:p>
+                  </a:txBody>
+                  <a:tcPr/>
+                </a:tc>
+                <a:tc>
+                  <a:txBody>
+                    <a:bodyPr/>
+                    <a:lstStyle/>
+                    <a:p>
+                      <a:r>
+                        <a:rPr lang="en-NZ" dirty="0" smtClean="0"/>
+                        <a:t>0</a:t>
+                      </a:r>
+                      <a:endParaRPr lang="en-NZ" dirty="0"/>
+                    </a:p>
+                  </a:txBody>
+                  <a:tcPr/>
+                </a:tc>
+                <a:tc>
+                  <a:txBody>
+                    <a:bodyPr/>
+                    <a:lstStyle/>
+                    <a:p>
+                      <a:r>
+                        <a:rPr lang="en-NZ" dirty="0" smtClean="0"/>
+                        <a:t>categorical</a:t>
+                      </a:r>
+                      <a:endParaRPr lang="en-NZ" dirty="0"/>
+                    </a:p>
+                  </a:txBody>
+                  <a:tcPr/>
+                </a:tc>
+                <a:tc>
+                  <a:txBody>
+                    <a:bodyPr/>
+                    <a:lstStyle/>
+                    <a:p>
+                      <a:r>
+                        <a:rPr lang="en-NZ" dirty="0" smtClean="0"/>
+                        <a:t>Main</a:t>
+                      </a:r>
+                      <a:endParaRPr lang="en-NZ" dirty="0"/>
+                    </a:p>
+                  </a:txBody>
+                  <a:tcPr/>
+                </a:tc>
+              </a:tr>
+              <a:tr h="370840">
+                <a:tc>
+                  <a:txBody>
+                    <a:bodyPr/>
+                    <a:lstStyle/>
+                    <a:p>
+                      <a:r>
+                        <a:rPr lang="en-NZ" dirty="0" err="1" smtClean="0"/>
+                        <a:t>Health_previous</a:t>
+                      </a:r>
+                      <a:endParaRPr lang="en-NZ" dirty="0"/>
+                    </a:p>
+                  </a:txBody>
+                  <a:tcPr/>
+                </a:tc>
+                <a:tc>
+                  <a:txBody>
+                    <a:bodyPr/>
+                    <a:lstStyle/>
+                    <a:p>
+                      <a:endParaRPr lang="en-NZ" dirty="0"/>
+                    </a:p>
+                  </a:txBody>
+                  <a:tcPr/>
+                </a:tc>
+                <a:tc>
+                  <a:txBody>
+                    <a:bodyPr/>
+                    <a:lstStyle/>
+                    <a:p>
+                      <a:r>
+                        <a:rPr lang="en-NZ" dirty="0" smtClean="0"/>
+                        <a:t>NA</a:t>
+                      </a:r>
+                      <a:endParaRPr lang="en-NZ" dirty="0"/>
+                    </a:p>
+                  </a:txBody>
+                  <a:tcPr/>
+                </a:tc>
+                <a:tc>
+                  <a:txBody>
+                    <a:bodyPr/>
+                    <a:lstStyle/>
+                    <a:p>
+                      <a:endParaRPr lang="en-NZ" dirty="0"/>
+                    </a:p>
+                  </a:txBody>
+                  <a:tcPr/>
+                </a:tc>
+                <a:tc>
+                  <a:txBody>
+                    <a:bodyPr/>
+                    <a:lstStyle/>
+                    <a:p>
+                      <a:endParaRPr lang="en-NZ" dirty="0"/>
+                    </a:p>
+                  </a:txBody>
+                  <a:tcPr/>
+                </a:tc>
+              </a:tr>
+              <a:tr h="370840">
+                <a:tc>
+                  <a:txBody>
+                    <a:bodyPr/>
+                    <a:lstStyle/>
+                    <a:p>
+                      <a:r>
+                        <a:rPr lang="en-NZ" dirty="0" smtClean="0"/>
+                        <a:t>Earnings</a:t>
+                      </a:r>
+                      <a:endParaRPr lang="en-NZ" dirty="0"/>
+                    </a:p>
+                  </a:txBody>
+                  <a:tcPr/>
+                </a:tc>
+                <a:tc>
+                  <a:txBody>
+                    <a:bodyPr/>
+                    <a:lstStyle/>
+                    <a:p>
+                      <a:endParaRPr lang="en-NZ" dirty="0"/>
+                    </a:p>
+                  </a:txBody>
+                  <a:tcPr/>
+                </a:tc>
+                <a:tc>
+                  <a:txBody>
+                    <a:bodyPr/>
+                    <a:lstStyle/>
+                    <a:p>
+                      <a:r>
+                        <a:rPr lang="en-NZ" dirty="0" smtClean="0"/>
+                        <a:t>0</a:t>
+                      </a:r>
+                      <a:endParaRPr lang="en-NZ" dirty="0"/>
+                    </a:p>
+                  </a:txBody>
+                  <a:tcPr/>
+                </a:tc>
+                <a:tc>
+                  <a:txBody>
+                    <a:bodyPr/>
+                    <a:lstStyle/>
+                    <a:p>
+                      <a:r>
+                        <a:rPr lang="en-NZ" dirty="0" smtClean="0"/>
+                        <a:t>continuous</a:t>
+                      </a:r>
+                      <a:endParaRPr lang="en-NZ" dirty="0"/>
+                    </a:p>
+                  </a:txBody>
+                  <a:tcPr/>
+                </a:tc>
+                <a:tc>
+                  <a:txBody>
+                    <a:bodyPr/>
+                    <a:lstStyle/>
+                    <a:p>
+                      <a:r>
+                        <a:rPr lang="en-NZ" dirty="0" smtClean="0"/>
+                        <a:t>Main</a:t>
+                      </a:r>
+                      <a:endParaRPr lang="en-NZ" dirty="0"/>
+                    </a:p>
+                  </a:txBody>
+                  <a:tcPr/>
+                </a:tc>
+              </a:tr>
+            </a:tbl>
+          </a:graphicData>
+        </a:graphic>
+      </p:graphicFrame>
     </p:spTree>
   </p:cSld>
   <p:clrMapOvr>
@@ -4630,7 +4666,15 @@
           <a:p>
             <a:r>
               <a:rPr lang="en-NZ" dirty="0" smtClean="0"/>
-              <a:t>The simulation process</a:t>
+              <a:t>One </a:t>
+            </a:r>
+            <a:r>
+              <a:rPr lang="en-NZ" dirty="0" err="1" smtClean="0"/>
+              <a:t>simframe</a:t>
+            </a:r>
+            <a:r>
+              <a:rPr lang="en-NZ" dirty="0" smtClean="0"/>
+              <a:t> per environment</a:t>
             </a:r>
             <a:endParaRPr lang="en-NZ" dirty="0"/>
           </a:p>
@@ -4648,97 +4692,39 @@
         </p:nvSpPr>
         <p:spPr/>
         <p:txBody>
-          <a:bodyPr>
-            <a:normAutofit fontScale="77500" lnSpcReduction="20000"/>
-          </a:bodyPr>
+          <a:bodyPr/>
           <a:lstStyle/>
           <a:p>
             <a:r>
               <a:rPr lang="en-NZ" dirty="0" smtClean="0"/>
-              <a:t>Categorical adjustments for iteration 1 are applied to the </a:t>
+              <a:t>When a simulation environment is created, it takes a copy of the master </a:t>
             </a:r>
             <a:r>
               <a:rPr lang="en-NZ" dirty="0" err="1" smtClean="0"/>
               <a:t>simframe</a:t>
             </a:r>
-            <a:r>
-              <a:rPr lang="en-NZ" dirty="0" smtClean="0"/>
-              <a:t>. The adjustments applied are specified in the </a:t>
+            <a:endParaRPr lang="en-NZ" dirty="0" smtClean="0"/>
+          </a:p>
+          <a:p>
+            <a:r>
+              <a:rPr lang="en-NZ" dirty="0" smtClean="0"/>
+              <a:t>Before simulating, a environment’s </a:t>
             </a:r>
             <a:r>
               <a:rPr lang="en-NZ" dirty="0" err="1" smtClean="0"/>
-              <a:t>cat.adjustments</a:t>
-            </a:r>
-            <a:r>
-              <a:rPr lang="en-NZ" dirty="0" smtClean="0"/>
-              <a:t> variable. </a:t>
-            </a:r>
-          </a:p>
-          <a:p>
-            <a:pPr lvl="1"/>
-            <a:r>
-              <a:rPr lang="en-NZ" dirty="0" smtClean="0"/>
-              <a:t>Other adjustments that might need to be performed, such as adjustments to continuous variables, can be done outside </a:t>
-            </a:r>
-            <a:r>
-              <a:rPr lang="en-NZ" dirty="0" err="1" smtClean="0"/>
-              <a:t>simar</a:t>
-            </a:r>
-            <a:r>
-              <a:rPr lang="en-NZ" dirty="0" smtClean="0"/>
-              <a:t> by the user before simulation.</a:t>
-            </a:r>
-          </a:p>
-          <a:p>
-            <a:r>
-              <a:rPr lang="en-NZ" dirty="0" smtClean="0"/>
-              <a:t>Pre simulation stats are generated</a:t>
-            </a:r>
-          </a:p>
-          <a:p>
-            <a:r>
-              <a:rPr lang="en-NZ" dirty="0" smtClean="0"/>
-              <a:t>Run loop</a:t>
-            </a:r>
-          </a:p>
-          <a:p>
-            <a:pPr lvl="1"/>
-            <a:r>
-              <a:rPr lang="en-NZ" dirty="0" smtClean="0"/>
-              <a:t>During each run, the following functions are called on each module</a:t>
-            </a:r>
-          </a:p>
-          <a:p>
-            <a:pPr lvl="2"/>
-            <a:r>
-              <a:rPr lang="en-NZ" dirty="0" err="1" smtClean="0"/>
-              <a:t>simulateRun</a:t>
-            </a:r>
-            <a:endParaRPr lang="en-NZ" dirty="0" smtClean="0"/>
-          </a:p>
-          <a:p>
-            <a:pPr lvl="2"/>
-            <a:r>
-              <a:rPr lang="en-NZ" dirty="0" err="1" smtClean="0"/>
-              <a:t>appendRunStats</a:t>
-            </a:r>
-            <a:endParaRPr lang="en-NZ" dirty="0" smtClean="0"/>
-          </a:p>
-          <a:p>
-            <a:r>
-              <a:rPr lang="en-NZ" dirty="0" smtClean="0"/>
-              <a:t>Final results are calculated by each module across all runs</a:t>
-            </a:r>
+              <a:t>simframe</a:t>
+            </a:r>
+            <a:r>
+              <a:rPr lang="en-NZ" dirty="0" smtClean="0"/>
+              <a:t> may be modified to test a particular scenario</a:t>
+            </a:r>
+          </a:p>
+          <a:p>
             <a:endParaRPr lang="en-NZ" dirty="0"/>
           </a:p>
         </p:txBody>
       </p:sp>
     </p:spTree>
-    <p:extLst>
-      <p:ext uri="{BB962C8B-B14F-4D97-AF65-F5344CB8AC3E}">
-        <p14:creationId xmlns:p14="http://schemas.microsoft.com/office/powerpoint/2010/main" val="3435886797"/>
-      </p:ext>
-    </p:extLst>
   </p:cSld>
   <p:clrMapOvr>
     <a:masterClrMapping/>
@@ -4775,6 +4761,156 @@
         </p:nvSpPr>
         <p:spPr/>
         <p:txBody>
+          <a:bodyPr/>
+          <a:lstStyle/>
+          <a:p>
+            <a:r>
+              <a:rPr lang="en-NZ" dirty="0" smtClean="0"/>
+              <a:t>The simulation process</a:t>
+            </a:r>
+            <a:endParaRPr lang="en-NZ" dirty="0"/>
+          </a:p>
+        </p:txBody>
+      </p:sp>
+      <p:sp>
+        <p:nvSpPr>
+          <p:cNvPr id="3" name="Content Placeholder 2"/>
+          <p:cNvSpPr>
+            <a:spLocks noGrp="1"/>
+          </p:cNvSpPr>
+          <p:nvPr>
+            <p:ph idx="1"/>
+          </p:nvPr>
+        </p:nvSpPr>
+        <p:spPr/>
+        <p:txBody>
+          <a:bodyPr>
+            <a:normAutofit fontScale="77500" lnSpcReduction="20000"/>
+          </a:bodyPr>
+          <a:lstStyle/>
+          <a:p>
+            <a:r>
+              <a:rPr lang="en-NZ" dirty="0" smtClean="0"/>
+              <a:t>Categorical adjustments for iteration 1 are applied to the </a:t>
+            </a:r>
+            <a:r>
+              <a:rPr lang="en-NZ" dirty="0" err="1" smtClean="0"/>
+              <a:t>simframe</a:t>
+            </a:r>
+            <a:r>
+              <a:rPr lang="en-NZ" dirty="0" smtClean="0"/>
+              <a:t>. The adjustments applied are specified in the </a:t>
+            </a:r>
+            <a:r>
+              <a:rPr lang="en-NZ" dirty="0" err="1" smtClean="0"/>
+              <a:t>cat.adjustments</a:t>
+            </a:r>
+            <a:r>
+              <a:rPr lang="en-NZ" dirty="0" smtClean="0"/>
+              <a:t> variable. </a:t>
+            </a:r>
+          </a:p>
+          <a:p>
+            <a:pPr lvl="1"/>
+            <a:r>
+              <a:rPr lang="en-NZ" dirty="0" smtClean="0"/>
+              <a:t>Other adjustments that might need to be performed, such as adjustments to continuous variables, can be done outside </a:t>
+            </a:r>
+            <a:r>
+              <a:rPr lang="en-NZ" dirty="0" err="1" smtClean="0"/>
+              <a:t>simar</a:t>
+            </a:r>
+            <a:r>
+              <a:rPr lang="en-NZ" dirty="0" smtClean="0"/>
+              <a:t> by the user before simulation.</a:t>
+            </a:r>
+          </a:p>
+          <a:p>
+            <a:r>
+              <a:rPr lang="en-NZ" dirty="0" smtClean="0"/>
+              <a:t>Pre simulation stats are generated</a:t>
+            </a:r>
+          </a:p>
+          <a:p>
+            <a:r>
+              <a:rPr lang="en-NZ" dirty="0" smtClean="0"/>
+              <a:t>Run loop</a:t>
+            </a:r>
+          </a:p>
+          <a:p>
+            <a:pPr lvl="1"/>
+            <a:r>
+              <a:rPr lang="en-NZ" dirty="0" smtClean="0"/>
+              <a:t>During each run, the following functions are called on each module</a:t>
+            </a:r>
+          </a:p>
+          <a:p>
+            <a:pPr lvl="2"/>
+            <a:r>
+              <a:rPr lang="en-NZ" dirty="0" err="1" smtClean="0"/>
+              <a:t>simulateRun</a:t>
+            </a:r>
+            <a:endParaRPr lang="en-NZ" dirty="0" smtClean="0"/>
+          </a:p>
+          <a:p>
+            <a:pPr lvl="2"/>
+            <a:r>
+              <a:rPr lang="en-NZ" dirty="0" err="1" smtClean="0"/>
+              <a:t>appendRunStats</a:t>
+            </a:r>
+            <a:endParaRPr lang="en-NZ" dirty="0" smtClean="0"/>
+          </a:p>
+          <a:p>
+            <a:r>
+              <a:rPr lang="en-NZ" dirty="0" smtClean="0"/>
+              <a:t>Final results are calculated by each module across all runs</a:t>
+            </a:r>
+            <a:endParaRPr lang="en-NZ" dirty="0"/>
+          </a:p>
+        </p:txBody>
+      </p:sp>
+    </p:spTree>
+    <p:extLst>
+      <p:ext uri="{BB962C8B-B14F-4D97-AF65-F5344CB8AC3E}">
+        <p14:creationId xmlns:p14="http://schemas.microsoft.com/office/powerpoint/2010/main" val="3435886797"/>
+      </p:ext>
+    </p:extLst>
+  </p:cSld>
+  <p:clrMapOvr>
+    <a:masterClrMapping/>
+  </p:clrMapOvr>
+</p:sld>
+</file>
+
+<file path=ppt/slides/slide18.xml><?xml version="1.0" encoding="utf-8"?>
+<p:sld xmlns:a="http://schemas.openxmlformats.org/drawingml/2006/main" xmlns:r="http://schemas.openxmlformats.org/officeDocument/2006/relationships" xmlns:p="http://schemas.openxmlformats.org/presentationml/2006/main">
+  <p:cSld>
+    <p:spTree>
+      <p:nvGrpSpPr>
+        <p:cNvPr id="1" name=""/>
+        <p:cNvGrpSpPr/>
+        <p:nvPr/>
+      </p:nvGrpSpPr>
+      <p:grpSpPr>
+        <a:xfrm>
+          <a:off x="0" y="0"/>
+          <a:ext cx="0" cy="0"/>
+          <a:chOff x="0" y="0"/>
+          <a:chExt cx="0" cy="0"/>
+        </a:xfrm>
+      </p:grpSpPr>
+      <p:sp>
+        <p:nvSpPr>
+          <p:cNvPr id="2" name="Title 1"/>
+          <p:cNvSpPr>
+            <a:spLocks noGrp="1"/>
+          </p:cNvSpPr>
+          <p:nvPr>
+            <p:ph type="title"/>
+          </p:nvPr>
+        </p:nvSpPr>
+        <p:spPr/>
+        <p:txBody>
           <a:bodyPr>
             <a:normAutofit/>
           </a:bodyPr>
@@ -4925,7 +5061,7 @@
 </p:sld>
 </file>
 
-<file path=ppt/slides/slide18.xml><?xml version="1.0" encoding="utf-8"?>
+<file path=ppt/slides/slide19.xml><?xml version="1.0" encoding="utf-8"?>
 <p:sld xmlns:a="http://schemas.openxmlformats.org/drawingml/2006/main" xmlns:r="http://schemas.openxmlformats.org/officeDocument/2006/relationships" xmlns:p="http://schemas.openxmlformats.org/presentationml/2006/main">
   <p:cSld>
     <p:spTree>
@@ -8348,73 +8484,6 @@
 </p:sld>
 </file>
 
-<file path=ppt/slides/slide19.xml><?xml version="1.0" encoding="utf-8"?>
-<p:sld xmlns:a="http://schemas.openxmlformats.org/drawingml/2006/main" xmlns:r="http://schemas.openxmlformats.org/officeDocument/2006/relationships" xmlns:p="http://schemas.openxmlformats.org/presentationml/2006/main">
-  <p:cSld>
-    <p:spTree>
-      <p:nvGrpSpPr>
-        <p:cNvPr id="1" name=""/>
-        <p:cNvGrpSpPr/>
-        <p:nvPr/>
-      </p:nvGrpSpPr>
-      <p:grpSpPr>
-        <a:xfrm>
-          <a:off x="0" y="0"/>
-          <a:ext cx="0" cy="0"/>
-          <a:chOff x="0" y="0"/>
-          <a:chExt cx="0" cy="0"/>
-        </a:xfrm>
-      </p:grpSpPr>
-      <p:sp>
-        <p:nvSpPr>
-          <p:cNvPr id="2" name="Title 1"/>
-          <p:cNvSpPr>
-            <a:spLocks noGrp="1"/>
-          </p:cNvSpPr>
-          <p:nvPr>
-            <p:ph type="title"/>
-          </p:nvPr>
-        </p:nvSpPr>
-        <p:spPr/>
-        <p:txBody>
-          <a:bodyPr/>
-          <a:lstStyle/>
-          <a:p>
-            <a:r>
-              <a:rPr lang="en-NZ" dirty="0" smtClean="0"/>
-              <a:t>GENERATE RUN STATS</a:t>
-            </a:r>
-            <a:endParaRPr lang="en-NZ" dirty="0"/>
-          </a:p>
-        </p:txBody>
-      </p:sp>
-      <p:sp>
-        <p:nvSpPr>
-          <p:cNvPr id="3" name="Text Placeholder 2"/>
-          <p:cNvSpPr>
-            <a:spLocks noGrp="1"/>
-          </p:cNvSpPr>
-          <p:nvPr>
-            <p:ph type="body" idx="1"/>
-          </p:nvPr>
-        </p:nvSpPr>
-        <p:spPr/>
-        <p:txBody>
-          <a:bodyPr/>
-          <a:lstStyle/>
-          <a:p>
-            <a:endParaRPr lang="en-NZ"/>
-          </a:p>
-        </p:txBody>
-      </p:sp>
-    </p:spTree>
-  </p:cSld>
-  <p:clrMapOvr>
-    <a:masterClrMapping/>
-  </p:clrMapOvr>
-</p:sld>
-</file>
-
 <file path=ppt/slides/slide2.xml><?xml version="1.0" encoding="utf-8"?>
 <p:sld xmlns:a="http://schemas.openxmlformats.org/drawingml/2006/main" xmlns:r="http://schemas.openxmlformats.org/officeDocument/2006/relationships" xmlns:p="http://schemas.openxmlformats.org/presentationml/2006/main">
   <p:cSld>
@@ -8458,6 +8527,73 @@
       <p:sp>
         <p:nvSpPr>
           <p:cNvPr id="5" name="Text Placeholder 4"/>
+          <p:cNvSpPr>
+            <a:spLocks noGrp="1"/>
+          </p:cNvSpPr>
+          <p:nvPr>
+            <p:ph type="body" idx="1"/>
+          </p:nvPr>
+        </p:nvSpPr>
+        <p:spPr/>
+        <p:txBody>
+          <a:bodyPr/>
+          <a:lstStyle/>
+          <a:p>
+            <a:endParaRPr lang="en-NZ"/>
+          </a:p>
+        </p:txBody>
+      </p:sp>
+    </p:spTree>
+  </p:cSld>
+  <p:clrMapOvr>
+    <a:masterClrMapping/>
+  </p:clrMapOvr>
+</p:sld>
+</file>
+
+<file path=ppt/slides/slide20.xml><?xml version="1.0" encoding="utf-8"?>
+<p:sld xmlns:a="http://schemas.openxmlformats.org/drawingml/2006/main" xmlns:r="http://schemas.openxmlformats.org/officeDocument/2006/relationships" xmlns:p="http://schemas.openxmlformats.org/presentationml/2006/main">
+  <p:cSld>
+    <p:spTree>
+      <p:nvGrpSpPr>
+        <p:cNvPr id="1" name=""/>
+        <p:cNvGrpSpPr/>
+        <p:nvPr/>
+      </p:nvGrpSpPr>
+      <p:grpSpPr>
+        <a:xfrm>
+          <a:off x="0" y="0"/>
+          <a:ext cx="0" cy="0"/>
+          <a:chOff x="0" y="0"/>
+          <a:chExt cx="0" cy="0"/>
+        </a:xfrm>
+      </p:grpSpPr>
+      <p:sp>
+        <p:nvSpPr>
+          <p:cNvPr id="2" name="Title 1"/>
+          <p:cNvSpPr>
+            <a:spLocks noGrp="1"/>
+          </p:cNvSpPr>
+          <p:nvPr>
+            <p:ph type="title"/>
+          </p:nvPr>
+        </p:nvSpPr>
+        <p:spPr/>
+        <p:txBody>
+          <a:bodyPr/>
+          <a:lstStyle/>
+          <a:p>
+            <a:r>
+              <a:rPr lang="en-NZ" dirty="0" smtClean="0"/>
+              <a:t>GENERATE RUN STATS</a:t>
+            </a:r>
+            <a:endParaRPr lang="en-NZ" dirty="0"/>
+          </a:p>
+        </p:txBody>
+      </p:sp>
+      <p:sp>
+        <p:nvSpPr>
+          <p:cNvPr id="3" name="Text Placeholder 2"/>
           <p:cNvSpPr>
             <a:spLocks noGrp="1"/>
           </p:cNvSpPr>
@@ -8664,20 +8800,8 @@
           <a:lstStyle/>
           <a:p>
             <a:r>
-              <a:rPr lang="en-NZ" dirty="0" err="1" smtClean="0"/>
-              <a:t>Simframe</a:t>
-            </a:r>
-            <a:r>
-              <a:rPr lang="en-NZ" dirty="0" smtClean="0"/>
-              <a:t> environment (</a:t>
-            </a:r>
-            <a:r>
-              <a:rPr lang="en-NZ" dirty="0" err="1" smtClean="0"/>
-              <a:t>Simenv</a:t>
-            </a:r>
-            <a:r>
-              <a:rPr lang="en-NZ" dirty="0" smtClean="0"/>
-              <a:t>)</a:t>
+              <a:rPr lang="en-NZ" dirty="0" smtClean="0"/>
+              <a:t>Global environment contents</a:t>
             </a:r>
             <a:endParaRPr lang="en-NZ" dirty="0"/>
           </a:p>
@@ -8695,53 +8819,102 @@
         </p:nvSpPr>
         <p:spPr/>
         <p:txBody>
-          <a:bodyPr/>
+          <a:bodyPr>
+            <a:normAutofit fontScale="92500" lnSpcReduction="10000"/>
+          </a:bodyPr>
           <a:lstStyle/>
           <a:p>
             <a:r>
               <a:rPr lang="en-NZ" dirty="0" smtClean="0"/>
-              <a:t>A </a:t>
-            </a:r>
+              <a:t>Models</a:t>
+            </a:r>
+          </a:p>
+          <a:p>
+            <a:pPr lvl="1"/>
             <a:r>
               <a:rPr lang="en-NZ" dirty="0"/>
-              <a:t>simulation environment contains everything required to perform a simulation. </a:t>
+              <a:t> </a:t>
+            </a:r>
+            <a:r>
+              <a:rPr lang="en-NZ" dirty="0" smtClean="0"/>
+              <a:t>list of generalized linear models. These contain model equations, </a:t>
+            </a:r>
+            <a:r>
+              <a:rPr lang="en-NZ" dirty="0" err="1" smtClean="0"/>
+              <a:t>ie</a:t>
+            </a:r>
+            <a:r>
+              <a:rPr lang="en-NZ" dirty="0" smtClean="0"/>
+              <a:t>: variable names and their co-</a:t>
+            </a:r>
+            <a:r>
+              <a:rPr lang="en-NZ" dirty="0" err="1" smtClean="0"/>
+              <a:t>efficients</a:t>
+            </a:r>
+            <a:r>
+              <a:rPr lang="en-NZ" dirty="0"/>
+              <a:t>.</a:t>
             </a:r>
             <a:endParaRPr lang="en-NZ" dirty="0" smtClean="0"/>
           </a:p>
           <a:p>
             <a:r>
               <a:rPr lang="en-NZ" dirty="0" smtClean="0"/>
-              <a:t>Typically one </a:t>
-            </a:r>
-            <a:r>
-              <a:rPr lang="en-NZ" dirty="0" err="1"/>
-              <a:t>Simenv</a:t>
-            </a:r>
+              <a:t>Propensities</a:t>
+            </a:r>
+          </a:p>
+          <a:p>
+            <a:pPr lvl="1"/>
+            <a:r>
+              <a:rPr lang="en-NZ" dirty="0" smtClean="0"/>
+              <a:t>list of propensity arrays. A propensity array consists of:</a:t>
+            </a:r>
+          </a:p>
+          <a:p>
+            <a:pPr lvl="2"/>
             <a:r>
               <a:rPr lang="en-NZ" dirty="0"/>
-              <a:t> will be created </a:t>
-            </a:r>
-            <a:r>
-              <a:rPr lang="en-NZ" dirty="0" smtClean="0"/>
-              <a:t>and </a:t>
-            </a:r>
+              <a:t>rows - the individual </a:t>
+            </a:r>
+            <a:r>
+              <a:rPr lang="en-NZ" dirty="0" smtClean="0"/>
+              <a:t>micro-units</a:t>
+            </a:r>
+          </a:p>
+          <a:p>
+            <a:pPr lvl="2"/>
             <a:r>
               <a:rPr lang="en-NZ" dirty="0"/>
-              <a:t>used to run a base simulation, and additional </a:t>
-            </a:r>
-            <a:r>
-              <a:rPr lang="en-NZ" dirty="0" err="1"/>
-              <a:t>Simenvs</a:t>
-            </a:r>
+              <a:t>cols - categories, with one less column than the total number of </a:t>
+            </a:r>
+            <a:r>
+              <a:rPr lang="en-NZ" dirty="0" smtClean="0"/>
+              <a:t>categories</a:t>
+            </a:r>
+          </a:p>
+          <a:p>
+            <a:pPr lvl="2"/>
             <a:r>
               <a:rPr lang="en-NZ" dirty="0"/>
-              <a:t> will be created to test different scenarios.</a:t>
+              <a:t>z dim - iterations/years</a:t>
+            </a:r>
+            <a:endParaRPr lang="en-NZ" dirty="0" smtClean="0"/>
+          </a:p>
+          <a:p>
+            <a:r>
+              <a:rPr lang="en-NZ" dirty="0" smtClean="0"/>
+              <a:t>Simulation environments</a:t>
             </a:r>
             <a:endParaRPr lang="en-NZ" dirty="0"/>
           </a:p>
         </p:txBody>
       </p:sp>
     </p:spTree>
+    <p:extLst>
+      <p:ext uri="{BB962C8B-B14F-4D97-AF65-F5344CB8AC3E}">
+        <p14:creationId xmlns:p14="http://schemas.microsoft.com/office/powerpoint/2010/main" val="160132860"/>
+      </p:ext>
+    </p:extLst>
   </p:cSld>
   <p:clrMapOvr>
     <a:masterClrMapping/>
@@ -8768,7 +8941,7 @@
       </p:grpSpPr>
       <p:sp>
         <p:nvSpPr>
-          <p:cNvPr id="2" name="Title 1"/>
+          <p:cNvPr id="4" name="Title 3"/>
           <p:cNvSpPr>
             <a:spLocks noGrp="1"/>
           </p:cNvSpPr>
@@ -8782,8 +8955,20 @@
           <a:lstStyle/>
           <a:p>
             <a:r>
-              <a:rPr lang="en-NZ" dirty="0" smtClean="0"/>
-              <a:t>Simulation environment contents</a:t>
+              <a:rPr lang="en-NZ" dirty="0" err="1" smtClean="0"/>
+              <a:t>Simframe</a:t>
+            </a:r>
+            <a:r>
+              <a:rPr lang="en-NZ" dirty="0" smtClean="0"/>
+              <a:t> environment (</a:t>
+            </a:r>
+            <a:r>
+              <a:rPr lang="en-NZ" dirty="0" err="1" smtClean="0"/>
+              <a:t>Simenv</a:t>
+            </a:r>
+            <a:r>
+              <a:rPr lang="en-NZ" dirty="0" smtClean="0"/>
+              <a:t>)</a:t>
             </a:r>
             <a:endParaRPr lang="en-NZ" dirty="0"/>
           </a:p>
@@ -8791,7 +8976,7 @@
       </p:sp>
       <p:sp>
         <p:nvSpPr>
-          <p:cNvPr id="3" name="Content Placeholder 2"/>
+          <p:cNvPr id="5" name="Content Placeholder 4"/>
           <p:cNvSpPr>
             <a:spLocks noGrp="1"/>
           </p:cNvSpPr>
@@ -8801,124 +8986,52 @@
         </p:nvSpPr>
         <p:spPr/>
         <p:txBody>
-          <a:bodyPr>
-            <a:normAutofit fontScale="62500" lnSpcReduction="20000"/>
-          </a:bodyPr>
+          <a:bodyPr/>
           <a:lstStyle/>
           <a:p>
             <a:r>
               <a:rPr lang="en-NZ" dirty="0" smtClean="0"/>
-              <a:t>name</a:t>
-            </a:r>
-          </a:p>
-          <a:p>
-            <a:r>
-              <a:rPr lang="en-NZ" dirty="0" err="1" smtClean="0"/>
-              <a:t>runs_simulated</a:t>
+              <a:t>A </a:t>
+            </a:r>
+            <a:r>
+              <a:rPr lang="en-NZ" dirty="0"/>
+              <a:t>simulation environment contains everything required to perform a simulation. </a:t>
             </a:r>
             <a:endParaRPr lang="en-NZ" dirty="0" smtClean="0"/>
           </a:p>
           <a:p>
-            <a:pPr lvl="1"/>
-            <a:r>
-              <a:rPr lang="en-NZ" dirty="0" smtClean="0"/>
-              <a:t>incremented during the simulation process</a:t>
-            </a:r>
-          </a:p>
-          <a:p>
-            <a:r>
-              <a:rPr lang="en-NZ" dirty="0" err="1" smtClean="0"/>
-              <a:t>dict</a:t>
-            </a:r>
-            <a:endParaRPr lang="en-NZ" dirty="0" smtClean="0"/>
-          </a:p>
-          <a:p>
-            <a:pPr lvl="1"/>
-            <a:r>
-              <a:rPr lang="en-NZ" dirty="0" smtClean="0"/>
-              <a:t>the data dictionary for the whole simulation</a:t>
-            </a:r>
-          </a:p>
-          <a:p>
-            <a:r>
-              <a:rPr lang="en-NZ" dirty="0" err="1" smtClean="0"/>
-              <a:t>Simframe</a:t>
-            </a:r>
-            <a:endParaRPr lang="en-NZ" dirty="0" smtClean="0"/>
-          </a:p>
-          <a:p>
-            <a:r>
-              <a:rPr lang="en-NZ" dirty="0" err="1" smtClean="0"/>
-              <a:t>cat.adjustments</a:t>
-            </a:r>
-            <a:endParaRPr lang="en-NZ" dirty="0" smtClean="0"/>
-          </a:p>
-          <a:p>
-            <a:pPr lvl="1"/>
-            <a:r>
-              <a:rPr lang="en-NZ" dirty="0" smtClean="0"/>
-              <a:t>adjustments applied to categorical variables before and during the simulation</a:t>
-            </a:r>
-          </a:p>
-          <a:p>
+            <a:r>
+              <a:rPr lang="en-NZ" dirty="0" smtClean="0"/>
+              <a:t>Typically one </a:t>
+            </a:r>
             <a:r>
               <a:rPr lang="en-NZ" dirty="0" err="1"/>
-              <a:t>p</a:t>
-            </a:r>
-            <a:r>
-              <a:rPr lang="en-NZ" dirty="0" err="1" smtClean="0"/>
-              <a:t>resim.stats</a:t>
-            </a:r>
-            <a:endParaRPr lang="en-NZ" dirty="0"/>
-          </a:p>
-          <a:p>
-            <a:pPr lvl="1"/>
-            <a:r>
-              <a:rPr lang="en-NZ" dirty="0" smtClean="0"/>
-              <a:t>stats generated after adjustment but before simulation begins. Typically these will be descriptive statistics of input variables that don’t change </a:t>
-            </a:r>
-            <a:r>
-              <a:rPr lang="en-NZ" dirty="0" err="1" smtClean="0"/>
-              <a:t>eg</a:t>
-            </a:r>
-            <a:r>
-              <a:rPr lang="en-NZ" dirty="0" smtClean="0"/>
-              <a:t>: gender, ethnicity</a:t>
-            </a:r>
-          </a:p>
-          <a:p>
+              <a:t>Simenv</a:t>
+            </a:r>
             <a:r>
               <a:rPr lang="en-NZ" dirty="0"/>
-              <a:t>m</a:t>
-            </a:r>
-            <a:r>
-              <a:rPr lang="en-NZ" dirty="0" smtClean="0"/>
-              <a:t>odules</a:t>
-            </a:r>
-          </a:p>
-          <a:p>
-            <a:pPr lvl="1"/>
-            <a:r>
-              <a:rPr lang="en-NZ" dirty="0" smtClean="0"/>
-              <a:t>one or more simulation modules (</a:t>
-            </a:r>
-            <a:r>
-              <a:rPr lang="en-NZ" dirty="0" err="1" smtClean="0"/>
-              <a:t>Simmodule</a:t>
-            </a:r>
-            <a:r>
-              <a:rPr lang="en-NZ" dirty="0" smtClean="0"/>
-              <a:t>)</a:t>
+              <a:t> will be created </a:t>
+            </a:r>
+            <a:r>
+              <a:rPr lang="en-NZ" dirty="0" smtClean="0"/>
+              <a:t>and </a:t>
+            </a:r>
+            <a:r>
+              <a:rPr lang="en-NZ" dirty="0"/>
+              <a:t>used to run a base simulation, and additional </a:t>
+            </a:r>
+            <a:r>
+              <a:rPr lang="en-NZ" dirty="0" err="1"/>
+              <a:t>Simenvs</a:t>
+            </a:r>
+            <a:r>
+              <a:rPr lang="en-NZ" dirty="0"/>
+              <a:t> will be created to test different scenarios.</a:t>
             </a:r>
           </a:p>
         </p:txBody>
       </p:sp>
     </p:spTree>
-    <p:extLst>
-      <p:ext uri="{BB962C8B-B14F-4D97-AF65-F5344CB8AC3E}">
-        <p14:creationId xmlns:p14="http://schemas.microsoft.com/office/powerpoint/2010/main" val="647059191"/>
-      </p:ext>
-    </p:extLst>
   </p:cSld>
   <p:clrMapOvr>
     <a:masterClrMapping/>
@@ -8960,7 +9073,7 @@
           <a:p>
             <a:r>
               <a:rPr lang="en-NZ" dirty="0" smtClean="0"/>
-              <a:t>Data dictionary</a:t>
+              <a:t>Simulation environment contents</a:t>
             </a:r>
             <a:endParaRPr lang="en-NZ" dirty="0"/>
           </a:p>
@@ -8979,110 +9092,113 @@
         <p:spPr/>
         <p:txBody>
           <a:bodyPr>
-            <a:normAutofit fontScale="92500" lnSpcReduction="10000"/>
+            <a:normAutofit fontScale="62500" lnSpcReduction="20000"/>
           </a:bodyPr>
           <a:lstStyle/>
           <a:p>
             <a:r>
               <a:rPr lang="en-NZ" dirty="0" smtClean="0"/>
-              <a:t>Contains </a:t>
-            </a:r>
+              <a:t>name</a:t>
+            </a:r>
+          </a:p>
+          <a:p>
             <a:r>
               <a:rPr lang="en-NZ" dirty="0" err="1" smtClean="0"/>
-              <a:t>vardesc</a:t>
-            </a:r>
-            <a:r>
-              <a:rPr lang="en-NZ" dirty="0" smtClean="0"/>
-              <a:t>, and </a:t>
-            </a:r>
+              <a:t>runs_simulated</a:t>
+            </a:r>
+            <a:endParaRPr lang="en-NZ" dirty="0" smtClean="0"/>
+          </a:p>
+          <a:p>
+            <a:pPr lvl="1"/>
+            <a:r>
+              <a:rPr lang="en-NZ" dirty="0" smtClean="0"/>
+              <a:t>incremented during the simulation process</a:t>
+            </a:r>
+          </a:p>
+          <a:p>
             <a:r>
               <a:rPr lang="en-NZ" dirty="0" err="1" smtClean="0"/>
-              <a:t>codings</a:t>
-            </a:r>
-            <a:r>
-              <a:rPr lang="en-NZ" dirty="0" smtClean="0"/>
-              <a:t>. Both are loaded from a file</a:t>
-            </a:r>
-          </a:p>
-          <a:p>
-            <a:r>
-              <a:rPr lang="en-NZ" dirty="0" smtClean="0"/>
-              <a:t>descriptions</a:t>
-            </a:r>
+              <a:t>dict</a:t>
+            </a:r>
+            <a:endParaRPr lang="en-NZ" dirty="0" smtClean="0"/>
           </a:p>
           <a:p>
             <a:pPr lvl="1"/>
             <a:r>
               <a:rPr lang="en-NZ" dirty="0" smtClean="0"/>
-              <a:t>a vector of variable descriptions, named with variable names</a:t>
-            </a:r>
-          </a:p>
-          <a:p>
-            <a:pPr lvl="2"/>
+              <a:t>the data dictionary for the whole simulation</a:t>
+            </a:r>
+          </a:p>
+          <a:p>
+            <a:r>
+              <a:rPr lang="en-NZ" dirty="0" err="1" smtClean="0"/>
+              <a:t>Simframe</a:t>
+            </a:r>
+            <a:endParaRPr lang="en-NZ" dirty="0" smtClean="0"/>
+          </a:p>
+          <a:p>
+            <a:r>
+              <a:rPr lang="en-NZ" dirty="0" err="1" smtClean="0"/>
+              <a:t>cat.adjustments</a:t>
+            </a:r>
+            <a:endParaRPr lang="en-NZ" dirty="0" smtClean="0"/>
+          </a:p>
+          <a:p>
+            <a:pPr lvl="1"/>
+            <a:r>
+              <a:rPr lang="en-NZ" dirty="0" smtClean="0"/>
+              <a:t>adjustments applied to categorical variables before and during the simulation</a:t>
+            </a:r>
+          </a:p>
+          <a:p>
+            <a:r>
+              <a:rPr lang="en-NZ" dirty="0" err="1"/>
+              <a:t>p</a:t>
+            </a:r>
+            <a:r>
+              <a:rPr lang="en-NZ" dirty="0" err="1" smtClean="0"/>
+              <a:t>resim.stats</a:t>
+            </a:r>
+            <a:endParaRPr lang="en-NZ" dirty="0"/>
+          </a:p>
+          <a:p>
+            <a:pPr lvl="1"/>
+            <a:r>
+              <a:rPr lang="en-NZ" dirty="0" smtClean="0"/>
+              <a:t>stats generated after adjustment but before simulation begins. Typically these will be descriptive statistics of input variables that don’t change </a:t>
+            </a:r>
             <a:r>
               <a:rPr lang="en-NZ" dirty="0" err="1" smtClean="0"/>
               <a:t>eg</a:t>
             </a:r>
             <a:r>
               <a:rPr lang="en-NZ" dirty="0" smtClean="0"/>
-              <a:t>: c(“</a:t>
+              <a:t>: gender, ethnicity</a:t>
+            </a:r>
+          </a:p>
+          <a:p>
+            <a:r>
+              <a:rPr lang="en-NZ" dirty="0"/>
+              <a:t>m</a:t>
+            </a:r>
+            <a:r>
+              <a:rPr lang="en-NZ" dirty="0" smtClean="0"/>
+              <a:t>odules</a:t>
+            </a:r>
+          </a:p>
+          <a:p>
+            <a:pPr lvl="1"/>
+            <a:r>
+              <a:rPr lang="en-NZ" dirty="0" smtClean="0"/>
+              <a:t>one or more simulation modules (</a:t>
             </a:r>
             <a:r>
               <a:rPr lang="en-NZ" dirty="0" err="1" smtClean="0"/>
-              <a:t>bwkg</a:t>
-            </a:r>
-            <a:r>
-              <a:rPr lang="en-NZ" dirty="0" smtClean="0"/>
-              <a:t>”=“Birth weight (g)”, “</a:t>
-            </a:r>
-            <a:r>
-              <a:rPr lang="en-NZ" dirty="0" err="1" smtClean="0"/>
-              <a:t>chkids</a:t>
-            </a:r>
-            <a:r>
-              <a:rPr lang="en-NZ" dirty="0" smtClean="0"/>
-              <a:t>”=“Change in kids”)</a:t>
-            </a:r>
-          </a:p>
-          <a:p>
-            <a:r>
-              <a:rPr lang="en-NZ" dirty="0" err="1" smtClean="0"/>
-              <a:t>codings</a:t>
-            </a:r>
-            <a:endParaRPr lang="en-NZ" dirty="0" smtClean="0"/>
-          </a:p>
-          <a:p>
-            <a:pPr lvl="1"/>
-            <a:r>
-              <a:rPr lang="en-NZ" dirty="0" smtClean="0"/>
-              <a:t>a list of category names for categorical variables</a:t>
-            </a:r>
-          </a:p>
-          <a:p>
-            <a:pPr lvl="2"/>
-            <a:r>
-              <a:rPr lang="en-NZ" dirty="0" err="1" smtClean="0"/>
-              <a:t>eg</a:t>
-            </a:r>
-            <a:r>
-              <a:rPr lang="en-NZ" dirty="0" smtClean="0"/>
-              <a:t>: list(SESBTH=c(“Professional”=1, “Clerical”=2), gender=c(“F”=</a:t>
-            </a:r>
-            <a:r>
-              <a:rPr lang="en-NZ" dirty="0"/>
-              <a:t>0</a:t>
-            </a:r>
-            <a:r>
-              <a:rPr lang="en-NZ" dirty="0" smtClean="0"/>
-              <a:t>, “</a:t>
-            </a:r>
-            <a:r>
-              <a:rPr lang="en-NZ" dirty="0"/>
-              <a:t>M</a:t>
-            </a:r>
-            <a:r>
-              <a:rPr lang="en-NZ" dirty="0" smtClean="0"/>
-              <a:t>”=1)</a:t>
+              <a:t>Simmodule</a:t>
+            </a:r>
+            <a:r>
+              <a:rPr lang="en-NZ" dirty="0" smtClean="0"/>
+              <a:t>)</a:t>
             </a:r>
           </a:p>
         </p:txBody>
@@ -9090,7 +9206,7 @@
     </p:spTree>
     <p:extLst>
       <p:ext uri="{BB962C8B-B14F-4D97-AF65-F5344CB8AC3E}">
-        <p14:creationId xmlns:p14="http://schemas.microsoft.com/office/powerpoint/2010/main" val="3229340986"/>
+        <p14:creationId xmlns:p14="http://schemas.microsoft.com/office/powerpoint/2010/main" val="647059191"/>
       </p:ext>
     </p:extLst>
   </p:cSld>
@@ -9134,7 +9250,7 @@
           <a:p>
             <a:r>
               <a:rPr lang="en-NZ" dirty="0" smtClean="0"/>
-              <a:t>Categorical adjustments	</a:t>
+              <a:t>Data dictionary</a:t>
             </a:r>
             <a:endParaRPr lang="en-NZ" dirty="0"/>
           </a:p>
@@ -9153,226 +9269,118 @@
         <p:spPr/>
         <p:txBody>
           <a:bodyPr>
-            <a:normAutofit/>
+            <a:normAutofit fontScale="92500" lnSpcReduction="10000"/>
           </a:bodyPr>
           <a:lstStyle/>
           <a:p>
             <a:r>
               <a:rPr lang="en-NZ" dirty="0" smtClean="0"/>
-              <a:t>Before or during the simulation the user may wish to specify the proportion of category values desired for a </a:t>
+              <a:t>Contains </a:t>
             </a:r>
             <a:r>
               <a:rPr lang="en-NZ" dirty="0" err="1" smtClean="0"/>
-              <a:t>simframe</a:t>
-            </a:r>
-            <a:r>
-              <a:rPr lang="en-NZ" dirty="0" smtClean="0"/>
-              <a:t> variable</a:t>
+              <a:t>vardesc</a:t>
+            </a:r>
+            <a:r>
+              <a:rPr lang="en-NZ" dirty="0" smtClean="0"/>
+              <a:t>, and </a:t>
+            </a:r>
+            <a:r>
+              <a:rPr lang="en-NZ" dirty="0" err="1" smtClean="0"/>
+              <a:t>codings</a:t>
+            </a:r>
+            <a:r>
+              <a:rPr lang="en-NZ" dirty="0" smtClean="0"/>
+              <a:t>. Both are loaded from a file</a:t>
+            </a:r>
+          </a:p>
+          <a:p>
+            <a:r>
+              <a:rPr lang="en-NZ" dirty="0" smtClean="0"/>
+              <a:t>descriptions</a:t>
             </a:r>
           </a:p>
           <a:p>
             <a:pPr lvl="1"/>
             <a:r>
-              <a:rPr lang="en-NZ" dirty="0" err="1" smtClean="0"/>
-              <a:t>Eg</a:t>
-            </a:r>
-            <a:r>
-              <a:rPr lang="en-NZ" dirty="0" smtClean="0"/>
-              <a:t>: a user may wish the proportion of home owners in year 2 to be 0.4, 0.6</a:t>
-            </a:r>
-          </a:p>
-          <a:p>
-            <a:r>
-              <a:rPr lang="en-NZ" dirty="0" smtClean="0"/>
-              <a:t>Desired proportions can be specified in a categorical adjustment matrix, </a:t>
-            </a:r>
+              <a:rPr lang="en-NZ" dirty="0" smtClean="0"/>
+              <a:t>a vector of variable descriptions, named with variable names</a:t>
+            </a:r>
+          </a:p>
+          <a:p>
+            <a:pPr lvl="2"/>
             <a:r>
               <a:rPr lang="en-NZ" dirty="0" err="1" smtClean="0"/>
               <a:t>eg</a:t>
             </a:r>
             <a:r>
               <a:rPr lang="en-NZ" dirty="0" smtClean="0"/>
-              <a:t>:</a:t>
-            </a:r>
-          </a:p>
-          <a:p>
+              <a:t>: c(“</a:t>
+            </a:r>
+            <a:r>
+              <a:rPr lang="en-NZ" dirty="0" err="1" smtClean="0"/>
+              <a:t>bwkg</a:t>
+            </a:r>
+            <a:r>
+              <a:rPr lang="en-NZ" dirty="0" smtClean="0"/>
+              <a:t>”=“Birth weight (g)”, “</a:t>
+            </a:r>
+            <a:r>
+              <a:rPr lang="en-NZ" dirty="0" err="1" smtClean="0"/>
+              <a:t>chkids</a:t>
+            </a:r>
+            <a:r>
+              <a:rPr lang="en-NZ" dirty="0" smtClean="0"/>
+              <a:t>”=“Change in kids”)</a:t>
+            </a:r>
+          </a:p>
+          <a:p>
+            <a:r>
+              <a:rPr lang="en-NZ" dirty="0" err="1" smtClean="0"/>
+              <a:t>codings</a:t>
+            </a:r>
             <a:endParaRPr lang="en-NZ" dirty="0" smtClean="0"/>
           </a:p>
           <a:p>
             <a:pPr lvl="1"/>
-            <a:endParaRPr lang="en-NZ" dirty="0" smtClean="0"/>
-          </a:p>
-        </p:txBody>
-      </p:sp>
-      <p:graphicFrame>
-        <p:nvGraphicFramePr>
-          <p:cNvPr id="4" name="Table 3"/>
-          <p:cNvGraphicFramePr>
-            <a:graphicFrameLocks noGrp="1"/>
-          </p:cNvGraphicFramePr>
-          <p:nvPr>
-            <p:extLst>
-              <p:ext uri="{D42A27DB-BD31-4B8C-83A1-F6EECF244321}">
-                <p14:modId xmlns:p14="http://schemas.microsoft.com/office/powerpoint/2010/main" val="1728243183"/>
-              </p:ext>
-            </p:extLst>
-          </p:nvPr>
-        </p:nvGraphicFramePr>
-        <p:xfrm>
-          <a:off x="1331640" y="5373216"/>
-          <a:ext cx="6096000" cy="1112520"/>
-        </p:xfrm>
-        <a:graphic>
-          <a:graphicData uri="http://schemas.openxmlformats.org/drawingml/2006/table">
-            <a:tbl>
-              <a:tblPr firstRow="1" bandRow="1">
-                <a:tableStyleId>{5C22544A-7EE6-4342-B048-85BDC9FD1C3A}</a:tableStyleId>
-              </a:tblPr>
-              <a:tblGrid>
-                <a:gridCol w="2032000"/>
-                <a:gridCol w="2032000"/>
-                <a:gridCol w="2032000"/>
-              </a:tblGrid>
-              <a:tr h="370840">
-                <a:tc>
-                  <a:txBody>
-                    <a:bodyPr/>
-                    <a:lstStyle/>
-                    <a:p>
-                      <a:r>
-                        <a:rPr lang="en-NZ" dirty="0" smtClean="0"/>
-                        <a:t>Iteration</a:t>
-                      </a:r>
-                      <a:endParaRPr lang="en-NZ" dirty="0"/>
-                    </a:p>
-                  </a:txBody>
-                  <a:tcPr/>
-                </a:tc>
-                <a:tc>
-                  <a:txBody>
-                    <a:bodyPr/>
-                    <a:lstStyle/>
-                    <a:p>
-                      <a:r>
-                        <a:rPr lang="en-NZ" dirty="0" smtClean="0"/>
-                        <a:t>Own home</a:t>
-                      </a:r>
-                      <a:endParaRPr lang="en-NZ" dirty="0"/>
-                    </a:p>
-                  </a:txBody>
-                  <a:tcPr/>
-                </a:tc>
-                <a:tc>
-                  <a:txBody>
-                    <a:bodyPr/>
-                    <a:lstStyle/>
-                    <a:p>
-                      <a:r>
-                        <a:rPr lang="en-NZ" dirty="0" smtClean="0"/>
-                        <a:t>Rents</a:t>
-                      </a:r>
-                      <a:endParaRPr lang="en-NZ" dirty="0"/>
-                    </a:p>
-                  </a:txBody>
-                  <a:tcPr/>
-                </a:tc>
-              </a:tr>
-              <a:tr h="370840">
-                <a:tc>
-                  <a:txBody>
-                    <a:bodyPr/>
-                    <a:lstStyle/>
-                    <a:p>
-                      <a:r>
-                        <a:rPr lang="en-NZ" dirty="0" smtClean="0"/>
-                        <a:t>1</a:t>
-                      </a:r>
-                      <a:endParaRPr lang="en-NZ" dirty="0"/>
-                    </a:p>
-                  </a:txBody>
-                  <a:tcPr/>
-                </a:tc>
-                <a:tc>
-                  <a:txBody>
-                    <a:bodyPr/>
-                    <a:lstStyle/>
-                    <a:p>
-                      <a:r>
-                        <a:rPr lang="en-NZ" dirty="0" smtClean="0"/>
-                        <a:t>NA</a:t>
-                      </a:r>
-                      <a:endParaRPr lang="en-NZ" dirty="0"/>
-                    </a:p>
-                  </a:txBody>
-                  <a:tcPr/>
-                </a:tc>
-                <a:tc>
-                  <a:txBody>
-                    <a:bodyPr/>
-                    <a:lstStyle/>
-                    <a:p>
-                      <a:r>
-                        <a:rPr lang="en-NZ" dirty="0" smtClean="0"/>
-                        <a:t>NA</a:t>
-                      </a:r>
-                      <a:endParaRPr lang="en-NZ" dirty="0"/>
-                    </a:p>
-                  </a:txBody>
-                  <a:tcPr/>
-                </a:tc>
-              </a:tr>
-              <a:tr h="370840">
-                <a:tc>
-                  <a:txBody>
-                    <a:bodyPr/>
-                    <a:lstStyle/>
-                    <a:p>
-                      <a:r>
-                        <a:rPr lang="en-NZ" dirty="0" smtClean="0"/>
-                        <a:t>2</a:t>
-                      </a:r>
-                      <a:endParaRPr lang="en-NZ" dirty="0"/>
-                    </a:p>
-                  </a:txBody>
-                  <a:tcPr/>
-                </a:tc>
-                <a:tc>
-                  <a:txBody>
-                    <a:bodyPr/>
-                    <a:lstStyle/>
-                    <a:p>
-                      <a:r>
-                        <a:rPr lang="en-NZ" dirty="0" smtClean="0"/>
-                        <a:t>0.4</a:t>
-                      </a:r>
-                      <a:endParaRPr lang="en-NZ" dirty="0"/>
-                    </a:p>
-                  </a:txBody>
-                  <a:tcPr/>
-                </a:tc>
-                <a:tc>
-                  <a:txBody>
-                    <a:bodyPr/>
-                    <a:lstStyle/>
-                    <a:p>
-                      <a:r>
-                        <a:rPr lang="en-NZ" dirty="0" smtClean="0"/>
-                        <a:t>0.6</a:t>
-                      </a:r>
-                      <a:endParaRPr lang="en-NZ" dirty="0"/>
-                    </a:p>
-                  </a:txBody>
-                  <a:tcPr/>
-                </a:tc>
-              </a:tr>
-            </a:tbl>
-          </a:graphicData>
-        </a:graphic>
-      </p:graphicFrame>
+            <a:r>
+              <a:rPr lang="en-NZ" dirty="0" smtClean="0"/>
+              <a:t>a list of category names for categorical variables</a:t>
+            </a:r>
+          </a:p>
+          <a:p>
+            <a:pPr lvl="2"/>
+            <a:r>
+              <a:rPr lang="en-NZ" dirty="0" err="1" smtClean="0"/>
+              <a:t>eg</a:t>
+            </a:r>
+            <a:r>
+              <a:rPr lang="en-NZ" dirty="0" smtClean="0"/>
+              <a:t>: list(SESBTH=c(“Professional”=1, “Clerical”=2), gender=c(“F”=</a:t>
+            </a:r>
+            <a:r>
+              <a:rPr lang="en-NZ" dirty="0"/>
+              <a:t>0</a:t>
+            </a:r>
+            <a:r>
+              <a:rPr lang="en-NZ" dirty="0" smtClean="0"/>
+              <a:t>, “</a:t>
+            </a:r>
+            <a:r>
+              <a:rPr lang="en-NZ" dirty="0"/>
+              <a:t>M</a:t>
+            </a:r>
+            <a:r>
+              <a:rPr lang="en-NZ" dirty="0" smtClean="0"/>
+              <a:t>”=1)</a:t>
+            </a:r>
+          </a:p>
+        </p:txBody>
+      </p:sp>
     </p:spTree>
     <p:extLst>
       <p:ext uri="{BB962C8B-B14F-4D97-AF65-F5344CB8AC3E}">
-        <p14:creationId xmlns:p14="http://schemas.microsoft.com/office/powerpoint/2010/main" val="2426780635"/>
+        <p14:creationId xmlns:p14="http://schemas.microsoft.com/office/powerpoint/2010/main" val="3229340986"/>
       </p:ext>
     </p:extLst>
   </p:cSld>
@@ -9435,83 +9443,226 @@
         <p:spPr/>
         <p:txBody>
           <a:bodyPr>
-            <a:normAutofit fontScale="92500" lnSpcReduction="10000"/>
+            <a:normAutofit/>
           </a:bodyPr>
           <a:lstStyle/>
           <a:p>
             <a:r>
               <a:rPr lang="en-NZ" dirty="0" smtClean="0"/>
-              <a:t>In the above example instead of simulating the home ownership variable in year 2, it will be set to the desired proportions 0.4, 0.6 </a:t>
-            </a:r>
-          </a:p>
-          <a:p>
-            <a:r>
-              <a:rPr lang="en-NZ" dirty="0" smtClean="0"/>
-              <a:t>A </a:t>
-            </a:r>
-            <a:r>
-              <a:rPr lang="en-NZ" dirty="0"/>
-              <a:t>desired proportion of NA </a:t>
-            </a:r>
-            <a:r>
-              <a:rPr lang="en-NZ" dirty="0" smtClean="0"/>
-              <a:t>will leave the variable unchanged</a:t>
-            </a:r>
-            <a:endParaRPr lang="en-NZ" dirty="0"/>
-          </a:p>
-          <a:p>
-            <a:r>
-              <a:rPr lang="en-NZ" dirty="0"/>
-              <a:t>If propensities are supplied </a:t>
-            </a:r>
-            <a:r>
-              <a:rPr lang="en-NZ" dirty="0" smtClean="0"/>
-              <a:t>they </a:t>
-            </a:r>
-            <a:r>
-              <a:rPr lang="en-NZ" dirty="0"/>
-              <a:t>will be used to select </a:t>
-            </a:r>
-            <a:r>
-              <a:rPr lang="en-NZ" dirty="0" smtClean="0"/>
-              <a:t>which micro-units </a:t>
-            </a:r>
-            <a:r>
-              <a:rPr lang="en-NZ" dirty="0"/>
-              <a:t>to </a:t>
-            </a:r>
-            <a:r>
-              <a:rPr lang="en-NZ" dirty="0" smtClean="0"/>
-              <a:t>adjust, otherwise the selection will be random</a:t>
+              <a:t>Before or during the simulation the user may wish to specify the proportion of category values desired for a </a:t>
+            </a:r>
+            <a:r>
+              <a:rPr lang="en-NZ" dirty="0" err="1" smtClean="0"/>
+              <a:t>simframe</a:t>
+            </a:r>
+            <a:r>
+              <a:rPr lang="en-NZ" dirty="0" smtClean="0"/>
+              <a:t> variable</a:t>
             </a:r>
           </a:p>
           <a:p>
             <a:pPr lvl="1"/>
             <a:r>
-              <a:rPr lang="en-NZ" dirty="0" smtClean="0"/>
-              <a:t>Propensities are specified via the global list variable </a:t>
-            </a:r>
-            <a:r>
-              <a:rPr lang="en-NZ" sz="2400" dirty="0" err="1" smtClean="0">
-                <a:latin typeface="Courier New" pitchFamily="49" charset="0"/>
-                <a:cs typeface="Courier New" pitchFamily="49" charset="0"/>
-              </a:rPr>
-              <a:t>propens.all</a:t>
-            </a:r>
-            <a:endParaRPr lang="en-NZ" sz="2400" dirty="0">
-              <a:latin typeface="Courier New" pitchFamily="49" charset="0"/>
-              <a:cs typeface="Courier New" pitchFamily="49" charset="0"/>
-            </a:endParaRPr>
-          </a:p>
-          <a:p>
-            <a:endParaRPr lang="en-NZ" dirty="0"/>
-          </a:p>
-        </p:txBody>
-      </p:sp>
+              <a:rPr lang="en-NZ" dirty="0" err="1" smtClean="0"/>
+              <a:t>Eg</a:t>
+            </a:r>
+            <a:r>
+              <a:rPr lang="en-NZ" dirty="0" smtClean="0"/>
+              <a:t>: a user may wish the proportion of home owners in year 2 to be 0.4, 0.6</a:t>
+            </a:r>
+          </a:p>
+          <a:p>
+            <a:r>
+              <a:rPr lang="en-NZ" dirty="0" smtClean="0"/>
+              <a:t>Desired proportions can be specified in a categorical adjustment matrix, </a:t>
+            </a:r>
+            <a:r>
+              <a:rPr lang="en-NZ" dirty="0" err="1" smtClean="0"/>
+              <a:t>eg</a:t>
+            </a:r>
+            <a:r>
+              <a:rPr lang="en-NZ" dirty="0" smtClean="0"/>
+              <a:t>:</a:t>
+            </a:r>
+          </a:p>
+          <a:p>
+            <a:endParaRPr lang="en-NZ" dirty="0" smtClean="0"/>
+          </a:p>
+          <a:p>
+            <a:pPr lvl="1"/>
+            <a:endParaRPr lang="en-NZ" dirty="0" smtClean="0"/>
+          </a:p>
+        </p:txBody>
+      </p:sp>
+      <p:graphicFrame>
+        <p:nvGraphicFramePr>
+          <p:cNvPr id="4" name="Table 3"/>
+          <p:cNvGraphicFramePr>
+            <a:graphicFrameLocks noGrp="1"/>
+          </p:cNvGraphicFramePr>
+          <p:nvPr>
+            <p:extLst>
+              <p:ext uri="{D42A27DB-BD31-4B8C-83A1-F6EECF244321}">
+                <p14:modId xmlns:p14="http://schemas.microsoft.com/office/powerpoint/2010/main" val="1728243183"/>
+              </p:ext>
+            </p:extLst>
+          </p:nvPr>
+        </p:nvGraphicFramePr>
+        <p:xfrm>
+          <a:off x="1331640" y="5373216"/>
+          <a:ext cx="6096000" cy="1112520"/>
+        </p:xfrm>
+        <a:graphic>
+          <a:graphicData uri="http://schemas.openxmlformats.org/drawingml/2006/table">
+            <a:tbl>
+              <a:tblPr firstRow="1" bandRow="1">
+                <a:tableStyleId>{5C22544A-7EE6-4342-B048-85BDC9FD1C3A}</a:tableStyleId>
+              </a:tblPr>
+              <a:tblGrid>
+                <a:gridCol w="2032000"/>
+                <a:gridCol w="2032000"/>
+                <a:gridCol w="2032000"/>
+              </a:tblGrid>
+              <a:tr h="370840">
+                <a:tc>
+                  <a:txBody>
+                    <a:bodyPr/>
+                    <a:lstStyle/>
+                    <a:p>
+                      <a:r>
+                        <a:rPr lang="en-NZ" dirty="0" smtClean="0"/>
+                        <a:t>Iteration</a:t>
+                      </a:r>
+                      <a:endParaRPr lang="en-NZ" dirty="0"/>
+                    </a:p>
+                  </a:txBody>
+                  <a:tcPr/>
+                </a:tc>
+                <a:tc>
+                  <a:txBody>
+                    <a:bodyPr/>
+                    <a:lstStyle/>
+                    <a:p>
+                      <a:r>
+                        <a:rPr lang="en-NZ" dirty="0" smtClean="0"/>
+                        <a:t>Own home</a:t>
+                      </a:r>
+                      <a:endParaRPr lang="en-NZ" dirty="0"/>
+                    </a:p>
+                  </a:txBody>
+                  <a:tcPr/>
+                </a:tc>
+                <a:tc>
+                  <a:txBody>
+                    <a:bodyPr/>
+                    <a:lstStyle/>
+                    <a:p>
+                      <a:r>
+                        <a:rPr lang="en-NZ" dirty="0" smtClean="0"/>
+                        <a:t>Rents</a:t>
+                      </a:r>
+                      <a:endParaRPr lang="en-NZ" dirty="0"/>
+                    </a:p>
+                  </a:txBody>
+                  <a:tcPr/>
+                </a:tc>
+              </a:tr>
+              <a:tr h="370840">
+                <a:tc>
+                  <a:txBody>
+                    <a:bodyPr/>
+                    <a:lstStyle/>
+                    <a:p>
+                      <a:r>
+                        <a:rPr lang="en-NZ" dirty="0" smtClean="0"/>
+                        <a:t>1</a:t>
+                      </a:r>
+                      <a:endParaRPr lang="en-NZ" dirty="0"/>
+                    </a:p>
+                  </a:txBody>
+                  <a:tcPr/>
+                </a:tc>
+                <a:tc>
+                  <a:txBody>
+                    <a:bodyPr/>
+                    <a:lstStyle/>
+                    <a:p>
+                      <a:r>
+                        <a:rPr lang="en-NZ" dirty="0" smtClean="0"/>
+                        <a:t>NA</a:t>
+                      </a:r>
+                      <a:endParaRPr lang="en-NZ" dirty="0"/>
+                    </a:p>
+                  </a:txBody>
+                  <a:tcPr/>
+                </a:tc>
+                <a:tc>
+                  <a:txBody>
+                    <a:bodyPr/>
+                    <a:lstStyle/>
+                    <a:p>
+                      <a:r>
+                        <a:rPr lang="en-NZ" dirty="0" smtClean="0"/>
+                        <a:t>NA</a:t>
+                      </a:r>
+                      <a:endParaRPr lang="en-NZ" dirty="0"/>
+                    </a:p>
+                  </a:txBody>
+                  <a:tcPr/>
+                </a:tc>
+              </a:tr>
+              <a:tr h="370840">
+                <a:tc>
+                  <a:txBody>
+                    <a:bodyPr/>
+                    <a:lstStyle/>
+                    <a:p>
+                      <a:r>
+                        <a:rPr lang="en-NZ" dirty="0" smtClean="0"/>
+                        <a:t>2</a:t>
+                      </a:r>
+                      <a:endParaRPr lang="en-NZ" dirty="0"/>
+                    </a:p>
+                  </a:txBody>
+                  <a:tcPr/>
+                </a:tc>
+                <a:tc>
+                  <a:txBody>
+                    <a:bodyPr/>
+                    <a:lstStyle/>
+                    <a:p>
+                      <a:r>
+                        <a:rPr lang="en-NZ" dirty="0" smtClean="0"/>
+                        <a:t>0.4</a:t>
+                      </a:r>
+                      <a:endParaRPr lang="en-NZ" dirty="0"/>
+                    </a:p>
+                  </a:txBody>
+                  <a:tcPr/>
+                </a:tc>
+                <a:tc>
+                  <a:txBody>
+                    <a:bodyPr/>
+                    <a:lstStyle/>
+                    <a:p>
+                      <a:r>
+                        <a:rPr lang="en-NZ" dirty="0" smtClean="0"/>
+                        <a:t>0.6</a:t>
+                      </a:r>
+                      <a:endParaRPr lang="en-NZ" dirty="0"/>
+                    </a:p>
+                  </a:txBody>
+                  <a:tcPr/>
+                </a:tc>
+              </a:tr>
+            </a:tbl>
+          </a:graphicData>
+        </a:graphic>
+      </p:graphicFrame>
     </p:spTree>
     <p:extLst>
       <p:ext uri="{BB962C8B-B14F-4D97-AF65-F5344CB8AC3E}">
-        <p14:creationId xmlns:p14="http://schemas.microsoft.com/office/powerpoint/2010/main" val="2840074760"/>
+        <p14:creationId xmlns:p14="http://schemas.microsoft.com/office/powerpoint/2010/main" val="2426780635"/>
       </p:ext>
     </p:extLst>
   </p:cSld>

</xml_diff>

<commit_message>
added demo/resource folder table.grpby now has useNA param
</commit_message>
<xml_diff>
--- a/docs/Simar overview.pptx
+++ b/docs/Simar overview.pptx
@@ -6,25 +6,26 @@
   </p:sldMasterIdLst>
   <p:sldIdLst>
     <p:sldId id="256" r:id="rId2"/>
-    <p:sldId id="262" r:id="rId3"/>
-    <p:sldId id="263" r:id="rId4"/>
-    <p:sldId id="260" r:id="rId5"/>
-    <p:sldId id="276" r:id="rId6"/>
-    <p:sldId id="270" r:id="rId7"/>
-    <p:sldId id="271" r:id="rId8"/>
-    <p:sldId id="273" r:id="rId9"/>
-    <p:sldId id="274" r:id="rId10"/>
-    <p:sldId id="275" r:id="rId11"/>
-    <p:sldId id="261" r:id="rId12"/>
-    <p:sldId id="269" r:id="rId13"/>
-    <p:sldId id="264" r:id="rId14"/>
-    <p:sldId id="268" r:id="rId15"/>
-    <p:sldId id="267" r:id="rId16"/>
-    <p:sldId id="266" r:id="rId17"/>
-    <p:sldId id="272" r:id="rId18"/>
-    <p:sldId id="265" r:id="rId19"/>
-    <p:sldId id="257" r:id="rId20"/>
-    <p:sldId id="259" r:id="rId21"/>
+    <p:sldId id="263" r:id="rId3"/>
+    <p:sldId id="279" r:id="rId4"/>
+    <p:sldId id="276" r:id="rId5"/>
+    <p:sldId id="270" r:id="rId6"/>
+    <p:sldId id="271" r:id="rId7"/>
+    <p:sldId id="273" r:id="rId8"/>
+    <p:sldId id="274" r:id="rId9"/>
+    <p:sldId id="275" r:id="rId10"/>
+    <p:sldId id="277" r:id="rId11"/>
+    <p:sldId id="278" r:id="rId12"/>
+    <p:sldId id="261" r:id="rId13"/>
+    <p:sldId id="269" r:id="rId14"/>
+    <p:sldId id="264" r:id="rId15"/>
+    <p:sldId id="268" r:id="rId16"/>
+    <p:sldId id="267" r:id="rId17"/>
+    <p:sldId id="266" r:id="rId18"/>
+    <p:sldId id="272" r:id="rId19"/>
+    <p:sldId id="265" r:id="rId20"/>
+    <p:sldId id="257" r:id="rId21"/>
+    <p:sldId id="259" r:id="rId22"/>
   </p:sldIdLst>
   <p:sldSz cx="9144000" cy="6858000" type="screen4x3"/>
   <p:notesSz cx="6858000" cy="9144000"/>
@@ -3069,7 +3070,11 @@
           <a:bodyPr/>
           <a:lstStyle/>
           <a:p>
-            <a:endParaRPr lang="en-NZ"/>
+            <a:r>
+              <a:rPr lang="en-NZ" dirty="0" err="1" smtClean="0"/>
+              <a:t>simar</a:t>
+            </a:r>
+            <a:endParaRPr lang="en-NZ" dirty="0"/>
           </a:p>
         </p:txBody>
       </p:sp>
@@ -3088,7 +3093,15 @@
           <a:bodyPr/>
           <a:lstStyle/>
           <a:p>
-            <a:endParaRPr lang="en-NZ"/>
+            <a:r>
+              <a:rPr lang="en-NZ" dirty="0" smtClean="0"/>
+              <a:t>A dynamic micro-simulation framework fo</a:t>
+            </a:r>
+            <a:r>
+              <a:rPr lang="en-NZ" dirty="0" smtClean="0"/>
+              <a:t>r R</a:t>
+            </a:r>
+            <a:endParaRPr lang="en-NZ" dirty="0"/>
           </a:p>
         </p:txBody>
       </p:sp>
@@ -3134,7 +3147,7 @@
           <a:p>
             <a:r>
               <a:rPr lang="en-NZ" dirty="0" smtClean="0"/>
-              <a:t>Categorical adjustments	</a:t>
+              <a:t>Propensity arrays</a:t>
             </a:r>
             <a:endParaRPr lang="en-NZ" dirty="0"/>
           </a:p>
@@ -3152,74 +3165,46 @@
         </p:nvSpPr>
         <p:spPr/>
         <p:txBody>
-          <a:bodyPr>
-            <a:normAutofit fontScale="92500" lnSpcReduction="10000"/>
-          </a:bodyPr>
+          <a:bodyPr/>
           <a:lstStyle/>
           <a:p>
             <a:r>
               <a:rPr lang="en-NZ" dirty="0" smtClean="0"/>
-              <a:t>In the above example instead of simulating the home ownership variable in year 2, it will be set to the desired proportions 0.4, 0.6 </a:t>
-            </a:r>
-          </a:p>
-          <a:p>
-            <a:r>
-              <a:rPr lang="en-NZ" dirty="0" smtClean="0"/>
-              <a:t>A </a:t>
+              <a:t>consist </a:t>
             </a:r>
             <a:r>
               <a:rPr lang="en-NZ" dirty="0"/>
-              <a:t>desired proportion of NA </a:t>
-            </a:r>
-            <a:r>
-              <a:rPr lang="en-NZ" dirty="0" smtClean="0"/>
-              <a:t>will leave the variable unchanged</a:t>
-            </a:r>
-            <a:endParaRPr lang="en-NZ" dirty="0"/>
-          </a:p>
-          <a:p>
+              <a:t>of:</a:t>
+            </a:r>
+          </a:p>
+          <a:p>
+            <a:pPr lvl="1"/>
             <a:r>
               <a:rPr lang="en-NZ" dirty="0"/>
-              <a:t>If propensities are supplied </a:t>
-            </a:r>
-            <a:r>
-              <a:rPr lang="en-NZ" dirty="0" smtClean="0"/>
-              <a:t>they </a:t>
-            </a:r>
+              <a:t>rows - the individual micro-units</a:t>
+            </a:r>
+          </a:p>
+          <a:p>
+            <a:pPr lvl="1"/>
             <a:r>
               <a:rPr lang="en-NZ" dirty="0"/>
-              <a:t>will be used to select </a:t>
-            </a:r>
-            <a:r>
-              <a:rPr lang="en-NZ" dirty="0" smtClean="0"/>
-              <a:t>which micro-units </a:t>
+              <a:t>cols - categories, with one less column than </a:t>
+            </a:r>
+            <a:r>
+              <a:rPr lang="en-NZ" dirty="0" smtClean="0"/>
+              <a:t>the total </a:t>
             </a:r>
             <a:r>
               <a:rPr lang="en-NZ" dirty="0"/>
-              <a:t>to </a:t>
-            </a:r>
-            <a:r>
-              <a:rPr lang="en-NZ" dirty="0" smtClean="0"/>
-              <a:t>adjust, otherwise the selection will be random</a:t>
+              <a:t>number of categories</a:t>
             </a:r>
           </a:p>
           <a:p>
             <a:pPr lvl="1"/>
             <a:r>
-              <a:rPr lang="en-NZ" dirty="0" smtClean="0"/>
-              <a:t>Propensities are specified via the global list variable </a:t>
-            </a:r>
-            <a:r>
-              <a:rPr lang="en-NZ" sz="2400" dirty="0" err="1" smtClean="0">
-                <a:latin typeface="Courier New" pitchFamily="49" charset="0"/>
-                <a:cs typeface="Courier New" pitchFamily="49" charset="0"/>
-              </a:rPr>
-              <a:t>propens.all</a:t>
-            </a:r>
-            <a:endParaRPr lang="en-NZ" sz="2400" dirty="0">
-              <a:latin typeface="Courier New" pitchFamily="49" charset="0"/>
-              <a:cs typeface="Courier New" pitchFamily="49" charset="0"/>
-            </a:endParaRPr>
+              <a:rPr lang="en-NZ" dirty="0"/>
+              <a:t>z dim - iterations/years</a:t>
+            </a:r>
           </a:p>
           <a:p>
             <a:endParaRPr lang="en-NZ" dirty="0"/>
@@ -3229,7 +3214,7 @@
     </p:spTree>
     <p:extLst>
       <p:ext uri="{BB962C8B-B14F-4D97-AF65-F5344CB8AC3E}">
-        <p14:creationId xmlns:p14="http://schemas.microsoft.com/office/powerpoint/2010/main" val="2840074760"/>
+        <p14:creationId xmlns:p14="http://schemas.microsoft.com/office/powerpoint/2010/main" val="304611099"/>
       </p:ext>
     </p:extLst>
   </p:cSld>
@@ -3258,7 +3243,7 @@
       </p:grpSpPr>
       <p:sp>
         <p:nvSpPr>
-          <p:cNvPr id="8" name="Title 7"/>
+          <p:cNvPr id="2" name="Title 1"/>
           <p:cNvSpPr>
             <a:spLocks noGrp="1"/>
           </p:cNvSpPr>
@@ -3272,8 +3257,16 @@
           <a:lstStyle/>
           <a:p>
             <a:r>
+              <a:rPr lang="en-NZ" dirty="0" smtClean="0"/>
+              <a:t>Simulation modules (</a:t>
+            </a:r>
+            <a:r>
               <a:rPr lang="en-NZ" dirty="0" err="1" smtClean="0"/>
-              <a:t>Simframe</a:t>
+              <a:t>Simmodule</a:t>
+            </a:r>
+            <a:r>
+              <a:rPr lang="en-NZ" dirty="0" smtClean="0"/>
+              <a:t>)</a:t>
             </a:r>
             <a:endParaRPr lang="en-NZ" dirty="0"/>
           </a:p>
@@ -3281,7 +3274,7 @@
       </p:sp>
       <p:sp>
         <p:nvSpPr>
-          <p:cNvPr id="9" name="Content Placeholder 8"/>
+          <p:cNvPr id="3" name="Content Placeholder 2"/>
           <p:cNvSpPr>
             <a:spLocks noGrp="1"/>
           </p:cNvSpPr>
@@ -3291,54 +3284,39 @@
         </p:nvSpPr>
         <p:spPr/>
         <p:txBody>
-          <a:bodyPr>
-            <a:normAutofit fontScale="92500" lnSpcReduction="10000"/>
-          </a:bodyPr>
+          <a:bodyPr/>
           <a:lstStyle/>
           <a:p>
             <a:r>
-              <a:rPr lang="en-NZ" dirty="0" smtClean="0"/>
-              <a:t>A </a:t>
-            </a:r>
-            <a:r>
-              <a:rPr lang="en-NZ" dirty="0" err="1" smtClean="0"/>
-              <a:t>dataframe</a:t>
-            </a:r>
-            <a:r>
-              <a:rPr lang="en-NZ" dirty="0" smtClean="0"/>
-              <a:t> of variables (input, intermediate, and outcome) used during the simulation</a:t>
-            </a:r>
-          </a:p>
-          <a:p>
-            <a:pPr lvl="1"/>
-            <a:r>
-              <a:rPr lang="en-NZ" dirty="0" smtClean="0"/>
-              <a:t>Input variables are those that are not transformed</a:t>
-            </a:r>
-          </a:p>
-          <a:p>
-            <a:pPr lvl="1"/>
-            <a:r>
-              <a:rPr lang="en-NZ" dirty="0" smtClean="0"/>
-              <a:t>Intermediate variables are transformed during simulation iterations, but not recorded for output</a:t>
-            </a:r>
-          </a:p>
-          <a:p>
-            <a:pPr lvl="1"/>
-            <a:r>
-              <a:rPr lang="en-NZ" dirty="0" smtClean="0"/>
-              <a:t>Outcome variables are transformed during simulation iterations, and are stored in outcome matrices for generation of run stats after each run</a:t>
-            </a:r>
-          </a:p>
-          <a:p>
-            <a:r>
-              <a:rPr lang="en-NZ" dirty="0" smtClean="0"/>
-              <a:t>Each variable is a vector that contains values for all micro-units</a:t>
-            </a:r>
+              <a:rPr lang="en-NZ" dirty="0"/>
+              <a:t>A simulation module is really the core of a simulation. It contains the code and output for a distinct </a:t>
+            </a:r>
+            <a:r>
+              <a:rPr lang="en-NZ" dirty="0" smtClean="0"/>
+              <a:t>set </a:t>
+            </a:r>
+            <a:r>
+              <a:rPr lang="en-NZ" dirty="0"/>
+              <a:t>of results generated, </a:t>
+            </a:r>
+            <a:r>
+              <a:rPr lang="en-NZ" dirty="0" err="1"/>
+              <a:t>eg</a:t>
+            </a:r>
+            <a:r>
+              <a:rPr lang="en-NZ" dirty="0"/>
+              <a:t>: health outcomes for years 1 - 10. </a:t>
+            </a:r>
+            <a:endParaRPr lang="en-NZ" dirty="0"/>
           </a:p>
         </p:txBody>
       </p:sp>
     </p:spTree>
+    <p:extLst>
+      <p:ext uri="{BB962C8B-B14F-4D97-AF65-F5344CB8AC3E}">
+        <p14:creationId xmlns:p14="http://schemas.microsoft.com/office/powerpoint/2010/main" val="1909179328"/>
+      </p:ext>
+    </p:extLst>
   </p:cSld>
   <p:clrMapOvr>
     <a:masterClrMapping/>
@@ -3365,7 +3343,7 @@
       </p:grpSpPr>
       <p:sp>
         <p:nvSpPr>
-          <p:cNvPr id="2" name="Title 1"/>
+          <p:cNvPr id="8" name="Title 7"/>
           <p:cNvSpPr>
             <a:spLocks noGrp="1"/>
           </p:cNvSpPr>
@@ -3386,469 +3364,65 @@
           </a:p>
         </p:txBody>
       </p:sp>
-      <p:graphicFrame>
-        <p:nvGraphicFramePr>
-          <p:cNvPr id="4" name="Content Placeholder 3"/>
-          <p:cNvGraphicFramePr>
-            <a:graphicFrameLocks noGrp="1"/>
-          </p:cNvGraphicFramePr>
+      <p:sp>
+        <p:nvSpPr>
+          <p:cNvPr id="9" name="Content Placeholder 8"/>
+          <p:cNvSpPr>
+            <a:spLocks noGrp="1"/>
+          </p:cNvSpPr>
           <p:nvPr>
             <p:ph idx="1"/>
           </p:nvPr>
-        </p:nvGraphicFramePr>
-        <p:xfrm>
-          <a:off x="1763688" y="1628800"/>
-          <a:ext cx="5606836" cy="2225040"/>
-        </p:xfrm>
-        <a:graphic>
-          <a:graphicData uri="http://schemas.openxmlformats.org/drawingml/2006/table">
-            <a:tbl>
-              <a:tblPr firstRow="1" bandRow="1">
-                <a:tableStyleId>{5C22544A-7EE6-4342-B048-85BDC9FD1C3A}</a:tableStyleId>
-              </a:tblPr>
-              <a:tblGrid>
-                <a:gridCol w="514400"/>
-                <a:gridCol w="792088"/>
-                <a:gridCol w="863918"/>
-                <a:gridCol w="1790510"/>
-                <a:gridCol w="1645920"/>
-              </a:tblGrid>
-              <a:tr h="370840">
-                <a:tc>
-                  <a:txBody>
-                    <a:bodyPr/>
-                    <a:lstStyle/>
-                    <a:p>
-                      <a:r>
-                        <a:rPr lang="en-NZ" dirty="0" smtClean="0"/>
-                        <a:t>ID</a:t>
-                      </a:r>
-                      <a:endParaRPr lang="en-NZ" dirty="0"/>
-                    </a:p>
-                  </a:txBody>
-                  <a:tcPr/>
-                </a:tc>
-                <a:tc>
-                  <a:txBody>
-                    <a:bodyPr/>
-                    <a:lstStyle/>
-                    <a:p>
-                      <a:r>
-                        <a:rPr lang="en-NZ" dirty="0" smtClean="0"/>
-                        <a:t>Age</a:t>
-                      </a:r>
-                      <a:endParaRPr lang="en-NZ" dirty="0"/>
-                    </a:p>
-                  </a:txBody>
-                  <a:tcPr/>
-                </a:tc>
-                <a:tc>
-                  <a:txBody>
-                    <a:bodyPr/>
-                    <a:lstStyle/>
-                    <a:p>
-                      <a:r>
-                        <a:rPr lang="en-NZ" dirty="0" smtClean="0"/>
-                        <a:t>Health</a:t>
-                      </a:r>
-                      <a:endParaRPr lang="en-NZ" dirty="0"/>
-                    </a:p>
-                  </a:txBody>
-                  <a:tcPr/>
-                </a:tc>
-                <a:tc>
-                  <a:txBody>
-                    <a:bodyPr/>
-                    <a:lstStyle/>
-                    <a:p>
-                      <a:r>
-                        <a:rPr lang="en-NZ" dirty="0" err="1" smtClean="0"/>
-                        <a:t>Health_previous</a:t>
-                      </a:r>
-                      <a:endParaRPr lang="en-NZ" dirty="0"/>
-                    </a:p>
-                  </a:txBody>
-                  <a:tcPr/>
-                </a:tc>
-                <a:tc>
-                  <a:txBody>
-                    <a:bodyPr/>
-                    <a:lstStyle/>
-                    <a:p>
-                      <a:r>
-                        <a:rPr lang="en-NZ" dirty="0" smtClean="0"/>
-                        <a:t>Earnings</a:t>
-                      </a:r>
-                      <a:endParaRPr lang="en-NZ" dirty="0"/>
-                    </a:p>
-                  </a:txBody>
-                  <a:tcPr/>
-                </a:tc>
-              </a:tr>
-              <a:tr h="370840">
-                <a:tc>
-                  <a:txBody>
-                    <a:bodyPr/>
-                    <a:lstStyle/>
-                    <a:p>
-                      <a:r>
-                        <a:rPr lang="en-NZ" dirty="0" smtClean="0"/>
-                        <a:t>1</a:t>
-                      </a:r>
-                      <a:endParaRPr lang="en-NZ" dirty="0"/>
-                    </a:p>
-                  </a:txBody>
-                  <a:tcPr/>
-                </a:tc>
-                <a:tc>
-                  <a:txBody>
-                    <a:bodyPr/>
-                    <a:lstStyle/>
-                    <a:p>
-                      <a:r>
-                        <a:rPr lang="en-NZ" dirty="0" smtClean="0"/>
-                        <a:t>2</a:t>
-                      </a:r>
-                      <a:endParaRPr lang="en-NZ" dirty="0"/>
-                    </a:p>
-                  </a:txBody>
-                  <a:tcPr/>
-                </a:tc>
-                <a:tc>
-                  <a:txBody>
-                    <a:bodyPr/>
-                    <a:lstStyle/>
-                    <a:p>
-                      <a:r>
-                        <a:rPr lang="en-NZ" dirty="0" smtClean="0"/>
-                        <a:t>0</a:t>
-                      </a:r>
-                      <a:endParaRPr lang="en-NZ" dirty="0"/>
-                    </a:p>
-                  </a:txBody>
-                  <a:tcPr/>
-                </a:tc>
-                <a:tc>
-                  <a:txBody>
-                    <a:bodyPr/>
-                    <a:lstStyle/>
-                    <a:p>
-                      <a:r>
-                        <a:rPr lang="en-NZ" dirty="0" smtClean="0"/>
-                        <a:t>NA</a:t>
-                      </a:r>
-                      <a:endParaRPr lang="en-NZ" dirty="0"/>
-                    </a:p>
-                  </a:txBody>
-                  <a:tcPr/>
-                </a:tc>
-                <a:tc>
-                  <a:txBody>
-                    <a:bodyPr/>
-                    <a:lstStyle/>
-                    <a:p>
-                      <a:r>
-                        <a:rPr lang="en-NZ" dirty="0" smtClean="0"/>
-                        <a:t>0</a:t>
-                      </a:r>
-                      <a:endParaRPr lang="en-NZ" dirty="0"/>
-                    </a:p>
-                  </a:txBody>
-                  <a:tcPr/>
-                </a:tc>
-              </a:tr>
-              <a:tr h="370840">
-                <a:tc>
-                  <a:txBody>
-                    <a:bodyPr/>
-                    <a:lstStyle/>
-                    <a:p>
-                      <a:r>
-                        <a:rPr lang="en-NZ" dirty="0" smtClean="0"/>
-                        <a:t>2</a:t>
-                      </a:r>
-                      <a:endParaRPr lang="en-NZ" dirty="0"/>
-                    </a:p>
-                  </a:txBody>
-                  <a:tcPr/>
-                </a:tc>
-                <a:tc>
-                  <a:txBody>
-                    <a:bodyPr/>
-                    <a:lstStyle/>
-                    <a:p>
-                      <a:r>
-                        <a:rPr lang="en-NZ" dirty="0" smtClean="0"/>
-                        <a:t>5</a:t>
-                      </a:r>
-                      <a:endParaRPr lang="en-NZ" dirty="0"/>
-                    </a:p>
-                  </a:txBody>
-                  <a:tcPr/>
-                </a:tc>
-                <a:tc>
-                  <a:txBody>
-                    <a:bodyPr/>
-                    <a:lstStyle/>
-                    <a:p>
-                      <a:r>
-                        <a:rPr lang="en-NZ" dirty="0" smtClean="0"/>
-                        <a:t>0</a:t>
-                      </a:r>
-                      <a:endParaRPr lang="en-NZ" dirty="0"/>
-                    </a:p>
-                  </a:txBody>
-                  <a:tcPr/>
-                </a:tc>
-                <a:tc>
-                  <a:txBody>
-                    <a:bodyPr/>
-                    <a:lstStyle/>
-                    <a:p>
-                      <a:r>
-                        <a:rPr lang="en-NZ" dirty="0" smtClean="0"/>
-                        <a:t>NA</a:t>
-                      </a:r>
-                      <a:endParaRPr lang="en-NZ" dirty="0"/>
-                    </a:p>
-                  </a:txBody>
-                  <a:tcPr/>
-                </a:tc>
-                <a:tc>
-                  <a:txBody>
-                    <a:bodyPr/>
-                    <a:lstStyle/>
-                    <a:p>
-                      <a:r>
-                        <a:rPr lang="en-NZ" dirty="0" smtClean="0"/>
-                        <a:t>0</a:t>
-                      </a:r>
-                      <a:endParaRPr lang="en-NZ" dirty="0"/>
-                    </a:p>
-                  </a:txBody>
-                  <a:tcPr/>
-                </a:tc>
-              </a:tr>
-              <a:tr h="370840">
-                <a:tc>
-                  <a:txBody>
-                    <a:bodyPr/>
-                    <a:lstStyle/>
-                    <a:p>
-                      <a:r>
-                        <a:rPr lang="en-NZ" dirty="0" smtClean="0"/>
-                        <a:t>3</a:t>
-                      </a:r>
-                      <a:endParaRPr lang="en-NZ" dirty="0"/>
-                    </a:p>
-                  </a:txBody>
-                  <a:tcPr/>
-                </a:tc>
-                <a:tc>
-                  <a:txBody>
-                    <a:bodyPr/>
-                    <a:lstStyle/>
-                    <a:p>
-                      <a:r>
-                        <a:rPr lang="en-NZ" dirty="0" smtClean="0"/>
-                        <a:t>6</a:t>
-                      </a:r>
-                      <a:endParaRPr lang="en-NZ" dirty="0"/>
-                    </a:p>
-                  </a:txBody>
-                  <a:tcPr/>
-                </a:tc>
-                <a:tc>
-                  <a:txBody>
-                    <a:bodyPr/>
-                    <a:lstStyle/>
-                    <a:p>
-                      <a:r>
-                        <a:rPr lang="en-NZ" dirty="0" smtClean="0"/>
-                        <a:t>0</a:t>
-                      </a:r>
-                      <a:endParaRPr lang="en-NZ" dirty="0"/>
-                    </a:p>
-                  </a:txBody>
-                  <a:tcPr/>
-                </a:tc>
-                <a:tc>
-                  <a:txBody>
-                    <a:bodyPr/>
-                    <a:lstStyle/>
-                    <a:p>
-                      <a:r>
-                        <a:rPr lang="en-NZ" dirty="0" smtClean="0"/>
-                        <a:t>NA</a:t>
-                      </a:r>
-                      <a:endParaRPr lang="en-NZ" dirty="0"/>
-                    </a:p>
-                  </a:txBody>
-                  <a:tcPr/>
-                </a:tc>
-                <a:tc>
-                  <a:txBody>
-                    <a:bodyPr/>
-                    <a:lstStyle/>
-                    <a:p>
-                      <a:r>
-                        <a:rPr lang="en-NZ" dirty="0" smtClean="0"/>
-                        <a:t>0</a:t>
-                      </a:r>
-                      <a:endParaRPr lang="en-NZ" dirty="0"/>
-                    </a:p>
-                  </a:txBody>
-                  <a:tcPr/>
-                </a:tc>
-              </a:tr>
-              <a:tr h="370840">
-                <a:tc>
-                  <a:txBody>
-                    <a:bodyPr/>
-                    <a:lstStyle/>
-                    <a:p>
-                      <a:r>
-                        <a:rPr lang="en-NZ" dirty="0" smtClean="0"/>
-                        <a:t>4</a:t>
-                      </a:r>
-                      <a:endParaRPr lang="en-NZ" dirty="0"/>
-                    </a:p>
-                  </a:txBody>
-                  <a:tcPr/>
-                </a:tc>
-                <a:tc>
-                  <a:txBody>
-                    <a:bodyPr/>
-                    <a:lstStyle/>
-                    <a:p>
-                      <a:r>
-                        <a:rPr lang="en-NZ" dirty="0" smtClean="0"/>
-                        <a:t>2</a:t>
-                      </a:r>
-                      <a:endParaRPr lang="en-NZ" dirty="0"/>
-                    </a:p>
-                  </a:txBody>
-                  <a:tcPr/>
-                </a:tc>
-                <a:tc>
-                  <a:txBody>
-                    <a:bodyPr/>
-                    <a:lstStyle/>
-                    <a:p>
-                      <a:r>
-                        <a:rPr lang="en-NZ" dirty="0" smtClean="0"/>
-                        <a:t>0</a:t>
-                      </a:r>
-                      <a:endParaRPr lang="en-NZ" dirty="0"/>
-                    </a:p>
-                  </a:txBody>
-                  <a:tcPr/>
-                </a:tc>
-                <a:tc>
-                  <a:txBody>
-                    <a:bodyPr/>
-                    <a:lstStyle/>
-                    <a:p>
-                      <a:r>
-                        <a:rPr lang="en-NZ" dirty="0" smtClean="0"/>
-                        <a:t>NA</a:t>
-                      </a:r>
-                      <a:endParaRPr lang="en-NZ" dirty="0"/>
-                    </a:p>
-                  </a:txBody>
-                  <a:tcPr/>
-                </a:tc>
-                <a:tc>
-                  <a:txBody>
-                    <a:bodyPr/>
-                    <a:lstStyle/>
-                    <a:p>
-                      <a:r>
-                        <a:rPr lang="en-NZ" dirty="0" smtClean="0"/>
-                        <a:t>0</a:t>
-                      </a:r>
-                      <a:endParaRPr lang="en-NZ" dirty="0"/>
-                    </a:p>
-                  </a:txBody>
-                  <a:tcPr/>
-                </a:tc>
-              </a:tr>
-              <a:tr h="370840">
-                <a:tc>
-                  <a:txBody>
-                    <a:bodyPr/>
-                    <a:lstStyle/>
-                    <a:p>
-                      <a:r>
-                        <a:rPr lang="en-NZ" dirty="0" smtClean="0"/>
-                        <a:t>5</a:t>
-                      </a:r>
-                      <a:endParaRPr lang="en-NZ" dirty="0"/>
-                    </a:p>
-                  </a:txBody>
-                  <a:tcPr/>
-                </a:tc>
-                <a:tc>
-                  <a:txBody>
-                    <a:bodyPr/>
-                    <a:lstStyle/>
-                    <a:p>
-                      <a:r>
-                        <a:rPr lang="en-NZ" dirty="0" smtClean="0"/>
-                        <a:t>4</a:t>
-                      </a:r>
-                      <a:endParaRPr lang="en-NZ" dirty="0"/>
-                    </a:p>
-                  </a:txBody>
-                  <a:tcPr/>
-                </a:tc>
-                <a:tc>
-                  <a:txBody>
-                    <a:bodyPr/>
-                    <a:lstStyle/>
-                    <a:p>
-                      <a:r>
-                        <a:rPr lang="en-NZ" dirty="0" smtClean="0"/>
-                        <a:t>0</a:t>
-                      </a:r>
-                      <a:endParaRPr lang="en-NZ" dirty="0"/>
-                    </a:p>
-                  </a:txBody>
-                  <a:tcPr/>
-                </a:tc>
-                <a:tc>
-                  <a:txBody>
-                    <a:bodyPr/>
-                    <a:lstStyle/>
-                    <a:p>
-                      <a:r>
-                        <a:rPr lang="en-NZ" dirty="0" smtClean="0"/>
-                        <a:t>NA</a:t>
-                      </a:r>
-                      <a:endParaRPr lang="en-NZ" dirty="0"/>
-                    </a:p>
-                  </a:txBody>
-                  <a:tcPr/>
-                </a:tc>
-                <a:tc>
-                  <a:txBody>
-                    <a:bodyPr/>
-                    <a:lstStyle/>
-                    <a:p>
-                      <a:r>
-                        <a:rPr lang="en-NZ" dirty="0" smtClean="0"/>
-                        <a:t>0</a:t>
-                      </a:r>
-                      <a:endParaRPr lang="en-NZ" dirty="0"/>
-                    </a:p>
-                  </a:txBody>
-                  <a:tcPr/>
-                </a:tc>
-              </a:tr>
-            </a:tbl>
-          </a:graphicData>
-        </a:graphic>
-      </p:graphicFrame>
+        </p:nvSpPr>
+        <p:spPr/>
+        <p:txBody>
+          <a:bodyPr>
+            <a:normAutofit fontScale="92500" lnSpcReduction="10000"/>
+          </a:bodyPr>
+          <a:lstStyle/>
+          <a:p>
+            <a:r>
+              <a:rPr lang="en-NZ" dirty="0" smtClean="0"/>
+              <a:t>A </a:t>
+            </a:r>
+            <a:r>
+              <a:rPr lang="en-NZ" dirty="0" err="1" smtClean="0"/>
+              <a:t>dataframe</a:t>
+            </a:r>
+            <a:r>
+              <a:rPr lang="en-NZ" dirty="0" smtClean="0"/>
+              <a:t> of variables (input, intermediate, and outcome) used during the simulation</a:t>
+            </a:r>
+          </a:p>
+          <a:p>
+            <a:pPr lvl="1"/>
+            <a:r>
+              <a:rPr lang="en-NZ" dirty="0" smtClean="0"/>
+              <a:t>Input variables are those that are not transformed</a:t>
+            </a:r>
+          </a:p>
+          <a:p>
+            <a:pPr lvl="1"/>
+            <a:r>
+              <a:rPr lang="en-NZ" dirty="0" smtClean="0"/>
+              <a:t>Intermediate variables are transformed during simulation iterations, but not recorded for output</a:t>
+            </a:r>
+          </a:p>
+          <a:p>
+            <a:pPr lvl="1"/>
+            <a:r>
+              <a:rPr lang="en-NZ" dirty="0" smtClean="0"/>
+              <a:t>Outcome variables are transformed during simulation iterations, and are stored in outcome matrices for generation of run stats after each run</a:t>
+            </a:r>
+          </a:p>
+          <a:p>
+            <a:r>
+              <a:rPr lang="en-NZ" dirty="0" smtClean="0"/>
+              <a:t>Each variable is a vector that contains values for all micro-units</a:t>
+            </a:r>
+          </a:p>
+        </p:txBody>
+      </p:sp>
     </p:spTree>
   </p:cSld>
   <p:clrMapOvr>
@@ -3886,108 +3460,480 @@
         </p:nvSpPr>
         <p:spPr/>
         <p:txBody>
-          <a:bodyPr>
-            <a:normAutofit/>
-          </a:bodyPr>
+          <a:bodyPr/>
           <a:lstStyle/>
           <a:p>
             <a:r>
-              <a:rPr lang="en-NZ" dirty="0" smtClean="0"/>
-              <a:t>The master </a:t>
-            </a:r>
-            <a:r>
               <a:rPr lang="en-NZ" dirty="0" err="1" smtClean="0"/>
-              <a:t>simframe</a:t>
+              <a:t>Simframe</a:t>
             </a:r>
             <a:endParaRPr lang="en-NZ" dirty="0"/>
           </a:p>
         </p:txBody>
       </p:sp>
-      <p:sp>
-        <p:nvSpPr>
-          <p:cNvPr id="3" name="Content Placeholder 2"/>
-          <p:cNvSpPr>
-            <a:spLocks noGrp="1"/>
-          </p:cNvSpPr>
+      <p:graphicFrame>
+        <p:nvGraphicFramePr>
+          <p:cNvPr id="4" name="Content Placeholder 3"/>
+          <p:cNvGraphicFramePr>
+            <a:graphicFrameLocks noGrp="1"/>
+          </p:cNvGraphicFramePr>
           <p:nvPr>
             <p:ph idx="1"/>
           </p:nvPr>
-        </p:nvSpPr>
-        <p:spPr/>
-        <p:txBody>
-          <a:bodyPr>
-            <a:normAutofit/>
-          </a:bodyPr>
-          <a:lstStyle/>
-          <a:p>
-            <a:r>
-              <a:rPr lang="en-NZ" dirty="0" smtClean="0"/>
-              <a:t>The master </a:t>
-            </a:r>
-            <a:r>
-              <a:rPr lang="en-NZ" dirty="0" err="1" smtClean="0"/>
-              <a:t>simframe</a:t>
-            </a:r>
-            <a:r>
-              <a:rPr lang="en-NZ" dirty="0" smtClean="0"/>
-              <a:t> is initialised from a </a:t>
-            </a:r>
-            <a:r>
-              <a:rPr lang="en-NZ" dirty="0" err="1" smtClean="0"/>
-              <a:t>simframe</a:t>
-            </a:r>
-            <a:r>
-              <a:rPr lang="en-NZ" dirty="0" smtClean="0"/>
-              <a:t> definition file.</a:t>
-            </a:r>
-          </a:p>
-          <a:p>
-            <a:r>
-              <a:rPr lang="en-NZ" dirty="0" smtClean="0"/>
-              <a:t>Each </a:t>
-            </a:r>
-            <a:r>
-              <a:rPr lang="en-NZ" dirty="0" err="1" smtClean="0"/>
-              <a:t>simframe</a:t>
-            </a:r>
-            <a:r>
-              <a:rPr lang="en-NZ" dirty="0" smtClean="0"/>
-              <a:t> variable is populated with initial values, as specified by the definition file.</a:t>
-            </a:r>
-          </a:p>
-          <a:p>
-            <a:r>
-              <a:rPr lang="en-NZ" dirty="0" smtClean="0"/>
-              <a:t>The master </a:t>
-            </a:r>
-            <a:r>
-              <a:rPr lang="en-NZ" dirty="0" err="1" smtClean="0"/>
-              <a:t>simframe</a:t>
-            </a:r>
-            <a:r>
-              <a:rPr lang="en-NZ" dirty="0" smtClean="0"/>
-              <a:t> is typically stored in the global variable </a:t>
-            </a:r>
-            <a:r>
-              <a:rPr lang="en-NZ" dirty="0" err="1" smtClean="0">
-                <a:latin typeface="Courier New" pitchFamily="49" charset="0"/>
-                <a:cs typeface="Courier New" pitchFamily="49" charset="0"/>
-              </a:rPr>
-              <a:t>simframe.master</a:t>
-            </a:r>
-            <a:endParaRPr lang="en-NZ" dirty="0" smtClean="0">
-              <a:latin typeface="Courier New" pitchFamily="49" charset="0"/>
-              <a:cs typeface="Courier New" pitchFamily="49" charset="0"/>
-            </a:endParaRPr>
-          </a:p>
-          <a:p>
-            <a:endParaRPr lang="en-NZ" dirty="0" smtClean="0"/>
-          </a:p>
-          <a:p>
-            <a:endParaRPr lang="en-NZ" dirty="0"/>
-          </a:p>
-        </p:txBody>
-      </p:sp>
+        </p:nvGraphicFramePr>
+        <p:xfrm>
+          <a:off x="1763688" y="1628800"/>
+          <a:ext cx="5606836" cy="2225040"/>
+        </p:xfrm>
+        <a:graphic>
+          <a:graphicData uri="http://schemas.openxmlformats.org/drawingml/2006/table">
+            <a:tbl>
+              <a:tblPr firstRow="1" bandRow="1">
+                <a:tableStyleId>{5C22544A-7EE6-4342-B048-85BDC9FD1C3A}</a:tableStyleId>
+              </a:tblPr>
+              <a:tblGrid>
+                <a:gridCol w="514400"/>
+                <a:gridCol w="792088"/>
+                <a:gridCol w="863918"/>
+                <a:gridCol w="1790510"/>
+                <a:gridCol w="1645920"/>
+              </a:tblGrid>
+              <a:tr h="370840">
+                <a:tc>
+                  <a:txBody>
+                    <a:bodyPr/>
+                    <a:lstStyle/>
+                    <a:p>
+                      <a:r>
+                        <a:rPr lang="en-NZ" dirty="0" smtClean="0"/>
+                        <a:t>ID</a:t>
+                      </a:r>
+                      <a:endParaRPr lang="en-NZ" dirty="0"/>
+                    </a:p>
+                  </a:txBody>
+                  <a:tcPr/>
+                </a:tc>
+                <a:tc>
+                  <a:txBody>
+                    <a:bodyPr/>
+                    <a:lstStyle/>
+                    <a:p>
+                      <a:r>
+                        <a:rPr lang="en-NZ" dirty="0" smtClean="0"/>
+                        <a:t>Age</a:t>
+                      </a:r>
+                      <a:endParaRPr lang="en-NZ" dirty="0"/>
+                    </a:p>
+                  </a:txBody>
+                  <a:tcPr/>
+                </a:tc>
+                <a:tc>
+                  <a:txBody>
+                    <a:bodyPr/>
+                    <a:lstStyle/>
+                    <a:p>
+                      <a:r>
+                        <a:rPr lang="en-NZ" dirty="0" smtClean="0"/>
+                        <a:t>Health</a:t>
+                      </a:r>
+                      <a:endParaRPr lang="en-NZ" dirty="0"/>
+                    </a:p>
+                  </a:txBody>
+                  <a:tcPr/>
+                </a:tc>
+                <a:tc>
+                  <a:txBody>
+                    <a:bodyPr/>
+                    <a:lstStyle/>
+                    <a:p>
+                      <a:r>
+                        <a:rPr lang="en-NZ" dirty="0" err="1" smtClean="0"/>
+                        <a:t>Health_previous</a:t>
+                      </a:r>
+                      <a:endParaRPr lang="en-NZ" dirty="0"/>
+                    </a:p>
+                  </a:txBody>
+                  <a:tcPr/>
+                </a:tc>
+                <a:tc>
+                  <a:txBody>
+                    <a:bodyPr/>
+                    <a:lstStyle/>
+                    <a:p>
+                      <a:r>
+                        <a:rPr lang="en-NZ" dirty="0" smtClean="0"/>
+                        <a:t>Earnings</a:t>
+                      </a:r>
+                      <a:endParaRPr lang="en-NZ" dirty="0"/>
+                    </a:p>
+                  </a:txBody>
+                  <a:tcPr/>
+                </a:tc>
+              </a:tr>
+              <a:tr h="370840">
+                <a:tc>
+                  <a:txBody>
+                    <a:bodyPr/>
+                    <a:lstStyle/>
+                    <a:p>
+                      <a:r>
+                        <a:rPr lang="en-NZ" dirty="0" smtClean="0"/>
+                        <a:t>1</a:t>
+                      </a:r>
+                      <a:endParaRPr lang="en-NZ" dirty="0"/>
+                    </a:p>
+                  </a:txBody>
+                  <a:tcPr/>
+                </a:tc>
+                <a:tc>
+                  <a:txBody>
+                    <a:bodyPr/>
+                    <a:lstStyle/>
+                    <a:p>
+                      <a:r>
+                        <a:rPr lang="en-NZ" dirty="0" smtClean="0"/>
+                        <a:t>2</a:t>
+                      </a:r>
+                      <a:endParaRPr lang="en-NZ" dirty="0"/>
+                    </a:p>
+                  </a:txBody>
+                  <a:tcPr/>
+                </a:tc>
+                <a:tc>
+                  <a:txBody>
+                    <a:bodyPr/>
+                    <a:lstStyle/>
+                    <a:p>
+                      <a:r>
+                        <a:rPr lang="en-NZ" dirty="0" smtClean="0"/>
+                        <a:t>0</a:t>
+                      </a:r>
+                      <a:endParaRPr lang="en-NZ" dirty="0"/>
+                    </a:p>
+                  </a:txBody>
+                  <a:tcPr/>
+                </a:tc>
+                <a:tc>
+                  <a:txBody>
+                    <a:bodyPr/>
+                    <a:lstStyle/>
+                    <a:p>
+                      <a:r>
+                        <a:rPr lang="en-NZ" dirty="0" smtClean="0"/>
+                        <a:t>NA</a:t>
+                      </a:r>
+                      <a:endParaRPr lang="en-NZ" dirty="0"/>
+                    </a:p>
+                  </a:txBody>
+                  <a:tcPr/>
+                </a:tc>
+                <a:tc>
+                  <a:txBody>
+                    <a:bodyPr/>
+                    <a:lstStyle/>
+                    <a:p>
+                      <a:r>
+                        <a:rPr lang="en-NZ" dirty="0" smtClean="0"/>
+                        <a:t>0</a:t>
+                      </a:r>
+                      <a:endParaRPr lang="en-NZ" dirty="0"/>
+                    </a:p>
+                  </a:txBody>
+                  <a:tcPr/>
+                </a:tc>
+              </a:tr>
+              <a:tr h="370840">
+                <a:tc>
+                  <a:txBody>
+                    <a:bodyPr/>
+                    <a:lstStyle/>
+                    <a:p>
+                      <a:r>
+                        <a:rPr lang="en-NZ" dirty="0" smtClean="0"/>
+                        <a:t>2</a:t>
+                      </a:r>
+                      <a:endParaRPr lang="en-NZ" dirty="0"/>
+                    </a:p>
+                  </a:txBody>
+                  <a:tcPr/>
+                </a:tc>
+                <a:tc>
+                  <a:txBody>
+                    <a:bodyPr/>
+                    <a:lstStyle/>
+                    <a:p>
+                      <a:r>
+                        <a:rPr lang="en-NZ" dirty="0" smtClean="0"/>
+                        <a:t>5</a:t>
+                      </a:r>
+                      <a:endParaRPr lang="en-NZ" dirty="0"/>
+                    </a:p>
+                  </a:txBody>
+                  <a:tcPr/>
+                </a:tc>
+                <a:tc>
+                  <a:txBody>
+                    <a:bodyPr/>
+                    <a:lstStyle/>
+                    <a:p>
+                      <a:r>
+                        <a:rPr lang="en-NZ" dirty="0" smtClean="0"/>
+                        <a:t>0</a:t>
+                      </a:r>
+                      <a:endParaRPr lang="en-NZ" dirty="0"/>
+                    </a:p>
+                  </a:txBody>
+                  <a:tcPr/>
+                </a:tc>
+                <a:tc>
+                  <a:txBody>
+                    <a:bodyPr/>
+                    <a:lstStyle/>
+                    <a:p>
+                      <a:r>
+                        <a:rPr lang="en-NZ" dirty="0" smtClean="0"/>
+                        <a:t>NA</a:t>
+                      </a:r>
+                      <a:endParaRPr lang="en-NZ" dirty="0"/>
+                    </a:p>
+                  </a:txBody>
+                  <a:tcPr/>
+                </a:tc>
+                <a:tc>
+                  <a:txBody>
+                    <a:bodyPr/>
+                    <a:lstStyle/>
+                    <a:p>
+                      <a:r>
+                        <a:rPr lang="en-NZ" dirty="0" smtClean="0"/>
+                        <a:t>0</a:t>
+                      </a:r>
+                      <a:endParaRPr lang="en-NZ" dirty="0"/>
+                    </a:p>
+                  </a:txBody>
+                  <a:tcPr/>
+                </a:tc>
+              </a:tr>
+              <a:tr h="370840">
+                <a:tc>
+                  <a:txBody>
+                    <a:bodyPr/>
+                    <a:lstStyle/>
+                    <a:p>
+                      <a:r>
+                        <a:rPr lang="en-NZ" dirty="0" smtClean="0"/>
+                        <a:t>3</a:t>
+                      </a:r>
+                      <a:endParaRPr lang="en-NZ" dirty="0"/>
+                    </a:p>
+                  </a:txBody>
+                  <a:tcPr/>
+                </a:tc>
+                <a:tc>
+                  <a:txBody>
+                    <a:bodyPr/>
+                    <a:lstStyle/>
+                    <a:p>
+                      <a:r>
+                        <a:rPr lang="en-NZ" dirty="0" smtClean="0"/>
+                        <a:t>6</a:t>
+                      </a:r>
+                      <a:endParaRPr lang="en-NZ" dirty="0"/>
+                    </a:p>
+                  </a:txBody>
+                  <a:tcPr/>
+                </a:tc>
+                <a:tc>
+                  <a:txBody>
+                    <a:bodyPr/>
+                    <a:lstStyle/>
+                    <a:p>
+                      <a:r>
+                        <a:rPr lang="en-NZ" dirty="0" smtClean="0"/>
+                        <a:t>0</a:t>
+                      </a:r>
+                      <a:endParaRPr lang="en-NZ" dirty="0"/>
+                    </a:p>
+                  </a:txBody>
+                  <a:tcPr/>
+                </a:tc>
+                <a:tc>
+                  <a:txBody>
+                    <a:bodyPr/>
+                    <a:lstStyle/>
+                    <a:p>
+                      <a:r>
+                        <a:rPr lang="en-NZ" dirty="0" smtClean="0"/>
+                        <a:t>NA</a:t>
+                      </a:r>
+                      <a:endParaRPr lang="en-NZ" dirty="0"/>
+                    </a:p>
+                  </a:txBody>
+                  <a:tcPr/>
+                </a:tc>
+                <a:tc>
+                  <a:txBody>
+                    <a:bodyPr/>
+                    <a:lstStyle/>
+                    <a:p>
+                      <a:r>
+                        <a:rPr lang="en-NZ" dirty="0" smtClean="0"/>
+                        <a:t>0</a:t>
+                      </a:r>
+                      <a:endParaRPr lang="en-NZ" dirty="0"/>
+                    </a:p>
+                  </a:txBody>
+                  <a:tcPr/>
+                </a:tc>
+              </a:tr>
+              <a:tr h="370840">
+                <a:tc>
+                  <a:txBody>
+                    <a:bodyPr/>
+                    <a:lstStyle/>
+                    <a:p>
+                      <a:r>
+                        <a:rPr lang="en-NZ" dirty="0" smtClean="0"/>
+                        <a:t>4</a:t>
+                      </a:r>
+                      <a:endParaRPr lang="en-NZ" dirty="0"/>
+                    </a:p>
+                  </a:txBody>
+                  <a:tcPr/>
+                </a:tc>
+                <a:tc>
+                  <a:txBody>
+                    <a:bodyPr/>
+                    <a:lstStyle/>
+                    <a:p>
+                      <a:r>
+                        <a:rPr lang="en-NZ" dirty="0" smtClean="0"/>
+                        <a:t>2</a:t>
+                      </a:r>
+                      <a:endParaRPr lang="en-NZ" dirty="0"/>
+                    </a:p>
+                  </a:txBody>
+                  <a:tcPr/>
+                </a:tc>
+                <a:tc>
+                  <a:txBody>
+                    <a:bodyPr/>
+                    <a:lstStyle/>
+                    <a:p>
+                      <a:r>
+                        <a:rPr lang="en-NZ" dirty="0" smtClean="0"/>
+                        <a:t>0</a:t>
+                      </a:r>
+                      <a:endParaRPr lang="en-NZ" dirty="0"/>
+                    </a:p>
+                  </a:txBody>
+                  <a:tcPr/>
+                </a:tc>
+                <a:tc>
+                  <a:txBody>
+                    <a:bodyPr/>
+                    <a:lstStyle/>
+                    <a:p>
+                      <a:r>
+                        <a:rPr lang="en-NZ" dirty="0" smtClean="0"/>
+                        <a:t>NA</a:t>
+                      </a:r>
+                      <a:endParaRPr lang="en-NZ" dirty="0"/>
+                    </a:p>
+                  </a:txBody>
+                  <a:tcPr/>
+                </a:tc>
+                <a:tc>
+                  <a:txBody>
+                    <a:bodyPr/>
+                    <a:lstStyle/>
+                    <a:p>
+                      <a:r>
+                        <a:rPr lang="en-NZ" dirty="0" smtClean="0"/>
+                        <a:t>0</a:t>
+                      </a:r>
+                      <a:endParaRPr lang="en-NZ" dirty="0"/>
+                    </a:p>
+                  </a:txBody>
+                  <a:tcPr/>
+                </a:tc>
+              </a:tr>
+              <a:tr h="370840">
+                <a:tc>
+                  <a:txBody>
+                    <a:bodyPr/>
+                    <a:lstStyle/>
+                    <a:p>
+                      <a:r>
+                        <a:rPr lang="en-NZ" dirty="0" smtClean="0"/>
+                        <a:t>5</a:t>
+                      </a:r>
+                      <a:endParaRPr lang="en-NZ" dirty="0"/>
+                    </a:p>
+                  </a:txBody>
+                  <a:tcPr/>
+                </a:tc>
+                <a:tc>
+                  <a:txBody>
+                    <a:bodyPr/>
+                    <a:lstStyle/>
+                    <a:p>
+                      <a:r>
+                        <a:rPr lang="en-NZ" dirty="0" smtClean="0"/>
+                        <a:t>4</a:t>
+                      </a:r>
+                      <a:endParaRPr lang="en-NZ" dirty="0"/>
+                    </a:p>
+                  </a:txBody>
+                  <a:tcPr/>
+                </a:tc>
+                <a:tc>
+                  <a:txBody>
+                    <a:bodyPr/>
+                    <a:lstStyle/>
+                    <a:p>
+                      <a:r>
+                        <a:rPr lang="en-NZ" dirty="0" smtClean="0"/>
+                        <a:t>0</a:t>
+                      </a:r>
+                      <a:endParaRPr lang="en-NZ" dirty="0"/>
+                    </a:p>
+                  </a:txBody>
+                  <a:tcPr/>
+                </a:tc>
+                <a:tc>
+                  <a:txBody>
+                    <a:bodyPr/>
+                    <a:lstStyle/>
+                    <a:p>
+                      <a:r>
+                        <a:rPr lang="en-NZ" dirty="0" smtClean="0"/>
+                        <a:t>NA</a:t>
+                      </a:r>
+                      <a:endParaRPr lang="en-NZ" dirty="0"/>
+                    </a:p>
+                  </a:txBody>
+                  <a:tcPr/>
+                </a:tc>
+                <a:tc>
+                  <a:txBody>
+                    <a:bodyPr/>
+                    <a:lstStyle/>
+                    <a:p>
+                      <a:r>
+                        <a:rPr lang="en-NZ" dirty="0" smtClean="0"/>
+                        <a:t>0</a:t>
+                      </a:r>
+                      <a:endParaRPr lang="en-NZ" dirty="0"/>
+                    </a:p>
+                  </a:txBody>
+                  <a:tcPr/>
+                </a:tc>
+              </a:tr>
+            </a:tbl>
+          </a:graphicData>
+        </a:graphic>
+      </p:graphicFrame>
     </p:spTree>
   </p:cSld>
   <p:clrMapOvr>
@@ -4025,16 +3971,18 @@
         </p:nvSpPr>
         <p:spPr/>
         <p:txBody>
-          <a:bodyPr/>
+          <a:bodyPr>
+            <a:normAutofit/>
+          </a:bodyPr>
           <a:lstStyle/>
           <a:p>
             <a:r>
+              <a:rPr lang="en-NZ" dirty="0" smtClean="0"/>
+              <a:t>The master </a:t>
+            </a:r>
+            <a:r>
               <a:rPr lang="en-NZ" dirty="0" err="1" smtClean="0"/>
-              <a:t>Simframe</a:t>
-            </a:r>
-            <a:r>
-              <a:rPr lang="en-NZ" dirty="0" smtClean="0"/>
-              <a:t> definition file</a:t>
+              <a:t>simframe</a:t>
             </a:r>
             <a:endParaRPr lang="en-NZ" dirty="0"/>
           </a:p>
@@ -4053,159 +4001,75 @@
         <p:spPr/>
         <p:txBody>
           <a:bodyPr>
-            <a:normAutofit fontScale="70000" lnSpcReduction="20000"/>
+            <a:normAutofit/>
           </a:bodyPr>
           <a:lstStyle/>
           <a:p>
             <a:r>
-              <a:rPr lang="en-NZ" dirty="0" err="1" smtClean="0"/>
-              <a:t>Varname</a:t>
-            </a:r>
-            <a:r>
-              <a:rPr lang="en-NZ" dirty="0" smtClean="0"/>
-              <a:t>: </a:t>
-            </a:r>
-          </a:p>
-          <a:p>
-            <a:pPr lvl="1"/>
-            <a:r>
-              <a:rPr lang="en-NZ" dirty="0" smtClean="0"/>
-              <a:t>the name of a variable in the </a:t>
+              <a:rPr lang="en-NZ" dirty="0" smtClean="0"/>
+              <a:t>The master </a:t>
             </a:r>
             <a:r>
               <a:rPr lang="en-NZ" dirty="0" err="1" smtClean="0"/>
               <a:t>simframe</a:t>
             </a:r>
+            <a:r>
+              <a:rPr lang="en-NZ" dirty="0" smtClean="0"/>
+              <a:t> is initialised from a </a:t>
+            </a:r>
+            <a:r>
+              <a:rPr lang="en-NZ" dirty="0" err="1" smtClean="0"/>
+              <a:t>simframe</a:t>
+            </a:r>
+            <a:r>
+              <a:rPr lang="en-NZ" dirty="0" smtClean="0"/>
+              <a:t> definition file.</a:t>
+            </a:r>
+          </a:p>
+          <a:p>
+            <a:r>
+              <a:rPr lang="en-NZ" dirty="0" smtClean="0"/>
+              <a:t>Each </a:t>
+            </a:r>
+            <a:r>
+              <a:rPr lang="en-NZ" dirty="0" err="1" smtClean="0"/>
+              <a:t>simframe</a:t>
+            </a:r>
+            <a:r>
+              <a:rPr lang="en-NZ" dirty="0" smtClean="0"/>
+              <a:t> variable is populated with initial values, as specified by the definition file.</a:t>
+            </a:r>
+          </a:p>
+          <a:p>
+            <a:r>
+              <a:rPr lang="en-NZ" dirty="0" smtClean="0"/>
+              <a:t>The master </a:t>
+            </a:r>
+            <a:r>
+              <a:rPr lang="en-NZ" dirty="0" err="1" smtClean="0"/>
+              <a:t>simframe</a:t>
+            </a:r>
+            <a:r>
+              <a:rPr lang="en-NZ" dirty="0" smtClean="0"/>
+              <a:t> is typically stored in the global variable </a:t>
+            </a:r>
+            <a:r>
+              <a:rPr lang="en-NZ" dirty="0" err="1" smtClean="0">
+                <a:latin typeface="Courier New" pitchFamily="49" charset="0"/>
+                <a:cs typeface="Courier New" pitchFamily="49" charset="0"/>
+              </a:rPr>
+              <a:t>simframe.master</a:t>
+            </a:r>
+            <a:endParaRPr lang="en-NZ" dirty="0" smtClean="0">
+              <a:latin typeface="Courier New" pitchFamily="49" charset="0"/>
+              <a:cs typeface="Courier New" pitchFamily="49" charset="0"/>
+            </a:endParaRPr>
+          </a:p>
+          <a:p>
             <a:endParaRPr lang="en-NZ" dirty="0" smtClean="0"/>
           </a:p>
           <a:p>
-            <a:r>
-              <a:rPr lang="en-NZ" dirty="0" err="1" smtClean="0"/>
-              <a:t>Previous_var</a:t>
-            </a:r>
-            <a:endParaRPr lang="en-NZ" dirty="0" smtClean="0"/>
-          </a:p>
-          <a:p>
-            <a:pPr lvl="1"/>
-            <a:r>
-              <a:rPr lang="en-NZ" dirty="0" smtClean="0"/>
-              <a:t>the </a:t>
-            </a:r>
-            <a:r>
-              <a:rPr lang="en-NZ" dirty="0"/>
-              <a:t>name of a variable in which to store the current value in at the </a:t>
-            </a:r>
-            <a:r>
-              <a:rPr lang="en-NZ" dirty="0" smtClean="0"/>
-              <a:t>beginning of </a:t>
-            </a:r>
-            <a:r>
-              <a:rPr lang="en-NZ" dirty="0"/>
-              <a:t>each iteration (</a:t>
-            </a:r>
-            <a:r>
-              <a:rPr lang="en-NZ" dirty="0" err="1"/>
-              <a:t>i.e</a:t>
-            </a:r>
-            <a:r>
-              <a:rPr lang="en-NZ" dirty="0"/>
-              <a:t>: before it's transformed</a:t>
-            </a:r>
-            <a:r>
-              <a:rPr lang="en-NZ" dirty="0" smtClean="0"/>
-              <a:t>).</a:t>
-            </a:r>
-          </a:p>
-          <a:p>
-            <a:pPr lvl="1"/>
-            <a:r>
-              <a:rPr lang="en-NZ" dirty="0" smtClean="0"/>
-              <a:t>Optional </a:t>
-            </a:r>
-            <a:r>
-              <a:rPr lang="en-NZ" dirty="0"/>
-              <a:t>- for models that require previous state</a:t>
-            </a:r>
-            <a:r>
-              <a:rPr lang="en-NZ" dirty="0" smtClean="0"/>
-              <a:t>.</a:t>
-            </a:r>
             <a:endParaRPr lang="en-NZ" dirty="0"/>
-          </a:p>
-          <a:p>
-            <a:r>
-              <a:rPr lang="en-NZ" dirty="0" err="1" smtClean="0"/>
-              <a:t>Initial_value</a:t>
-            </a:r>
-            <a:endParaRPr lang="en-NZ" dirty="0" smtClean="0"/>
-          </a:p>
-          <a:p>
-            <a:pPr lvl="1"/>
-            <a:r>
-              <a:rPr lang="en-NZ" dirty="0"/>
-              <a:t>an expression that generates the initial value of the variable</a:t>
-            </a:r>
-            <a:r>
-              <a:rPr lang="en-NZ" dirty="0" smtClean="0"/>
-              <a:t>. Typically this expression will reference values in a previously loaded </a:t>
-            </a:r>
-            <a:r>
-              <a:rPr lang="en-NZ" dirty="0" err="1" smtClean="0"/>
-              <a:t>basefile</a:t>
-            </a:r>
-            <a:r>
-              <a:rPr lang="en-NZ" dirty="0" smtClean="0"/>
-              <a:t>.</a:t>
-            </a:r>
-          </a:p>
-          <a:p>
-            <a:r>
-              <a:rPr lang="en-NZ" dirty="0" err="1" smtClean="0"/>
-              <a:t>Outcome_type</a:t>
-            </a:r>
-            <a:endParaRPr lang="en-NZ" dirty="0" smtClean="0"/>
-          </a:p>
-          <a:p>
-            <a:pPr lvl="1"/>
-            <a:r>
-              <a:rPr lang="en-NZ" dirty="0"/>
-              <a:t>i</a:t>
-            </a:r>
-            <a:r>
-              <a:rPr lang="en-NZ" dirty="0" smtClean="0"/>
-              <a:t>f specified, indicates this is an outcome variable and indicates its type which is one of “categorical” or “continuous”</a:t>
-            </a:r>
-          </a:p>
-          <a:p>
-            <a:r>
-              <a:rPr lang="en-NZ" dirty="0" err="1" smtClean="0"/>
-              <a:t>Outcome_module</a:t>
-            </a:r>
-            <a:endParaRPr lang="en-NZ" dirty="0" smtClean="0"/>
-          </a:p>
-          <a:p>
-            <a:pPr lvl="1"/>
-            <a:r>
-              <a:rPr lang="en-NZ" dirty="0"/>
-              <a:t>if specified, indicates the </a:t>
-            </a:r>
-            <a:r>
-              <a:rPr lang="en-NZ" dirty="0" err="1" smtClean="0"/>
-              <a:t>Simmodule</a:t>
-            </a:r>
-            <a:r>
-              <a:rPr lang="en-NZ" dirty="0" smtClean="0"/>
-              <a:t> </a:t>
-            </a:r>
-            <a:r>
-              <a:rPr lang="en-NZ" dirty="0"/>
-              <a:t>this outcome variable belongs to</a:t>
-            </a:r>
-            <a:endParaRPr lang="en-NZ" dirty="0" smtClean="0"/>
-          </a:p>
-          <a:p>
-            <a:pPr lvl="1"/>
-            <a:endParaRPr lang="en-NZ" dirty="0" smtClean="0"/>
           </a:p>
         </p:txBody>
       </p:sp>
@@ -4261,369 +4125,175 @@
           </a:p>
         </p:txBody>
       </p:sp>
-      <p:graphicFrame>
-        <p:nvGraphicFramePr>
-          <p:cNvPr id="4" name="Content Placeholder 3"/>
-          <p:cNvGraphicFramePr>
-            <a:graphicFrameLocks noGrp="1"/>
-          </p:cNvGraphicFramePr>
+      <p:sp>
+        <p:nvSpPr>
+          <p:cNvPr id="3" name="Content Placeholder 2"/>
+          <p:cNvSpPr>
+            <a:spLocks noGrp="1"/>
+          </p:cNvSpPr>
           <p:nvPr>
             <p:ph idx="1"/>
           </p:nvPr>
-        </p:nvGraphicFramePr>
-        <p:xfrm>
-          <a:off x="457200" y="1600200"/>
-          <a:ext cx="8229600" cy="2392680"/>
-        </p:xfrm>
-        <a:graphic>
-          <a:graphicData uri="http://schemas.openxmlformats.org/drawingml/2006/table">
-            <a:tbl>
-              <a:tblPr firstRow="1" bandRow="1">
-                <a:tableStyleId>{5C22544A-7EE6-4342-B048-85BDC9FD1C3A}</a:tableStyleId>
-              </a:tblPr>
-              <a:tblGrid>
-                <a:gridCol w="1378496"/>
-                <a:gridCol w="1512168"/>
-                <a:gridCol w="1656184"/>
-                <a:gridCol w="1728192"/>
-                <a:gridCol w="1954560"/>
-              </a:tblGrid>
-              <a:tr h="370840">
-                <a:tc>
-                  <a:txBody>
-                    <a:bodyPr/>
-                    <a:lstStyle/>
-                    <a:p>
-                      <a:r>
-                        <a:rPr lang="en-NZ" smtClean="0"/>
-                        <a:t>Varname</a:t>
-                      </a:r>
-                      <a:endParaRPr lang="en-NZ" dirty="0"/>
-                    </a:p>
-                  </a:txBody>
-                  <a:tcPr/>
-                </a:tc>
-                <a:tc>
-                  <a:txBody>
-                    <a:bodyPr/>
-                    <a:lstStyle/>
-                    <a:p>
-                      <a:r>
-                        <a:rPr lang="en-NZ" dirty="0" err="1" smtClean="0"/>
-                        <a:t>Previous_var</a:t>
-                      </a:r>
-                      <a:endParaRPr lang="en-NZ" dirty="0"/>
-                    </a:p>
-                  </a:txBody>
-                  <a:tcPr/>
-                </a:tc>
-                <a:tc>
-                  <a:txBody>
-                    <a:bodyPr/>
-                    <a:lstStyle/>
-                    <a:p>
-                      <a:r>
-                        <a:rPr lang="en-NZ" dirty="0" err="1" smtClean="0"/>
-                        <a:t>Initial_value</a:t>
-                      </a:r>
-                      <a:endParaRPr lang="en-NZ" dirty="0"/>
-                    </a:p>
-                  </a:txBody>
-                  <a:tcPr/>
-                </a:tc>
-                <a:tc>
-                  <a:txBody>
-                    <a:bodyPr/>
-                    <a:lstStyle/>
-                    <a:p>
-                      <a:r>
-                        <a:rPr lang="en-NZ" dirty="0" err="1" smtClean="0"/>
-                        <a:t>Outcome_type</a:t>
-                      </a:r>
-                      <a:endParaRPr lang="en-NZ" dirty="0"/>
-                    </a:p>
-                  </a:txBody>
-                  <a:tcPr/>
-                </a:tc>
-                <a:tc>
-                  <a:txBody>
-                    <a:bodyPr/>
-                    <a:lstStyle/>
-                    <a:p>
-                      <a:r>
-                        <a:rPr lang="en-NZ" dirty="0" err="1" smtClean="0"/>
-                        <a:t>Outcome_module</a:t>
-                      </a:r>
-                      <a:endParaRPr lang="en-NZ" dirty="0"/>
-                    </a:p>
-                  </a:txBody>
-                  <a:tcPr/>
-                </a:tc>
-              </a:tr>
-              <a:tr h="370840">
-                <a:tc>
-                  <a:txBody>
-                    <a:bodyPr/>
-                    <a:lstStyle/>
-                    <a:p>
-                      <a:r>
-                        <a:rPr lang="en-NZ" dirty="0" smtClean="0"/>
-                        <a:t>Age</a:t>
-                      </a:r>
-                      <a:endParaRPr lang="en-NZ" dirty="0"/>
-                    </a:p>
-                  </a:txBody>
-                  <a:tcPr/>
-                </a:tc>
-                <a:tc>
-                  <a:txBody>
-                    <a:bodyPr/>
-                    <a:lstStyle/>
-                    <a:p>
-                      <a:endParaRPr lang="en-NZ" dirty="0"/>
-                    </a:p>
-                  </a:txBody>
-                  <a:tcPr/>
-                </a:tc>
-                <a:tc>
-                  <a:txBody>
-                    <a:bodyPr/>
-                    <a:lstStyle/>
-                    <a:p>
-                      <a:r>
-                        <a:rPr lang="en-NZ" dirty="0" err="1" smtClean="0"/>
-                        <a:t>Basefile_age</a:t>
-                      </a:r>
-                      <a:endParaRPr lang="en-NZ" dirty="0"/>
-                    </a:p>
-                  </a:txBody>
-                  <a:tcPr/>
-                </a:tc>
-                <a:tc>
-                  <a:txBody>
-                    <a:bodyPr/>
-                    <a:lstStyle/>
-                    <a:p>
-                      <a:endParaRPr lang="en-NZ" dirty="0"/>
-                    </a:p>
-                  </a:txBody>
-                  <a:tcPr/>
-                </a:tc>
-                <a:tc>
-                  <a:txBody>
-                    <a:bodyPr/>
-                    <a:lstStyle/>
-                    <a:p>
-                      <a:endParaRPr lang="en-NZ" dirty="0"/>
-                    </a:p>
-                  </a:txBody>
-                  <a:tcPr/>
-                </a:tc>
-              </a:tr>
-              <a:tr h="370840">
-                <a:tc>
-                  <a:txBody>
-                    <a:bodyPr/>
-                    <a:lstStyle/>
-                    <a:p>
-                      <a:r>
-                        <a:rPr lang="en-NZ" dirty="0" smtClean="0"/>
-                        <a:t>Health</a:t>
-                      </a:r>
-                      <a:endParaRPr lang="en-NZ" dirty="0"/>
-                    </a:p>
-                  </a:txBody>
-                  <a:tcPr/>
-                </a:tc>
-                <a:tc>
-                  <a:txBody>
-                    <a:bodyPr/>
-                    <a:lstStyle/>
-                    <a:p>
-                      <a:r>
-                        <a:rPr lang="en-NZ" dirty="0" err="1" smtClean="0"/>
-                        <a:t>Health_previous</a:t>
-                      </a:r>
-                      <a:endParaRPr lang="en-NZ" dirty="0"/>
-                    </a:p>
-                  </a:txBody>
-                  <a:tcPr/>
-                </a:tc>
-                <a:tc>
-                  <a:txBody>
-                    <a:bodyPr/>
-                    <a:lstStyle/>
-                    <a:p>
-                      <a:r>
-                        <a:rPr lang="en-NZ" dirty="0" smtClean="0"/>
-                        <a:t>0</a:t>
-                      </a:r>
-                      <a:endParaRPr lang="en-NZ" dirty="0"/>
-                    </a:p>
-                  </a:txBody>
-                  <a:tcPr/>
-                </a:tc>
-                <a:tc>
-                  <a:txBody>
-                    <a:bodyPr/>
-                    <a:lstStyle/>
-                    <a:p>
-                      <a:r>
-                        <a:rPr lang="en-NZ" dirty="0" smtClean="0"/>
-                        <a:t>categorical</a:t>
-                      </a:r>
-                      <a:endParaRPr lang="en-NZ" dirty="0"/>
-                    </a:p>
-                  </a:txBody>
-                  <a:tcPr/>
-                </a:tc>
-                <a:tc>
-                  <a:txBody>
-                    <a:bodyPr/>
-                    <a:lstStyle/>
-                    <a:p>
-                      <a:r>
-                        <a:rPr lang="en-NZ" dirty="0" smtClean="0"/>
-                        <a:t>Main</a:t>
-                      </a:r>
-                      <a:endParaRPr lang="en-NZ" dirty="0"/>
-                    </a:p>
-                  </a:txBody>
-                  <a:tcPr/>
-                </a:tc>
-              </a:tr>
-              <a:tr h="370840">
-                <a:tc>
-                  <a:txBody>
-                    <a:bodyPr/>
-                    <a:lstStyle/>
-                    <a:p>
-                      <a:r>
-                        <a:rPr lang="en-NZ" dirty="0" err="1" smtClean="0"/>
-                        <a:t>Health_previous</a:t>
-                      </a:r>
-                      <a:endParaRPr lang="en-NZ" dirty="0"/>
-                    </a:p>
-                  </a:txBody>
-                  <a:tcPr/>
-                </a:tc>
-                <a:tc>
-                  <a:txBody>
-                    <a:bodyPr/>
-                    <a:lstStyle/>
-                    <a:p>
-                      <a:endParaRPr lang="en-NZ" dirty="0"/>
-                    </a:p>
-                  </a:txBody>
-                  <a:tcPr/>
-                </a:tc>
-                <a:tc>
-                  <a:txBody>
-                    <a:bodyPr/>
-                    <a:lstStyle/>
-                    <a:p>
-                      <a:r>
-                        <a:rPr lang="en-NZ" dirty="0" smtClean="0"/>
-                        <a:t>NA</a:t>
-                      </a:r>
-                      <a:endParaRPr lang="en-NZ" dirty="0"/>
-                    </a:p>
-                  </a:txBody>
-                  <a:tcPr/>
-                </a:tc>
-                <a:tc>
-                  <a:txBody>
-                    <a:bodyPr/>
-                    <a:lstStyle/>
-                    <a:p>
-                      <a:endParaRPr lang="en-NZ" dirty="0"/>
-                    </a:p>
-                  </a:txBody>
-                  <a:tcPr/>
-                </a:tc>
-                <a:tc>
-                  <a:txBody>
-                    <a:bodyPr/>
-                    <a:lstStyle/>
-                    <a:p>
-                      <a:endParaRPr lang="en-NZ" dirty="0"/>
-                    </a:p>
-                  </a:txBody>
-                  <a:tcPr/>
-                </a:tc>
-              </a:tr>
-              <a:tr h="370840">
-                <a:tc>
-                  <a:txBody>
-                    <a:bodyPr/>
-                    <a:lstStyle/>
-                    <a:p>
-                      <a:r>
-                        <a:rPr lang="en-NZ" dirty="0" smtClean="0"/>
-                        <a:t>Earnings</a:t>
-                      </a:r>
-                      <a:endParaRPr lang="en-NZ" dirty="0"/>
-                    </a:p>
-                  </a:txBody>
-                  <a:tcPr/>
-                </a:tc>
-                <a:tc>
-                  <a:txBody>
-                    <a:bodyPr/>
-                    <a:lstStyle/>
-                    <a:p>
-                      <a:endParaRPr lang="en-NZ" dirty="0"/>
-                    </a:p>
-                  </a:txBody>
-                  <a:tcPr/>
-                </a:tc>
-                <a:tc>
-                  <a:txBody>
-                    <a:bodyPr/>
-                    <a:lstStyle/>
-                    <a:p>
-                      <a:r>
-                        <a:rPr lang="en-NZ" dirty="0" smtClean="0"/>
-                        <a:t>0</a:t>
-                      </a:r>
-                      <a:endParaRPr lang="en-NZ" dirty="0"/>
-                    </a:p>
-                  </a:txBody>
-                  <a:tcPr/>
-                </a:tc>
-                <a:tc>
-                  <a:txBody>
-                    <a:bodyPr/>
-                    <a:lstStyle/>
-                    <a:p>
-                      <a:r>
-                        <a:rPr lang="en-NZ" dirty="0" smtClean="0"/>
-                        <a:t>continuous</a:t>
-                      </a:r>
-                      <a:endParaRPr lang="en-NZ" dirty="0"/>
-                    </a:p>
-                  </a:txBody>
-                  <a:tcPr/>
-                </a:tc>
-                <a:tc>
-                  <a:txBody>
-                    <a:bodyPr/>
-                    <a:lstStyle/>
-                    <a:p>
-                      <a:r>
-                        <a:rPr lang="en-NZ" dirty="0" smtClean="0"/>
-                        <a:t>Main</a:t>
-                      </a:r>
-                      <a:endParaRPr lang="en-NZ" dirty="0"/>
-                    </a:p>
-                  </a:txBody>
-                  <a:tcPr/>
-                </a:tc>
-              </a:tr>
-            </a:tbl>
-          </a:graphicData>
-        </a:graphic>
-      </p:graphicFrame>
+        </p:nvSpPr>
+        <p:spPr/>
+        <p:txBody>
+          <a:bodyPr>
+            <a:normAutofit fontScale="70000" lnSpcReduction="20000"/>
+          </a:bodyPr>
+          <a:lstStyle/>
+          <a:p>
+            <a:r>
+              <a:rPr lang="en-NZ" dirty="0" err="1" smtClean="0"/>
+              <a:t>Varname</a:t>
+            </a:r>
+            <a:r>
+              <a:rPr lang="en-NZ" dirty="0" smtClean="0"/>
+              <a:t>: </a:t>
+            </a:r>
+          </a:p>
+          <a:p>
+            <a:pPr lvl="1"/>
+            <a:r>
+              <a:rPr lang="en-NZ" dirty="0" smtClean="0"/>
+              <a:t>the name of a variable in the </a:t>
+            </a:r>
+            <a:r>
+              <a:rPr lang="en-NZ" dirty="0" err="1" smtClean="0"/>
+              <a:t>simframe</a:t>
+            </a:r>
+            <a:endParaRPr lang="en-NZ" dirty="0" smtClean="0"/>
+          </a:p>
+          <a:p>
+            <a:r>
+              <a:rPr lang="en-NZ" dirty="0" err="1" smtClean="0"/>
+              <a:t>Previous_var</a:t>
+            </a:r>
+            <a:endParaRPr lang="en-NZ" dirty="0" smtClean="0"/>
+          </a:p>
+          <a:p>
+            <a:pPr lvl="1"/>
+            <a:r>
+              <a:rPr lang="en-NZ" dirty="0" smtClean="0"/>
+              <a:t>the </a:t>
+            </a:r>
+            <a:r>
+              <a:rPr lang="en-NZ" dirty="0"/>
+              <a:t>name of a variable in which to store the current value in at the </a:t>
+            </a:r>
+            <a:r>
+              <a:rPr lang="en-NZ" dirty="0" smtClean="0"/>
+              <a:t>beginning of </a:t>
+            </a:r>
+            <a:r>
+              <a:rPr lang="en-NZ" dirty="0"/>
+              <a:t>each iteration (</a:t>
+            </a:r>
+            <a:r>
+              <a:rPr lang="en-NZ" dirty="0" err="1"/>
+              <a:t>i.e</a:t>
+            </a:r>
+            <a:r>
+              <a:rPr lang="en-NZ" dirty="0"/>
+              <a:t>: before it's transformed</a:t>
+            </a:r>
+            <a:r>
+              <a:rPr lang="en-NZ" dirty="0" smtClean="0"/>
+              <a:t>).</a:t>
+            </a:r>
+          </a:p>
+          <a:p>
+            <a:pPr lvl="1"/>
+            <a:r>
+              <a:rPr lang="en-NZ" dirty="0" smtClean="0"/>
+              <a:t>Optional </a:t>
+            </a:r>
+            <a:r>
+              <a:rPr lang="en-NZ" dirty="0"/>
+              <a:t>- for models that require previous state</a:t>
+            </a:r>
+            <a:r>
+              <a:rPr lang="en-NZ" dirty="0" smtClean="0"/>
+              <a:t>.</a:t>
+            </a:r>
+            <a:endParaRPr lang="en-NZ" dirty="0"/>
+          </a:p>
+          <a:p>
+            <a:r>
+              <a:rPr lang="en-NZ" dirty="0" err="1" smtClean="0"/>
+              <a:t>Initial_value</a:t>
+            </a:r>
+            <a:endParaRPr lang="en-NZ" dirty="0" smtClean="0"/>
+          </a:p>
+          <a:p>
+            <a:pPr lvl="1"/>
+            <a:r>
+              <a:rPr lang="en-NZ" dirty="0"/>
+              <a:t>an expression that generates the initial value of the variable</a:t>
+            </a:r>
+            <a:r>
+              <a:rPr lang="en-NZ" dirty="0" smtClean="0"/>
+              <a:t>. Typically this expression will reference values in a previously loaded </a:t>
+            </a:r>
+            <a:r>
+              <a:rPr lang="en-NZ" dirty="0" err="1" smtClean="0"/>
+              <a:t>basefile</a:t>
+            </a:r>
+            <a:r>
+              <a:rPr lang="en-NZ" dirty="0" smtClean="0"/>
+              <a:t>.</a:t>
+            </a:r>
+          </a:p>
+          <a:p>
+            <a:r>
+              <a:rPr lang="en-NZ" dirty="0" err="1" smtClean="0"/>
+              <a:t>Outcome_type</a:t>
+            </a:r>
+            <a:endParaRPr lang="en-NZ" dirty="0" smtClean="0"/>
+          </a:p>
+          <a:p>
+            <a:pPr lvl="1"/>
+            <a:r>
+              <a:rPr lang="en-NZ" dirty="0"/>
+              <a:t>i</a:t>
+            </a:r>
+            <a:r>
+              <a:rPr lang="en-NZ" dirty="0" smtClean="0"/>
+              <a:t>f specified, indicates this is an outcome variable and indicates its type which is one of “categorical” or “continuous”</a:t>
+            </a:r>
+          </a:p>
+          <a:p>
+            <a:r>
+              <a:rPr lang="en-NZ" dirty="0" err="1" smtClean="0"/>
+              <a:t>Outcome_module</a:t>
+            </a:r>
+            <a:endParaRPr lang="en-NZ" dirty="0" smtClean="0"/>
+          </a:p>
+          <a:p>
+            <a:pPr lvl="1"/>
+            <a:r>
+              <a:rPr lang="en-NZ" dirty="0"/>
+              <a:t>if specified, indicates the </a:t>
+            </a:r>
+            <a:r>
+              <a:rPr lang="en-NZ" dirty="0" err="1" smtClean="0"/>
+              <a:t>Simmodule</a:t>
+            </a:r>
+            <a:r>
+              <a:rPr lang="en-NZ" dirty="0" smtClean="0"/>
+              <a:t> </a:t>
+            </a:r>
+            <a:r>
+              <a:rPr lang="en-NZ" dirty="0"/>
+              <a:t>this outcome variable belongs to</a:t>
+            </a:r>
+            <a:endParaRPr lang="en-NZ" dirty="0" smtClean="0"/>
+          </a:p>
+          <a:p>
+            <a:pPr lvl="1"/>
+            <a:endParaRPr lang="en-NZ" dirty="0" smtClean="0"/>
+          </a:p>
+        </p:txBody>
+      </p:sp>
     </p:spTree>
   </p:cSld>
   <p:clrMapOvr>
@@ -4665,65 +4335,380 @@
           <a:lstStyle/>
           <a:p>
             <a:r>
-              <a:rPr lang="en-NZ" dirty="0" smtClean="0"/>
-              <a:t>One </a:t>
-            </a:r>
-            <a:r>
               <a:rPr lang="en-NZ" dirty="0" err="1" smtClean="0"/>
-              <a:t>simframe</a:t>
-            </a:r>
-            <a:r>
-              <a:rPr lang="en-NZ" dirty="0" smtClean="0"/>
-              <a:t> per environment</a:t>
+              <a:t>Simframe</a:t>
+            </a:r>
+            <a:r>
+              <a:rPr lang="en-NZ" dirty="0" smtClean="0"/>
+              <a:t> definition file</a:t>
             </a:r>
             <a:endParaRPr lang="en-NZ" dirty="0"/>
           </a:p>
         </p:txBody>
       </p:sp>
-      <p:sp>
-        <p:nvSpPr>
-          <p:cNvPr id="3" name="Content Placeholder 2"/>
-          <p:cNvSpPr>
-            <a:spLocks noGrp="1"/>
-          </p:cNvSpPr>
+      <p:graphicFrame>
+        <p:nvGraphicFramePr>
+          <p:cNvPr id="4" name="Content Placeholder 3"/>
+          <p:cNvGraphicFramePr>
+            <a:graphicFrameLocks noGrp="1"/>
+          </p:cNvGraphicFramePr>
           <p:nvPr>
             <p:ph idx="1"/>
           </p:nvPr>
-        </p:nvSpPr>
-        <p:spPr/>
-        <p:txBody>
-          <a:bodyPr/>
-          <a:lstStyle/>
-          <a:p>
-            <a:r>
-              <a:rPr lang="en-NZ" dirty="0" smtClean="0"/>
-              <a:t>When a simulation environment is created, it takes a copy of the master </a:t>
-            </a:r>
-            <a:r>
-              <a:rPr lang="en-NZ" dirty="0" err="1" smtClean="0"/>
-              <a:t>simframe</a:t>
-            </a:r>
-            <a:endParaRPr lang="en-NZ" dirty="0" smtClean="0"/>
-          </a:p>
-          <a:p>
-            <a:r>
-              <a:rPr lang="en-NZ" dirty="0" smtClean="0"/>
-              <a:t>Before simulating, a environment’s </a:t>
-            </a:r>
-            <a:r>
-              <a:rPr lang="en-NZ" dirty="0" err="1" smtClean="0"/>
-              <a:t>simframe</a:t>
-            </a:r>
-            <a:r>
-              <a:rPr lang="en-NZ" dirty="0" smtClean="0"/>
-              <a:t> may be modified to test a particular scenario</a:t>
-            </a:r>
-          </a:p>
-          <a:p>
-            <a:endParaRPr lang="en-NZ" dirty="0"/>
-          </a:p>
-        </p:txBody>
-      </p:sp>
+        </p:nvGraphicFramePr>
+        <p:xfrm>
+          <a:off x="457200" y="1600200"/>
+          <a:ext cx="8229600" cy="2392680"/>
+        </p:xfrm>
+        <a:graphic>
+          <a:graphicData uri="http://schemas.openxmlformats.org/drawingml/2006/table">
+            <a:tbl>
+              <a:tblPr firstRow="1" bandRow="1">
+                <a:tableStyleId>{5C22544A-7EE6-4342-B048-85BDC9FD1C3A}</a:tableStyleId>
+              </a:tblPr>
+              <a:tblGrid>
+                <a:gridCol w="1378496"/>
+                <a:gridCol w="1512168"/>
+                <a:gridCol w="1656184"/>
+                <a:gridCol w="1728192"/>
+                <a:gridCol w="1954560"/>
+              </a:tblGrid>
+              <a:tr h="370840">
+                <a:tc>
+                  <a:txBody>
+                    <a:bodyPr/>
+                    <a:lstStyle/>
+                    <a:p>
+                      <a:r>
+                        <a:rPr lang="en-NZ" smtClean="0"/>
+                        <a:t>Varname</a:t>
+                      </a:r>
+                      <a:endParaRPr lang="en-NZ" dirty="0"/>
+                    </a:p>
+                  </a:txBody>
+                  <a:tcPr/>
+                </a:tc>
+                <a:tc>
+                  <a:txBody>
+                    <a:bodyPr/>
+                    <a:lstStyle/>
+                    <a:p>
+                      <a:r>
+                        <a:rPr lang="en-NZ" dirty="0" err="1" smtClean="0"/>
+                        <a:t>Previous_var</a:t>
+                      </a:r>
+                      <a:endParaRPr lang="en-NZ" dirty="0"/>
+                    </a:p>
+                  </a:txBody>
+                  <a:tcPr/>
+                </a:tc>
+                <a:tc>
+                  <a:txBody>
+                    <a:bodyPr/>
+                    <a:lstStyle/>
+                    <a:p>
+                      <a:r>
+                        <a:rPr lang="en-NZ" dirty="0" err="1" smtClean="0"/>
+                        <a:t>Initial_value</a:t>
+                      </a:r>
+                      <a:endParaRPr lang="en-NZ" dirty="0"/>
+                    </a:p>
+                  </a:txBody>
+                  <a:tcPr/>
+                </a:tc>
+                <a:tc>
+                  <a:txBody>
+                    <a:bodyPr/>
+                    <a:lstStyle/>
+                    <a:p>
+                      <a:r>
+                        <a:rPr lang="en-NZ" dirty="0" err="1" smtClean="0"/>
+                        <a:t>Outcome_type</a:t>
+                      </a:r>
+                      <a:endParaRPr lang="en-NZ" dirty="0"/>
+                    </a:p>
+                  </a:txBody>
+                  <a:tcPr/>
+                </a:tc>
+                <a:tc>
+                  <a:txBody>
+                    <a:bodyPr/>
+                    <a:lstStyle/>
+                    <a:p>
+                      <a:r>
+                        <a:rPr lang="en-NZ" dirty="0" err="1" smtClean="0"/>
+                        <a:t>Outcome_module</a:t>
+                      </a:r>
+                      <a:endParaRPr lang="en-NZ" dirty="0"/>
+                    </a:p>
+                  </a:txBody>
+                  <a:tcPr/>
+                </a:tc>
+              </a:tr>
+              <a:tr h="370840">
+                <a:tc>
+                  <a:txBody>
+                    <a:bodyPr/>
+                    <a:lstStyle/>
+                    <a:p>
+                      <a:r>
+                        <a:rPr lang="en-NZ" dirty="0" smtClean="0"/>
+                        <a:t>Age</a:t>
+                      </a:r>
+                      <a:endParaRPr lang="en-NZ" dirty="0"/>
+                    </a:p>
+                  </a:txBody>
+                  <a:tcPr/>
+                </a:tc>
+                <a:tc>
+                  <a:txBody>
+                    <a:bodyPr/>
+                    <a:lstStyle/>
+                    <a:p>
+                      <a:endParaRPr lang="en-NZ" dirty="0"/>
+                    </a:p>
+                  </a:txBody>
+                  <a:tcPr/>
+                </a:tc>
+                <a:tc>
+                  <a:txBody>
+                    <a:bodyPr/>
+                    <a:lstStyle/>
+                    <a:p>
+                      <a:r>
+                        <a:rPr lang="en-NZ" dirty="0" err="1" smtClean="0"/>
+                        <a:t>Basefile_age</a:t>
+                      </a:r>
+                      <a:endParaRPr lang="en-NZ" dirty="0"/>
+                    </a:p>
+                  </a:txBody>
+                  <a:tcPr/>
+                </a:tc>
+                <a:tc>
+                  <a:txBody>
+                    <a:bodyPr/>
+                    <a:lstStyle/>
+                    <a:p>
+                      <a:endParaRPr lang="en-NZ" dirty="0"/>
+                    </a:p>
+                  </a:txBody>
+                  <a:tcPr/>
+                </a:tc>
+                <a:tc>
+                  <a:txBody>
+                    <a:bodyPr/>
+                    <a:lstStyle/>
+                    <a:p>
+                      <a:endParaRPr lang="en-NZ" dirty="0"/>
+                    </a:p>
+                  </a:txBody>
+                  <a:tcPr/>
+                </a:tc>
+              </a:tr>
+              <a:tr h="370840">
+                <a:tc>
+                  <a:txBody>
+                    <a:bodyPr/>
+                    <a:lstStyle/>
+                    <a:p>
+                      <a:r>
+                        <a:rPr lang="en-NZ" dirty="0" smtClean="0"/>
+                        <a:t>Health</a:t>
+                      </a:r>
+                      <a:endParaRPr lang="en-NZ" dirty="0"/>
+                    </a:p>
+                  </a:txBody>
+                  <a:tcPr/>
+                </a:tc>
+                <a:tc>
+                  <a:txBody>
+                    <a:bodyPr/>
+                    <a:lstStyle/>
+                    <a:p>
+                      <a:r>
+                        <a:rPr lang="en-NZ" dirty="0" err="1" smtClean="0"/>
+                        <a:t>Health_previous</a:t>
+                      </a:r>
+                      <a:endParaRPr lang="en-NZ" dirty="0"/>
+                    </a:p>
+                  </a:txBody>
+                  <a:tcPr/>
+                </a:tc>
+                <a:tc>
+                  <a:txBody>
+                    <a:bodyPr/>
+                    <a:lstStyle/>
+                    <a:p>
+                      <a:r>
+                        <a:rPr lang="en-NZ" dirty="0" smtClean="0"/>
+                        <a:t>0</a:t>
+                      </a:r>
+                      <a:endParaRPr lang="en-NZ" dirty="0"/>
+                    </a:p>
+                  </a:txBody>
+                  <a:tcPr/>
+                </a:tc>
+                <a:tc>
+                  <a:txBody>
+                    <a:bodyPr/>
+                    <a:lstStyle/>
+                    <a:p>
+                      <a:r>
+                        <a:rPr lang="en-NZ" dirty="0" smtClean="0"/>
+                        <a:t>categorical</a:t>
+                      </a:r>
+                      <a:endParaRPr lang="en-NZ" dirty="0"/>
+                    </a:p>
+                  </a:txBody>
+                  <a:tcPr/>
+                </a:tc>
+                <a:tc>
+                  <a:txBody>
+                    <a:bodyPr/>
+                    <a:lstStyle/>
+                    <a:p>
+                      <a:r>
+                        <a:rPr lang="en-NZ" dirty="0" smtClean="0"/>
+                        <a:t>Main</a:t>
+                      </a:r>
+                      <a:endParaRPr lang="en-NZ" dirty="0"/>
+                    </a:p>
+                  </a:txBody>
+                  <a:tcPr/>
+                </a:tc>
+              </a:tr>
+              <a:tr h="370840">
+                <a:tc>
+                  <a:txBody>
+                    <a:bodyPr/>
+                    <a:lstStyle/>
+                    <a:p>
+                      <a:r>
+                        <a:rPr lang="en-NZ" dirty="0" err="1" smtClean="0"/>
+                        <a:t>Health_previous</a:t>
+                      </a:r>
+                      <a:endParaRPr lang="en-NZ" dirty="0"/>
+                    </a:p>
+                  </a:txBody>
+                  <a:tcPr/>
+                </a:tc>
+                <a:tc>
+                  <a:txBody>
+                    <a:bodyPr/>
+                    <a:lstStyle/>
+                    <a:p>
+                      <a:endParaRPr lang="en-NZ" dirty="0"/>
+                    </a:p>
+                  </a:txBody>
+                  <a:tcPr/>
+                </a:tc>
+                <a:tc>
+                  <a:txBody>
+                    <a:bodyPr/>
+                    <a:lstStyle/>
+                    <a:p>
+                      <a:r>
+                        <a:rPr lang="en-NZ" dirty="0" smtClean="0"/>
+                        <a:t>NA</a:t>
+                      </a:r>
+                      <a:endParaRPr lang="en-NZ" dirty="0"/>
+                    </a:p>
+                  </a:txBody>
+                  <a:tcPr/>
+                </a:tc>
+                <a:tc>
+                  <a:txBody>
+                    <a:bodyPr/>
+                    <a:lstStyle/>
+                    <a:p>
+                      <a:endParaRPr lang="en-NZ" dirty="0"/>
+                    </a:p>
+                  </a:txBody>
+                  <a:tcPr/>
+                </a:tc>
+                <a:tc>
+                  <a:txBody>
+                    <a:bodyPr/>
+                    <a:lstStyle/>
+                    <a:p>
+                      <a:endParaRPr lang="en-NZ" dirty="0"/>
+                    </a:p>
+                  </a:txBody>
+                  <a:tcPr/>
+                </a:tc>
+              </a:tr>
+              <a:tr h="370840">
+                <a:tc>
+                  <a:txBody>
+                    <a:bodyPr/>
+                    <a:lstStyle/>
+                    <a:p>
+                      <a:r>
+                        <a:rPr lang="en-NZ" dirty="0" smtClean="0"/>
+                        <a:t>Earnings</a:t>
+                      </a:r>
+                      <a:endParaRPr lang="en-NZ" dirty="0"/>
+                    </a:p>
+                  </a:txBody>
+                  <a:tcPr/>
+                </a:tc>
+                <a:tc>
+                  <a:txBody>
+                    <a:bodyPr/>
+                    <a:lstStyle/>
+                    <a:p>
+                      <a:endParaRPr lang="en-NZ" dirty="0"/>
+                    </a:p>
+                  </a:txBody>
+                  <a:tcPr/>
+                </a:tc>
+                <a:tc>
+                  <a:txBody>
+                    <a:bodyPr/>
+                    <a:lstStyle/>
+                    <a:p>
+                      <a:r>
+                        <a:rPr lang="en-NZ" dirty="0" smtClean="0"/>
+                        <a:t>0</a:t>
+                      </a:r>
+                      <a:endParaRPr lang="en-NZ" dirty="0"/>
+                    </a:p>
+                  </a:txBody>
+                  <a:tcPr/>
+                </a:tc>
+                <a:tc>
+                  <a:txBody>
+                    <a:bodyPr/>
+                    <a:lstStyle/>
+                    <a:p>
+                      <a:r>
+                        <a:rPr lang="en-NZ" dirty="0" smtClean="0"/>
+                        <a:t>continuous</a:t>
+                      </a:r>
+                      <a:endParaRPr lang="en-NZ" dirty="0"/>
+                    </a:p>
+                  </a:txBody>
+                  <a:tcPr/>
+                </a:tc>
+                <a:tc>
+                  <a:txBody>
+                    <a:bodyPr/>
+                    <a:lstStyle/>
+                    <a:p>
+                      <a:r>
+                        <a:rPr lang="en-NZ" dirty="0" smtClean="0"/>
+                        <a:t>Main</a:t>
+                      </a:r>
+                      <a:endParaRPr lang="en-NZ" dirty="0"/>
+                    </a:p>
+                  </a:txBody>
+                  <a:tcPr/>
+                </a:tc>
+              </a:tr>
+            </a:tbl>
+          </a:graphicData>
+        </a:graphic>
+      </p:graphicFrame>
     </p:spTree>
   </p:cSld>
   <p:clrMapOvr>
@@ -4766,7 +4751,15 @@
           <a:p>
             <a:r>
               <a:rPr lang="en-NZ" dirty="0" smtClean="0"/>
-              <a:t>The simulation process</a:t>
+              <a:t>One </a:t>
+            </a:r>
+            <a:r>
+              <a:rPr lang="en-NZ" dirty="0" err="1" smtClean="0"/>
+              <a:t>simframe</a:t>
+            </a:r>
+            <a:r>
+              <a:rPr lang="en-NZ" dirty="0" smtClean="0"/>
+              <a:t> per environment</a:t>
             </a:r>
             <a:endParaRPr lang="en-NZ" dirty="0"/>
           </a:p>
@@ -4784,97 +4777,39 @@
         </p:nvSpPr>
         <p:spPr/>
         <p:txBody>
-          <a:bodyPr>
-            <a:normAutofit fontScale="77500" lnSpcReduction="20000"/>
-          </a:bodyPr>
+          <a:bodyPr/>
           <a:lstStyle/>
           <a:p>
             <a:r>
               <a:rPr lang="en-NZ" dirty="0" smtClean="0"/>
-              <a:t>Categorical adjustments for iteration 1 are applied to the </a:t>
+              <a:t>When a simulation environment is created, it takes a copy of the master </a:t>
             </a:r>
             <a:r>
               <a:rPr lang="en-NZ" dirty="0" err="1" smtClean="0"/>
               <a:t>simframe</a:t>
             </a:r>
-            <a:r>
-              <a:rPr lang="en-NZ" dirty="0" smtClean="0"/>
-              <a:t>. The adjustments applied are specified in the </a:t>
+            <a:endParaRPr lang="en-NZ" dirty="0" smtClean="0"/>
+          </a:p>
+          <a:p>
+            <a:r>
+              <a:rPr lang="en-NZ" dirty="0" smtClean="0"/>
+              <a:t>Before simulating, a environment’s </a:t>
             </a:r>
             <a:r>
               <a:rPr lang="en-NZ" dirty="0" err="1" smtClean="0"/>
-              <a:t>cat.adjustments</a:t>
-            </a:r>
-            <a:r>
-              <a:rPr lang="en-NZ" dirty="0" smtClean="0"/>
-              <a:t> variable. </a:t>
-            </a:r>
-          </a:p>
-          <a:p>
-            <a:pPr lvl="1"/>
-            <a:r>
-              <a:rPr lang="en-NZ" dirty="0" smtClean="0"/>
-              <a:t>Other adjustments that might need to be performed, such as adjustments to continuous variables, can be done outside </a:t>
-            </a:r>
-            <a:r>
-              <a:rPr lang="en-NZ" dirty="0" err="1" smtClean="0"/>
-              <a:t>simar</a:t>
-            </a:r>
-            <a:r>
-              <a:rPr lang="en-NZ" dirty="0" smtClean="0"/>
-              <a:t> by the user before simulation.</a:t>
-            </a:r>
-          </a:p>
-          <a:p>
-            <a:r>
-              <a:rPr lang="en-NZ" dirty="0" smtClean="0"/>
-              <a:t>Pre simulation stats are generated</a:t>
-            </a:r>
-          </a:p>
-          <a:p>
-            <a:r>
-              <a:rPr lang="en-NZ" dirty="0" smtClean="0"/>
-              <a:t>Run loop</a:t>
-            </a:r>
-          </a:p>
-          <a:p>
-            <a:pPr lvl="1"/>
-            <a:r>
-              <a:rPr lang="en-NZ" dirty="0" smtClean="0"/>
-              <a:t>During each run, the following functions are called on each module</a:t>
-            </a:r>
-          </a:p>
-          <a:p>
-            <a:pPr lvl="2"/>
-            <a:r>
-              <a:rPr lang="en-NZ" dirty="0" err="1" smtClean="0"/>
-              <a:t>simulateRun</a:t>
-            </a:r>
-            <a:endParaRPr lang="en-NZ" dirty="0" smtClean="0"/>
-          </a:p>
-          <a:p>
-            <a:pPr lvl="2"/>
-            <a:r>
-              <a:rPr lang="en-NZ" dirty="0" err="1" smtClean="0"/>
-              <a:t>appendRunStats</a:t>
-            </a:r>
-            <a:endParaRPr lang="en-NZ" dirty="0" smtClean="0"/>
-          </a:p>
-          <a:p>
-            <a:r>
-              <a:rPr lang="en-NZ" dirty="0" smtClean="0"/>
-              <a:t>Final results are calculated by each module across all runs</a:t>
-            </a:r>
+              <a:t>simframe</a:t>
+            </a:r>
+            <a:r>
+              <a:rPr lang="en-NZ" dirty="0" smtClean="0"/>
+              <a:t> may be modified to test a particular scenario</a:t>
+            </a:r>
+          </a:p>
+          <a:p>
             <a:endParaRPr lang="en-NZ" dirty="0"/>
           </a:p>
         </p:txBody>
       </p:sp>
     </p:spTree>
-    <p:extLst>
-      <p:ext uri="{BB962C8B-B14F-4D97-AF65-F5344CB8AC3E}">
-        <p14:creationId xmlns:p14="http://schemas.microsoft.com/office/powerpoint/2010/main" val="3435886797"/>
-      </p:ext>
-    </p:extLst>
   </p:cSld>
   <p:clrMapOvr>
     <a:masterClrMapping/>
@@ -4911,6 +4846,156 @@
         </p:nvSpPr>
         <p:spPr/>
         <p:txBody>
+          <a:bodyPr/>
+          <a:lstStyle/>
+          <a:p>
+            <a:r>
+              <a:rPr lang="en-NZ" dirty="0" smtClean="0"/>
+              <a:t>The simulation process</a:t>
+            </a:r>
+            <a:endParaRPr lang="en-NZ" dirty="0"/>
+          </a:p>
+        </p:txBody>
+      </p:sp>
+      <p:sp>
+        <p:nvSpPr>
+          <p:cNvPr id="3" name="Content Placeholder 2"/>
+          <p:cNvSpPr>
+            <a:spLocks noGrp="1"/>
+          </p:cNvSpPr>
+          <p:nvPr>
+            <p:ph idx="1"/>
+          </p:nvPr>
+        </p:nvSpPr>
+        <p:spPr/>
+        <p:txBody>
+          <a:bodyPr>
+            <a:normAutofit fontScale="77500" lnSpcReduction="20000"/>
+          </a:bodyPr>
+          <a:lstStyle/>
+          <a:p>
+            <a:r>
+              <a:rPr lang="en-NZ" dirty="0" smtClean="0"/>
+              <a:t>Categorical adjustments for iteration 1 are applied to the </a:t>
+            </a:r>
+            <a:r>
+              <a:rPr lang="en-NZ" dirty="0" err="1" smtClean="0"/>
+              <a:t>simframe</a:t>
+            </a:r>
+            <a:r>
+              <a:rPr lang="en-NZ" dirty="0" smtClean="0"/>
+              <a:t>. The adjustments applied are specified in the </a:t>
+            </a:r>
+            <a:r>
+              <a:rPr lang="en-NZ" dirty="0" err="1" smtClean="0"/>
+              <a:t>cat.adjustments</a:t>
+            </a:r>
+            <a:r>
+              <a:rPr lang="en-NZ" dirty="0" smtClean="0"/>
+              <a:t> variable. </a:t>
+            </a:r>
+          </a:p>
+          <a:p>
+            <a:pPr lvl="1"/>
+            <a:r>
+              <a:rPr lang="en-NZ" dirty="0" smtClean="0"/>
+              <a:t>Other adjustments that might need to be performed, such as adjustments to continuous variables, can be done outside </a:t>
+            </a:r>
+            <a:r>
+              <a:rPr lang="en-NZ" dirty="0" err="1" smtClean="0"/>
+              <a:t>simar</a:t>
+            </a:r>
+            <a:r>
+              <a:rPr lang="en-NZ" dirty="0" smtClean="0"/>
+              <a:t> by the user before simulation.</a:t>
+            </a:r>
+          </a:p>
+          <a:p>
+            <a:r>
+              <a:rPr lang="en-NZ" dirty="0" smtClean="0"/>
+              <a:t>Pre simulation stats are generated</a:t>
+            </a:r>
+          </a:p>
+          <a:p>
+            <a:r>
+              <a:rPr lang="en-NZ" dirty="0" smtClean="0"/>
+              <a:t>Run loop</a:t>
+            </a:r>
+          </a:p>
+          <a:p>
+            <a:pPr lvl="1"/>
+            <a:r>
+              <a:rPr lang="en-NZ" dirty="0" smtClean="0"/>
+              <a:t>During each run, the following functions are called on each module</a:t>
+            </a:r>
+          </a:p>
+          <a:p>
+            <a:pPr lvl="2"/>
+            <a:r>
+              <a:rPr lang="en-NZ" dirty="0" err="1" smtClean="0"/>
+              <a:t>simulateRun</a:t>
+            </a:r>
+            <a:endParaRPr lang="en-NZ" dirty="0" smtClean="0"/>
+          </a:p>
+          <a:p>
+            <a:pPr lvl="2"/>
+            <a:r>
+              <a:rPr lang="en-NZ" dirty="0" err="1" smtClean="0"/>
+              <a:t>appendRunStats</a:t>
+            </a:r>
+            <a:endParaRPr lang="en-NZ" dirty="0" smtClean="0"/>
+          </a:p>
+          <a:p>
+            <a:r>
+              <a:rPr lang="en-NZ" dirty="0" smtClean="0"/>
+              <a:t>Final results are calculated by each module across all runs</a:t>
+            </a:r>
+            <a:endParaRPr lang="en-NZ" dirty="0"/>
+          </a:p>
+        </p:txBody>
+      </p:sp>
+    </p:spTree>
+    <p:extLst>
+      <p:ext uri="{BB962C8B-B14F-4D97-AF65-F5344CB8AC3E}">
+        <p14:creationId xmlns:p14="http://schemas.microsoft.com/office/powerpoint/2010/main" val="3435886797"/>
+      </p:ext>
+    </p:extLst>
+  </p:cSld>
+  <p:clrMapOvr>
+    <a:masterClrMapping/>
+  </p:clrMapOvr>
+</p:sld>
+</file>
+
+<file path=ppt/slides/slide19.xml><?xml version="1.0" encoding="utf-8"?>
+<p:sld xmlns:a="http://schemas.openxmlformats.org/drawingml/2006/main" xmlns:r="http://schemas.openxmlformats.org/officeDocument/2006/relationships" xmlns:p="http://schemas.openxmlformats.org/presentationml/2006/main">
+  <p:cSld>
+    <p:spTree>
+      <p:nvGrpSpPr>
+        <p:cNvPr id="1" name=""/>
+        <p:cNvGrpSpPr/>
+        <p:nvPr/>
+      </p:nvGrpSpPr>
+      <p:grpSpPr>
+        <a:xfrm>
+          <a:off x="0" y="0"/>
+          <a:ext cx="0" cy="0"/>
+          <a:chOff x="0" y="0"/>
+          <a:chExt cx="0" cy="0"/>
+        </a:xfrm>
+      </p:grpSpPr>
+      <p:sp>
+        <p:nvSpPr>
+          <p:cNvPr id="2" name="Title 1"/>
+          <p:cNvSpPr>
+            <a:spLocks noGrp="1"/>
+          </p:cNvSpPr>
+          <p:nvPr>
+            <p:ph type="title"/>
+          </p:nvPr>
+        </p:nvSpPr>
+        <p:spPr/>
+        <p:txBody>
           <a:bodyPr>
             <a:normAutofit/>
           </a:bodyPr>
@@ -5061,7 +5146,93 @@
 </p:sld>
 </file>
 
-<file path=ppt/slides/slide19.xml><?xml version="1.0" encoding="utf-8"?>
+<file path=ppt/slides/slide2.xml><?xml version="1.0" encoding="utf-8"?>
+<p:sld xmlns:a="http://schemas.openxmlformats.org/drawingml/2006/main" xmlns:r="http://schemas.openxmlformats.org/officeDocument/2006/relationships" xmlns:p="http://schemas.openxmlformats.org/presentationml/2006/main">
+  <p:cSld>
+    <p:spTree>
+      <p:nvGrpSpPr>
+        <p:cNvPr id="1" name=""/>
+        <p:cNvGrpSpPr/>
+        <p:nvPr/>
+      </p:nvGrpSpPr>
+      <p:grpSpPr>
+        <a:xfrm>
+          <a:off x="0" y="0"/>
+          <a:ext cx="0" cy="0"/>
+          <a:chOff x="0" y="0"/>
+          <a:chExt cx="0" cy="0"/>
+        </a:xfrm>
+      </p:grpSpPr>
+      <p:sp>
+        <p:nvSpPr>
+          <p:cNvPr id="4" name="Title 3"/>
+          <p:cNvSpPr>
+            <a:spLocks noGrp="1"/>
+          </p:cNvSpPr>
+          <p:nvPr>
+            <p:ph type="title"/>
+          </p:nvPr>
+        </p:nvSpPr>
+        <p:spPr/>
+        <p:txBody>
+          <a:bodyPr/>
+          <a:lstStyle/>
+          <a:p>
+            <a:r>
+              <a:rPr lang="en-NZ" dirty="0" smtClean="0"/>
+              <a:t>Glossary</a:t>
+            </a:r>
+            <a:endParaRPr lang="en-NZ" dirty="0"/>
+          </a:p>
+        </p:txBody>
+      </p:sp>
+      <p:sp>
+        <p:nvSpPr>
+          <p:cNvPr id="5" name="Content Placeholder 4"/>
+          <p:cNvSpPr>
+            <a:spLocks noGrp="1"/>
+          </p:cNvSpPr>
+          <p:nvPr>
+            <p:ph idx="1"/>
+          </p:nvPr>
+        </p:nvSpPr>
+        <p:spPr/>
+        <p:txBody>
+          <a:bodyPr/>
+          <a:lstStyle/>
+          <a:p>
+            <a:r>
+              <a:rPr lang="en-NZ" dirty="0" smtClean="0"/>
+              <a:t>Micro-unit:</a:t>
+            </a:r>
+          </a:p>
+          <a:p>
+            <a:pPr lvl="1"/>
+            <a:r>
+              <a:rPr lang="en-NZ" dirty="0" smtClean="0"/>
+              <a:t>The unit of analysis being simulated, </a:t>
+            </a:r>
+            <a:r>
+              <a:rPr lang="en-NZ" dirty="0" err="1" smtClean="0"/>
+              <a:t>eg</a:t>
+            </a:r>
+            <a:r>
+              <a:rPr lang="en-NZ" dirty="0" smtClean="0"/>
+              <a:t>: child, patient etc.</a:t>
+            </a:r>
+            <a:endParaRPr lang="en-NZ" dirty="0"/>
+          </a:p>
+        </p:txBody>
+      </p:sp>
+    </p:spTree>
+  </p:cSld>
+  <p:clrMapOvr>
+    <a:masterClrMapping/>
+  </p:clrMapOvr>
+</p:sld>
+</file>
+
+<file path=ppt/slides/slide20.xml><?xml version="1.0" encoding="utf-8"?>
 <p:sld xmlns:a="http://schemas.openxmlformats.org/drawingml/2006/main" xmlns:r="http://schemas.openxmlformats.org/officeDocument/2006/relationships" xmlns:p="http://schemas.openxmlformats.org/presentationml/2006/main">
   <p:cSld>
     <p:spTree>
@@ -8484,74 +8655,7 @@
 </p:sld>
 </file>
 
-<file path=ppt/slides/slide2.xml><?xml version="1.0" encoding="utf-8"?>
-<p:sld xmlns:a="http://schemas.openxmlformats.org/drawingml/2006/main" xmlns:r="http://schemas.openxmlformats.org/officeDocument/2006/relationships" xmlns:p="http://schemas.openxmlformats.org/presentationml/2006/main">
-  <p:cSld>
-    <p:spTree>
-      <p:nvGrpSpPr>
-        <p:cNvPr id="1" name=""/>
-        <p:cNvGrpSpPr/>
-        <p:nvPr/>
-      </p:nvGrpSpPr>
-      <p:grpSpPr>
-        <a:xfrm>
-          <a:off x="0" y="0"/>
-          <a:ext cx="0" cy="0"/>
-          <a:chOff x="0" y="0"/>
-          <a:chExt cx="0" cy="0"/>
-        </a:xfrm>
-      </p:grpSpPr>
-      <p:sp>
-        <p:nvSpPr>
-          <p:cNvPr id="4" name="Title 3"/>
-          <p:cNvSpPr>
-            <a:spLocks noGrp="1"/>
-          </p:cNvSpPr>
-          <p:nvPr>
-            <p:ph type="title"/>
-          </p:nvPr>
-        </p:nvSpPr>
-        <p:spPr/>
-        <p:txBody>
-          <a:bodyPr/>
-          <a:lstStyle/>
-          <a:p>
-            <a:r>
-              <a:rPr lang="en-NZ" dirty="0" smtClean="0"/>
-              <a:t>Terminology</a:t>
-            </a:r>
-            <a:endParaRPr lang="en-NZ" dirty="0"/>
-          </a:p>
-        </p:txBody>
-      </p:sp>
-      <p:sp>
-        <p:nvSpPr>
-          <p:cNvPr id="5" name="Text Placeholder 4"/>
-          <p:cNvSpPr>
-            <a:spLocks noGrp="1"/>
-          </p:cNvSpPr>
-          <p:nvPr>
-            <p:ph type="body" idx="1"/>
-          </p:nvPr>
-        </p:nvSpPr>
-        <p:spPr/>
-        <p:txBody>
-          <a:bodyPr/>
-          <a:lstStyle/>
-          <a:p>
-            <a:endParaRPr lang="en-NZ"/>
-          </a:p>
-        </p:txBody>
-      </p:sp>
-    </p:spTree>
-  </p:cSld>
-  <p:clrMapOvr>
-    <a:masterClrMapping/>
-  </p:clrMapOvr>
-</p:sld>
-</file>
-
-<file path=ppt/slides/slide20.xml><?xml version="1.0" encoding="utf-8"?>
+<file path=ppt/slides/slide21.xml><?xml version="1.0" encoding="utf-8"?>
 <p:sld xmlns:a="http://schemas.openxmlformats.org/drawingml/2006/main" xmlns:r="http://schemas.openxmlformats.org/officeDocument/2006/relationships" xmlns:p="http://schemas.openxmlformats.org/presentationml/2006/main">
   <p:cSld>
     <p:spTree>
@@ -8637,7 +8741,7 @@
       </p:grpSpPr>
       <p:sp>
         <p:nvSpPr>
-          <p:cNvPr id="4" name="Title 3"/>
+          <p:cNvPr id="2" name="Title 1"/>
           <p:cNvSpPr>
             <a:spLocks noGrp="1"/>
           </p:cNvSpPr>
@@ -8650,13 +8754,21 @@
           <a:bodyPr/>
           <a:lstStyle/>
           <a:p>
-            <a:endParaRPr lang="en-NZ"/>
+            <a:r>
+              <a:rPr lang="en-NZ" dirty="0" err="1" smtClean="0"/>
+              <a:t>simar</a:t>
+            </a:r>
+            <a:r>
+              <a:rPr lang="en-NZ" dirty="0" smtClean="0"/>
+              <a:t> features</a:t>
+            </a:r>
+            <a:endParaRPr lang="en-NZ" dirty="0"/>
           </a:p>
         </p:txBody>
       </p:sp>
       <p:sp>
         <p:nvSpPr>
-          <p:cNvPr id="5" name="Content Placeholder 4"/>
+          <p:cNvPr id="3" name="Content Placeholder 2"/>
           <p:cNvSpPr>
             <a:spLocks noGrp="1"/>
           </p:cNvSpPr>
@@ -8666,33 +8778,110 @@
         </p:nvSpPr>
         <p:spPr/>
         <p:txBody>
-          <a:bodyPr/>
+          <a:bodyPr>
+            <a:normAutofit fontScale="62500" lnSpcReduction="20000"/>
+          </a:bodyPr>
           <a:lstStyle/>
           <a:p>
             <a:r>
               <a:rPr lang="en-NZ" dirty="0" smtClean="0"/>
-              <a:t>Micro-unit:</a:t>
+              <a:t>Perform dynamic simulation, i.e.: transform a single set of micro-units</a:t>
             </a:r>
           </a:p>
           <a:p>
             <a:pPr lvl="1"/>
             <a:r>
               <a:rPr lang="en-NZ" dirty="0" smtClean="0"/>
-              <a:t>The unit of analysis being simulated, </a:t>
+              <a:t>transformations can occur across multiple iterations and statistics can by generated from the results of each iteration</a:t>
+            </a:r>
+          </a:p>
+          <a:p>
+            <a:pPr lvl="1"/>
+            <a:r>
+              <a:rPr lang="en-NZ" dirty="0" smtClean="0"/>
+              <a:t>transformations include results from</a:t>
+            </a:r>
+          </a:p>
+          <a:p>
+            <a:pPr lvl="2"/>
+            <a:r>
+              <a:rPr lang="en-NZ" dirty="0"/>
+              <a:t>l</a:t>
+            </a:r>
+            <a:r>
+              <a:rPr lang="en-NZ" dirty="0" smtClean="0"/>
+              <a:t>ogistic,  binomial, Poisson, negative binomial, and normal regression models with coefficients specified via a file</a:t>
+            </a:r>
+          </a:p>
+          <a:p>
+            <a:pPr lvl="2"/>
+            <a:r>
+              <a:rPr lang="en-NZ" dirty="0" smtClean="0"/>
+              <a:t>transformation probabilities specified in a file</a:t>
+            </a:r>
+          </a:p>
+          <a:p>
+            <a:r>
+              <a:rPr lang="en-NZ" dirty="0" smtClean="0"/>
+              <a:t>Simulations can be run multiple times and the statistics generated from the results of each iteration can be averaged across runs</a:t>
+            </a:r>
+          </a:p>
+          <a:p>
+            <a:pPr lvl="1"/>
+            <a:r>
+              <a:rPr lang="en-NZ" dirty="0"/>
+              <a:t>s</a:t>
+            </a:r>
+            <a:r>
+              <a:rPr lang="en-NZ" dirty="0" smtClean="0"/>
+              <a:t>tatistics that can be generated include frequencies, means, </a:t>
             </a:r>
             <a:r>
               <a:rPr lang="en-NZ" dirty="0" err="1" smtClean="0"/>
-              <a:t>eg</a:t>
-            </a:r>
-            <a:r>
-              <a:rPr lang="en-NZ" dirty="0" smtClean="0"/>
-              <a:t>: child, patient etc.</a:t>
+              <a:t>quantiles</a:t>
+            </a:r>
+            <a:r>
+              <a:rPr lang="en-NZ" dirty="0" smtClean="0"/>
+              <a:t>, and summaries</a:t>
+            </a:r>
+          </a:p>
+          <a:p>
+            <a:r>
+              <a:rPr lang="en-NZ" dirty="0" smtClean="0"/>
+              <a:t>A simulation can be run as-is, or variables modified to test a scenario and observe the flow-on effect</a:t>
+            </a:r>
+          </a:p>
+          <a:p>
+            <a:pPr lvl="1"/>
+            <a:r>
+              <a:rPr lang="en-NZ" dirty="0"/>
+              <a:t>c</a:t>
+            </a:r>
+            <a:r>
+              <a:rPr lang="en-NZ" dirty="0" smtClean="0"/>
+              <a:t>ontinuous variables can be modified before the simulation begins</a:t>
+            </a:r>
+          </a:p>
+          <a:p>
+            <a:pPr lvl="1"/>
+            <a:r>
+              <a:rPr lang="en-NZ" dirty="0"/>
+              <a:t>c</a:t>
+            </a:r>
+            <a:r>
+              <a:rPr lang="en-NZ" dirty="0" smtClean="0"/>
+              <a:t>ategorical variables can be modified before the simulation begins, or during the simulation for specific iterations</a:t>
             </a:r>
             <a:endParaRPr lang="en-NZ" dirty="0"/>
           </a:p>
         </p:txBody>
       </p:sp>
     </p:spTree>
+    <p:extLst>
+      <p:ext uri="{BB962C8B-B14F-4D97-AF65-F5344CB8AC3E}">
+        <p14:creationId xmlns:p14="http://schemas.microsoft.com/office/powerpoint/2010/main" val="2965780452"/>
+      </p:ext>
+    </p:extLst>
   </p:cSld>
   <p:clrMapOvr>
     <a:masterClrMapping/>
@@ -8734,7 +8923,7 @@
           <a:p>
             <a:r>
               <a:rPr lang="en-NZ" dirty="0" smtClean="0"/>
-              <a:t>SIMFRAME</a:t>
+              <a:t>Global environment contents</a:t>
             </a:r>
             <a:endParaRPr lang="en-NZ" dirty="0"/>
           </a:p>
@@ -8742,24 +8931,78 @@
       </p:sp>
       <p:sp>
         <p:nvSpPr>
-          <p:cNvPr id="5" name="Text Placeholder 4"/>
+          <p:cNvPr id="5" name="Content Placeholder 4"/>
           <p:cNvSpPr>
             <a:spLocks noGrp="1"/>
           </p:cNvSpPr>
           <p:nvPr>
-            <p:ph type="body" idx="1"/>
+            <p:ph idx="1"/>
           </p:nvPr>
         </p:nvSpPr>
         <p:spPr/>
         <p:txBody>
-          <a:bodyPr/>
+          <a:bodyPr>
+            <a:normAutofit/>
+          </a:bodyPr>
           <a:lstStyle/>
           <a:p>
-            <a:endParaRPr lang="en-NZ"/>
+            <a:r>
+              <a:rPr lang="en-NZ" dirty="0" smtClean="0"/>
+              <a:t>Models</a:t>
+            </a:r>
+          </a:p>
+          <a:p>
+            <a:pPr lvl="1"/>
+            <a:r>
+              <a:rPr lang="en-NZ" dirty="0"/>
+              <a:t> </a:t>
+            </a:r>
+            <a:r>
+              <a:rPr lang="en-NZ" dirty="0" smtClean="0"/>
+              <a:t>list of generalized linear models. These contain model equations, i.e.: variable names and their coefficients</a:t>
+            </a:r>
+            <a:r>
+              <a:rPr lang="en-NZ" dirty="0"/>
+              <a:t>.</a:t>
+            </a:r>
+            <a:endParaRPr lang="en-NZ" dirty="0" smtClean="0"/>
+          </a:p>
+          <a:p>
+            <a:r>
+              <a:rPr lang="en-NZ" dirty="0" smtClean="0"/>
+              <a:t>Propensities</a:t>
+            </a:r>
+          </a:p>
+          <a:p>
+            <a:pPr lvl="1"/>
+            <a:r>
+              <a:rPr lang="en-NZ" dirty="0" smtClean="0"/>
+              <a:t>list of propensity arrays used for categorical adjustment </a:t>
+            </a:r>
+          </a:p>
+          <a:p>
+            <a:r>
+              <a:rPr lang="en-NZ" dirty="0" smtClean="0"/>
+              <a:t>Simulation environments (</a:t>
+            </a:r>
+            <a:r>
+              <a:rPr lang="en-NZ" dirty="0" err="1" smtClean="0"/>
+              <a:t>Simenv</a:t>
+            </a:r>
+            <a:r>
+              <a:rPr lang="en-NZ" dirty="0" smtClean="0"/>
+              <a:t>)</a:t>
+            </a:r>
+            <a:endParaRPr lang="en-NZ" dirty="0"/>
           </a:p>
         </p:txBody>
       </p:sp>
     </p:spTree>
+    <p:extLst>
+      <p:ext uri="{BB962C8B-B14F-4D97-AF65-F5344CB8AC3E}">
+        <p14:creationId xmlns:p14="http://schemas.microsoft.com/office/powerpoint/2010/main" val="160132860"/>
+      </p:ext>
+    </p:extLst>
   </p:cSld>
   <p:clrMapOvr>
     <a:masterClrMapping/>
@@ -8800,8 +9043,20 @@
           <a:lstStyle/>
           <a:p>
             <a:r>
-              <a:rPr lang="en-NZ" dirty="0" smtClean="0"/>
-              <a:t>Global environment contents</a:t>
+              <a:rPr lang="en-NZ" dirty="0" err="1" smtClean="0"/>
+              <a:t>Simframe</a:t>
+            </a:r>
+            <a:r>
+              <a:rPr lang="en-NZ" dirty="0" smtClean="0"/>
+              <a:t> environment (</a:t>
+            </a:r>
+            <a:r>
+              <a:rPr lang="en-NZ" dirty="0" err="1" smtClean="0"/>
+              <a:t>Simenv</a:t>
+            </a:r>
+            <a:r>
+              <a:rPr lang="en-NZ" dirty="0" smtClean="0"/>
+              <a:t>)</a:t>
             </a:r>
             <a:endParaRPr lang="en-NZ" dirty="0"/>
           </a:p>
@@ -8819,102 +9074,52 @@
         </p:nvSpPr>
         <p:spPr/>
         <p:txBody>
-          <a:bodyPr>
-            <a:normAutofit fontScale="92500" lnSpcReduction="10000"/>
-          </a:bodyPr>
+          <a:bodyPr/>
           <a:lstStyle/>
           <a:p>
             <a:r>
               <a:rPr lang="en-NZ" dirty="0" smtClean="0"/>
-              <a:t>Models</a:t>
-            </a:r>
-          </a:p>
-          <a:p>
-            <a:pPr lvl="1"/>
+              <a:t>A </a:t>
+            </a:r>
             <a:r>
               <a:rPr lang="en-NZ" dirty="0"/>
-              <a:t> </a:t>
-            </a:r>
-            <a:r>
-              <a:rPr lang="en-NZ" dirty="0" smtClean="0"/>
-              <a:t>list of generalized linear models. These contain model equations, </a:t>
-            </a:r>
-            <a:r>
-              <a:rPr lang="en-NZ" dirty="0" err="1" smtClean="0"/>
-              <a:t>ie</a:t>
-            </a:r>
-            <a:r>
-              <a:rPr lang="en-NZ" dirty="0" smtClean="0"/>
-              <a:t>: variable names and their co-</a:t>
-            </a:r>
-            <a:r>
-              <a:rPr lang="en-NZ" dirty="0" err="1" smtClean="0"/>
-              <a:t>efficients</a:t>
+              <a:t>simulation environment contains everything required to perform a simulation. </a:t>
+            </a:r>
+            <a:endParaRPr lang="en-NZ" dirty="0" smtClean="0"/>
+          </a:p>
+          <a:p>
+            <a:r>
+              <a:rPr lang="en-NZ" dirty="0" smtClean="0"/>
+              <a:t>Typically one </a:t>
+            </a:r>
+            <a:r>
+              <a:rPr lang="en-NZ" dirty="0" err="1"/>
+              <a:t>Simenv</a:t>
             </a:r>
             <a:r>
               <a:rPr lang="en-NZ" dirty="0"/>
-              <a:t>.</a:t>
-            </a:r>
-            <a:endParaRPr lang="en-NZ" dirty="0" smtClean="0"/>
-          </a:p>
-          <a:p>
-            <a:r>
-              <a:rPr lang="en-NZ" dirty="0" smtClean="0"/>
-              <a:t>Propensities</a:t>
-            </a:r>
-          </a:p>
-          <a:p>
-            <a:pPr lvl="1"/>
-            <a:r>
-              <a:rPr lang="en-NZ" dirty="0" smtClean="0"/>
-              <a:t>list of propensity arrays. A propensity array consists of:</a:t>
-            </a:r>
-          </a:p>
-          <a:p>
-            <a:pPr lvl="2"/>
+              <a:t> will be created </a:t>
+            </a:r>
+            <a:r>
+              <a:rPr lang="en-NZ" dirty="0" smtClean="0"/>
+              <a:t>and </a:t>
+            </a:r>
             <a:r>
               <a:rPr lang="en-NZ" dirty="0"/>
-              <a:t>rows - the individual </a:t>
-            </a:r>
-            <a:r>
-              <a:rPr lang="en-NZ" dirty="0" smtClean="0"/>
-              <a:t>micro-units</a:t>
-            </a:r>
-          </a:p>
-          <a:p>
-            <a:pPr lvl="2"/>
+              <a:t>used to run a base simulation, and additional </a:t>
+            </a:r>
+            <a:r>
+              <a:rPr lang="en-NZ" dirty="0" err="1"/>
+              <a:t>Simenvs</a:t>
+            </a:r>
             <a:r>
               <a:rPr lang="en-NZ" dirty="0"/>
-              <a:t>cols - categories, with one less column than the total number of </a:t>
-            </a:r>
-            <a:r>
-              <a:rPr lang="en-NZ" dirty="0" smtClean="0"/>
-              <a:t>categories</a:t>
-            </a:r>
-          </a:p>
-          <a:p>
-            <a:pPr lvl="2"/>
-            <a:r>
-              <a:rPr lang="en-NZ" dirty="0"/>
-              <a:t>z dim - iterations/years</a:t>
-            </a:r>
-            <a:endParaRPr lang="en-NZ" dirty="0" smtClean="0"/>
-          </a:p>
-          <a:p>
-            <a:r>
-              <a:rPr lang="en-NZ" dirty="0" smtClean="0"/>
-              <a:t>Simulation environments</a:t>
-            </a:r>
-            <a:endParaRPr lang="en-NZ" dirty="0"/>
+              <a:t> will be created to test different scenarios.</a:t>
+            </a:r>
           </a:p>
         </p:txBody>
       </p:sp>
     </p:spTree>
-    <p:extLst>
-      <p:ext uri="{BB962C8B-B14F-4D97-AF65-F5344CB8AC3E}">
-        <p14:creationId xmlns:p14="http://schemas.microsoft.com/office/powerpoint/2010/main" val="160132860"/>
-      </p:ext>
-    </p:extLst>
   </p:cSld>
   <p:clrMapOvr>
     <a:masterClrMapping/>
@@ -8941,7 +9146,7 @@
       </p:grpSpPr>
       <p:sp>
         <p:nvSpPr>
-          <p:cNvPr id="4" name="Title 3"/>
+          <p:cNvPr id="2" name="Title 1"/>
           <p:cNvSpPr>
             <a:spLocks noGrp="1"/>
           </p:cNvSpPr>
@@ -8955,20 +9160,8 @@
           <a:lstStyle/>
           <a:p>
             <a:r>
-              <a:rPr lang="en-NZ" dirty="0" err="1" smtClean="0"/>
-              <a:t>Simframe</a:t>
-            </a:r>
-            <a:r>
-              <a:rPr lang="en-NZ" dirty="0" smtClean="0"/>
-              <a:t> environment (</a:t>
-            </a:r>
-            <a:r>
-              <a:rPr lang="en-NZ" dirty="0" err="1" smtClean="0"/>
-              <a:t>Simenv</a:t>
-            </a:r>
-            <a:r>
-              <a:rPr lang="en-NZ" dirty="0" smtClean="0"/>
-              <a:t>)</a:t>
+              <a:rPr lang="en-NZ" dirty="0" smtClean="0"/>
+              <a:t>Simulation environment contents</a:t>
             </a:r>
             <a:endParaRPr lang="en-NZ" dirty="0"/>
           </a:p>
@@ -8976,7 +9169,7 @@
       </p:sp>
       <p:sp>
         <p:nvSpPr>
-          <p:cNvPr id="5" name="Content Placeholder 4"/>
+          <p:cNvPr id="3" name="Content Placeholder 2"/>
           <p:cNvSpPr>
             <a:spLocks noGrp="1"/>
           </p:cNvSpPr>
@@ -8986,52 +9179,145 @@
         </p:nvSpPr>
         <p:spPr/>
         <p:txBody>
-          <a:bodyPr/>
+          <a:bodyPr>
+            <a:normAutofit fontScale="55000" lnSpcReduction="20000"/>
+          </a:bodyPr>
           <a:lstStyle/>
           <a:p>
             <a:r>
               <a:rPr lang="en-NZ" dirty="0" smtClean="0"/>
+              <a:t>name</a:t>
+            </a:r>
+          </a:p>
+          <a:p>
+            <a:r>
+              <a:rPr lang="en-NZ" dirty="0" err="1" smtClean="0"/>
+              <a:t>runs_simulated</a:t>
+            </a:r>
+            <a:endParaRPr lang="en-NZ" dirty="0" smtClean="0"/>
+          </a:p>
+          <a:p>
+            <a:pPr lvl="1"/>
+            <a:r>
+              <a:rPr lang="en-NZ" dirty="0" smtClean="0"/>
+              <a:t>incremented during the simulation process</a:t>
+            </a:r>
+          </a:p>
+          <a:p>
+            <a:r>
+              <a:rPr lang="en-NZ" dirty="0" err="1" smtClean="0"/>
+              <a:t>dict</a:t>
+            </a:r>
+            <a:endParaRPr lang="en-NZ" dirty="0" smtClean="0"/>
+          </a:p>
+          <a:p>
+            <a:pPr lvl="1"/>
+            <a:r>
+              <a:rPr lang="en-NZ" dirty="0" smtClean="0"/>
+              <a:t>the data dictionary for the whole simulation</a:t>
+            </a:r>
+          </a:p>
+          <a:p>
+            <a:r>
+              <a:rPr lang="en-NZ" dirty="0" err="1" smtClean="0"/>
+              <a:t>simframe</a:t>
+            </a:r>
+            <a:endParaRPr lang="en-NZ" dirty="0" smtClean="0"/>
+          </a:p>
+          <a:p>
+            <a:pPr lvl="1"/>
+            <a:r>
+              <a:rPr lang="en-NZ" dirty="0"/>
               <a:t>A </a:t>
             </a:r>
             <a:r>
+              <a:rPr lang="en-NZ" dirty="0" err="1"/>
+              <a:t>dataframe</a:t>
+            </a:r>
+            <a:r>
               <a:rPr lang="en-NZ" dirty="0"/>
-              <a:t>simulation environment contains everything required to perform a simulation. </a:t>
+              <a:t> of variables (input, intermediate, and outcome) used during the </a:t>
+            </a:r>
+            <a:r>
+              <a:rPr lang="en-NZ" dirty="0" smtClean="0"/>
+              <a:t>simulation</a:t>
             </a:r>
             <a:endParaRPr lang="en-NZ" dirty="0" smtClean="0"/>
           </a:p>
           <a:p>
             <a:r>
-              <a:rPr lang="en-NZ" dirty="0" smtClean="0"/>
-              <a:t>Typically one </a:t>
-            </a:r>
+              <a:rPr lang="en-NZ" dirty="0" err="1" smtClean="0"/>
+              <a:t>cat.adjustments</a:t>
+            </a:r>
+            <a:endParaRPr lang="en-NZ" dirty="0" smtClean="0"/>
+          </a:p>
+          <a:p>
+            <a:pPr lvl="1"/>
+            <a:r>
+              <a:rPr lang="en-NZ" dirty="0" smtClean="0"/>
+              <a:t>adjustments applied to categorical variables before and during the simulation</a:t>
+            </a:r>
+          </a:p>
+          <a:p>
             <a:r>
               <a:rPr lang="en-NZ" dirty="0" err="1"/>
-              <a:t>Simenv</a:t>
-            </a:r>
+              <a:t>p</a:t>
+            </a:r>
+            <a:r>
+              <a:rPr lang="en-NZ" dirty="0" err="1" smtClean="0"/>
+              <a:t>resim.stats</a:t>
+            </a:r>
+            <a:endParaRPr lang="en-NZ" dirty="0"/>
+          </a:p>
+          <a:p>
+            <a:pPr lvl="1"/>
+            <a:r>
+              <a:rPr lang="en-NZ" dirty="0" smtClean="0"/>
+              <a:t>stats generated after adjustment but before simulation begins. Typically these will be descriptive statistics of input variables that don’t change </a:t>
+            </a:r>
+            <a:r>
+              <a:rPr lang="en-NZ" dirty="0" err="1" smtClean="0"/>
+              <a:t>eg</a:t>
+            </a:r>
+            <a:r>
+              <a:rPr lang="en-NZ" dirty="0" smtClean="0"/>
+              <a:t>: gender, ethnicity</a:t>
+            </a:r>
+          </a:p>
+          <a:p>
             <a:r>
               <a:rPr lang="en-NZ" dirty="0"/>
-              <a:t> will be created </a:t>
-            </a:r>
-            <a:r>
-              <a:rPr lang="en-NZ" dirty="0" smtClean="0"/>
-              <a:t>and </a:t>
-            </a:r>
-            <a:r>
-              <a:rPr lang="en-NZ" dirty="0"/>
-              <a:t>used to run a base simulation, and additional </a:t>
-            </a:r>
-            <a:r>
-              <a:rPr lang="en-NZ" dirty="0" err="1"/>
-              <a:t>Simenvs</a:t>
-            </a:r>
-            <a:r>
-              <a:rPr lang="en-NZ" dirty="0"/>
-              <a:t> will be created to test different scenarios.</a:t>
-            </a:r>
+              <a:t>m</a:t>
+            </a:r>
+            <a:r>
+              <a:rPr lang="en-NZ" dirty="0" smtClean="0"/>
+              <a:t>odules</a:t>
+            </a:r>
+          </a:p>
+          <a:p>
+            <a:pPr lvl="1"/>
+            <a:r>
+              <a:rPr lang="en-NZ" dirty="0" smtClean="0"/>
+              <a:t>one or more simulation modules (</a:t>
+            </a:r>
+            <a:r>
+              <a:rPr lang="en-NZ" dirty="0" err="1" smtClean="0"/>
+              <a:t>Simmodule</a:t>
+            </a:r>
+            <a:r>
+              <a:rPr lang="en-NZ" dirty="0" smtClean="0"/>
+              <a:t>) which contain code and results for a discrete part of the simulation</a:t>
+            </a:r>
+            <a:endParaRPr lang="en-NZ" dirty="0" smtClean="0"/>
           </a:p>
         </p:txBody>
       </p:sp>
     </p:spTree>
+    <p:extLst>
+      <p:ext uri="{BB962C8B-B14F-4D97-AF65-F5344CB8AC3E}">
+        <p14:creationId xmlns:p14="http://schemas.microsoft.com/office/powerpoint/2010/main" val="647059191"/>
+      </p:ext>
+    </p:extLst>
   </p:cSld>
   <p:clrMapOvr>
     <a:masterClrMapping/>
@@ -9073,7 +9359,7 @@
           <a:p>
             <a:r>
               <a:rPr lang="en-NZ" dirty="0" smtClean="0"/>
-              <a:t>Simulation environment contents</a:t>
+              <a:t>Data dictionary</a:t>
             </a:r>
             <a:endParaRPr lang="en-NZ" dirty="0"/>
           </a:p>
@@ -9092,113 +9378,110 @@
         <p:spPr/>
         <p:txBody>
           <a:bodyPr>
-            <a:normAutofit fontScale="62500" lnSpcReduction="20000"/>
+            <a:normAutofit fontScale="92500" lnSpcReduction="10000"/>
           </a:bodyPr>
           <a:lstStyle/>
           <a:p>
             <a:r>
               <a:rPr lang="en-NZ" dirty="0" smtClean="0"/>
-              <a:t>name</a:t>
-            </a:r>
-          </a:p>
-          <a:p>
+              <a:t>Contains </a:t>
+            </a:r>
             <a:r>
               <a:rPr lang="en-NZ" dirty="0" err="1" smtClean="0"/>
-              <a:t>runs_simulated</a:t>
-            </a:r>
-            <a:endParaRPr lang="en-NZ" dirty="0" smtClean="0"/>
+              <a:t>vardesc</a:t>
+            </a:r>
+            <a:r>
+              <a:rPr lang="en-NZ" dirty="0" smtClean="0"/>
+              <a:t>, and </a:t>
+            </a:r>
+            <a:r>
+              <a:rPr lang="en-NZ" dirty="0" err="1" smtClean="0"/>
+              <a:t>codings</a:t>
+            </a:r>
+            <a:r>
+              <a:rPr lang="en-NZ" dirty="0" smtClean="0"/>
+              <a:t>. Both are loaded from a file</a:t>
+            </a:r>
+          </a:p>
+          <a:p>
+            <a:r>
+              <a:rPr lang="en-NZ" dirty="0" smtClean="0"/>
+              <a:t>descriptions</a:t>
+            </a:r>
           </a:p>
           <a:p>
             <a:pPr lvl="1"/>
             <a:r>
               <a:rPr lang="en-NZ" dirty="0" smtClean="0"/>
-              <a:t>incremented during the simulation process</a:t>
-            </a:r>
-          </a:p>
-          <a:p>
-            <a:r>
-              <a:rPr lang="en-NZ" dirty="0" err="1" smtClean="0"/>
-              <a:t>dict</a:t>
-            </a:r>
-            <a:endParaRPr lang="en-NZ" dirty="0" smtClean="0"/>
-          </a:p>
-          <a:p>
-            <a:pPr lvl="1"/>
-            <a:r>
-              <a:rPr lang="en-NZ" dirty="0" smtClean="0"/>
-              <a:t>the data dictionary for the whole simulation</a:t>
-            </a:r>
-          </a:p>
-          <a:p>
-            <a:r>
-              <a:rPr lang="en-NZ" dirty="0" err="1" smtClean="0"/>
-              <a:t>Simframe</a:t>
-            </a:r>
-            <a:endParaRPr lang="en-NZ" dirty="0" smtClean="0"/>
-          </a:p>
-          <a:p>
-            <a:r>
-              <a:rPr lang="en-NZ" dirty="0" err="1" smtClean="0"/>
-              <a:t>cat.adjustments</a:t>
-            </a:r>
-            <a:endParaRPr lang="en-NZ" dirty="0" smtClean="0"/>
-          </a:p>
-          <a:p>
-            <a:pPr lvl="1"/>
-            <a:r>
-              <a:rPr lang="en-NZ" dirty="0" smtClean="0"/>
-              <a:t>adjustments applied to categorical variables before and during the simulation</a:t>
-            </a:r>
-          </a:p>
-          <a:p>
-            <a:r>
-              <a:rPr lang="en-NZ" dirty="0" err="1"/>
-              <a:t>p</a:t>
-            </a:r>
-            <a:r>
-              <a:rPr lang="en-NZ" dirty="0" err="1" smtClean="0"/>
-              <a:t>resim.stats</a:t>
-            </a:r>
-            <a:endParaRPr lang="en-NZ" dirty="0"/>
-          </a:p>
-          <a:p>
-            <a:pPr lvl="1"/>
-            <a:r>
-              <a:rPr lang="en-NZ" dirty="0" smtClean="0"/>
-              <a:t>stats generated after adjustment but before simulation begins. Typically these will be descriptive statistics of input variables that don’t change </a:t>
-            </a:r>
+              <a:t>a vector of variable descriptions, named with variable names</a:t>
+            </a:r>
+          </a:p>
+          <a:p>
+            <a:pPr lvl="2"/>
             <a:r>
               <a:rPr lang="en-NZ" dirty="0" err="1" smtClean="0"/>
               <a:t>eg</a:t>
             </a:r>
             <a:r>
               <a:rPr lang="en-NZ" dirty="0" smtClean="0"/>
-              <a:t>: gender, ethnicity</a:t>
-            </a:r>
-          </a:p>
-          <a:p>
+              <a:t>: c(“</a:t>
+            </a:r>
+            <a:r>
+              <a:rPr lang="en-NZ" dirty="0" err="1" smtClean="0"/>
+              <a:t>bwkg</a:t>
+            </a:r>
+            <a:r>
+              <a:rPr lang="en-NZ" dirty="0" smtClean="0"/>
+              <a:t>”=“Birth weight (g)”, “</a:t>
+            </a:r>
+            <a:r>
+              <a:rPr lang="en-NZ" dirty="0" err="1" smtClean="0"/>
+              <a:t>chkids</a:t>
+            </a:r>
+            <a:r>
+              <a:rPr lang="en-NZ" dirty="0" smtClean="0"/>
+              <a:t>”=“Change in kids”)</a:t>
+            </a:r>
+          </a:p>
+          <a:p>
+            <a:r>
+              <a:rPr lang="en-NZ" dirty="0" err="1" smtClean="0"/>
+              <a:t>codings</a:t>
+            </a:r>
+            <a:endParaRPr lang="en-NZ" dirty="0" smtClean="0"/>
+          </a:p>
+          <a:p>
+            <a:pPr lvl="1"/>
+            <a:r>
+              <a:rPr lang="en-NZ" dirty="0" smtClean="0"/>
+              <a:t>a list of category names for categorical variables</a:t>
+            </a:r>
+          </a:p>
+          <a:p>
+            <a:pPr lvl="2"/>
+            <a:r>
+              <a:rPr lang="en-NZ" dirty="0" err="1" smtClean="0"/>
+              <a:t>eg</a:t>
+            </a:r>
+            <a:r>
+              <a:rPr lang="en-NZ" dirty="0" smtClean="0"/>
+              <a:t>: list(SESBTH=c(“Professional”=1, “Clerical”=2), gender=c(“F”=</a:t>
+            </a:r>
             <a:r>
               <a:rPr lang="en-NZ" dirty="0"/>
-              <a:t>m</a:t>
-            </a:r>
-            <a:r>
-              <a:rPr lang="en-NZ" dirty="0" smtClean="0"/>
-              <a:t>odules</a:t>
-            </a:r>
-          </a:p>
-          <a:p>
-            <a:pPr lvl="1"/>
-            <a:r>
-              <a:rPr lang="en-NZ" dirty="0" smtClean="0"/>
-              <a:t>one or more simulation modules (</a:t>
-            </a:r>
-            <a:r>
-              <a:rPr lang="en-NZ" dirty="0" err="1" smtClean="0"/>
-              <a:t>Simmodule</a:t>
-            </a:r>
-            <a:r>
-              <a:rPr lang="en-NZ" dirty="0" smtClean="0"/>
-              <a:t>)</a:t>
+              <a:t>0</a:t>
+            </a:r>
+            <a:r>
+              <a:rPr lang="en-NZ" dirty="0" smtClean="0"/>
+              <a:t>, “</a:t>
+            </a:r>
+            <a:r>
+              <a:rPr lang="en-NZ" dirty="0"/>
+              <a:t>M</a:t>
+            </a:r>
+            <a:r>
+              <a:rPr lang="en-NZ" dirty="0" smtClean="0"/>
+              <a:t>”=1)</a:t>
             </a:r>
           </a:p>
         </p:txBody>
@@ -9206,7 +9489,7 @@
     </p:spTree>
     <p:extLst>
       <p:ext uri="{BB962C8B-B14F-4D97-AF65-F5344CB8AC3E}">
-        <p14:creationId xmlns:p14="http://schemas.microsoft.com/office/powerpoint/2010/main" val="647059191"/>
+        <p14:creationId xmlns:p14="http://schemas.microsoft.com/office/powerpoint/2010/main" val="3229340986"/>
       </p:ext>
     </p:extLst>
   </p:cSld>
@@ -9250,7 +9533,7 @@
           <a:p>
             <a:r>
               <a:rPr lang="en-NZ" dirty="0" smtClean="0"/>
-              <a:t>Data dictionary</a:t>
+              <a:t>Categorical adjustments	</a:t>
             </a:r>
             <a:endParaRPr lang="en-NZ" dirty="0"/>
           </a:p>
@@ -9269,118 +9552,226 @@
         <p:spPr/>
         <p:txBody>
           <a:bodyPr>
-            <a:normAutofit fontScale="92500" lnSpcReduction="10000"/>
+            <a:normAutofit/>
           </a:bodyPr>
           <a:lstStyle/>
           <a:p>
             <a:r>
               <a:rPr lang="en-NZ" dirty="0" smtClean="0"/>
-              <a:t>Contains </a:t>
+              <a:t>Before or during the simulation the user may wish to specify the proportion of category values desired for a </a:t>
             </a:r>
             <a:r>
               <a:rPr lang="en-NZ" dirty="0" err="1" smtClean="0"/>
-              <a:t>vardesc</a:t>
-            </a:r>
-            <a:r>
-              <a:rPr lang="en-NZ" dirty="0" smtClean="0"/>
-              <a:t>, and </a:t>
-            </a:r>
+              <a:t>simframe</a:t>
+            </a:r>
+            <a:r>
+              <a:rPr lang="en-NZ" dirty="0" smtClean="0"/>
+              <a:t> variable</a:t>
+            </a:r>
+          </a:p>
+          <a:p>
+            <a:pPr lvl="1"/>
             <a:r>
               <a:rPr lang="en-NZ" dirty="0" err="1" smtClean="0"/>
-              <a:t>codings</a:t>
-            </a:r>
-            <a:r>
-              <a:rPr lang="en-NZ" dirty="0" smtClean="0"/>
-              <a:t>. Both are loaded from a file</a:t>
-            </a:r>
-          </a:p>
-          <a:p>
-            <a:r>
-              <a:rPr lang="en-NZ" dirty="0" smtClean="0"/>
-              <a:t>descriptions</a:t>
-            </a:r>
-          </a:p>
-          <a:p>
-            <a:pPr lvl="1"/>
-            <a:r>
-              <a:rPr lang="en-NZ" dirty="0" smtClean="0"/>
-              <a:t>a vector of variable descriptions, named with variable names</a:t>
-            </a:r>
-          </a:p>
-          <a:p>
-            <a:pPr lvl="2"/>
+              <a:t>Eg</a:t>
+            </a:r>
+            <a:r>
+              <a:rPr lang="en-NZ" dirty="0" smtClean="0"/>
+              <a:t>: a user may wish the proportion of home owners in year 2 to be 0.4, 0.6</a:t>
+            </a:r>
+          </a:p>
+          <a:p>
+            <a:r>
+              <a:rPr lang="en-NZ" dirty="0" smtClean="0"/>
+              <a:t>Desired proportions can be specified in a categorical adjustment matrix, </a:t>
+            </a:r>
             <a:r>
               <a:rPr lang="en-NZ" dirty="0" err="1" smtClean="0"/>
               <a:t>eg</a:t>
             </a:r>
             <a:r>
               <a:rPr lang="en-NZ" dirty="0" smtClean="0"/>
-              <a:t>: c(“</a:t>
-            </a:r>
-            <a:r>
-              <a:rPr lang="en-NZ" dirty="0" err="1" smtClean="0"/>
-              <a:t>bwkg</a:t>
-            </a:r>
-            <a:r>
-              <a:rPr lang="en-NZ" dirty="0" smtClean="0"/>
-              <a:t>”=“Birth weight (g)”, “</a:t>
-            </a:r>
-            <a:r>
-              <a:rPr lang="en-NZ" dirty="0" err="1" smtClean="0"/>
-              <a:t>chkids</a:t>
-            </a:r>
-            <a:r>
-              <a:rPr lang="en-NZ" dirty="0" smtClean="0"/>
-              <a:t>”=“Change in kids”)</a:t>
-            </a:r>
-          </a:p>
-          <a:p>
-            <a:r>
-              <a:rPr lang="en-NZ" dirty="0" err="1" smtClean="0"/>
-              <a:t>codings</a:t>
-            </a:r>
+              <a:t>:</a:t>
+            </a:r>
+          </a:p>
+          <a:p>
             <a:endParaRPr lang="en-NZ" dirty="0" smtClean="0"/>
           </a:p>
           <a:p>
             <a:pPr lvl="1"/>
-            <a:r>
-              <a:rPr lang="en-NZ" dirty="0" smtClean="0"/>
-              <a:t>a list of category names for categorical variables</a:t>
-            </a:r>
-          </a:p>
-          <a:p>
-            <a:pPr lvl="2"/>
-            <a:r>
-              <a:rPr lang="en-NZ" dirty="0" err="1" smtClean="0"/>
-              <a:t>eg</a:t>
-            </a:r>
-            <a:r>
-              <a:rPr lang="en-NZ" dirty="0" smtClean="0"/>
-              <a:t>: list(SESBTH=c(“Professional”=1, “Clerical”=2), gender=c(“F”=</a:t>
-            </a:r>
-            <a:r>
-              <a:rPr lang="en-NZ" dirty="0"/>
-              <a:t>0</a:t>
-            </a:r>
-            <a:r>
-              <a:rPr lang="en-NZ" dirty="0" smtClean="0"/>
-              <a:t>, “</a:t>
-            </a:r>
-            <a:r>
-              <a:rPr lang="en-NZ" dirty="0"/>
-              <a:t>M</a:t>
-            </a:r>
-            <a:r>
-              <a:rPr lang="en-NZ" dirty="0" smtClean="0"/>
-              <a:t>”=1)</a:t>
-            </a:r>
+            <a:endParaRPr lang="en-NZ" dirty="0" smtClean="0"/>
           </a:p>
         </p:txBody>
       </p:sp>
+      <p:graphicFrame>
+        <p:nvGraphicFramePr>
+          <p:cNvPr id="4" name="Table 3"/>
+          <p:cNvGraphicFramePr>
+            <a:graphicFrameLocks noGrp="1"/>
+          </p:cNvGraphicFramePr>
+          <p:nvPr>
+            <p:extLst>
+              <p:ext uri="{D42A27DB-BD31-4B8C-83A1-F6EECF244321}">
+                <p14:modId xmlns:p14="http://schemas.microsoft.com/office/powerpoint/2010/main" val="1728243183"/>
+              </p:ext>
+            </p:extLst>
+          </p:nvPr>
+        </p:nvGraphicFramePr>
+        <p:xfrm>
+          <a:off x="1331640" y="5373216"/>
+          <a:ext cx="6096000" cy="1112520"/>
+        </p:xfrm>
+        <a:graphic>
+          <a:graphicData uri="http://schemas.openxmlformats.org/drawingml/2006/table">
+            <a:tbl>
+              <a:tblPr firstRow="1" bandRow="1">
+                <a:tableStyleId>{5C22544A-7EE6-4342-B048-85BDC9FD1C3A}</a:tableStyleId>
+              </a:tblPr>
+              <a:tblGrid>
+                <a:gridCol w="2032000"/>
+                <a:gridCol w="2032000"/>
+                <a:gridCol w="2032000"/>
+              </a:tblGrid>
+              <a:tr h="370840">
+                <a:tc>
+                  <a:txBody>
+                    <a:bodyPr/>
+                    <a:lstStyle/>
+                    <a:p>
+                      <a:r>
+                        <a:rPr lang="en-NZ" dirty="0" smtClean="0"/>
+                        <a:t>Iteration</a:t>
+                      </a:r>
+                      <a:endParaRPr lang="en-NZ" dirty="0"/>
+                    </a:p>
+                  </a:txBody>
+                  <a:tcPr/>
+                </a:tc>
+                <a:tc>
+                  <a:txBody>
+                    <a:bodyPr/>
+                    <a:lstStyle/>
+                    <a:p>
+                      <a:r>
+                        <a:rPr lang="en-NZ" dirty="0" smtClean="0"/>
+                        <a:t>Own home</a:t>
+                      </a:r>
+                      <a:endParaRPr lang="en-NZ" dirty="0"/>
+                    </a:p>
+                  </a:txBody>
+                  <a:tcPr/>
+                </a:tc>
+                <a:tc>
+                  <a:txBody>
+                    <a:bodyPr/>
+                    <a:lstStyle/>
+                    <a:p>
+                      <a:r>
+                        <a:rPr lang="en-NZ" dirty="0" smtClean="0"/>
+                        <a:t>Rents</a:t>
+                      </a:r>
+                      <a:endParaRPr lang="en-NZ" dirty="0"/>
+                    </a:p>
+                  </a:txBody>
+                  <a:tcPr/>
+                </a:tc>
+              </a:tr>
+              <a:tr h="370840">
+                <a:tc>
+                  <a:txBody>
+                    <a:bodyPr/>
+                    <a:lstStyle/>
+                    <a:p>
+                      <a:r>
+                        <a:rPr lang="en-NZ" dirty="0" smtClean="0"/>
+                        <a:t>1</a:t>
+                      </a:r>
+                      <a:endParaRPr lang="en-NZ" dirty="0"/>
+                    </a:p>
+                  </a:txBody>
+                  <a:tcPr/>
+                </a:tc>
+                <a:tc>
+                  <a:txBody>
+                    <a:bodyPr/>
+                    <a:lstStyle/>
+                    <a:p>
+                      <a:r>
+                        <a:rPr lang="en-NZ" dirty="0" smtClean="0"/>
+                        <a:t>NA</a:t>
+                      </a:r>
+                      <a:endParaRPr lang="en-NZ" dirty="0"/>
+                    </a:p>
+                  </a:txBody>
+                  <a:tcPr/>
+                </a:tc>
+                <a:tc>
+                  <a:txBody>
+                    <a:bodyPr/>
+                    <a:lstStyle/>
+                    <a:p>
+                      <a:r>
+                        <a:rPr lang="en-NZ" dirty="0" smtClean="0"/>
+                        <a:t>NA</a:t>
+                      </a:r>
+                      <a:endParaRPr lang="en-NZ" dirty="0"/>
+                    </a:p>
+                  </a:txBody>
+                  <a:tcPr/>
+                </a:tc>
+              </a:tr>
+              <a:tr h="370840">
+                <a:tc>
+                  <a:txBody>
+                    <a:bodyPr/>
+                    <a:lstStyle/>
+                    <a:p>
+                      <a:r>
+                        <a:rPr lang="en-NZ" dirty="0" smtClean="0"/>
+                        <a:t>2</a:t>
+                      </a:r>
+                      <a:endParaRPr lang="en-NZ" dirty="0"/>
+                    </a:p>
+                  </a:txBody>
+                  <a:tcPr/>
+                </a:tc>
+                <a:tc>
+                  <a:txBody>
+                    <a:bodyPr/>
+                    <a:lstStyle/>
+                    <a:p>
+                      <a:r>
+                        <a:rPr lang="en-NZ" dirty="0" smtClean="0"/>
+                        <a:t>0.4</a:t>
+                      </a:r>
+                      <a:endParaRPr lang="en-NZ" dirty="0"/>
+                    </a:p>
+                  </a:txBody>
+                  <a:tcPr/>
+                </a:tc>
+                <a:tc>
+                  <a:txBody>
+                    <a:bodyPr/>
+                    <a:lstStyle/>
+                    <a:p>
+                      <a:r>
+                        <a:rPr lang="en-NZ" dirty="0" smtClean="0"/>
+                        <a:t>0.6</a:t>
+                      </a:r>
+                      <a:endParaRPr lang="en-NZ" dirty="0"/>
+                    </a:p>
+                  </a:txBody>
+                  <a:tcPr/>
+                </a:tc>
+              </a:tr>
+            </a:tbl>
+          </a:graphicData>
+        </a:graphic>
+      </p:graphicFrame>
     </p:spTree>
     <p:extLst>
       <p:ext uri="{BB962C8B-B14F-4D97-AF65-F5344CB8AC3E}">
-        <p14:creationId xmlns:p14="http://schemas.microsoft.com/office/powerpoint/2010/main" val="3229340986"/>
+        <p14:creationId xmlns:p14="http://schemas.microsoft.com/office/powerpoint/2010/main" val="2426780635"/>
       </p:ext>
     </p:extLst>
   </p:cSld>
@@ -9443,226 +9834,91 @@
         <p:spPr/>
         <p:txBody>
           <a:bodyPr>
-            <a:normAutofit/>
+            <a:normAutofit fontScale="92500" lnSpcReduction="10000"/>
           </a:bodyPr>
           <a:lstStyle/>
           <a:p>
             <a:r>
               <a:rPr lang="en-NZ" dirty="0" smtClean="0"/>
-              <a:t>Before or during the simulation the user may wish to specify the proportion of category values desired for a </a:t>
-            </a:r>
-            <a:r>
-              <a:rPr lang="en-NZ" dirty="0" err="1" smtClean="0"/>
-              <a:t>simframe</a:t>
-            </a:r>
-            <a:r>
-              <a:rPr lang="en-NZ" dirty="0" smtClean="0"/>
-              <a:t> variable</a:t>
+              <a:t>In the above example instead of simulating the home ownership variable in year 2, it will be set to the desired proportions 0.4, 0.6 </a:t>
+            </a:r>
+          </a:p>
+          <a:p>
+            <a:r>
+              <a:rPr lang="en-NZ" dirty="0" smtClean="0"/>
+              <a:t>A </a:t>
+            </a:r>
+            <a:r>
+              <a:rPr lang="en-NZ" dirty="0"/>
+              <a:t>desired proportion of NA </a:t>
+            </a:r>
+            <a:r>
+              <a:rPr lang="en-NZ" dirty="0" smtClean="0"/>
+              <a:t>will leave the variable unchanged</a:t>
+            </a:r>
+            <a:endParaRPr lang="en-NZ" dirty="0"/>
+          </a:p>
+          <a:p>
+            <a:r>
+              <a:rPr lang="en-NZ" dirty="0"/>
+              <a:t>If propensities are supplied </a:t>
+            </a:r>
+            <a:r>
+              <a:rPr lang="en-NZ" dirty="0" smtClean="0"/>
+              <a:t>they </a:t>
+            </a:r>
+            <a:r>
+              <a:rPr lang="en-NZ" dirty="0"/>
+              <a:t>will be used to select </a:t>
+            </a:r>
+            <a:r>
+              <a:rPr lang="en-NZ" dirty="0" smtClean="0"/>
+              <a:t>which micro-units </a:t>
+            </a:r>
+            <a:r>
+              <a:rPr lang="en-NZ" dirty="0"/>
+              <a:t>to </a:t>
+            </a:r>
+            <a:r>
+              <a:rPr lang="en-NZ" dirty="0" smtClean="0"/>
+              <a:t>adjust, otherwise the selection will be random</a:t>
             </a:r>
           </a:p>
           <a:p>
             <a:pPr lvl="1"/>
             <a:r>
-              <a:rPr lang="en-NZ" dirty="0" err="1" smtClean="0"/>
-              <a:t>Eg</a:t>
-            </a:r>
-            <a:r>
-              <a:rPr lang="en-NZ" dirty="0" smtClean="0"/>
-              <a:t>: a user may wish the proportion of home owners in year 2 to be 0.4, 0.6</a:t>
-            </a:r>
-          </a:p>
-          <a:p>
-            <a:r>
-              <a:rPr lang="en-NZ" dirty="0" smtClean="0"/>
-              <a:t>Desired proportions can be specified in a categorical adjustment matrix, </a:t>
-            </a:r>
-            <a:r>
-              <a:rPr lang="en-NZ" dirty="0" err="1" smtClean="0"/>
-              <a:t>eg</a:t>
-            </a:r>
-            <a:r>
-              <a:rPr lang="en-NZ" dirty="0" smtClean="0"/>
-              <a:t>:</a:t>
-            </a:r>
-          </a:p>
-          <a:p>
-            <a:endParaRPr lang="en-NZ" dirty="0" smtClean="0"/>
-          </a:p>
-          <a:p>
-            <a:pPr lvl="1"/>
-            <a:endParaRPr lang="en-NZ" dirty="0" smtClean="0"/>
+              <a:rPr lang="en-NZ" dirty="0" smtClean="0"/>
+              <a:t>Propensities are specified </a:t>
+            </a:r>
+            <a:r>
+              <a:rPr lang="en-NZ" dirty="0" smtClean="0"/>
+              <a:t>via propensity arrays and stored in the global </a:t>
+            </a:r>
+            <a:r>
+              <a:rPr lang="en-NZ" dirty="0" smtClean="0"/>
+              <a:t>list variable </a:t>
+            </a:r>
+            <a:r>
+              <a:rPr lang="en-NZ" sz="2400" dirty="0" smtClean="0">
+                <a:latin typeface="Courier New" pitchFamily="49" charset="0"/>
+                <a:cs typeface="Courier New" pitchFamily="49" charset="0"/>
+              </a:rPr>
+              <a:t>propensities</a:t>
+            </a:r>
+            <a:endParaRPr lang="en-NZ" sz="2400" dirty="0">
+              <a:latin typeface="Courier New" pitchFamily="49" charset="0"/>
+              <a:cs typeface="Courier New" pitchFamily="49" charset="0"/>
+            </a:endParaRPr>
+          </a:p>
+          <a:p>
+            <a:endParaRPr lang="en-NZ" dirty="0"/>
           </a:p>
         </p:txBody>
       </p:sp>
-      <p:graphicFrame>
-        <p:nvGraphicFramePr>
-          <p:cNvPr id="4" name="Table 3"/>
-          <p:cNvGraphicFramePr>
-            <a:graphicFrameLocks noGrp="1"/>
-          </p:cNvGraphicFramePr>
-          <p:nvPr>
-            <p:extLst>
-              <p:ext uri="{D42A27DB-BD31-4B8C-83A1-F6EECF244321}">
-                <p14:modId xmlns:p14="http://schemas.microsoft.com/office/powerpoint/2010/main" val="1728243183"/>
-              </p:ext>
-            </p:extLst>
-          </p:nvPr>
-        </p:nvGraphicFramePr>
-        <p:xfrm>
-          <a:off x="1331640" y="5373216"/>
-          <a:ext cx="6096000" cy="1112520"/>
-        </p:xfrm>
-        <a:graphic>
-          <a:graphicData uri="http://schemas.openxmlformats.org/drawingml/2006/table">
-            <a:tbl>
-              <a:tblPr firstRow="1" bandRow="1">
-                <a:tableStyleId>{5C22544A-7EE6-4342-B048-85BDC9FD1C3A}</a:tableStyleId>
-              </a:tblPr>
-              <a:tblGrid>
-                <a:gridCol w="2032000"/>
-                <a:gridCol w="2032000"/>
-                <a:gridCol w="2032000"/>
-              </a:tblGrid>
-              <a:tr h="370840">
-                <a:tc>
-                  <a:txBody>
-                    <a:bodyPr/>
-                    <a:lstStyle/>
-                    <a:p>
-                      <a:r>
-                        <a:rPr lang="en-NZ" dirty="0" smtClean="0"/>
-                        <a:t>Iteration</a:t>
-                      </a:r>
-                      <a:endParaRPr lang="en-NZ" dirty="0"/>
-                    </a:p>
-                  </a:txBody>
-                  <a:tcPr/>
-                </a:tc>
-                <a:tc>
-                  <a:txBody>
-                    <a:bodyPr/>
-                    <a:lstStyle/>
-                    <a:p>
-                      <a:r>
-                        <a:rPr lang="en-NZ" dirty="0" smtClean="0"/>
-                        <a:t>Own home</a:t>
-                      </a:r>
-                      <a:endParaRPr lang="en-NZ" dirty="0"/>
-                    </a:p>
-                  </a:txBody>
-                  <a:tcPr/>
-                </a:tc>
-                <a:tc>
-                  <a:txBody>
-                    <a:bodyPr/>
-                    <a:lstStyle/>
-                    <a:p>
-                      <a:r>
-                        <a:rPr lang="en-NZ" dirty="0" smtClean="0"/>
-                        <a:t>Rents</a:t>
-                      </a:r>
-                      <a:endParaRPr lang="en-NZ" dirty="0"/>
-                    </a:p>
-                  </a:txBody>
-                  <a:tcPr/>
-                </a:tc>
-              </a:tr>
-              <a:tr h="370840">
-                <a:tc>
-                  <a:txBody>
-                    <a:bodyPr/>
-                    <a:lstStyle/>
-                    <a:p>
-                      <a:r>
-                        <a:rPr lang="en-NZ" dirty="0" smtClean="0"/>
-                        <a:t>1</a:t>
-                      </a:r>
-                      <a:endParaRPr lang="en-NZ" dirty="0"/>
-                    </a:p>
-                  </a:txBody>
-                  <a:tcPr/>
-                </a:tc>
-                <a:tc>
-                  <a:txBody>
-                    <a:bodyPr/>
-                    <a:lstStyle/>
-                    <a:p>
-                      <a:r>
-                        <a:rPr lang="en-NZ" dirty="0" smtClean="0"/>
-                        <a:t>NA</a:t>
-                      </a:r>
-                      <a:endParaRPr lang="en-NZ" dirty="0"/>
-                    </a:p>
-                  </a:txBody>
-                  <a:tcPr/>
-                </a:tc>
-                <a:tc>
-                  <a:txBody>
-                    <a:bodyPr/>
-                    <a:lstStyle/>
-                    <a:p>
-                      <a:r>
-                        <a:rPr lang="en-NZ" dirty="0" smtClean="0"/>
-                        <a:t>NA</a:t>
-                      </a:r>
-                      <a:endParaRPr lang="en-NZ" dirty="0"/>
-                    </a:p>
-                  </a:txBody>
-                  <a:tcPr/>
-                </a:tc>
-              </a:tr>
-              <a:tr h="370840">
-                <a:tc>
-                  <a:txBody>
-                    <a:bodyPr/>
-                    <a:lstStyle/>
-                    <a:p>
-                      <a:r>
-                        <a:rPr lang="en-NZ" dirty="0" smtClean="0"/>
-                        <a:t>2</a:t>
-                      </a:r>
-                      <a:endParaRPr lang="en-NZ" dirty="0"/>
-                    </a:p>
-                  </a:txBody>
-                  <a:tcPr/>
-                </a:tc>
-                <a:tc>
-                  <a:txBody>
-                    <a:bodyPr/>
-                    <a:lstStyle/>
-                    <a:p>
-                      <a:r>
-                        <a:rPr lang="en-NZ" dirty="0" smtClean="0"/>
-                        <a:t>0.4</a:t>
-                      </a:r>
-                      <a:endParaRPr lang="en-NZ" dirty="0"/>
-                    </a:p>
-                  </a:txBody>
-                  <a:tcPr/>
-                </a:tc>
-                <a:tc>
-                  <a:txBody>
-                    <a:bodyPr/>
-                    <a:lstStyle/>
-                    <a:p>
-                      <a:r>
-                        <a:rPr lang="en-NZ" dirty="0" smtClean="0"/>
-                        <a:t>0.6</a:t>
-                      </a:r>
-                      <a:endParaRPr lang="en-NZ" dirty="0"/>
-                    </a:p>
-                  </a:txBody>
-                  <a:tcPr/>
-                </a:tc>
-              </a:tr>
-            </a:tbl>
-          </a:graphicData>
-        </a:graphic>
-      </p:graphicFrame>
     </p:spTree>
     <p:extLst>
       <p:ext uri="{BB962C8B-B14F-4D97-AF65-F5344CB8AC3E}">
-        <p14:creationId xmlns:p14="http://schemas.microsoft.com/office/powerpoint/2010/main" val="2426780635"/>
+        <p14:creationId xmlns:p14="http://schemas.microsoft.com/office/powerpoint/2010/main" val="2840074760"/>
       </p:ext>
     </p:extLst>
   </p:cSld>

</xml_diff>

<commit_message>
demo tidy added modules param to Simenv$new
</commit_message>
<xml_diff>
--- a/docs/Simar overview.pptx
+++ b/docs/Simar overview.pptx
@@ -216,7 +216,7 @@
           <a:p>
             <a:fld id="{FCC0B684-8014-45B5-B9C4-47CA9572B093}" type="datetimeFigureOut">
               <a:rPr lang="en-NZ" smtClean="0"/>
-              <a:t>2/02/2012</a:t>
+              <a:t>3/02/2012</a:t>
             </a:fld>
             <a:endParaRPr lang="en-NZ"/>
           </a:p>
@@ -480,7 +480,7 @@
           <a:p>
             <a:fld id="{3ACCE87F-A4BF-4D9A-9320-ACD565033031}" type="datetimeFigureOut">
               <a:rPr lang="en-NZ" smtClean="0"/>
-              <a:t>2/02/2012</a:t>
+              <a:t>3/02/2012</a:t>
             </a:fld>
             <a:endParaRPr lang="en-NZ"/>
           </a:p>
@@ -645,7 +645,7 @@
           <a:p>
             <a:fld id="{3ACCE87F-A4BF-4D9A-9320-ACD565033031}" type="datetimeFigureOut">
               <a:rPr lang="en-NZ" smtClean="0"/>
-              <a:t>2/02/2012</a:t>
+              <a:t>3/02/2012</a:t>
             </a:fld>
             <a:endParaRPr lang="en-NZ"/>
           </a:p>
@@ -820,7 +820,7 @@
           <a:p>
             <a:fld id="{3ACCE87F-A4BF-4D9A-9320-ACD565033031}" type="datetimeFigureOut">
               <a:rPr lang="en-NZ" smtClean="0"/>
-              <a:t>2/02/2012</a:t>
+              <a:t>3/02/2012</a:t>
             </a:fld>
             <a:endParaRPr lang="en-NZ"/>
           </a:p>
@@ -985,7 +985,7 @@
           <a:p>
             <a:fld id="{3ACCE87F-A4BF-4D9A-9320-ACD565033031}" type="datetimeFigureOut">
               <a:rPr lang="en-NZ" smtClean="0"/>
-              <a:t>2/02/2012</a:t>
+              <a:t>3/02/2012</a:t>
             </a:fld>
             <a:endParaRPr lang="en-NZ"/>
           </a:p>
@@ -1226,7 +1226,7 @@
           <a:p>
             <a:fld id="{3ACCE87F-A4BF-4D9A-9320-ACD565033031}" type="datetimeFigureOut">
               <a:rPr lang="en-NZ" smtClean="0"/>
-              <a:t>2/02/2012</a:t>
+              <a:t>3/02/2012</a:t>
             </a:fld>
             <a:endParaRPr lang="en-NZ"/>
           </a:p>
@@ -1509,7 +1509,7 @@
           <a:p>
             <a:fld id="{3ACCE87F-A4BF-4D9A-9320-ACD565033031}" type="datetimeFigureOut">
               <a:rPr lang="en-NZ" smtClean="0"/>
-              <a:t>2/02/2012</a:t>
+              <a:t>3/02/2012</a:t>
             </a:fld>
             <a:endParaRPr lang="en-NZ"/>
           </a:p>
@@ -1926,7 +1926,7 @@
           <a:p>
             <a:fld id="{3ACCE87F-A4BF-4D9A-9320-ACD565033031}" type="datetimeFigureOut">
               <a:rPr lang="en-NZ" smtClean="0"/>
-              <a:t>2/02/2012</a:t>
+              <a:t>3/02/2012</a:t>
             </a:fld>
             <a:endParaRPr lang="en-NZ"/>
           </a:p>
@@ -2039,7 +2039,7 @@
           <a:p>
             <a:fld id="{3ACCE87F-A4BF-4D9A-9320-ACD565033031}" type="datetimeFigureOut">
               <a:rPr lang="en-NZ" smtClean="0"/>
-              <a:t>2/02/2012</a:t>
+              <a:t>3/02/2012</a:t>
             </a:fld>
             <a:endParaRPr lang="en-NZ"/>
           </a:p>
@@ -2129,7 +2129,7 @@
           <a:p>
             <a:fld id="{3ACCE87F-A4BF-4D9A-9320-ACD565033031}" type="datetimeFigureOut">
               <a:rPr lang="en-NZ" smtClean="0"/>
-              <a:t>2/02/2012</a:t>
+              <a:t>3/02/2012</a:t>
             </a:fld>
             <a:endParaRPr lang="en-NZ"/>
           </a:p>
@@ -2401,7 +2401,7 @@
           <a:p>
             <a:fld id="{3ACCE87F-A4BF-4D9A-9320-ACD565033031}" type="datetimeFigureOut">
               <a:rPr lang="en-NZ" smtClean="0"/>
-              <a:t>2/02/2012</a:t>
+              <a:t>3/02/2012</a:t>
             </a:fld>
             <a:endParaRPr lang="en-NZ"/>
           </a:p>
@@ -2649,7 +2649,7 @@
           <a:p>
             <a:fld id="{3ACCE87F-A4BF-4D9A-9320-ACD565033031}" type="datetimeFigureOut">
               <a:rPr lang="en-NZ" smtClean="0"/>
-              <a:t>2/02/2012</a:t>
+              <a:t>3/02/2012</a:t>
             </a:fld>
             <a:endParaRPr lang="en-NZ"/>
           </a:p>
@@ -2857,7 +2857,7 @@
           <a:p>
             <a:fld id="{3ACCE87F-A4BF-4D9A-9320-ACD565033031}" type="datetimeFigureOut">
               <a:rPr lang="en-NZ" smtClean="0"/>
-              <a:t>2/02/2012</a:t>
+              <a:t>3/02/2012</a:t>
             </a:fld>
             <a:endParaRPr lang="en-NZ"/>
           </a:p>
@@ -3953,7 +3953,7 @@
           </a:p>
           <a:p>
             <a:r>
-              <a:rPr lang="en-NZ" dirty="0" err="1" smtClean="0"/>
+              <a:rPr lang="en-NZ" smtClean="0"/>
               <a:t>runs.averaged</a:t>
             </a:r>
             <a:endParaRPr lang="en-NZ" dirty="0" smtClean="0"/>
@@ -4672,7 +4672,7 @@
         <p:spPr/>
         <p:txBody>
           <a:bodyPr>
-            <a:normAutofit/>
+            <a:normAutofit fontScale="92500" lnSpcReduction="20000"/>
           </a:bodyPr>
           <a:lstStyle/>
           <a:p>
@@ -4708,8 +4708,47 @@
             </a:r>
             <a:r>
               <a:rPr lang="en-NZ" dirty="0" smtClean="0"/>
-              <a:t> variable is populated with initial values, as specified by the definition file.</a:t>
-            </a:r>
+              <a:t> variable is populated with initial values, as specified by the definition </a:t>
+            </a:r>
+            <a:r>
+              <a:rPr lang="en-NZ" dirty="0" smtClean="0"/>
+              <a:t>file.</a:t>
+            </a:r>
+          </a:p>
+          <a:p>
+            <a:r>
+              <a:rPr lang="en-NZ" dirty="0" smtClean="0"/>
+              <a:t>Initial values may come from the global environment, or from a supplied </a:t>
+            </a:r>
+            <a:r>
+              <a:rPr lang="en-NZ" dirty="0" err="1" smtClean="0"/>
+              <a:t>dataframe</a:t>
+            </a:r>
+            <a:r>
+              <a:rPr lang="en-NZ" dirty="0" smtClean="0"/>
+              <a:t>, </a:t>
+            </a:r>
+            <a:r>
+              <a:rPr lang="en-NZ" dirty="0" err="1" smtClean="0"/>
+              <a:t>eg</a:t>
+            </a:r>
+            <a:r>
+              <a:rPr lang="en-NZ" dirty="0" smtClean="0"/>
+              <a:t>: a </a:t>
+            </a:r>
+            <a:r>
+              <a:rPr lang="en-NZ" dirty="0" err="1" smtClean="0"/>
+              <a:t>dataframe</a:t>
+            </a:r>
+            <a:r>
+              <a:rPr lang="en-NZ" dirty="0" smtClean="0"/>
+              <a:t> loaded from a base </a:t>
+            </a:r>
+            <a:r>
+              <a:rPr lang="en-NZ" dirty="0" smtClean="0"/>
+              <a:t>file</a:t>
+            </a:r>
+            <a:endParaRPr lang="en-NZ" dirty="0" smtClean="0"/>
           </a:p>
           <a:p>
             <a:r>
@@ -4731,6 +4770,30 @@
               </a:rPr>
               <a:t>simframe.master</a:t>
             </a:r>
+            <a:endParaRPr lang="en-NZ" dirty="0" smtClean="0">
+              <a:latin typeface="Courier New" pitchFamily="49" charset="0"/>
+              <a:cs typeface="Courier New" pitchFamily="49" charset="0"/>
+            </a:endParaRPr>
+          </a:p>
+          <a:p>
+            <a:r>
+              <a:rPr lang="en-NZ" dirty="0" smtClean="0"/>
+              <a:t>After loading the master </a:t>
+            </a:r>
+            <a:r>
+              <a:rPr lang="en-NZ" dirty="0" err="1" smtClean="0"/>
+              <a:t>simframe</a:t>
+            </a:r>
+            <a:r>
+              <a:rPr lang="en-NZ" dirty="0" smtClean="0"/>
+              <a:t> is not modified</a:t>
+            </a:r>
+            <a:endParaRPr lang="en-NZ" dirty="0" smtClean="0">
+              <a:latin typeface="Courier New" pitchFamily="49" charset="0"/>
+              <a:cs typeface="Courier New" pitchFamily="49" charset="0"/>
+            </a:endParaRPr>
+          </a:p>
+          <a:p>
             <a:endParaRPr lang="en-NZ" dirty="0" smtClean="0">
               <a:latin typeface="Courier New" pitchFamily="49" charset="0"/>
               <a:cs typeface="Courier New" pitchFamily="49" charset="0"/>
@@ -5710,11 +5773,7 @@
           <a:p>
             <a:r>
               <a:rPr lang="en-NZ" dirty="0" smtClean="0"/>
-              <a:t>Final results are calculated by each module across all </a:t>
-            </a:r>
-            <a:r>
-              <a:rPr lang="en-NZ" dirty="0" smtClean="0"/>
-              <a:t>runs (using the </a:t>
+              <a:t>Final results are calculated by each module across all runs (using the </a:t>
             </a:r>
             <a:r>
               <a:rPr lang="en-NZ" dirty="0" err="1" smtClean="0"/>
@@ -5832,15 +5891,7 @@
             </a:r>
             <a:r>
               <a:rPr lang="en-NZ" dirty="0" smtClean="0"/>
-              <a:t>() </a:t>
-            </a:r>
-            <a:r>
-              <a:rPr lang="en-NZ" dirty="0" smtClean="0"/>
-              <a:t>function </a:t>
-            </a:r>
-            <a:r>
-              <a:rPr lang="en-NZ" dirty="0" smtClean="0"/>
-              <a:t>uses a local copy of the </a:t>
+              <a:t>() function uses a local copy of the </a:t>
             </a:r>
             <a:r>
               <a:rPr lang="en-NZ" dirty="0" err="1" smtClean="0"/>
@@ -5900,21 +5951,8 @@
             </a:r>
             <a:r>
               <a:rPr lang="en-NZ" dirty="0" smtClean="0"/>
-              <a:t> variables are </a:t>
-            </a:r>
-            <a:r>
-              <a:rPr lang="en-NZ" dirty="0" smtClean="0"/>
-              <a:t>transformed by transition probabilitie</a:t>
-            </a:r>
-            <a:r>
-              <a:rPr lang="en-NZ" dirty="0" smtClean="0"/>
-              <a:t>s, models or set to desired categorical adjustment proportions</a:t>
-            </a:r>
-            <a:r>
-              <a:rPr lang="en-NZ" dirty="0" smtClean="0"/>
-              <a:t> </a:t>
-            </a:r>
-            <a:endParaRPr lang="en-NZ" dirty="0" smtClean="0"/>
+              <a:t> variables are transformed by transition probabilities, models or set to desired categorical adjustment proportions </a:t>
+            </a:r>
           </a:p>
           <a:p>
             <a:r>
@@ -5927,11 +5965,7 @@
             </a:r>
             <a:r>
               <a:rPr lang="en-NZ" dirty="0" smtClean="0"/>
-              <a:t> outcome variables are stored in outcome </a:t>
-            </a:r>
-            <a:r>
-              <a:rPr lang="en-NZ" dirty="0" smtClean="0"/>
-              <a:t>matrices</a:t>
+              <a:t> outcome variables are stored in outcome matrices</a:t>
             </a:r>
           </a:p>
           <a:p>
@@ -9645,7 +9679,7 @@
           <a:p>
             <a:r>
               <a:rPr lang="en-NZ" dirty="0" smtClean="0"/>
-              <a:t>Prepares run stats for averaging by first transforming, e:</a:t>
+              <a:t>Prepares run stats for averaging by first transforming, e.g.:</a:t>
             </a:r>
           </a:p>
           <a:p>
@@ -9687,6 +9721,13 @@
   <p:clrMapOvr>
     <a:masterClrMapping/>
   </p:clrMapOvr>
+  <p:timing>
+    <p:tnLst>
+      <p:par>
+        <p:cTn id="1" dur="indefinite" restart="never" nodeType="tmRoot"/>
+      </p:par>
+    </p:tnLst>
+  </p:timing>
 </p:sld>
 </file>
 
@@ -9791,27 +9832,7 @@
           <a:p>
             <a:r>
               <a:rPr lang="en-NZ" dirty="0" smtClean="0"/>
-              <a:t>Generate </a:t>
-            </a:r>
-            <a:r>
-              <a:rPr lang="en-NZ" dirty="0" smtClean="0"/>
-              <a:t>descriptive statistics </a:t>
-            </a:r>
-            <a:r>
-              <a:rPr lang="en-NZ" dirty="0" smtClean="0"/>
-              <a:t>from </a:t>
-            </a:r>
-            <a:r>
-              <a:rPr lang="en-NZ" dirty="0" smtClean="0"/>
-              <a:t>the results of each iteration </a:t>
-            </a:r>
-            <a:r>
-              <a:rPr lang="en-NZ" dirty="0" smtClean="0"/>
-              <a:t>including frequencies</a:t>
-            </a:r>
-            <a:r>
-              <a:rPr lang="en-NZ" dirty="0" smtClean="0"/>
-              <a:t>, means, </a:t>
+              <a:t>Generate descriptive statistics from the results of each iteration including frequencies, means, </a:t>
             </a:r>
             <a:r>
               <a:rPr lang="en-NZ" dirty="0" err="1" smtClean="0"/>
@@ -9819,11 +9840,7 @@
             </a:r>
             <a:r>
               <a:rPr lang="en-NZ" dirty="0" smtClean="0"/>
-              <a:t>, and </a:t>
-            </a:r>
-            <a:r>
-              <a:rPr lang="en-NZ" dirty="0" smtClean="0"/>
-              <a:t>summaries</a:t>
+              <a:t>, and summaries</a:t>
             </a:r>
           </a:p>
           <a:p>
@@ -9831,22 +9848,12 @@
               <a:rPr lang="en-NZ" dirty="0" smtClean="0"/>
               <a:t>Perform multiple runs of simulation and average descriptive statistics across multiple runs</a:t>
             </a:r>
-            <a:endParaRPr lang="en-NZ" dirty="0" smtClean="0"/>
-          </a:p>
-          <a:p>
-            <a:r>
-              <a:rPr lang="en-NZ" dirty="0" smtClean="0"/>
-              <a:t>Allow scenario testing via the modification of </a:t>
-            </a:r>
-            <a:r>
-              <a:rPr lang="en-NZ" dirty="0" smtClean="0"/>
-              <a:t>simulation variables so the </a:t>
-            </a:r>
-            <a:r>
-              <a:rPr lang="en-NZ" dirty="0" smtClean="0"/>
-              <a:t>flow-on effects can be observed</a:t>
-            </a:r>
-            <a:endParaRPr lang="en-NZ" dirty="0" smtClean="0"/>
+          </a:p>
+          <a:p>
+            <a:r>
+              <a:rPr lang="en-NZ" dirty="0" smtClean="0"/>
+              <a:t>Allow scenario testing via the modification of simulation variables so the flow-on effects can be observed</a:t>
+            </a:r>
           </a:p>
           <a:p>
             <a:pPr lvl="1"/>
@@ -9867,7 +9874,17 @@
             </a:r>
             <a:r>
               <a:rPr lang="en-NZ" dirty="0" smtClean="0"/>
-              <a:t>ategorical variables can be modified before the simulation begins, or during the simulation for specific iterations</a:t>
+              <a:t>ategorical variables can be modified before the simulation begins, or during the simulation for specific </a:t>
+            </a:r>
+            <a:r>
+              <a:rPr lang="en-NZ" dirty="0" smtClean="0"/>
+              <a:t>iterations</a:t>
+            </a:r>
+          </a:p>
+          <a:p>
+            <a:r>
+              <a:rPr lang="en-NZ" dirty="0" smtClean="0"/>
+              <a:t>Available as an R package</a:t>
             </a:r>
             <a:endParaRPr lang="en-NZ" dirty="0"/>
           </a:p>
@@ -9883,6 +9900,13 @@
   <p:clrMapOvr>
     <a:masterClrMapping/>
   </p:clrMapOvr>
+  <p:timing>
+    <p:tnLst>
+      <p:par>
+        <p:cTn id="1" dur="indefinite" restart="never" nodeType="tmRoot"/>
+      </p:par>
+    </p:tnLst>
+  </p:timing>
 </p:sld>
 </file>
 
@@ -9920,11 +9944,7 @@
           <a:p>
             <a:r>
               <a:rPr lang="en-NZ" dirty="0" smtClean="0"/>
-              <a:t>Global environment </a:t>
-            </a:r>
-            <a:r>
-              <a:rPr lang="en-NZ" dirty="0" smtClean="0"/>
-              <a:t>variables</a:t>
+              <a:t>Global environment variables</a:t>
             </a:r>
             <a:endParaRPr lang="en-NZ" dirty="0"/>
           </a:p>
@@ -9955,11 +9975,7 @@
           <a:p>
             <a:r>
               <a:rPr lang="en-NZ" dirty="0" smtClean="0"/>
-              <a:t>All simulations must have at least one simulation environment </a:t>
-            </a:r>
-            <a:r>
-              <a:rPr lang="en-NZ" dirty="0" smtClean="0"/>
-              <a:t>(</a:t>
+              <a:t>All simulations must have at least one simulation environment (</a:t>
             </a:r>
             <a:r>
               <a:rPr lang="en-NZ" dirty="0" err="1" smtClean="0"/>
@@ -10008,7 +10024,6 @@
               <a:rPr lang="en-NZ" dirty="0"/>
               <a:t>list of propensity arrays used for categorical adjustment </a:t>
             </a:r>
-            <a:endParaRPr lang="en-NZ" dirty="0"/>
           </a:p>
         </p:txBody>
       </p:sp>
@@ -10176,11 +10191,7 @@
           <a:p>
             <a:r>
               <a:rPr lang="en-NZ" dirty="0" smtClean="0"/>
-              <a:t>Simulation environment </a:t>
-            </a:r>
-            <a:r>
-              <a:rPr lang="en-NZ" dirty="0" smtClean="0"/>
-              <a:t>variables</a:t>
+              <a:t>Simulation environment variables</a:t>
             </a:r>
             <a:endParaRPr lang="en-NZ" dirty="0"/>
           </a:p>
@@ -10211,7 +10222,7 @@
           <a:p>
             <a:r>
               <a:rPr lang="en-NZ" dirty="0" err="1" smtClean="0"/>
-              <a:t>runs_simulated</a:t>
+              <a:t>num_runs_simulated</a:t>
             </a:r>
             <a:endParaRPr lang="en-NZ" dirty="0" smtClean="0"/>
           </a:p>
@@ -10401,15 +10412,7 @@
           <a:p>
             <a:r>
               <a:rPr lang="en-NZ" dirty="0" smtClean="0"/>
-              <a:t>Contains </a:t>
-            </a:r>
-            <a:r>
-              <a:rPr lang="en-NZ" dirty="0" smtClean="0"/>
-              <a:t>descriptions, </a:t>
-            </a:r>
-            <a:r>
-              <a:rPr lang="en-NZ" dirty="0" smtClean="0"/>
-              <a:t>and </a:t>
+              <a:t>Contains descriptions, and </a:t>
             </a:r>
             <a:r>
               <a:rPr lang="en-NZ" dirty="0" err="1" smtClean="0"/>
@@ -10417,13 +10420,8 @@
             </a:r>
             <a:r>
               <a:rPr lang="en-NZ" dirty="0" smtClean="0"/>
-              <a:t>. Both are loaded from a </a:t>
-            </a:r>
-            <a:r>
-              <a:rPr lang="en-NZ" dirty="0" smtClean="0"/>
-              <a:t>file</a:t>
-            </a:r>
-            <a:endParaRPr lang="en-NZ" dirty="0" smtClean="0"/>
+              <a:t>. Both are loaded from a file</a:t>
+            </a:r>
           </a:p>
         </p:txBody>
       </p:sp>

</xml_diff>